<commit_message>
working on presentation - RL
</commit_message>
<xml_diff>
--- a/presentation/app_trader_proposal.pptx
+++ b/presentation/app_trader_proposal.pptx
@@ -10,7 +10,9 @@
     <p:sldId id="260" r:id="rId4"/>
     <p:sldId id="262" r:id="rId5"/>
     <p:sldId id="263" r:id="rId6"/>
-    <p:sldId id="258" r:id="rId7"/>
+    <p:sldId id="264" r:id="rId7"/>
+    <p:sldId id="265" r:id="rId8"/>
+    <p:sldId id="258" r:id="rId9"/>
   </p:sldIdLst>
   <p:sldSz cx="12192000" cy="6858000"/>
   <p:notesSz cx="6858000" cy="9144000"/>
@@ -3905,35 +3907,38 @@
           </a:p>
           <a:p>
             <a:r>
-              <a:rPr lang="en-US" sz="1800" dirty="0">
+              <a:rPr lang="en-US" sz="1600" dirty="0">
                 <a:solidFill>
                   <a:schemeClr val="tx1">
                     <a:lumMod val="85000"/>
                     <a:lumOff val="15000"/>
                   </a:schemeClr>
                 </a:solidFill>
+                <a:latin typeface="Georgia" panose="02040502050405020303" pitchFamily="18" charset="0"/>
               </a:rPr>
               <a:t>Where Our Synonym </a:t>
             </a:r>
             <a:r>
-              <a:rPr lang="en-US" sz="1800" i="1" u="sng" dirty="0">
+              <a:rPr lang="en-US" sz="1600" i="1" u="sng" dirty="0">
                 <a:solidFill>
                   <a:schemeClr val="tx1">
                     <a:lumMod val="85000"/>
                     <a:lumOff val="15000"/>
                   </a:schemeClr>
                 </a:solidFill>
+                <a:latin typeface="Georgia" panose="02040502050405020303" pitchFamily="18" charset="0"/>
               </a:rPr>
               <a:t>is</a:t>
             </a:r>
             <a:r>
-              <a:rPr lang="en-US" sz="1800" dirty="0">
+              <a:rPr lang="en-US" sz="1600" dirty="0">
                 <a:solidFill>
                   <a:schemeClr val="tx1">
                     <a:lumMod val="85000"/>
                     <a:lumOff val="15000"/>
                   </a:schemeClr>
                 </a:solidFill>
+                <a:latin typeface="Georgia" panose="02040502050405020303" pitchFamily="18" charset="0"/>
               </a:rPr>
               <a:t> DATA</a:t>
             </a:r>
@@ -4126,13 +4131,13 @@
   <p:clrMapOvr>
     <a:masterClrMapping/>
   </p:clrMapOvr>
-  <mc:AlternateContent xmlns:mc="http://schemas.openxmlformats.org/markup-compatibility/2006">
-    <mc:Choice xmlns:p14="http://schemas.microsoft.com/office/powerpoint/2010/main" Requires="p14">
+  <mc:AlternateContent xmlns:mc="http://schemas.openxmlformats.org/markup-compatibility/2006" xmlns:p14="http://schemas.microsoft.com/office/powerpoint/2010/main">
+    <mc:Choice Requires="p14">
       <p:transition spd="med" p14:dur="700">
         <p:fade/>
       </p:transition>
     </mc:Choice>
-    <mc:Fallback>
+    <mc:Fallback xmlns="">
       <p:transition spd="med">
         <p:fade/>
       </p:transition>
@@ -4209,7 +4214,7 @@
           <a:p>
             <a:r>
               <a:rPr lang="en-US" dirty="0"/>
-              <a:t>Mission</a:t>
+              <a:t>The Ask</a:t>
             </a:r>
           </a:p>
           <a:p>
@@ -4221,7 +4226,7 @@
           <a:p>
             <a:r>
               <a:rPr lang="en-US" dirty="0"/>
-              <a:t>The Proof is in the DATA</a:t>
+              <a:t>Proof</a:t>
             </a:r>
           </a:p>
           <a:p>
@@ -4247,13 +4252,13 @@
   <p:clrMapOvr>
     <a:masterClrMapping/>
   </p:clrMapOvr>
-  <mc:AlternateContent xmlns:mc="http://schemas.openxmlformats.org/markup-compatibility/2006">
-    <mc:Choice xmlns:p14="http://schemas.microsoft.com/office/powerpoint/2010/main" Requires="p14">
+  <mc:AlternateContent xmlns:mc="http://schemas.openxmlformats.org/markup-compatibility/2006" xmlns:p14="http://schemas.microsoft.com/office/powerpoint/2010/main">
+    <mc:Choice Requires="p14">
       <p:transition spd="med" p14:dur="700">
         <p:fade/>
       </p:transition>
     </mc:Choice>
-    <mc:Fallback>
+    <mc:Fallback xmlns="">
       <p:transition spd="med">
         <p:fade/>
       </p:transition>
@@ -4340,13 +4345,13 @@
           <a:p>
             <a:r>
               <a:rPr lang="en-US" dirty="0"/>
-              <a:t>Data, our primary frontier</a:t>
+              <a:t>Data, the final frontier</a:t>
             </a:r>
           </a:p>
           <a:p>
             <a:r>
               <a:rPr lang="en-US" dirty="0"/>
-              <a:t>This is “The Ask” of App Trader, Inc</a:t>
+              <a:t>These are the requests of App Trader, Inc</a:t>
             </a:r>
           </a:p>
           <a:p>
@@ -4376,7 +4381,7 @@
           <a:p>
             <a:r>
               <a:rPr lang="en-US" dirty="0"/>
-              <a:t>To boldly go where no data firm has gone before.</a:t>
+              <a:t>To boldly go where no firm has gone before.</a:t>
             </a:r>
           </a:p>
           <a:p>
@@ -4429,13 +4434,13 @@
   <p:clrMapOvr>
     <a:masterClrMapping/>
   </p:clrMapOvr>
-  <mc:AlternateContent xmlns:mc="http://schemas.openxmlformats.org/markup-compatibility/2006">
-    <mc:Choice xmlns:p14="http://schemas.microsoft.com/office/powerpoint/2010/main" Requires="p14">
+  <mc:AlternateContent xmlns:mc="http://schemas.openxmlformats.org/markup-compatibility/2006" xmlns:p14="http://schemas.microsoft.com/office/powerpoint/2010/main">
+    <mc:Choice Requires="p14">
       <p:transition spd="med" p14:dur="700">
         <p:fade/>
       </p:transition>
     </mc:Choice>
-    <mc:Fallback>
+    <mc:Fallback xmlns="">
       <p:transition spd="med">
         <p:fade/>
       </p:transition>
@@ -4491,7 +4496,7 @@
                                     </p:set>
                                     <p:animEffect transition="in" filter="fade">
                                       <p:cBhvr>
-                                        <p:cTn id="7" dur="1250"/>
+                                        <p:cTn id="7" dur="1750"/>
                                         <p:tgtEl>
                                           <p:spTgt spid="13">
                                             <p:txEl>
@@ -4510,7 +4515,7 @@
                         <p:par>
                           <p:cTn id="8" fill="hold">
                             <p:stCondLst>
-                              <p:cond delay="1250"/>
+                              <p:cond delay="1750"/>
                             </p:stCondLst>
                             <p:childTnLst>
                               <p:par>
@@ -4543,7 +4548,7 @@
                                     </p:set>
                                     <p:animEffect transition="in" filter="fade">
                                       <p:cBhvr>
-                                        <p:cTn id="11" dur="1250"/>
+                                        <p:cTn id="11" dur="1750"/>
                                         <p:tgtEl>
                                           <p:spTgt spid="13">
                                             <p:txEl>
@@ -4562,7 +4567,7 @@
                         <p:par>
                           <p:cTn id="12" fill="hold">
                             <p:stCondLst>
-                              <p:cond delay="2500"/>
+                              <p:cond delay="3500"/>
                             </p:stCondLst>
                             <p:childTnLst>
                               <p:par>
@@ -4595,7 +4600,7 @@
                                     </p:set>
                                     <p:animEffect transition="in" filter="fade">
                                       <p:cBhvr>
-                                        <p:cTn id="15" dur="1250"/>
+                                        <p:cTn id="15" dur="1750"/>
                                         <p:tgtEl>
                                           <p:spTgt spid="13">
                                             <p:txEl>
@@ -4614,7 +4619,7 @@
                         <p:par>
                           <p:cTn id="16" fill="hold">
                             <p:stCondLst>
-                              <p:cond delay="3750"/>
+                              <p:cond delay="5250"/>
                             </p:stCondLst>
                             <p:childTnLst>
                               <p:par>
@@ -4647,7 +4652,7 @@
                                     </p:set>
                                     <p:animEffect transition="in" filter="fade">
                                       <p:cBhvr>
-                                        <p:cTn id="19" dur="1250"/>
+                                        <p:cTn id="19" dur="1750"/>
                                         <p:tgtEl>
                                           <p:spTgt spid="13">
                                             <p:txEl>
@@ -4666,7 +4671,7 @@
                         <p:par>
                           <p:cTn id="20" fill="hold">
                             <p:stCondLst>
-                              <p:cond delay="5000"/>
+                              <p:cond delay="7000"/>
                             </p:stCondLst>
                             <p:childTnLst>
                               <p:par>
@@ -4699,7 +4704,7 @@
                                     </p:set>
                                     <p:animEffect transition="in" filter="fade">
                                       <p:cBhvr>
-                                        <p:cTn id="23" dur="1250"/>
+                                        <p:cTn id="23" dur="1750"/>
                                         <p:tgtEl>
                                           <p:spTgt spid="13">
                                             <p:txEl>
@@ -4718,7 +4723,7 @@
                         <p:par>
                           <p:cTn id="24" fill="hold">
                             <p:stCondLst>
-                              <p:cond delay="6250"/>
+                              <p:cond delay="8750"/>
                             </p:stCondLst>
                             <p:childTnLst>
                               <p:par>
@@ -4751,7 +4756,7 @@
                                     </p:set>
                                     <p:animEffect transition="in" filter="fade">
                                       <p:cBhvr>
-                                        <p:cTn id="27" dur="1250"/>
+                                        <p:cTn id="27" dur="1750"/>
                                         <p:tgtEl>
                                           <p:spTgt spid="13">
                                             <p:txEl>
@@ -4770,7 +4775,7 @@
                         <p:par>
                           <p:cTn id="28" fill="hold">
                             <p:stCondLst>
-                              <p:cond delay="7500"/>
+                              <p:cond delay="10500"/>
                             </p:stCondLst>
                             <p:childTnLst>
                               <p:par>
@@ -4803,7 +4808,7 @@
                                     </p:set>
                                     <p:animEffect transition="in" filter="fade">
                                       <p:cBhvr>
-                                        <p:cTn id="31" dur="1250"/>
+                                        <p:cTn id="31" dur="1750"/>
                                         <p:tgtEl>
                                           <p:spTgt spid="13">
                                             <p:txEl>
@@ -5007,13 +5012,13 @@
   <p:clrMapOvr>
     <a:masterClrMapping/>
   </p:clrMapOvr>
-  <mc:AlternateContent xmlns:mc="http://schemas.openxmlformats.org/markup-compatibility/2006">
-    <mc:Choice xmlns:p14="http://schemas.microsoft.com/office/powerpoint/2010/main" Requires="p14">
+  <mc:AlternateContent xmlns:mc="http://schemas.openxmlformats.org/markup-compatibility/2006" xmlns:p14="http://schemas.microsoft.com/office/powerpoint/2010/main">
+    <mc:Choice Requires="p14">
       <p:transition spd="med" p14:dur="700">
         <p:fade/>
       </p:transition>
     </mc:Choice>
-    <mc:Fallback>
+    <mc:Fallback xmlns="">
       <p:transition spd="med">
         <p:fade/>
       </p:transition>
@@ -5139,30 +5144,21 @@
                             </p:childTnLst>
                           </p:cTn>
                         </p:par>
-                      </p:childTnLst>
-                    </p:cTn>
-                  </p:par>
-                  <p:par>
-                    <p:cTn id="10" fill="hold">
-                      <p:stCondLst>
-                        <p:cond delay="indefinite"/>
-                      </p:stCondLst>
-                      <p:childTnLst>
                         <p:par>
-                          <p:cTn id="11" fill="hold">
+                          <p:cTn id="10" fill="hold">
                             <p:stCondLst>
-                              <p:cond delay="0"/>
+                              <p:cond delay="1000"/>
                             </p:stCondLst>
                             <p:childTnLst>
                               <p:par>
-                                <p:cTn id="12" presetID="42" presetClass="entr" presetSubtype="0" fill="hold" grpId="0" nodeType="clickEffect">
+                                <p:cTn id="11" presetID="42" presetClass="entr" presetSubtype="0" fill="hold" grpId="0" nodeType="afterEffect">
                                   <p:stCondLst>
                                     <p:cond delay="0"/>
                                   </p:stCondLst>
                                   <p:childTnLst>
                                     <p:set>
                                       <p:cBhvr>
-                                        <p:cTn id="13" dur="1" fill="hold">
+                                        <p:cTn id="12" dur="1" fill="hold">
                                           <p:stCondLst>
                                             <p:cond delay="0"/>
                                           </p:stCondLst>
@@ -5184,7 +5180,7 @@
                                     </p:set>
                                     <p:animEffect transition="in" filter="fade">
                                       <p:cBhvr>
-                                        <p:cTn id="14" dur="1000"/>
+                                        <p:cTn id="13" dur="1000"/>
                                         <p:tgtEl>
                                           <p:spTgt spid="3">
                                             <p:txEl>
@@ -5196,7 +5192,7 @@
                                     </p:animEffect>
                                     <p:anim calcmode="lin" valueType="num">
                                       <p:cBhvr>
-                                        <p:cTn id="15" dur="1000" fill="hold"/>
+                                        <p:cTn id="14" dur="1000" fill="hold"/>
                                         <p:tgtEl>
                                           <p:spTgt spid="3">
                                             <p:txEl>
@@ -5223,7 +5219,7 @@
                                     </p:anim>
                                     <p:anim calcmode="lin" valueType="num">
                                       <p:cBhvr>
-                                        <p:cTn id="16" dur="1000" fill="hold"/>
+                                        <p:cTn id="15" dur="1000" fill="hold"/>
                                         <p:tgtEl>
                                           <p:spTgt spid="3">
                                             <p:txEl>
@@ -5254,30 +5250,21 @@
                             </p:childTnLst>
                           </p:cTn>
                         </p:par>
-                      </p:childTnLst>
-                    </p:cTn>
-                  </p:par>
-                  <p:par>
-                    <p:cTn id="17" fill="hold">
-                      <p:stCondLst>
-                        <p:cond delay="indefinite"/>
-                      </p:stCondLst>
-                      <p:childTnLst>
                         <p:par>
-                          <p:cTn id="18" fill="hold">
+                          <p:cTn id="16" fill="hold">
                             <p:stCondLst>
-                              <p:cond delay="0"/>
+                              <p:cond delay="2000"/>
                             </p:stCondLst>
                             <p:childTnLst>
                               <p:par>
-                                <p:cTn id="19" presetID="42" presetClass="entr" presetSubtype="0" fill="hold" grpId="0" nodeType="clickEffect">
+                                <p:cTn id="17" presetID="42" presetClass="entr" presetSubtype="0" fill="hold" grpId="0" nodeType="afterEffect">
                                   <p:stCondLst>
                                     <p:cond delay="0"/>
                                   </p:stCondLst>
                                   <p:childTnLst>
                                     <p:set>
                                       <p:cBhvr>
-                                        <p:cTn id="20" dur="1" fill="hold">
+                                        <p:cTn id="18" dur="1" fill="hold">
                                           <p:stCondLst>
                                             <p:cond delay="0"/>
                                           </p:stCondLst>
@@ -5299,7 +5286,7 @@
                                     </p:set>
                                     <p:animEffect transition="in" filter="fade">
                                       <p:cBhvr>
-                                        <p:cTn id="21" dur="1000"/>
+                                        <p:cTn id="19" dur="1000"/>
                                         <p:tgtEl>
                                           <p:spTgt spid="3">
                                             <p:txEl>
@@ -5311,7 +5298,7 @@
                                     </p:animEffect>
                                     <p:anim calcmode="lin" valueType="num">
                                       <p:cBhvr>
-                                        <p:cTn id="22" dur="1000" fill="hold"/>
+                                        <p:cTn id="20" dur="1000" fill="hold"/>
                                         <p:tgtEl>
                                           <p:spTgt spid="3">
                                             <p:txEl>
@@ -5338,7 +5325,7 @@
                                     </p:anim>
                                     <p:anim calcmode="lin" valueType="num">
                                       <p:cBhvr>
-                                        <p:cTn id="23" dur="1000" fill="hold"/>
+                                        <p:cTn id="21" dur="1000" fill="hold"/>
                                         <p:tgtEl>
                                           <p:spTgt spid="3">
                                             <p:txEl>
@@ -5369,30 +5356,21 @@
                             </p:childTnLst>
                           </p:cTn>
                         </p:par>
-                      </p:childTnLst>
-                    </p:cTn>
-                  </p:par>
-                  <p:par>
-                    <p:cTn id="24" fill="hold">
-                      <p:stCondLst>
-                        <p:cond delay="indefinite"/>
-                      </p:stCondLst>
-                      <p:childTnLst>
                         <p:par>
-                          <p:cTn id="25" fill="hold">
+                          <p:cTn id="22" fill="hold">
                             <p:stCondLst>
-                              <p:cond delay="0"/>
+                              <p:cond delay="3000"/>
                             </p:stCondLst>
                             <p:childTnLst>
                               <p:par>
-                                <p:cTn id="26" presetID="42" presetClass="entr" presetSubtype="0" fill="hold" grpId="0" nodeType="clickEffect">
+                                <p:cTn id="23" presetID="42" presetClass="entr" presetSubtype="0" fill="hold" grpId="0" nodeType="afterEffect">
                                   <p:stCondLst>
                                     <p:cond delay="0"/>
                                   </p:stCondLst>
                                   <p:childTnLst>
                                     <p:set>
                                       <p:cBhvr>
-                                        <p:cTn id="27" dur="1" fill="hold">
+                                        <p:cTn id="24" dur="1" fill="hold">
                                           <p:stCondLst>
                                             <p:cond delay="0"/>
                                           </p:stCondLst>
@@ -5414,7 +5392,7 @@
                                     </p:set>
                                     <p:animEffect transition="in" filter="fade">
                                       <p:cBhvr>
-                                        <p:cTn id="28" dur="1000"/>
+                                        <p:cTn id="25" dur="1000"/>
                                         <p:tgtEl>
                                           <p:spTgt spid="3">
                                             <p:txEl>
@@ -5426,7 +5404,7 @@
                                     </p:animEffect>
                                     <p:anim calcmode="lin" valueType="num">
                                       <p:cBhvr>
-                                        <p:cTn id="29" dur="1000" fill="hold"/>
+                                        <p:cTn id="26" dur="1000" fill="hold"/>
                                         <p:tgtEl>
                                           <p:spTgt spid="3">
                                             <p:txEl>
@@ -5453,7 +5431,7 @@
                                     </p:anim>
                                     <p:anim calcmode="lin" valueType="num">
                                       <p:cBhvr>
-                                        <p:cTn id="30" dur="1000" fill="hold"/>
+                                        <p:cTn id="27" dur="1000" fill="hold"/>
                                         <p:tgtEl>
                                           <p:spTgt spid="3">
                                             <p:txEl>
@@ -5484,30 +5462,21 @@
                             </p:childTnLst>
                           </p:cTn>
                         </p:par>
-                      </p:childTnLst>
-                    </p:cTn>
-                  </p:par>
-                  <p:par>
-                    <p:cTn id="31" fill="hold">
-                      <p:stCondLst>
-                        <p:cond delay="indefinite"/>
-                      </p:stCondLst>
-                      <p:childTnLst>
                         <p:par>
-                          <p:cTn id="32" fill="hold">
+                          <p:cTn id="28" fill="hold">
                             <p:stCondLst>
-                              <p:cond delay="0"/>
+                              <p:cond delay="4000"/>
                             </p:stCondLst>
                             <p:childTnLst>
                               <p:par>
-                                <p:cTn id="33" presetID="42" presetClass="entr" presetSubtype="0" fill="hold" grpId="0" nodeType="clickEffect">
+                                <p:cTn id="29" presetID="42" presetClass="entr" presetSubtype="0" fill="hold" grpId="0" nodeType="afterEffect">
                                   <p:stCondLst>
                                     <p:cond delay="0"/>
                                   </p:stCondLst>
                                   <p:childTnLst>
                                     <p:set>
                                       <p:cBhvr>
-                                        <p:cTn id="34" dur="1" fill="hold">
+                                        <p:cTn id="30" dur="1" fill="hold">
                                           <p:stCondLst>
                                             <p:cond delay="0"/>
                                           </p:stCondLst>
@@ -5529,7 +5498,7 @@
                                     </p:set>
                                     <p:animEffect transition="in" filter="fade">
                                       <p:cBhvr>
-                                        <p:cTn id="35" dur="1000"/>
+                                        <p:cTn id="31" dur="1000"/>
                                         <p:tgtEl>
                                           <p:spTgt spid="3">
                                             <p:txEl>
@@ -5541,7 +5510,7 @@
                                     </p:animEffect>
                                     <p:anim calcmode="lin" valueType="num">
                                       <p:cBhvr>
-                                        <p:cTn id="36" dur="1000" fill="hold"/>
+                                        <p:cTn id="32" dur="1000" fill="hold"/>
                                         <p:tgtEl>
                                           <p:spTgt spid="3">
                                             <p:txEl>
@@ -5568,7 +5537,7 @@
                                     </p:anim>
                                     <p:anim calcmode="lin" valueType="num">
                                       <p:cBhvr>
-                                        <p:cTn id="37" dur="1000" fill="hold"/>
+                                        <p:cTn id="33" dur="1000" fill="hold"/>
                                         <p:tgtEl>
                                           <p:spTgt spid="3">
                                             <p:txEl>
@@ -5624,13 +5593,283 @@
       </p:par>
     </p:tnLst>
     <p:bldLst>
-      <p:bldP spid="3" grpId="0" build="p"/>
+      <p:bldP spid="3" grpId="0" uiExpand="1" build="p"/>
     </p:bldLst>
   </p:timing>
 </p:sld>
 </file>
 
 <file path=ppt/slides/slide6.xml><?xml version="1.0" encoding="utf-8"?>
+<p:sld xmlns:a="http://schemas.openxmlformats.org/drawingml/2006/main" xmlns:r="http://schemas.openxmlformats.org/officeDocument/2006/relationships" xmlns:p="http://schemas.openxmlformats.org/presentationml/2006/main">
+  <p:cSld>
+    <p:spTree>
+      <p:nvGrpSpPr>
+        <p:cNvPr id="1" name=""/>
+        <p:cNvGrpSpPr/>
+        <p:nvPr/>
+      </p:nvGrpSpPr>
+      <p:grpSpPr>
+        <a:xfrm>
+          <a:off x="0" y="0"/>
+          <a:ext cx="0" cy="0"/>
+          <a:chOff x="0" y="0"/>
+          <a:chExt cx="0" cy="0"/>
+        </a:xfrm>
+      </p:grpSpPr>
+      <p:sp>
+        <p:nvSpPr>
+          <p:cNvPr id="2" name="Title 1">
+            <a:extLst>
+              <a:ext uri="{FF2B5EF4-FFF2-40B4-BE49-F238E27FC236}">
+                <a16:creationId xmlns:a16="http://schemas.microsoft.com/office/drawing/2014/main" id="{29970C53-4DC9-4539-8ADE-A3EAF90CBA35}"/>
+              </a:ext>
+            </a:extLst>
+          </p:cNvPr>
+          <p:cNvSpPr>
+            <a:spLocks noGrp="1"/>
+          </p:cNvSpPr>
+          <p:nvPr>
+            <p:ph type="title"/>
+          </p:nvPr>
+        </p:nvSpPr>
+        <p:spPr/>
+        <p:txBody>
+          <a:bodyPr/>
+          <a:lstStyle/>
+          <a:p>
+            <a:r>
+              <a:rPr lang="en-US" dirty="0"/>
+              <a:t>The Proof is in the DATA</a:t>
+            </a:r>
+          </a:p>
+        </p:txBody>
+      </p:sp>
+      <p:sp>
+        <p:nvSpPr>
+          <p:cNvPr id="3" name="Text Placeholder 2">
+            <a:extLst>
+              <a:ext uri="{FF2B5EF4-FFF2-40B4-BE49-F238E27FC236}">
+                <a16:creationId xmlns:a16="http://schemas.microsoft.com/office/drawing/2014/main" id="{CE58E6FE-90D3-4531-99F4-327525A68CA1}"/>
+              </a:ext>
+            </a:extLst>
+          </p:cNvPr>
+          <p:cNvSpPr>
+            <a:spLocks noGrp="1"/>
+          </p:cNvSpPr>
+          <p:nvPr>
+            <p:ph type="body" idx="1"/>
+          </p:nvPr>
+        </p:nvSpPr>
+        <p:spPr/>
+        <p:txBody>
+          <a:bodyPr/>
+          <a:lstStyle/>
+          <a:p>
+            <a:endParaRPr lang="en-US"/>
+          </a:p>
+        </p:txBody>
+      </p:sp>
+      <p:sp>
+        <p:nvSpPr>
+          <p:cNvPr id="4" name="Content Placeholder 3">
+            <a:extLst>
+              <a:ext uri="{FF2B5EF4-FFF2-40B4-BE49-F238E27FC236}">
+                <a16:creationId xmlns:a16="http://schemas.microsoft.com/office/drawing/2014/main" id="{E783C360-69FA-452D-AE0E-EE08AABF84D1}"/>
+              </a:ext>
+            </a:extLst>
+          </p:cNvPr>
+          <p:cNvSpPr>
+            <a:spLocks noGrp="1"/>
+          </p:cNvSpPr>
+          <p:nvPr>
+            <p:ph sz="half" idx="2"/>
+          </p:nvPr>
+        </p:nvSpPr>
+        <p:spPr/>
+        <p:txBody>
+          <a:bodyPr/>
+          <a:lstStyle/>
+          <a:p>
+            <a:endParaRPr lang="en-US"/>
+          </a:p>
+        </p:txBody>
+      </p:sp>
+      <p:sp>
+        <p:nvSpPr>
+          <p:cNvPr id="5" name="Text Placeholder 4">
+            <a:extLst>
+              <a:ext uri="{FF2B5EF4-FFF2-40B4-BE49-F238E27FC236}">
+                <a16:creationId xmlns:a16="http://schemas.microsoft.com/office/drawing/2014/main" id="{F90F5BF4-8587-48DA-A352-2BA6426582F9}"/>
+              </a:ext>
+            </a:extLst>
+          </p:cNvPr>
+          <p:cNvSpPr>
+            <a:spLocks noGrp="1"/>
+          </p:cNvSpPr>
+          <p:nvPr>
+            <p:ph type="body" sz="quarter" idx="3"/>
+          </p:nvPr>
+        </p:nvSpPr>
+        <p:spPr/>
+        <p:txBody>
+          <a:bodyPr/>
+          <a:lstStyle/>
+          <a:p>
+            <a:endParaRPr lang="en-US"/>
+          </a:p>
+        </p:txBody>
+      </p:sp>
+      <p:sp>
+        <p:nvSpPr>
+          <p:cNvPr id="6" name="Content Placeholder 5">
+            <a:extLst>
+              <a:ext uri="{FF2B5EF4-FFF2-40B4-BE49-F238E27FC236}">
+                <a16:creationId xmlns:a16="http://schemas.microsoft.com/office/drawing/2014/main" id="{3C6C0612-7493-4D9D-A023-737863305CDE}"/>
+              </a:ext>
+            </a:extLst>
+          </p:cNvPr>
+          <p:cNvSpPr>
+            <a:spLocks noGrp="1"/>
+          </p:cNvSpPr>
+          <p:nvPr>
+            <p:ph sz="quarter" idx="4"/>
+          </p:nvPr>
+        </p:nvSpPr>
+        <p:spPr/>
+        <p:txBody>
+          <a:bodyPr/>
+          <a:lstStyle/>
+          <a:p>
+            <a:endParaRPr lang="en-US"/>
+          </a:p>
+        </p:txBody>
+      </p:sp>
+    </p:spTree>
+    <p:extLst>
+      <p:ext uri="{BB962C8B-B14F-4D97-AF65-F5344CB8AC3E}">
+        <p14:creationId xmlns:p14="http://schemas.microsoft.com/office/powerpoint/2010/main" val="1044832069"/>
+      </p:ext>
+    </p:extLst>
+  </p:cSld>
+  <p:clrMapOvr>
+    <a:masterClrMapping/>
+  </p:clrMapOvr>
+  <mc:AlternateContent xmlns:mc="http://schemas.openxmlformats.org/markup-compatibility/2006">
+    <mc:Choice xmlns:p14="http://schemas.microsoft.com/office/powerpoint/2010/main" Requires="p14">
+      <p:transition spd="med" p14:dur="700">
+        <p:fade/>
+      </p:transition>
+    </mc:Choice>
+    <mc:Fallback>
+      <p:transition spd="med">
+        <p:fade/>
+      </p:transition>
+    </mc:Fallback>
+  </mc:AlternateContent>
+</p:sld>
+</file>
+
+<file path=ppt/slides/slide7.xml><?xml version="1.0" encoding="utf-8"?>
+<p:sld xmlns:a="http://schemas.openxmlformats.org/drawingml/2006/main" xmlns:r="http://schemas.openxmlformats.org/officeDocument/2006/relationships" xmlns:p="http://schemas.openxmlformats.org/presentationml/2006/main">
+  <p:cSld>
+    <p:spTree>
+      <p:nvGrpSpPr>
+        <p:cNvPr id="1" name=""/>
+        <p:cNvGrpSpPr/>
+        <p:nvPr/>
+      </p:nvGrpSpPr>
+      <p:grpSpPr>
+        <a:xfrm>
+          <a:off x="0" y="0"/>
+          <a:ext cx="0" cy="0"/>
+          <a:chOff x="0" y="0"/>
+          <a:chExt cx="0" cy="0"/>
+        </a:xfrm>
+      </p:grpSpPr>
+      <p:sp>
+        <p:nvSpPr>
+          <p:cNvPr id="2" name="Title 1">
+            <a:extLst>
+              <a:ext uri="{FF2B5EF4-FFF2-40B4-BE49-F238E27FC236}">
+                <a16:creationId xmlns:a16="http://schemas.microsoft.com/office/drawing/2014/main" id="{8E04682E-F77E-4D76-9D8E-A21D9F6617E7}"/>
+              </a:ext>
+            </a:extLst>
+          </p:cNvPr>
+          <p:cNvSpPr>
+            <a:spLocks noGrp="1"/>
+          </p:cNvSpPr>
+          <p:nvPr>
+            <p:ph type="title"/>
+          </p:nvPr>
+        </p:nvSpPr>
+        <p:spPr/>
+        <p:txBody>
+          <a:bodyPr/>
+          <a:lstStyle/>
+          <a:p>
+            <a:r>
+              <a:rPr lang="en-US" dirty="0"/>
+              <a:t>Our </a:t>
+            </a:r>
+            <a:r>
+              <a:rPr lang="en-US" dirty="0" err="1"/>
+              <a:t>SELECTion</a:t>
+            </a:r>
+            <a:endParaRPr lang="en-US" dirty="0"/>
+          </a:p>
+        </p:txBody>
+      </p:sp>
+      <p:sp>
+        <p:nvSpPr>
+          <p:cNvPr id="3" name="Content Placeholder 2">
+            <a:extLst>
+              <a:ext uri="{FF2B5EF4-FFF2-40B4-BE49-F238E27FC236}">
+                <a16:creationId xmlns:a16="http://schemas.microsoft.com/office/drawing/2014/main" id="{C4D18CF8-357E-4A56-9176-310C6574768C}"/>
+              </a:ext>
+            </a:extLst>
+          </p:cNvPr>
+          <p:cNvSpPr>
+            <a:spLocks noGrp="1"/>
+          </p:cNvSpPr>
+          <p:nvPr>
+            <p:ph idx="1"/>
+          </p:nvPr>
+        </p:nvSpPr>
+        <p:spPr/>
+        <p:txBody>
+          <a:bodyPr/>
+          <a:lstStyle/>
+          <a:p>
+            <a:endParaRPr lang="en-US"/>
+          </a:p>
+        </p:txBody>
+      </p:sp>
+    </p:spTree>
+    <p:extLst>
+      <p:ext uri="{BB962C8B-B14F-4D97-AF65-F5344CB8AC3E}">
+        <p14:creationId xmlns:p14="http://schemas.microsoft.com/office/powerpoint/2010/main" val="564477931"/>
+      </p:ext>
+    </p:extLst>
+  </p:cSld>
+  <p:clrMapOvr>
+    <a:masterClrMapping/>
+  </p:clrMapOvr>
+  <mc:AlternateContent xmlns:mc="http://schemas.openxmlformats.org/markup-compatibility/2006">
+    <mc:Choice xmlns:p14="http://schemas.microsoft.com/office/powerpoint/2010/main" Requires="p14">
+      <p:transition spd="med" p14:dur="700">
+        <p:fade/>
+      </p:transition>
+    </mc:Choice>
+    <mc:Fallback>
+      <p:transition spd="med">
+        <p:fade/>
+      </p:transition>
+    </mc:Fallback>
+  </mc:AlternateContent>
+</p:sld>
+</file>
+
+<file path=ppt/slides/slide8.xml><?xml version="1.0" encoding="utf-8"?>
 <p:sld xmlns:a="http://schemas.openxmlformats.org/drawingml/2006/main" xmlns:r="http://schemas.openxmlformats.org/officeDocument/2006/relationships" xmlns:p="http://schemas.openxmlformats.org/presentationml/2006/main">
   <p:cSld>
     <p:bg>
@@ -5753,7 +5992,7 @@
                   <a:srgbClr val="FFFFFF"/>
                 </a:solidFill>
               </a:rPr>
-              <a:t>Your best quote that reflects your approach… “It’s one small step for man, one giant leap for mankind.”</a:t>
+              <a:t>“If the statistics are boring, you’ve got the wrong numbers.”</a:t>
             </a:r>
           </a:p>
         </p:txBody>
@@ -5842,12 +6081,12 @@
           <a:lstStyle/>
           <a:p>
             <a:r>
-              <a:rPr lang="en-US">
+              <a:rPr lang="en-US" dirty="0">
                 <a:solidFill>
                   <a:srgbClr val="FFFFFF"/>
                 </a:solidFill>
               </a:rPr>
-              <a:t>- Neil Armstrong</a:t>
+              <a:t>- Edward Tufte</a:t>
             </a:r>
           </a:p>
         </p:txBody>
@@ -5862,6 +6101,18 @@
   <p:clrMapOvr>
     <a:masterClrMapping/>
   </p:clrMapOvr>
+  <mc:AlternateContent xmlns:mc="http://schemas.openxmlformats.org/markup-compatibility/2006">
+    <mc:Choice xmlns:p14="http://schemas.microsoft.com/office/powerpoint/2010/main" Requires="p14">
+      <p:transition spd="med" p14:dur="700">
+        <p:fade/>
+      </p:transition>
+    </mc:Choice>
+    <mc:Fallback>
+      <p:transition spd="med">
+        <p:fade/>
+      </p:transition>
+    </mc:Fallback>
+  </mc:AlternateContent>
 </p:sld>
 </file>
 

</xml_diff>

<commit_message>
Updated proposal - RL
</commit_message>
<xml_diff>
--- a/presentation/app_trader_proposal.pptx
+++ b/presentation/app_trader_proposal.pptx
@@ -6,13 +6,17 @@
   </p:sldMasterIdLst>
   <p:sldIdLst>
     <p:sldId id="257" r:id="rId2"/>
-    <p:sldId id="259" r:id="rId3"/>
-    <p:sldId id="260" r:id="rId4"/>
+    <p:sldId id="260" r:id="rId3"/>
+    <p:sldId id="266" r:id="rId4"/>
     <p:sldId id="262" r:id="rId5"/>
     <p:sldId id="263" r:id="rId6"/>
     <p:sldId id="264" r:id="rId7"/>
-    <p:sldId id="265" r:id="rId8"/>
-    <p:sldId id="258" r:id="rId9"/>
+    <p:sldId id="267" r:id="rId8"/>
+    <p:sldId id="268" r:id="rId9"/>
+    <p:sldId id="269" r:id="rId10"/>
+    <p:sldId id="270" r:id="rId11"/>
+    <p:sldId id="265" r:id="rId12"/>
+    <p:sldId id="258" r:id="rId13"/>
   </p:sldIdLst>
   <p:sldSz cx="12192000" cy="6858000"/>
   <p:notesSz cx="6858000" cy="9144000"/>
@@ -119,6 +123,3093 @@
 </p:presentation>
 </file>
 
+<file path=ppt/diagrams/colors1.xml><?xml version="1.0" encoding="utf-8"?>
+<dgm:colorsDef xmlns:dgm="http://schemas.openxmlformats.org/drawingml/2006/diagram" xmlns:a="http://schemas.openxmlformats.org/drawingml/2006/main" uniqueId="urn:microsoft.com/office/officeart/2005/8/colors/accent2_2">
+  <dgm:title val=""/>
+  <dgm:desc val=""/>
+  <dgm:catLst>
+    <dgm:cat type="accent2" pri="11200"/>
+  </dgm:catLst>
+  <dgm:styleLbl name="node0">
+    <dgm:fillClrLst meth="repeat">
+      <a:schemeClr val="accent2"/>
+    </dgm:fillClrLst>
+    <dgm:linClrLst meth="repeat">
+      <a:schemeClr val="lt1"/>
+    </dgm:linClrLst>
+    <dgm:effectClrLst/>
+    <dgm:txLinClrLst/>
+    <dgm:txFillClrLst/>
+    <dgm:txEffectClrLst/>
+  </dgm:styleLbl>
+  <dgm:styleLbl name="node1">
+    <dgm:fillClrLst meth="repeat">
+      <a:schemeClr val="accent2"/>
+    </dgm:fillClrLst>
+    <dgm:linClrLst meth="repeat">
+      <a:schemeClr val="lt1"/>
+    </dgm:linClrLst>
+    <dgm:effectClrLst/>
+    <dgm:txLinClrLst/>
+    <dgm:txFillClrLst/>
+    <dgm:txEffectClrLst/>
+  </dgm:styleLbl>
+  <dgm:styleLbl name="alignNode1">
+    <dgm:fillClrLst meth="repeat">
+      <a:schemeClr val="accent2"/>
+    </dgm:fillClrLst>
+    <dgm:linClrLst meth="repeat">
+      <a:schemeClr val="accent2"/>
+    </dgm:linClrLst>
+    <dgm:effectClrLst/>
+    <dgm:txLinClrLst/>
+    <dgm:txFillClrLst/>
+    <dgm:txEffectClrLst/>
+  </dgm:styleLbl>
+  <dgm:styleLbl name="lnNode1">
+    <dgm:fillClrLst meth="repeat">
+      <a:schemeClr val="accent2"/>
+    </dgm:fillClrLst>
+    <dgm:linClrLst meth="repeat">
+      <a:schemeClr val="lt1"/>
+    </dgm:linClrLst>
+    <dgm:effectClrLst/>
+    <dgm:txLinClrLst/>
+    <dgm:txFillClrLst/>
+    <dgm:txEffectClrLst/>
+  </dgm:styleLbl>
+  <dgm:styleLbl name="vennNode1">
+    <dgm:fillClrLst meth="repeat">
+      <a:schemeClr val="accent2">
+        <a:alpha val="50000"/>
+      </a:schemeClr>
+    </dgm:fillClrLst>
+    <dgm:linClrLst meth="repeat">
+      <a:schemeClr val="lt1"/>
+    </dgm:linClrLst>
+    <dgm:effectClrLst/>
+    <dgm:txLinClrLst/>
+    <dgm:txFillClrLst/>
+    <dgm:txEffectClrLst/>
+  </dgm:styleLbl>
+  <dgm:styleLbl name="node2">
+    <dgm:fillClrLst meth="repeat">
+      <a:schemeClr val="accent2"/>
+    </dgm:fillClrLst>
+    <dgm:linClrLst meth="repeat">
+      <a:schemeClr val="lt1"/>
+    </dgm:linClrLst>
+    <dgm:effectClrLst/>
+    <dgm:txLinClrLst/>
+    <dgm:txFillClrLst/>
+    <dgm:txEffectClrLst/>
+  </dgm:styleLbl>
+  <dgm:styleLbl name="node3">
+    <dgm:fillClrLst meth="repeat">
+      <a:schemeClr val="accent2"/>
+    </dgm:fillClrLst>
+    <dgm:linClrLst meth="repeat">
+      <a:schemeClr val="lt1"/>
+    </dgm:linClrLst>
+    <dgm:effectClrLst/>
+    <dgm:txLinClrLst/>
+    <dgm:txFillClrLst/>
+    <dgm:txEffectClrLst/>
+  </dgm:styleLbl>
+  <dgm:styleLbl name="node4">
+    <dgm:fillClrLst meth="repeat">
+      <a:schemeClr val="accent2"/>
+    </dgm:fillClrLst>
+    <dgm:linClrLst meth="repeat">
+      <a:schemeClr val="lt1"/>
+    </dgm:linClrLst>
+    <dgm:effectClrLst/>
+    <dgm:txLinClrLst/>
+    <dgm:txFillClrLst/>
+    <dgm:txEffectClrLst/>
+  </dgm:styleLbl>
+  <dgm:styleLbl name="fgImgPlace1">
+    <dgm:fillClrLst meth="repeat">
+      <a:schemeClr val="accent2">
+        <a:tint val="50000"/>
+      </a:schemeClr>
+    </dgm:fillClrLst>
+    <dgm:linClrLst meth="repeat">
+      <a:schemeClr val="lt1"/>
+    </dgm:linClrLst>
+    <dgm:effectClrLst/>
+    <dgm:txLinClrLst/>
+    <dgm:txFillClrLst meth="repeat">
+      <a:schemeClr val="lt1"/>
+    </dgm:txFillClrLst>
+    <dgm:txEffectClrLst/>
+  </dgm:styleLbl>
+  <dgm:styleLbl name="alignImgPlace1">
+    <dgm:fillClrLst meth="repeat">
+      <a:schemeClr val="accent2">
+        <a:tint val="50000"/>
+      </a:schemeClr>
+    </dgm:fillClrLst>
+    <dgm:linClrLst meth="repeat">
+      <a:schemeClr val="lt1"/>
+    </dgm:linClrLst>
+    <dgm:effectClrLst/>
+    <dgm:txLinClrLst/>
+    <dgm:txFillClrLst meth="repeat">
+      <a:schemeClr val="lt1"/>
+    </dgm:txFillClrLst>
+    <dgm:txEffectClrLst/>
+  </dgm:styleLbl>
+  <dgm:styleLbl name="bgImgPlace1">
+    <dgm:fillClrLst meth="repeat">
+      <a:schemeClr val="accent2">
+        <a:tint val="50000"/>
+      </a:schemeClr>
+    </dgm:fillClrLst>
+    <dgm:linClrLst meth="repeat">
+      <a:schemeClr val="lt1"/>
+    </dgm:linClrLst>
+    <dgm:effectClrLst/>
+    <dgm:txLinClrLst/>
+    <dgm:txFillClrLst meth="repeat">
+      <a:schemeClr val="lt1"/>
+    </dgm:txFillClrLst>
+    <dgm:txEffectClrLst/>
+  </dgm:styleLbl>
+  <dgm:styleLbl name="sibTrans2D1">
+    <dgm:fillClrLst meth="repeat">
+      <a:schemeClr val="accent2">
+        <a:tint val="60000"/>
+      </a:schemeClr>
+    </dgm:fillClrLst>
+    <dgm:linClrLst meth="repeat">
+      <a:schemeClr val="accent2">
+        <a:tint val="60000"/>
+      </a:schemeClr>
+    </dgm:linClrLst>
+    <dgm:effectClrLst/>
+    <dgm:txLinClrLst/>
+    <dgm:txFillClrLst/>
+    <dgm:txEffectClrLst/>
+  </dgm:styleLbl>
+  <dgm:styleLbl name="fgSibTrans2D1">
+    <dgm:fillClrLst meth="repeat">
+      <a:schemeClr val="accent2">
+        <a:tint val="60000"/>
+      </a:schemeClr>
+    </dgm:fillClrLst>
+    <dgm:linClrLst meth="repeat">
+      <a:schemeClr val="accent2">
+        <a:tint val="60000"/>
+      </a:schemeClr>
+    </dgm:linClrLst>
+    <dgm:effectClrLst/>
+    <dgm:txLinClrLst/>
+    <dgm:txFillClrLst/>
+    <dgm:txEffectClrLst/>
+  </dgm:styleLbl>
+  <dgm:styleLbl name="bgSibTrans2D1">
+    <dgm:fillClrLst meth="repeat">
+      <a:schemeClr val="accent2">
+        <a:tint val="60000"/>
+      </a:schemeClr>
+    </dgm:fillClrLst>
+    <dgm:linClrLst meth="repeat">
+      <a:schemeClr val="accent2">
+        <a:tint val="60000"/>
+      </a:schemeClr>
+    </dgm:linClrLst>
+    <dgm:effectClrLst/>
+    <dgm:txLinClrLst/>
+    <dgm:txFillClrLst/>
+    <dgm:txEffectClrLst/>
+  </dgm:styleLbl>
+  <dgm:styleLbl name="sibTrans1D1">
+    <dgm:fillClrLst meth="repeat">
+      <a:schemeClr val="accent2"/>
+    </dgm:fillClrLst>
+    <dgm:linClrLst meth="repeat">
+      <a:schemeClr val="accent2"/>
+    </dgm:linClrLst>
+    <dgm:effectClrLst/>
+    <dgm:txLinClrLst/>
+    <dgm:txFillClrLst meth="repeat">
+      <a:schemeClr val="tx1"/>
+    </dgm:txFillClrLst>
+    <dgm:txEffectClrLst/>
+  </dgm:styleLbl>
+  <dgm:styleLbl name="callout">
+    <dgm:fillClrLst meth="repeat">
+      <a:schemeClr val="accent2"/>
+    </dgm:fillClrLst>
+    <dgm:linClrLst meth="repeat">
+      <a:schemeClr val="accent2">
+        <a:tint val="50000"/>
+      </a:schemeClr>
+    </dgm:linClrLst>
+    <dgm:effectClrLst/>
+    <dgm:txLinClrLst/>
+    <dgm:txFillClrLst meth="repeat">
+      <a:schemeClr val="tx1"/>
+    </dgm:txFillClrLst>
+    <dgm:txEffectClrLst/>
+  </dgm:styleLbl>
+  <dgm:styleLbl name="asst0">
+    <dgm:fillClrLst meth="repeat">
+      <a:schemeClr val="accent2"/>
+    </dgm:fillClrLst>
+    <dgm:linClrLst meth="repeat">
+      <a:schemeClr val="lt1"/>
+    </dgm:linClrLst>
+    <dgm:effectClrLst/>
+    <dgm:txLinClrLst/>
+    <dgm:txFillClrLst/>
+    <dgm:txEffectClrLst/>
+  </dgm:styleLbl>
+  <dgm:styleLbl name="asst1">
+    <dgm:fillClrLst meth="repeat">
+      <a:schemeClr val="accent2"/>
+    </dgm:fillClrLst>
+    <dgm:linClrLst meth="repeat">
+      <a:schemeClr val="lt1"/>
+    </dgm:linClrLst>
+    <dgm:effectClrLst/>
+    <dgm:txLinClrLst/>
+    <dgm:txFillClrLst/>
+    <dgm:txEffectClrLst/>
+  </dgm:styleLbl>
+  <dgm:styleLbl name="asst2">
+    <dgm:fillClrLst meth="repeat">
+      <a:schemeClr val="accent2"/>
+    </dgm:fillClrLst>
+    <dgm:linClrLst meth="repeat">
+      <a:schemeClr val="lt1"/>
+    </dgm:linClrLst>
+    <dgm:effectClrLst/>
+    <dgm:txLinClrLst/>
+    <dgm:txFillClrLst/>
+    <dgm:txEffectClrLst/>
+  </dgm:styleLbl>
+  <dgm:styleLbl name="asst3">
+    <dgm:fillClrLst meth="repeat">
+      <a:schemeClr val="accent2"/>
+    </dgm:fillClrLst>
+    <dgm:linClrLst meth="repeat">
+      <a:schemeClr val="lt1"/>
+    </dgm:linClrLst>
+    <dgm:effectClrLst/>
+    <dgm:txLinClrLst/>
+    <dgm:txFillClrLst/>
+    <dgm:txEffectClrLst/>
+  </dgm:styleLbl>
+  <dgm:styleLbl name="asst4">
+    <dgm:fillClrLst meth="repeat">
+      <a:schemeClr val="accent2"/>
+    </dgm:fillClrLst>
+    <dgm:linClrLst meth="repeat">
+      <a:schemeClr val="lt1"/>
+    </dgm:linClrLst>
+    <dgm:effectClrLst/>
+    <dgm:txLinClrLst/>
+    <dgm:txFillClrLst/>
+    <dgm:txEffectClrLst/>
+  </dgm:styleLbl>
+  <dgm:styleLbl name="parChTrans2D1">
+    <dgm:fillClrLst meth="repeat">
+      <a:schemeClr val="accent2">
+        <a:tint val="60000"/>
+      </a:schemeClr>
+    </dgm:fillClrLst>
+    <dgm:linClrLst meth="repeat">
+      <a:schemeClr val="accent2">
+        <a:tint val="60000"/>
+      </a:schemeClr>
+    </dgm:linClrLst>
+    <dgm:effectClrLst/>
+    <dgm:txLinClrLst/>
+    <dgm:txFillClrLst meth="repeat">
+      <a:schemeClr val="lt1"/>
+    </dgm:txFillClrLst>
+    <dgm:txEffectClrLst/>
+  </dgm:styleLbl>
+  <dgm:styleLbl name="parChTrans2D2">
+    <dgm:fillClrLst meth="repeat">
+      <a:schemeClr val="accent2"/>
+    </dgm:fillClrLst>
+    <dgm:linClrLst meth="repeat">
+      <a:schemeClr val="accent2"/>
+    </dgm:linClrLst>
+    <dgm:effectClrLst/>
+    <dgm:txLinClrLst/>
+    <dgm:txFillClrLst meth="repeat">
+      <a:schemeClr val="lt1"/>
+    </dgm:txFillClrLst>
+    <dgm:txEffectClrLst/>
+  </dgm:styleLbl>
+  <dgm:styleLbl name="parChTrans2D3">
+    <dgm:fillClrLst meth="repeat">
+      <a:schemeClr val="accent2"/>
+    </dgm:fillClrLst>
+    <dgm:linClrLst meth="repeat">
+      <a:schemeClr val="accent2"/>
+    </dgm:linClrLst>
+    <dgm:effectClrLst/>
+    <dgm:txLinClrLst/>
+    <dgm:txFillClrLst meth="repeat">
+      <a:schemeClr val="lt1"/>
+    </dgm:txFillClrLst>
+    <dgm:txEffectClrLst/>
+  </dgm:styleLbl>
+  <dgm:styleLbl name="parChTrans2D4">
+    <dgm:fillClrLst meth="repeat">
+      <a:schemeClr val="accent2"/>
+    </dgm:fillClrLst>
+    <dgm:linClrLst meth="repeat">
+      <a:schemeClr val="accent2"/>
+    </dgm:linClrLst>
+    <dgm:effectClrLst/>
+    <dgm:txLinClrLst/>
+    <dgm:txFillClrLst meth="repeat">
+      <a:schemeClr val="lt1"/>
+    </dgm:txFillClrLst>
+    <dgm:txEffectClrLst/>
+  </dgm:styleLbl>
+  <dgm:styleLbl name="parChTrans1D1">
+    <dgm:fillClrLst meth="repeat">
+      <a:schemeClr val="accent2"/>
+    </dgm:fillClrLst>
+    <dgm:linClrLst meth="repeat">
+      <a:schemeClr val="accent2">
+        <a:shade val="60000"/>
+      </a:schemeClr>
+    </dgm:linClrLst>
+    <dgm:effectClrLst/>
+    <dgm:txLinClrLst/>
+    <dgm:txFillClrLst meth="repeat">
+      <a:schemeClr val="tx1"/>
+    </dgm:txFillClrLst>
+    <dgm:txEffectClrLst/>
+  </dgm:styleLbl>
+  <dgm:styleLbl name="parChTrans1D2">
+    <dgm:fillClrLst meth="repeat">
+      <a:schemeClr val="accent2"/>
+    </dgm:fillClrLst>
+    <dgm:linClrLst meth="repeat">
+      <a:schemeClr val="accent2">
+        <a:shade val="60000"/>
+      </a:schemeClr>
+    </dgm:linClrLst>
+    <dgm:effectClrLst/>
+    <dgm:txLinClrLst/>
+    <dgm:txFillClrLst meth="repeat">
+      <a:schemeClr val="tx1"/>
+    </dgm:txFillClrLst>
+    <dgm:txEffectClrLst/>
+  </dgm:styleLbl>
+  <dgm:styleLbl name="parChTrans1D3">
+    <dgm:fillClrLst meth="repeat">
+      <a:schemeClr val="accent2"/>
+    </dgm:fillClrLst>
+    <dgm:linClrLst meth="repeat">
+      <a:schemeClr val="accent2">
+        <a:shade val="80000"/>
+      </a:schemeClr>
+    </dgm:linClrLst>
+    <dgm:effectClrLst/>
+    <dgm:txLinClrLst/>
+    <dgm:txFillClrLst meth="repeat">
+      <a:schemeClr val="tx1"/>
+    </dgm:txFillClrLst>
+    <dgm:txEffectClrLst/>
+  </dgm:styleLbl>
+  <dgm:styleLbl name="parChTrans1D4">
+    <dgm:fillClrLst meth="repeat">
+      <a:schemeClr val="accent2"/>
+    </dgm:fillClrLst>
+    <dgm:linClrLst meth="repeat">
+      <a:schemeClr val="accent2">
+        <a:shade val="80000"/>
+      </a:schemeClr>
+    </dgm:linClrLst>
+    <dgm:effectClrLst/>
+    <dgm:txLinClrLst/>
+    <dgm:txFillClrLst meth="repeat">
+      <a:schemeClr val="tx1"/>
+    </dgm:txFillClrLst>
+    <dgm:txEffectClrLst/>
+  </dgm:styleLbl>
+  <dgm:styleLbl name="fgAcc1">
+    <dgm:fillClrLst meth="repeat">
+      <a:schemeClr val="lt1">
+        <a:alpha val="90000"/>
+      </a:schemeClr>
+    </dgm:fillClrLst>
+    <dgm:linClrLst meth="repeat">
+      <a:schemeClr val="accent2"/>
+    </dgm:linClrLst>
+    <dgm:effectClrLst/>
+    <dgm:txLinClrLst/>
+    <dgm:txFillClrLst meth="repeat">
+      <a:schemeClr val="dk1"/>
+    </dgm:txFillClrLst>
+    <dgm:txEffectClrLst/>
+  </dgm:styleLbl>
+  <dgm:styleLbl name="conFgAcc1">
+    <dgm:fillClrLst meth="repeat">
+      <a:schemeClr val="lt1">
+        <a:alpha val="90000"/>
+      </a:schemeClr>
+    </dgm:fillClrLst>
+    <dgm:linClrLst meth="repeat">
+      <a:schemeClr val="accent2"/>
+    </dgm:linClrLst>
+    <dgm:effectClrLst/>
+    <dgm:txLinClrLst/>
+    <dgm:txFillClrLst meth="repeat">
+      <a:schemeClr val="dk1"/>
+    </dgm:txFillClrLst>
+    <dgm:txEffectClrLst/>
+  </dgm:styleLbl>
+  <dgm:styleLbl name="alignAcc1">
+    <dgm:fillClrLst meth="repeat">
+      <a:schemeClr val="lt1">
+        <a:alpha val="90000"/>
+      </a:schemeClr>
+    </dgm:fillClrLst>
+    <dgm:linClrLst meth="repeat">
+      <a:schemeClr val="accent2"/>
+    </dgm:linClrLst>
+    <dgm:effectClrLst/>
+    <dgm:txLinClrLst/>
+    <dgm:txFillClrLst meth="repeat">
+      <a:schemeClr val="dk1"/>
+    </dgm:txFillClrLst>
+    <dgm:txEffectClrLst/>
+  </dgm:styleLbl>
+  <dgm:styleLbl name="trAlignAcc1">
+    <dgm:fillClrLst meth="repeat">
+      <a:schemeClr val="lt1">
+        <a:alpha val="40000"/>
+      </a:schemeClr>
+    </dgm:fillClrLst>
+    <dgm:linClrLst meth="repeat">
+      <a:schemeClr val="accent2"/>
+    </dgm:linClrLst>
+    <dgm:effectClrLst/>
+    <dgm:txLinClrLst/>
+    <dgm:txFillClrLst meth="repeat">
+      <a:schemeClr val="dk1"/>
+    </dgm:txFillClrLst>
+    <dgm:txEffectClrLst/>
+  </dgm:styleLbl>
+  <dgm:styleLbl name="bgAcc1">
+    <dgm:fillClrLst meth="repeat">
+      <a:schemeClr val="lt1">
+        <a:alpha val="90000"/>
+      </a:schemeClr>
+    </dgm:fillClrLst>
+    <dgm:linClrLst meth="repeat">
+      <a:schemeClr val="accent2"/>
+    </dgm:linClrLst>
+    <dgm:effectClrLst/>
+    <dgm:txLinClrLst/>
+    <dgm:txFillClrLst meth="repeat">
+      <a:schemeClr val="dk1"/>
+    </dgm:txFillClrLst>
+    <dgm:txEffectClrLst/>
+  </dgm:styleLbl>
+  <dgm:styleLbl name="solidFgAcc1">
+    <dgm:fillClrLst meth="repeat">
+      <a:schemeClr val="lt1"/>
+    </dgm:fillClrLst>
+    <dgm:linClrLst meth="repeat">
+      <a:schemeClr val="accent2"/>
+    </dgm:linClrLst>
+    <dgm:effectClrLst/>
+    <dgm:txLinClrLst/>
+    <dgm:txFillClrLst meth="repeat">
+      <a:schemeClr val="dk1"/>
+    </dgm:txFillClrLst>
+    <dgm:txEffectClrLst/>
+  </dgm:styleLbl>
+  <dgm:styleLbl name="solidAlignAcc1">
+    <dgm:fillClrLst meth="repeat">
+      <a:schemeClr val="lt1"/>
+    </dgm:fillClrLst>
+    <dgm:linClrLst meth="repeat">
+      <a:schemeClr val="accent2"/>
+    </dgm:linClrLst>
+    <dgm:effectClrLst/>
+    <dgm:txLinClrLst/>
+    <dgm:txFillClrLst meth="repeat">
+      <a:schemeClr val="dk1"/>
+    </dgm:txFillClrLst>
+    <dgm:txEffectClrLst/>
+  </dgm:styleLbl>
+  <dgm:styleLbl name="solidBgAcc1">
+    <dgm:fillClrLst meth="repeat">
+      <a:schemeClr val="lt1"/>
+    </dgm:fillClrLst>
+    <dgm:linClrLst meth="repeat">
+      <a:schemeClr val="accent2"/>
+    </dgm:linClrLst>
+    <dgm:effectClrLst/>
+    <dgm:txLinClrLst/>
+    <dgm:txFillClrLst meth="repeat">
+      <a:schemeClr val="dk1"/>
+    </dgm:txFillClrLst>
+    <dgm:txEffectClrLst/>
+  </dgm:styleLbl>
+  <dgm:styleLbl name="fgAccFollowNode1">
+    <dgm:fillClrLst meth="repeat">
+      <a:schemeClr val="accent2">
+        <a:alpha val="90000"/>
+        <a:tint val="40000"/>
+      </a:schemeClr>
+    </dgm:fillClrLst>
+    <dgm:linClrLst meth="repeat">
+      <a:schemeClr val="accent2">
+        <a:alpha val="90000"/>
+        <a:tint val="40000"/>
+      </a:schemeClr>
+    </dgm:linClrLst>
+    <dgm:effectClrLst/>
+    <dgm:txLinClrLst/>
+    <dgm:txFillClrLst meth="repeat">
+      <a:schemeClr val="dk1"/>
+    </dgm:txFillClrLst>
+    <dgm:txEffectClrLst/>
+  </dgm:styleLbl>
+  <dgm:styleLbl name="alignAccFollowNode1">
+    <dgm:fillClrLst meth="repeat">
+      <a:schemeClr val="accent2">
+        <a:alpha val="90000"/>
+        <a:tint val="40000"/>
+      </a:schemeClr>
+    </dgm:fillClrLst>
+    <dgm:linClrLst meth="repeat">
+      <a:schemeClr val="accent2">
+        <a:alpha val="90000"/>
+        <a:tint val="40000"/>
+      </a:schemeClr>
+    </dgm:linClrLst>
+    <dgm:effectClrLst/>
+    <dgm:txLinClrLst/>
+    <dgm:txFillClrLst meth="repeat">
+      <a:schemeClr val="dk1"/>
+    </dgm:txFillClrLst>
+    <dgm:txEffectClrLst/>
+  </dgm:styleLbl>
+  <dgm:styleLbl name="bgAccFollowNode1">
+    <dgm:fillClrLst meth="repeat">
+      <a:schemeClr val="accent2">
+        <a:alpha val="90000"/>
+        <a:tint val="40000"/>
+      </a:schemeClr>
+    </dgm:fillClrLst>
+    <dgm:linClrLst meth="repeat">
+      <a:schemeClr val="accent2">
+        <a:alpha val="90000"/>
+        <a:tint val="40000"/>
+      </a:schemeClr>
+    </dgm:linClrLst>
+    <dgm:effectClrLst/>
+    <dgm:txLinClrLst/>
+    <dgm:txFillClrLst meth="repeat">
+      <a:schemeClr val="dk1"/>
+    </dgm:txFillClrLst>
+    <dgm:txEffectClrLst/>
+  </dgm:styleLbl>
+  <dgm:styleLbl name="fgAcc0">
+    <dgm:fillClrLst meth="repeat">
+      <a:schemeClr val="lt1">
+        <a:alpha val="90000"/>
+      </a:schemeClr>
+    </dgm:fillClrLst>
+    <dgm:linClrLst meth="repeat">
+      <a:schemeClr val="accent2"/>
+    </dgm:linClrLst>
+    <dgm:effectClrLst/>
+    <dgm:txLinClrLst/>
+    <dgm:txFillClrLst meth="repeat">
+      <a:schemeClr val="dk1"/>
+    </dgm:txFillClrLst>
+    <dgm:txEffectClrLst/>
+  </dgm:styleLbl>
+  <dgm:styleLbl name="fgAcc2">
+    <dgm:fillClrLst meth="repeat">
+      <a:schemeClr val="lt1">
+        <a:alpha val="90000"/>
+      </a:schemeClr>
+    </dgm:fillClrLst>
+    <dgm:linClrLst meth="repeat">
+      <a:schemeClr val="accent2"/>
+    </dgm:linClrLst>
+    <dgm:effectClrLst/>
+    <dgm:txLinClrLst/>
+    <dgm:txFillClrLst meth="repeat">
+      <a:schemeClr val="dk1"/>
+    </dgm:txFillClrLst>
+    <dgm:txEffectClrLst/>
+  </dgm:styleLbl>
+  <dgm:styleLbl name="fgAcc3">
+    <dgm:fillClrLst meth="repeat">
+      <a:schemeClr val="lt1">
+        <a:alpha val="90000"/>
+      </a:schemeClr>
+    </dgm:fillClrLst>
+    <dgm:linClrLst meth="repeat">
+      <a:schemeClr val="accent2"/>
+    </dgm:linClrLst>
+    <dgm:effectClrLst/>
+    <dgm:txLinClrLst/>
+    <dgm:txFillClrLst meth="repeat">
+      <a:schemeClr val="dk1"/>
+    </dgm:txFillClrLst>
+    <dgm:txEffectClrLst/>
+  </dgm:styleLbl>
+  <dgm:styleLbl name="fgAcc4">
+    <dgm:fillClrLst meth="repeat">
+      <a:schemeClr val="lt1">
+        <a:alpha val="90000"/>
+      </a:schemeClr>
+    </dgm:fillClrLst>
+    <dgm:linClrLst meth="repeat">
+      <a:schemeClr val="accent2"/>
+    </dgm:linClrLst>
+    <dgm:effectClrLst/>
+    <dgm:txLinClrLst/>
+    <dgm:txFillClrLst meth="repeat">
+      <a:schemeClr val="dk1"/>
+    </dgm:txFillClrLst>
+    <dgm:txEffectClrLst/>
+  </dgm:styleLbl>
+  <dgm:styleLbl name="bgShp">
+    <dgm:fillClrLst meth="repeat">
+      <a:schemeClr val="accent2">
+        <a:tint val="40000"/>
+      </a:schemeClr>
+    </dgm:fillClrLst>
+    <dgm:linClrLst meth="repeat">
+      <a:schemeClr val="accent2"/>
+    </dgm:linClrLst>
+    <dgm:effectClrLst/>
+    <dgm:txLinClrLst/>
+    <dgm:txFillClrLst meth="repeat">
+      <a:schemeClr val="dk1"/>
+    </dgm:txFillClrLst>
+    <dgm:txEffectClrLst/>
+  </dgm:styleLbl>
+  <dgm:styleLbl name="dkBgShp">
+    <dgm:fillClrLst meth="repeat">
+      <a:schemeClr val="accent2">
+        <a:shade val="80000"/>
+      </a:schemeClr>
+    </dgm:fillClrLst>
+    <dgm:linClrLst meth="repeat">
+      <a:schemeClr val="accent2"/>
+    </dgm:linClrLst>
+    <dgm:effectClrLst/>
+    <dgm:txLinClrLst/>
+    <dgm:txFillClrLst meth="repeat">
+      <a:schemeClr val="lt1"/>
+    </dgm:txFillClrLst>
+    <dgm:txEffectClrLst/>
+  </dgm:styleLbl>
+  <dgm:styleLbl name="trBgShp">
+    <dgm:fillClrLst meth="repeat">
+      <a:schemeClr val="accent2">
+        <a:tint val="50000"/>
+        <a:alpha val="40000"/>
+      </a:schemeClr>
+    </dgm:fillClrLst>
+    <dgm:linClrLst meth="repeat">
+      <a:schemeClr val="accent2"/>
+    </dgm:linClrLst>
+    <dgm:effectClrLst/>
+    <dgm:txLinClrLst/>
+    <dgm:txFillClrLst meth="repeat">
+      <a:schemeClr val="lt1"/>
+    </dgm:txFillClrLst>
+    <dgm:txEffectClrLst/>
+  </dgm:styleLbl>
+  <dgm:styleLbl name="fgShp">
+    <dgm:fillClrLst meth="repeat">
+      <a:schemeClr val="accent2">
+        <a:tint val="60000"/>
+      </a:schemeClr>
+    </dgm:fillClrLst>
+    <dgm:linClrLst meth="repeat">
+      <a:schemeClr val="lt1"/>
+    </dgm:linClrLst>
+    <dgm:effectClrLst/>
+    <dgm:txLinClrLst/>
+    <dgm:txFillClrLst meth="repeat">
+      <a:schemeClr val="dk1"/>
+    </dgm:txFillClrLst>
+    <dgm:txEffectClrLst/>
+  </dgm:styleLbl>
+  <dgm:styleLbl name="revTx">
+    <dgm:fillClrLst meth="repeat">
+      <a:schemeClr val="lt1">
+        <a:alpha val="0"/>
+      </a:schemeClr>
+    </dgm:fillClrLst>
+    <dgm:linClrLst meth="repeat">
+      <a:schemeClr val="dk1">
+        <a:alpha val="0"/>
+      </a:schemeClr>
+    </dgm:linClrLst>
+    <dgm:effectClrLst/>
+    <dgm:txLinClrLst/>
+    <dgm:txFillClrLst meth="repeat">
+      <a:schemeClr val="tx1"/>
+    </dgm:txFillClrLst>
+    <dgm:txEffectClrLst/>
+  </dgm:styleLbl>
+</dgm:colorsDef>
+</file>
+
+<file path=ppt/diagrams/data1.xml><?xml version="1.0" encoding="utf-8"?>
+<dgm:dataModel xmlns:dgm="http://schemas.openxmlformats.org/drawingml/2006/diagram" xmlns:a="http://schemas.openxmlformats.org/drawingml/2006/main">
+  <dgm:ptLst>
+    <dgm:pt modelId="{7743FDEF-5C9B-42F9-97C7-DA32515A370C}" type="doc">
+      <dgm:prSet loTypeId="urn:microsoft.com/office/officeart/2005/8/layout/list1" loCatId="list" qsTypeId="urn:microsoft.com/office/officeart/2005/8/quickstyle/simple5" qsCatId="simple" csTypeId="urn:microsoft.com/office/officeart/2005/8/colors/accent2_2" csCatId="accent2"/>
+      <dgm:spPr/>
+      <dgm:t>
+        <a:bodyPr/>
+        <a:lstStyle/>
+        <a:p>
+          <a:endParaRPr lang="en-US"/>
+        </a:p>
+      </dgm:t>
+    </dgm:pt>
+    <dgm:pt modelId="{D41D6D61-D738-4B2D-ADFF-90CFFFCF0ACE}">
+      <dgm:prSet/>
+      <dgm:spPr/>
+      <dgm:t>
+        <a:bodyPr/>
+        <a:lstStyle/>
+        <a:p>
+          <a:r>
+            <a:rPr lang="en-US"/>
+            <a:t>Christian Mack – Team Lead</a:t>
+          </a:r>
+        </a:p>
+      </dgm:t>
+    </dgm:pt>
+    <dgm:pt modelId="{B46FF745-1DD6-4461-AA11-D77AC9DBE69A}" type="parTrans" cxnId="{0F966007-8483-46CE-8729-4A124D9800AE}">
+      <dgm:prSet/>
+      <dgm:spPr/>
+      <dgm:t>
+        <a:bodyPr/>
+        <a:lstStyle/>
+        <a:p>
+          <a:endParaRPr lang="en-US"/>
+        </a:p>
+      </dgm:t>
+    </dgm:pt>
+    <dgm:pt modelId="{5E06BE9E-4706-41FF-9CF9-E18249971166}" type="sibTrans" cxnId="{0F966007-8483-46CE-8729-4A124D9800AE}">
+      <dgm:prSet/>
+      <dgm:spPr/>
+      <dgm:t>
+        <a:bodyPr/>
+        <a:lstStyle/>
+        <a:p>
+          <a:endParaRPr lang="en-US"/>
+        </a:p>
+      </dgm:t>
+    </dgm:pt>
+    <dgm:pt modelId="{F9762961-164A-422F-804A-480E83795FDA}">
+      <dgm:prSet/>
+      <dgm:spPr/>
+      <dgm:t>
+        <a:bodyPr/>
+        <a:lstStyle/>
+        <a:p>
+          <a:r>
+            <a:rPr lang="en-US"/>
+            <a:t>Derek Price – Data Analyst</a:t>
+          </a:r>
+        </a:p>
+      </dgm:t>
+    </dgm:pt>
+    <dgm:pt modelId="{8379A767-DB7B-4EDF-8CC3-3798D409F822}" type="parTrans" cxnId="{06E7E528-7C12-4757-B2E6-15D1EC88952E}">
+      <dgm:prSet/>
+      <dgm:spPr/>
+      <dgm:t>
+        <a:bodyPr/>
+        <a:lstStyle/>
+        <a:p>
+          <a:endParaRPr lang="en-US"/>
+        </a:p>
+      </dgm:t>
+    </dgm:pt>
+    <dgm:pt modelId="{08B1E8DC-263D-43B9-9E6B-F5B968522F5C}" type="sibTrans" cxnId="{06E7E528-7C12-4757-B2E6-15D1EC88952E}">
+      <dgm:prSet/>
+      <dgm:spPr/>
+      <dgm:t>
+        <a:bodyPr/>
+        <a:lstStyle/>
+        <a:p>
+          <a:endParaRPr lang="en-US"/>
+        </a:p>
+      </dgm:t>
+    </dgm:pt>
+    <dgm:pt modelId="{8BD478FB-DC5F-47F6-ADAD-42E3CD2579CD}">
+      <dgm:prSet/>
+      <dgm:spPr/>
+      <dgm:t>
+        <a:bodyPr/>
+        <a:lstStyle/>
+        <a:p>
+          <a:r>
+            <a:rPr lang="en-US"/>
+            <a:t>Michael Ferral – Data Analyst</a:t>
+          </a:r>
+        </a:p>
+      </dgm:t>
+    </dgm:pt>
+    <dgm:pt modelId="{2C1A96D0-8851-4C71-9AAC-87FCB03480A2}" type="parTrans" cxnId="{EFEBB607-8967-466F-B367-7E972F7B50B6}">
+      <dgm:prSet/>
+      <dgm:spPr/>
+      <dgm:t>
+        <a:bodyPr/>
+        <a:lstStyle/>
+        <a:p>
+          <a:endParaRPr lang="en-US"/>
+        </a:p>
+      </dgm:t>
+    </dgm:pt>
+    <dgm:pt modelId="{58AFA5F5-24E8-4A76-A2CF-6D2146E8AA6E}" type="sibTrans" cxnId="{EFEBB607-8967-466F-B367-7E972F7B50B6}">
+      <dgm:prSet/>
+      <dgm:spPr/>
+      <dgm:t>
+        <a:bodyPr/>
+        <a:lstStyle/>
+        <a:p>
+          <a:endParaRPr lang="en-US"/>
+        </a:p>
+      </dgm:t>
+    </dgm:pt>
+    <dgm:pt modelId="{6ACBE639-3180-4050-8286-6B1E8CD1160D}">
+      <dgm:prSet/>
+      <dgm:spPr/>
+      <dgm:t>
+        <a:bodyPr/>
+        <a:lstStyle/>
+        <a:p>
+          <a:r>
+            <a:rPr lang="en-US"/>
+            <a:t>Robert LaNier – Data Analyst</a:t>
+          </a:r>
+        </a:p>
+      </dgm:t>
+    </dgm:pt>
+    <dgm:pt modelId="{4CFD375B-271F-49A5-8A00-AEC731A8EC70}" type="parTrans" cxnId="{DAB6B934-A7EE-4CF4-B63C-28BB1B905105}">
+      <dgm:prSet/>
+      <dgm:spPr/>
+      <dgm:t>
+        <a:bodyPr/>
+        <a:lstStyle/>
+        <a:p>
+          <a:endParaRPr lang="en-US"/>
+        </a:p>
+      </dgm:t>
+    </dgm:pt>
+    <dgm:pt modelId="{F98D55E8-82CD-4C13-9745-363FDB3C881F}" type="sibTrans" cxnId="{DAB6B934-A7EE-4CF4-B63C-28BB1B905105}">
+      <dgm:prSet/>
+      <dgm:spPr/>
+      <dgm:t>
+        <a:bodyPr/>
+        <a:lstStyle/>
+        <a:p>
+          <a:endParaRPr lang="en-US"/>
+        </a:p>
+      </dgm:t>
+    </dgm:pt>
+    <dgm:pt modelId="{8B7696CA-F5E8-4674-9F55-5A5A24615C3E}" type="pres">
+      <dgm:prSet presAssocID="{7743FDEF-5C9B-42F9-97C7-DA32515A370C}" presName="linear" presStyleCnt="0">
+        <dgm:presLayoutVars>
+          <dgm:dir/>
+          <dgm:animLvl val="lvl"/>
+          <dgm:resizeHandles val="exact"/>
+        </dgm:presLayoutVars>
+      </dgm:prSet>
+      <dgm:spPr/>
+    </dgm:pt>
+    <dgm:pt modelId="{C2FD087E-4300-4C4C-9E44-96684B208A3D}" type="pres">
+      <dgm:prSet presAssocID="{D41D6D61-D738-4B2D-ADFF-90CFFFCF0ACE}" presName="parentLin" presStyleCnt="0"/>
+      <dgm:spPr/>
+    </dgm:pt>
+    <dgm:pt modelId="{D4399AF2-B14B-4BE2-B5EC-F27EF3932722}" type="pres">
+      <dgm:prSet presAssocID="{D41D6D61-D738-4B2D-ADFF-90CFFFCF0ACE}" presName="parentLeftMargin" presStyleLbl="node1" presStyleIdx="0" presStyleCnt="4"/>
+      <dgm:spPr/>
+    </dgm:pt>
+    <dgm:pt modelId="{A27D0206-CB66-43AE-98C2-07C6AC18179C}" type="pres">
+      <dgm:prSet presAssocID="{D41D6D61-D738-4B2D-ADFF-90CFFFCF0ACE}" presName="parentText" presStyleLbl="node1" presStyleIdx="0" presStyleCnt="4">
+        <dgm:presLayoutVars>
+          <dgm:chMax val="0"/>
+          <dgm:bulletEnabled val="1"/>
+        </dgm:presLayoutVars>
+      </dgm:prSet>
+      <dgm:spPr/>
+    </dgm:pt>
+    <dgm:pt modelId="{453B4B06-D674-466E-B36C-2F233880E385}" type="pres">
+      <dgm:prSet presAssocID="{D41D6D61-D738-4B2D-ADFF-90CFFFCF0ACE}" presName="negativeSpace" presStyleCnt="0"/>
+      <dgm:spPr/>
+    </dgm:pt>
+    <dgm:pt modelId="{36B0B9B5-0AFD-45FE-BA77-417E5898C244}" type="pres">
+      <dgm:prSet presAssocID="{D41D6D61-D738-4B2D-ADFF-90CFFFCF0ACE}" presName="childText" presStyleLbl="conFgAcc1" presStyleIdx="0" presStyleCnt="4">
+        <dgm:presLayoutVars>
+          <dgm:bulletEnabled val="1"/>
+        </dgm:presLayoutVars>
+      </dgm:prSet>
+      <dgm:spPr/>
+    </dgm:pt>
+    <dgm:pt modelId="{3D1DFE25-7A09-4518-A81A-47AA9413ED33}" type="pres">
+      <dgm:prSet presAssocID="{5E06BE9E-4706-41FF-9CF9-E18249971166}" presName="spaceBetweenRectangles" presStyleCnt="0"/>
+      <dgm:spPr/>
+    </dgm:pt>
+    <dgm:pt modelId="{F62C8B80-C786-47BC-945B-FBE440F1068A}" type="pres">
+      <dgm:prSet presAssocID="{F9762961-164A-422F-804A-480E83795FDA}" presName="parentLin" presStyleCnt="0"/>
+      <dgm:spPr/>
+    </dgm:pt>
+    <dgm:pt modelId="{D6ADC702-96A0-4145-B5C7-43FF4AD4E9DB}" type="pres">
+      <dgm:prSet presAssocID="{F9762961-164A-422F-804A-480E83795FDA}" presName="parentLeftMargin" presStyleLbl="node1" presStyleIdx="0" presStyleCnt="4"/>
+      <dgm:spPr/>
+    </dgm:pt>
+    <dgm:pt modelId="{F6640668-7E84-4177-8838-C031FF22BABD}" type="pres">
+      <dgm:prSet presAssocID="{F9762961-164A-422F-804A-480E83795FDA}" presName="parentText" presStyleLbl="node1" presStyleIdx="1" presStyleCnt="4">
+        <dgm:presLayoutVars>
+          <dgm:chMax val="0"/>
+          <dgm:bulletEnabled val="1"/>
+        </dgm:presLayoutVars>
+      </dgm:prSet>
+      <dgm:spPr/>
+    </dgm:pt>
+    <dgm:pt modelId="{1C7BCADF-7C72-4994-AD27-1476D3BE5C0C}" type="pres">
+      <dgm:prSet presAssocID="{F9762961-164A-422F-804A-480E83795FDA}" presName="negativeSpace" presStyleCnt="0"/>
+      <dgm:spPr/>
+    </dgm:pt>
+    <dgm:pt modelId="{03D966FE-DE7D-4A2E-BDF2-9E717CAFA6CB}" type="pres">
+      <dgm:prSet presAssocID="{F9762961-164A-422F-804A-480E83795FDA}" presName="childText" presStyleLbl="conFgAcc1" presStyleIdx="1" presStyleCnt="4">
+        <dgm:presLayoutVars>
+          <dgm:bulletEnabled val="1"/>
+        </dgm:presLayoutVars>
+      </dgm:prSet>
+      <dgm:spPr/>
+    </dgm:pt>
+    <dgm:pt modelId="{2805896D-496D-4D37-9871-F18243AE0F06}" type="pres">
+      <dgm:prSet presAssocID="{08B1E8DC-263D-43B9-9E6B-F5B968522F5C}" presName="spaceBetweenRectangles" presStyleCnt="0"/>
+      <dgm:spPr/>
+    </dgm:pt>
+    <dgm:pt modelId="{22BD3CED-2C67-4ECE-8C2D-D5C1375F81A2}" type="pres">
+      <dgm:prSet presAssocID="{8BD478FB-DC5F-47F6-ADAD-42E3CD2579CD}" presName="parentLin" presStyleCnt="0"/>
+      <dgm:spPr/>
+    </dgm:pt>
+    <dgm:pt modelId="{A52AED0B-51BB-49EA-8895-37CD67C2C209}" type="pres">
+      <dgm:prSet presAssocID="{8BD478FB-DC5F-47F6-ADAD-42E3CD2579CD}" presName="parentLeftMargin" presStyleLbl="node1" presStyleIdx="1" presStyleCnt="4"/>
+      <dgm:spPr/>
+    </dgm:pt>
+    <dgm:pt modelId="{03755200-9E85-451C-8C28-0975B440E167}" type="pres">
+      <dgm:prSet presAssocID="{8BD478FB-DC5F-47F6-ADAD-42E3CD2579CD}" presName="parentText" presStyleLbl="node1" presStyleIdx="2" presStyleCnt="4">
+        <dgm:presLayoutVars>
+          <dgm:chMax val="0"/>
+          <dgm:bulletEnabled val="1"/>
+        </dgm:presLayoutVars>
+      </dgm:prSet>
+      <dgm:spPr/>
+    </dgm:pt>
+    <dgm:pt modelId="{6FACBC04-3A34-4915-A69D-30A145C8C086}" type="pres">
+      <dgm:prSet presAssocID="{8BD478FB-DC5F-47F6-ADAD-42E3CD2579CD}" presName="negativeSpace" presStyleCnt="0"/>
+      <dgm:spPr/>
+    </dgm:pt>
+    <dgm:pt modelId="{D1C1463C-4374-43EE-9066-C7AFD196D8C0}" type="pres">
+      <dgm:prSet presAssocID="{8BD478FB-DC5F-47F6-ADAD-42E3CD2579CD}" presName="childText" presStyleLbl="conFgAcc1" presStyleIdx="2" presStyleCnt="4">
+        <dgm:presLayoutVars>
+          <dgm:bulletEnabled val="1"/>
+        </dgm:presLayoutVars>
+      </dgm:prSet>
+      <dgm:spPr/>
+    </dgm:pt>
+    <dgm:pt modelId="{94A745D2-15BE-4F2D-8D20-661AD73719BF}" type="pres">
+      <dgm:prSet presAssocID="{58AFA5F5-24E8-4A76-A2CF-6D2146E8AA6E}" presName="spaceBetweenRectangles" presStyleCnt="0"/>
+      <dgm:spPr/>
+    </dgm:pt>
+    <dgm:pt modelId="{77890652-11D5-4EA0-BFC3-274AE687A674}" type="pres">
+      <dgm:prSet presAssocID="{6ACBE639-3180-4050-8286-6B1E8CD1160D}" presName="parentLin" presStyleCnt="0"/>
+      <dgm:spPr/>
+    </dgm:pt>
+    <dgm:pt modelId="{27070355-0B25-4891-93C1-3272CFABC5FD}" type="pres">
+      <dgm:prSet presAssocID="{6ACBE639-3180-4050-8286-6B1E8CD1160D}" presName="parentLeftMargin" presStyleLbl="node1" presStyleIdx="2" presStyleCnt="4"/>
+      <dgm:spPr/>
+    </dgm:pt>
+    <dgm:pt modelId="{DF6D1B9D-7B70-4089-BEFA-85E8EDDAD769}" type="pres">
+      <dgm:prSet presAssocID="{6ACBE639-3180-4050-8286-6B1E8CD1160D}" presName="parentText" presStyleLbl="node1" presStyleIdx="3" presStyleCnt="4">
+        <dgm:presLayoutVars>
+          <dgm:chMax val="0"/>
+          <dgm:bulletEnabled val="1"/>
+        </dgm:presLayoutVars>
+      </dgm:prSet>
+      <dgm:spPr/>
+    </dgm:pt>
+    <dgm:pt modelId="{4A409DE5-6DF6-4125-A14F-ADCF10AEA35A}" type="pres">
+      <dgm:prSet presAssocID="{6ACBE639-3180-4050-8286-6B1E8CD1160D}" presName="negativeSpace" presStyleCnt="0"/>
+      <dgm:spPr/>
+    </dgm:pt>
+    <dgm:pt modelId="{1DC8B2D0-1489-492D-BC08-78D65542FAB5}" type="pres">
+      <dgm:prSet presAssocID="{6ACBE639-3180-4050-8286-6B1E8CD1160D}" presName="childText" presStyleLbl="conFgAcc1" presStyleIdx="3" presStyleCnt="4">
+        <dgm:presLayoutVars>
+          <dgm:bulletEnabled val="1"/>
+        </dgm:presLayoutVars>
+      </dgm:prSet>
+      <dgm:spPr/>
+    </dgm:pt>
+  </dgm:ptLst>
+  <dgm:cxnLst>
+    <dgm:cxn modelId="{0F966007-8483-46CE-8729-4A124D9800AE}" srcId="{7743FDEF-5C9B-42F9-97C7-DA32515A370C}" destId="{D41D6D61-D738-4B2D-ADFF-90CFFFCF0ACE}" srcOrd="0" destOrd="0" parTransId="{B46FF745-1DD6-4461-AA11-D77AC9DBE69A}" sibTransId="{5E06BE9E-4706-41FF-9CF9-E18249971166}"/>
+    <dgm:cxn modelId="{EFEBB607-8967-466F-B367-7E972F7B50B6}" srcId="{7743FDEF-5C9B-42F9-97C7-DA32515A370C}" destId="{8BD478FB-DC5F-47F6-ADAD-42E3CD2579CD}" srcOrd="2" destOrd="0" parTransId="{2C1A96D0-8851-4C71-9AAC-87FCB03480A2}" sibTransId="{58AFA5F5-24E8-4A76-A2CF-6D2146E8AA6E}"/>
+    <dgm:cxn modelId="{06E7E528-7C12-4757-B2E6-15D1EC88952E}" srcId="{7743FDEF-5C9B-42F9-97C7-DA32515A370C}" destId="{F9762961-164A-422F-804A-480E83795FDA}" srcOrd="1" destOrd="0" parTransId="{8379A767-DB7B-4EDF-8CC3-3798D409F822}" sibTransId="{08B1E8DC-263D-43B9-9E6B-F5B968522F5C}"/>
+    <dgm:cxn modelId="{748C4932-B25F-457A-BF98-6270FE97F559}" type="presOf" srcId="{8BD478FB-DC5F-47F6-ADAD-42E3CD2579CD}" destId="{03755200-9E85-451C-8C28-0975B440E167}" srcOrd="1" destOrd="0" presId="urn:microsoft.com/office/officeart/2005/8/layout/list1"/>
+    <dgm:cxn modelId="{DAB6B934-A7EE-4CF4-B63C-28BB1B905105}" srcId="{7743FDEF-5C9B-42F9-97C7-DA32515A370C}" destId="{6ACBE639-3180-4050-8286-6B1E8CD1160D}" srcOrd="3" destOrd="0" parTransId="{4CFD375B-271F-49A5-8A00-AEC731A8EC70}" sibTransId="{F98D55E8-82CD-4C13-9745-363FDB3C881F}"/>
+    <dgm:cxn modelId="{0AB5E05C-9950-4562-B1B7-E252842F7C25}" type="presOf" srcId="{6ACBE639-3180-4050-8286-6B1E8CD1160D}" destId="{DF6D1B9D-7B70-4089-BEFA-85E8EDDAD769}" srcOrd="1" destOrd="0" presId="urn:microsoft.com/office/officeart/2005/8/layout/list1"/>
+    <dgm:cxn modelId="{BCBDE44B-CE74-4FEF-BFBD-07A968046EF8}" type="presOf" srcId="{6ACBE639-3180-4050-8286-6B1E8CD1160D}" destId="{27070355-0B25-4891-93C1-3272CFABC5FD}" srcOrd="0" destOrd="0" presId="urn:microsoft.com/office/officeart/2005/8/layout/list1"/>
+    <dgm:cxn modelId="{C5E35C9E-BFE1-49A7-A49E-B60FAD087A9A}" type="presOf" srcId="{F9762961-164A-422F-804A-480E83795FDA}" destId="{D6ADC702-96A0-4145-B5C7-43FF4AD4E9DB}" srcOrd="0" destOrd="0" presId="urn:microsoft.com/office/officeart/2005/8/layout/list1"/>
+    <dgm:cxn modelId="{AAE4FCBA-DFDD-4121-95A7-1FCBC6D1C8E6}" type="presOf" srcId="{7743FDEF-5C9B-42F9-97C7-DA32515A370C}" destId="{8B7696CA-F5E8-4674-9F55-5A5A24615C3E}" srcOrd="0" destOrd="0" presId="urn:microsoft.com/office/officeart/2005/8/layout/list1"/>
+    <dgm:cxn modelId="{EFC019BB-0EC8-4AD8-ABB3-7933156D5AB5}" type="presOf" srcId="{F9762961-164A-422F-804A-480E83795FDA}" destId="{F6640668-7E84-4177-8838-C031FF22BABD}" srcOrd="1" destOrd="0" presId="urn:microsoft.com/office/officeart/2005/8/layout/list1"/>
+    <dgm:cxn modelId="{CB187BC9-11B1-48FA-8284-945440E3A6E3}" type="presOf" srcId="{8BD478FB-DC5F-47F6-ADAD-42E3CD2579CD}" destId="{A52AED0B-51BB-49EA-8895-37CD67C2C209}" srcOrd="0" destOrd="0" presId="urn:microsoft.com/office/officeart/2005/8/layout/list1"/>
+    <dgm:cxn modelId="{2869ABCE-724F-416B-9EBD-187600F1F03B}" type="presOf" srcId="{D41D6D61-D738-4B2D-ADFF-90CFFFCF0ACE}" destId="{A27D0206-CB66-43AE-98C2-07C6AC18179C}" srcOrd="1" destOrd="0" presId="urn:microsoft.com/office/officeart/2005/8/layout/list1"/>
+    <dgm:cxn modelId="{4D3A06D3-4AAD-4D1A-BA4F-4DADD9A76680}" type="presOf" srcId="{D41D6D61-D738-4B2D-ADFF-90CFFFCF0ACE}" destId="{D4399AF2-B14B-4BE2-B5EC-F27EF3932722}" srcOrd="0" destOrd="0" presId="urn:microsoft.com/office/officeart/2005/8/layout/list1"/>
+    <dgm:cxn modelId="{E2EA6EDE-1D39-436F-B43A-407C2EB6B335}" type="presParOf" srcId="{8B7696CA-F5E8-4674-9F55-5A5A24615C3E}" destId="{C2FD087E-4300-4C4C-9E44-96684B208A3D}" srcOrd="0" destOrd="0" presId="urn:microsoft.com/office/officeart/2005/8/layout/list1"/>
+    <dgm:cxn modelId="{16A41BB4-6F92-4D77-98A9-D31F0225206F}" type="presParOf" srcId="{C2FD087E-4300-4C4C-9E44-96684B208A3D}" destId="{D4399AF2-B14B-4BE2-B5EC-F27EF3932722}" srcOrd="0" destOrd="0" presId="urn:microsoft.com/office/officeart/2005/8/layout/list1"/>
+    <dgm:cxn modelId="{EF4F1AB1-CA0A-4F85-BFC3-B43CB09A13A1}" type="presParOf" srcId="{C2FD087E-4300-4C4C-9E44-96684B208A3D}" destId="{A27D0206-CB66-43AE-98C2-07C6AC18179C}" srcOrd="1" destOrd="0" presId="urn:microsoft.com/office/officeart/2005/8/layout/list1"/>
+    <dgm:cxn modelId="{37FB0A3D-3A8B-4948-9D4E-CA8208DA12E8}" type="presParOf" srcId="{8B7696CA-F5E8-4674-9F55-5A5A24615C3E}" destId="{453B4B06-D674-466E-B36C-2F233880E385}" srcOrd="1" destOrd="0" presId="urn:microsoft.com/office/officeart/2005/8/layout/list1"/>
+    <dgm:cxn modelId="{83E007B9-D92C-44A6-BE88-5D73425B1ABF}" type="presParOf" srcId="{8B7696CA-F5E8-4674-9F55-5A5A24615C3E}" destId="{36B0B9B5-0AFD-45FE-BA77-417E5898C244}" srcOrd="2" destOrd="0" presId="urn:microsoft.com/office/officeart/2005/8/layout/list1"/>
+    <dgm:cxn modelId="{A85A6941-B05F-43D6-B4CE-394DA14F7AED}" type="presParOf" srcId="{8B7696CA-F5E8-4674-9F55-5A5A24615C3E}" destId="{3D1DFE25-7A09-4518-A81A-47AA9413ED33}" srcOrd="3" destOrd="0" presId="urn:microsoft.com/office/officeart/2005/8/layout/list1"/>
+    <dgm:cxn modelId="{3EDBBE69-4AE3-47DF-849B-96CE54333F02}" type="presParOf" srcId="{8B7696CA-F5E8-4674-9F55-5A5A24615C3E}" destId="{F62C8B80-C786-47BC-945B-FBE440F1068A}" srcOrd="4" destOrd="0" presId="urn:microsoft.com/office/officeart/2005/8/layout/list1"/>
+    <dgm:cxn modelId="{471E2909-DBCF-4A7B-99FF-FFACEABAFC50}" type="presParOf" srcId="{F62C8B80-C786-47BC-945B-FBE440F1068A}" destId="{D6ADC702-96A0-4145-B5C7-43FF4AD4E9DB}" srcOrd="0" destOrd="0" presId="urn:microsoft.com/office/officeart/2005/8/layout/list1"/>
+    <dgm:cxn modelId="{A3E77165-E8D7-4E4C-AB48-7702B3E3A441}" type="presParOf" srcId="{F62C8B80-C786-47BC-945B-FBE440F1068A}" destId="{F6640668-7E84-4177-8838-C031FF22BABD}" srcOrd="1" destOrd="0" presId="urn:microsoft.com/office/officeart/2005/8/layout/list1"/>
+    <dgm:cxn modelId="{129BA452-7B5B-4EEE-8C62-3507D2693A74}" type="presParOf" srcId="{8B7696CA-F5E8-4674-9F55-5A5A24615C3E}" destId="{1C7BCADF-7C72-4994-AD27-1476D3BE5C0C}" srcOrd="5" destOrd="0" presId="urn:microsoft.com/office/officeart/2005/8/layout/list1"/>
+    <dgm:cxn modelId="{A788F6BE-207C-4FB2-A6ED-2B52FAD4DD89}" type="presParOf" srcId="{8B7696CA-F5E8-4674-9F55-5A5A24615C3E}" destId="{03D966FE-DE7D-4A2E-BDF2-9E717CAFA6CB}" srcOrd="6" destOrd="0" presId="urn:microsoft.com/office/officeart/2005/8/layout/list1"/>
+    <dgm:cxn modelId="{6358B13F-6C9E-41BB-9D71-4C442053AA9E}" type="presParOf" srcId="{8B7696CA-F5E8-4674-9F55-5A5A24615C3E}" destId="{2805896D-496D-4D37-9871-F18243AE0F06}" srcOrd="7" destOrd="0" presId="urn:microsoft.com/office/officeart/2005/8/layout/list1"/>
+    <dgm:cxn modelId="{E3A0FC3F-94C6-441A-8CF5-97DE25340EA8}" type="presParOf" srcId="{8B7696CA-F5E8-4674-9F55-5A5A24615C3E}" destId="{22BD3CED-2C67-4ECE-8C2D-D5C1375F81A2}" srcOrd="8" destOrd="0" presId="urn:microsoft.com/office/officeart/2005/8/layout/list1"/>
+    <dgm:cxn modelId="{F2B946FD-FD9C-482A-9C39-F655906202F9}" type="presParOf" srcId="{22BD3CED-2C67-4ECE-8C2D-D5C1375F81A2}" destId="{A52AED0B-51BB-49EA-8895-37CD67C2C209}" srcOrd="0" destOrd="0" presId="urn:microsoft.com/office/officeart/2005/8/layout/list1"/>
+    <dgm:cxn modelId="{F72D04AD-8B80-4379-ABF4-80A43E11E3C8}" type="presParOf" srcId="{22BD3CED-2C67-4ECE-8C2D-D5C1375F81A2}" destId="{03755200-9E85-451C-8C28-0975B440E167}" srcOrd="1" destOrd="0" presId="urn:microsoft.com/office/officeart/2005/8/layout/list1"/>
+    <dgm:cxn modelId="{D6363F07-D434-45E4-9344-39871D3DB3E1}" type="presParOf" srcId="{8B7696CA-F5E8-4674-9F55-5A5A24615C3E}" destId="{6FACBC04-3A34-4915-A69D-30A145C8C086}" srcOrd="9" destOrd="0" presId="urn:microsoft.com/office/officeart/2005/8/layout/list1"/>
+    <dgm:cxn modelId="{AD2F4241-DD38-4137-983F-2E47ACFC4CBE}" type="presParOf" srcId="{8B7696CA-F5E8-4674-9F55-5A5A24615C3E}" destId="{D1C1463C-4374-43EE-9066-C7AFD196D8C0}" srcOrd="10" destOrd="0" presId="urn:microsoft.com/office/officeart/2005/8/layout/list1"/>
+    <dgm:cxn modelId="{602461F1-076C-4AA6-B61A-5963A7414AA3}" type="presParOf" srcId="{8B7696CA-F5E8-4674-9F55-5A5A24615C3E}" destId="{94A745D2-15BE-4F2D-8D20-661AD73719BF}" srcOrd="11" destOrd="0" presId="urn:microsoft.com/office/officeart/2005/8/layout/list1"/>
+    <dgm:cxn modelId="{DE31F091-22BC-42FD-99DE-5539FF12EC43}" type="presParOf" srcId="{8B7696CA-F5E8-4674-9F55-5A5A24615C3E}" destId="{77890652-11D5-4EA0-BFC3-274AE687A674}" srcOrd="12" destOrd="0" presId="urn:microsoft.com/office/officeart/2005/8/layout/list1"/>
+    <dgm:cxn modelId="{0E5B26EB-1538-4FD6-9930-AB449D5A82E9}" type="presParOf" srcId="{77890652-11D5-4EA0-BFC3-274AE687A674}" destId="{27070355-0B25-4891-93C1-3272CFABC5FD}" srcOrd="0" destOrd="0" presId="urn:microsoft.com/office/officeart/2005/8/layout/list1"/>
+    <dgm:cxn modelId="{EF6C7B33-90A1-4B49-BA9E-D87A427C8A48}" type="presParOf" srcId="{77890652-11D5-4EA0-BFC3-274AE687A674}" destId="{DF6D1B9D-7B70-4089-BEFA-85E8EDDAD769}" srcOrd="1" destOrd="0" presId="urn:microsoft.com/office/officeart/2005/8/layout/list1"/>
+    <dgm:cxn modelId="{AF5A6770-21F2-414C-90DB-917678558C67}" type="presParOf" srcId="{8B7696CA-F5E8-4674-9F55-5A5A24615C3E}" destId="{4A409DE5-6DF6-4125-A14F-ADCF10AEA35A}" srcOrd="13" destOrd="0" presId="urn:microsoft.com/office/officeart/2005/8/layout/list1"/>
+    <dgm:cxn modelId="{5E3E3A42-3827-453B-82B3-95F77B569A03}" type="presParOf" srcId="{8B7696CA-F5E8-4674-9F55-5A5A24615C3E}" destId="{1DC8B2D0-1489-492D-BC08-78D65542FAB5}" srcOrd="14" destOrd="0" presId="urn:microsoft.com/office/officeart/2005/8/layout/list1"/>
+  </dgm:cxnLst>
+  <dgm:bg/>
+  <dgm:whole/>
+  <dgm:extLst>
+    <a:ext uri="http://schemas.microsoft.com/office/drawing/2008/diagram">
+      <dsp:dataModelExt xmlns:dsp="http://schemas.microsoft.com/office/drawing/2008/diagram" relId="rId6" minVer="http://schemas.openxmlformats.org/drawingml/2006/diagram"/>
+    </a:ext>
+  </dgm:extLst>
+</dgm:dataModel>
+</file>
+
+<file path=ppt/diagrams/drawing1.xml><?xml version="1.0" encoding="utf-8"?>
+<dsp:drawing xmlns:dgm="http://schemas.openxmlformats.org/drawingml/2006/diagram" xmlns:dsp="http://schemas.microsoft.com/office/drawing/2008/diagram" xmlns:a="http://schemas.openxmlformats.org/drawingml/2006/main">
+  <dsp:spTree>
+    <dsp:nvGrpSpPr>
+      <dsp:cNvPr id="0" name=""/>
+      <dsp:cNvGrpSpPr/>
+    </dsp:nvGrpSpPr>
+    <dsp:grpSpPr/>
+    <dsp:sp modelId="{36B0B9B5-0AFD-45FE-BA77-417E5898C244}">
+      <dsp:nvSpPr>
+        <dsp:cNvPr id="0" name=""/>
+        <dsp:cNvSpPr/>
+      </dsp:nvSpPr>
+      <dsp:spPr>
+        <a:xfrm>
+          <a:off x="0" y="341985"/>
+          <a:ext cx="10058399" cy="529200"/>
+        </a:xfrm>
+        <a:prstGeom prst="rect">
+          <a:avLst/>
+        </a:prstGeom>
+        <a:solidFill>
+          <a:schemeClr val="lt1">
+            <a:alpha val="90000"/>
+            <a:hueOff val="0"/>
+            <a:satOff val="0"/>
+            <a:lumOff val="0"/>
+            <a:alphaOff val="0"/>
+          </a:schemeClr>
+        </a:solidFill>
+        <a:ln w="12700" cap="flat" cmpd="sng" algn="ctr">
+          <a:solidFill>
+            <a:schemeClr val="accent2">
+              <a:hueOff val="0"/>
+              <a:satOff val="0"/>
+              <a:lumOff val="0"/>
+              <a:alphaOff val="0"/>
+            </a:schemeClr>
+          </a:solidFill>
+          <a:prstDash val="solid"/>
+        </a:ln>
+        <a:effectLst>
+          <a:outerShdw blurRad="38100" dist="25400" dir="2700000" algn="br" rotWithShape="0">
+            <a:srgbClr val="000000">
+              <a:alpha val="60000"/>
+            </a:srgbClr>
+          </a:outerShdw>
+        </a:effectLst>
+      </dsp:spPr>
+      <dsp:style>
+        <a:lnRef idx="1">
+          <a:scrgbClr r="0" g="0" b="0"/>
+        </a:lnRef>
+        <a:fillRef idx="1">
+          <a:scrgbClr r="0" g="0" b="0"/>
+        </a:fillRef>
+        <a:effectRef idx="2">
+          <a:scrgbClr r="0" g="0" b="0"/>
+        </a:effectRef>
+        <a:fontRef idx="minor"/>
+      </dsp:style>
+    </dsp:sp>
+    <dsp:sp modelId="{A27D0206-CB66-43AE-98C2-07C6AC18179C}">
+      <dsp:nvSpPr>
+        <dsp:cNvPr id="0" name=""/>
+        <dsp:cNvSpPr/>
+      </dsp:nvSpPr>
+      <dsp:spPr>
+        <a:xfrm>
+          <a:off x="502920" y="32025"/>
+          <a:ext cx="7040880" cy="619920"/>
+        </a:xfrm>
+        <a:prstGeom prst="roundRect">
+          <a:avLst/>
+        </a:prstGeom>
+        <a:gradFill rotWithShape="0">
+          <a:gsLst>
+            <a:gs pos="0">
+              <a:schemeClr val="accent2">
+                <a:hueOff val="0"/>
+                <a:satOff val="0"/>
+                <a:lumOff val="0"/>
+                <a:alphaOff val="0"/>
+                <a:shade val="85000"/>
+                <a:satMod val="130000"/>
+              </a:schemeClr>
+            </a:gs>
+            <a:gs pos="34000">
+              <a:schemeClr val="accent2">
+                <a:hueOff val="0"/>
+                <a:satOff val="0"/>
+                <a:lumOff val="0"/>
+                <a:alphaOff val="0"/>
+                <a:shade val="87000"/>
+                <a:satMod val="125000"/>
+              </a:schemeClr>
+            </a:gs>
+            <a:gs pos="70000">
+              <a:schemeClr val="accent2">
+                <a:hueOff val="0"/>
+                <a:satOff val="0"/>
+                <a:lumOff val="0"/>
+                <a:alphaOff val="0"/>
+                <a:tint val="100000"/>
+                <a:shade val="90000"/>
+                <a:satMod val="130000"/>
+              </a:schemeClr>
+            </a:gs>
+            <a:gs pos="100000">
+              <a:schemeClr val="accent2">
+                <a:hueOff val="0"/>
+                <a:satOff val="0"/>
+                <a:lumOff val="0"/>
+                <a:alphaOff val="0"/>
+                <a:tint val="100000"/>
+                <a:shade val="100000"/>
+                <a:satMod val="110000"/>
+              </a:schemeClr>
+            </a:gs>
+          </a:gsLst>
+          <a:path path="circle">
+            <a:fillToRect l="100000" t="100000" r="100000" b="100000"/>
+          </a:path>
+        </a:gradFill>
+        <a:ln>
+          <a:noFill/>
+        </a:ln>
+        <a:effectLst>
+          <a:outerShdw blurRad="44450" dist="25400" dir="2700000" algn="br" rotWithShape="0">
+            <a:srgbClr val="000000">
+              <a:alpha val="60000"/>
+            </a:srgbClr>
+          </a:outerShdw>
+        </a:effectLst>
+        <a:scene3d>
+          <a:camera prst="orthographicFront">
+            <a:rot lat="0" lon="0" rev="0"/>
+          </a:camera>
+          <a:lightRig rig="threePt" dir="t">
+            <a:rot lat="0" lon="0" rev="19800000"/>
+          </a:lightRig>
+        </a:scene3d>
+        <a:sp3d prstMaterial="flat">
+          <a:bevelT w="25400" h="31750"/>
+        </a:sp3d>
+      </dsp:spPr>
+      <dsp:style>
+        <a:lnRef idx="0">
+          <a:scrgbClr r="0" g="0" b="0"/>
+        </a:lnRef>
+        <a:fillRef idx="3">
+          <a:scrgbClr r="0" g="0" b="0"/>
+        </a:fillRef>
+        <a:effectRef idx="3">
+          <a:scrgbClr r="0" g="0" b="0"/>
+        </a:effectRef>
+        <a:fontRef idx="minor">
+          <a:schemeClr val="lt1"/>
+        </a:fontRef>
+      </dsp:style>
+      <dsp:txBody>
+        <a:bodyPr spcFirstLastPara="0" vert="horz" wrap="square" lIns="266129" tIns="0" rIns="266129" bIns="0" numCol="1" spcCol="1270" anchor="ctr" anchorCtr="0">
+          <a:noAutofit/>
+        </a:bodyPr>
+        <a:lstStyle/>
+        <a:p>
+          <a:pPr marL="0" lvl="0" indent="0" algn="l" defTabSz="933450">
+            <a:lnSpc>
+              <a:spcPct val="90000"/>
+            </a:lnSpc>
+            <a:spcBef>
+              <a:spcPct val="0"/>
+            </a:spcBef>
+            <a:spcAft>
+              <a:spcPct val="35000"/>
+            </a:spcAft>
+            <a:buNone/>
+          </a:pPr>
+          <a:r>
+            <a:rPr lang="en-US" sz="2100" kern="1200"/>
+            <a:t>Christian Mack – Team Lead</a:t>
+          </a:r>
+        </a:p>
+      </dsp:txBody>
+      <dsp:txXfrm>
+        <a:off x="533182" y="62287"/>
+        <a:ext cx="6980356" cy="559396"/>
+      </dsp:txXfrm>
+    </dsp:sp>
+    <dsp:sp modelId="{03D966FE-DE7D-4A2E-BDF2-9E717CAFA6CB}">
+      <dsp:nvSpPr>
+        <dsp:cNvPr id="0" name=""/>
+        <dsp:cNvSpPr/>
+      </dsp:nvSpPr>
+      <dsp:spPr>
+        <a:xfrm>
+          <a:off x="0" y="1294545"/>
+          <a:ext cx="10058399" cy="529200"/>
+        </a:xfrm>
+        <a:prstGeom prst="rect">
+          <a:avLst/>
+        </a:prstGeom>
+        <a:solidFill>
+          <a:schemeClr val="lt1">
+            <a:alpha val="90000"/>
+            <a:hueOff val="0"/>
+            <a:satOff val="0"/>
+            <a:lumOff val="0"/>
+            <a:alphaOff val="0"/>
+          </a:schemeClr>
+        </a:solidFill>
+        <a:ln w="12700" cap="flat" cmpd="sng" algn="ctr">
+          <a:solidFill>
+            <a:schemeClr val="accent2">
+              <a:hueOff val="0"/>
+              <a:satOff val="0"/>
+              <a:lumOff val="0"/>
+              <a:alphaOff val="0"/>
+            </a:schemeClr>
+          </a:solidFill>
+          <a:prstDash val="solid"/>
+        </a:ln>
+        <a:effectLst>
+          <a:outerShdw blurRad="38100" dist="25400" dir="2700000" algn="br" rotWithShape="0">
+            <a:srgbClr val="000000">
+              <a:alpha val="60000"/>
+            </a:srgbClr>
+          </a:outerShdw>
+        </a:effectLst>
+      </dsp:spPr>
+      <dsp:style>
+        <a:lnRef idx="1">
+          <a:scrgbClr r="0" g="0" b="0"/>
+        </a:lnRef>
+        <a:fillRef idx="1">
+          <a:scrgbClr r="0" g="0" b="0"/>
+        </a:fillRef>
+        <a:effectRef idx="2">
+          <a:scrgbClr r="0" g="0" b="0"/>
+        </a:effectRef>
+        <a:fontRef idx="minor"/>
+      </dsp:style>
+    </dsp:sp>
+    <dsp:sp modelId="{F6640668-7E84-4177-8838-C031FF22BABD}">
+      <dsp:nvSpPr>
+        <dsp:cNvPr id="0" name=""/>
+        <dsp:cNvSpPr/>
+      </dsp:nvSpPr>
+      <dsp:spPr>
+        <a:xfrm>
+          <a:off x="502920" y="984585"/>
+          <a:ext cx="7040880" cy="619920"/>
+        </a:xfrm>
+        <a:prstGeom prst="roundRect">
+          <a:avLst/>
+        </a:prstGeom>
+        <a:gradFill rotWithShape="0">
+          <a:gsLst>
+            <a:gs pos="0">
+              <a:schemeClr val="accent2">
+                <a:hueOff val="0"/>
+                <a:satOff val="0"/>
+                <a:lumOff val="0"/>
+                <a:alphaOff val="0"/>
+                <a:shade val="85000"/>
+                <a:satMod val="130000"/>
+              </a:schemeClr>
+            </a:gs>
+            <a:gs pos="34000">
+              <a:schemeClr val="accent2">
+                <a:hueOff val="0"/>
+                <a:satOff val="0"/>
+                <a:lumOff val="0"/>
+                <a:alphaOff val="0"/>
+                <a:shade val="87000"/>
+                <a:satMod val="125000"/>
+              </a:schemeClr>
+            </a:gs>
+            <a:gs pos="70000">
+              <a:schemeClr val="accent2">
+                <a:hueOff val="0"/>
+                <a:satOff val="0"/>
+                <a:lumOff val="0"/>
+                <a:alphaOff val="0"/>
+                <a:tint val="100000"/>
+                <a:shade val="90000"/>
+                <a:satMod val="130000"/>
+              </a:schemeClr>
+            </a:gs>
+            <a:gs pos="100000">
+              <a:schemeClr val="accent2">
+                <a:hueOff val="0"/>
+                <a:satOff val="0"/>
+                <a:lumOff val="0"/>
+                <a:alphaOff val="0"/>
+                <a:tint val="100000"/>
+                <a:shade val="100000"/>
+                <a:satMod val="110000"/>
+              </a:schemeClr>
+            </a:gs>
+          </a:gsLst>
+          <a:path path="circle">
+            <a:fillToRect l="100000" t="100000" r="100000" b="100000"/>
+          </a:path>
+        </a:gradFill>
+        <a:ln>
+          <a:noFill/>
+        </a:ln>
+        <a:effectLst>
+          <a:outerShdw blurRad="44450" dist="25400" dir="2700000" algn="br" rotWithShape="0">
+            <a:srgbClr val="000000">
+              <a:alpha val="60000"/>
+            </a:srgbClr>
+          </a:outerShdw>
+        </a:effectLst>
+        <a:scene3d>
+          <a:camera prst="orthographicFront">
+            <a:rot lat="0" lon="0" rev="0"/>
+          </a:camera>
+          <a:lightRig rig="threePt" dir="t">
+            <a:rot lat="0" lon="0" rev="19800000"/>
+          </a:lightRig>
+        </a:scene3d>
+        <a:sp3d prstMaterial="flat">
+          <a:bevelT w="25400" h="31750"/>
+        </a:sp3d>
+      </dsp:spPr>
+      <dsp:style>
+        <a:lnRef idx="0">
+          <a:scrgbClr r="0" g="0" b="0"/>
+        </a:lnRef>
+        <a:fillRef idx="3">
+          <a:scrgbClr r="0" g="0" b="0"/>
+        </a:fillRef>
+        <a:effectRef idx="3">
+          <a:scrgbClr r="0" g="0" b="0"/>
+        </a:effectRef>
+        <a:fontRef idx="minor">
+          <a:schemeClr val="lt1"/>
+        </a:fontRef>
+      </dsp:style>
+      <dsp:txBody>
+        <a:bodyPr spcFirstLastPara="0" vert="horz" wrap="square" lIns="266129" tIns="0" rIns="266129" bIns="0" numCol="1" spcCol="1270" anchor="ctr" anchorCtr="0">
+          <a:noAutofit/>
+        </a:bodyPr>
+        <a:lstStyle/>
+        <a:p>
+          <a:pPr marL="0" lvl="0" indent="0" algn="l" defTabSz="933450">
+            <a:lnSpc>
+              <a:spcPct val="90000"/>
+            </a:lnSpc>
+            <a:spcBef>
+              <a:spcPct val="0"/>
+            </a:spcBef>
+            <a:spcAft>
+              <a:spcPct val="35000"/>
+            </a:spcAft>
+            <a:buNone/>
+          </a:pPr>
+          <a:r>
+            <a:rPr lang="en-US" sz="2100" kern="1200"/>
+            <a:t>Derek Price – Data Analyst</a:t>
+          </a:r>
+        </a:p>
+      </dsp:txBody>
+      <dsp:txXfrm>
+        <a:off x="533182" y="1014847"/>
+        <a:ext cx="6980356" cy="559396"/>
+      </dsp:txXfrm>
+    </dsp:sp>
+    <dsp:sp modelId="{D1C1463C-4374-43EE-9066-C7AFD196D8C0}">
+      <dsp:nvSpPr>
+        <dsp:cNvPr id="0" name=""/>
+        <dsp:cNvSpPr/>
+      </dsp:nvSpPr>
+      <dsp:spPr>
+        <a:xfrm>
+          <a:off x="0" y="2247105"/>
+          <a:ext cx="10058399" cy="529200"/>
+        </a:xfrm>
+        <a:prstGeom prst="rect">
+          <a:avLst/>
+        </a:prstGeom>
+        <a:solidFill>
+          <a:schemeClr val="lt1">
+            <a:alpha val="90000"/>
+            <a:hueOff val="0"/>
+            <a:satOff val="0"/>
+            <a:lumOff val="0"/>
+            <a:alphaOff val="0"/>
+          </a:schemeClr>
+        </a:solidFill>
+        <a:ln w="12700" cap="flat" cmpd="sng" algn="ctr">
+          <a:solidFill>
+            <a:schemeClr val="accent2">
+              <a:hueOff val="0"/>
+              <a:satOff val="0"/>
+              <a:lumOff val="0"/>
+              <a:alphaOff val="0"/>
+            </a:schemeClr>
+          </a:solidFill>
+          <a:prstDash val="solid"/>
+        </a:ln>
+        <a:effectLst>
+          <a:outerShdw blurRad="38100" dist="25400" dir="2700000" algn="br" rotWithShape="0">
+            <a:srgbClr val="000000">
+              <a:alpha val="60000"/>
+            </a:srgbClr>
+          </a:outerShdw>
+        </a:effectLst>
+      </dsp:spPr>
+      <dsp:style>
+        <a:lnRef idx="1">
+          <a:scrgbClr r="0" g="0" b="0"/>
+        </a:lnRef>
+        <a:fillRef idx="1">
+          <a:scrgbClr r="0" g="0" b="0"/>
+        </a:fillRef>
+        <a:effectRef idx="2">
+          <a:scrgbClr r="0" g="0" b="0"/>
+        </a:effectRef>
+        <a:fontRef idx="minor"/>
+      </dsp:style>
+    </dsp:sp>
+    <dsp:sp modelId="{03755200-9E85-451C-8C28-0975B440E167}">
+      <dsp:nvSpPr>
+        <dsp:cNvPr id="0" name=""/>
+        <dsp:cNvSpPr/>
+      </dsp:nvSpPr>
+      <dsp:spPr>
+        <a:xfrm>
+          <a:off x="502920" y="1937145"/>
+          <a:ext cx="7040880" cy="619920"/>
+        </a:xfrm>
+        <a:prstGeom prst="roundRect">
+          <a:avLst/>
+        </a:prstGeom>
+        <a:gradFill rotWithShape="0">
+          <a:gsLst>
+            <a:gs pos="0">
+              <a:schemeClr val="accent2">
+                <a:hueOff val="0"/>
+                <a:satOff val="0"/>
+                <a:lumOff val="0"/>
+                <a:alphaOff val="0"/>
+                <a:shade val="85000"/>
+                <a:satMod val="130000"/>
+              </a:schemeClr>
+            </a:gs>
+            <a:gs pos="34000">
+              <a:schemeClr val="accent2">
+                <a:hueOff val="0"/>
+                <a:satOff val="0"/>
+                <a:lumOff val="0"/>
+                <a:alphaOff val="0"/>
+                <a:shade val="87000"/>
+                <a:satMod val="125000"/>
+              </a:schemeClr>
+            </a:gs>
+            <a:gs pos="70000">
+              <a:schemeClr val="accent2">
+                <a:hueOff val="0"/>
+                <a:satOff val="0"/>
+                <a:lumOff val="0"/>
+                <a:alphaOff val="0"/>
+                <a:tint val="100000"/>
+                <a:shade val="90000"/>
+                <a:satMod val="130000"/>
+              </a:schemeClr>
+            </a:gs>
+            <a:gs pos="100000">
+              <a:schemeClr val="accent2">
+                <a:hueOff val="0"/>
+                <a:satOff val="0"/>
+                <a:lumOff val="0"/>
+                <a:alphaOff val="0"/>
+                <a:tint val="100000"/>
+                <a:shade val="100000"/>
+                <a:satMod val="110000"/>
+              </a:schemeClr>
+            </a:gs>
+          </a:gsLst>
+          <a:path path="circle">
+            <a:fillToRect l="100000" t="100000" r="100000" b="100000"/>
+          </a:path>
+        </a:gradFill>
+        <a:ln>
+          <a:noFill/>
+        </a:ln>
+        <a:effectLst>
+          <a:outerShdw blurRad="44450" dist="25400" dir="2700000" algn="br" rotWithShape="0">
+            <a:srgbClr val="000000">
+              <a:alpha val="60000"/>
+            </a:srgbClr>
+          </a:outerShdw>
+        </a:effectLst>
+        <a:scene3d>
+          <a:camera prst="orthographicFront">
+            <a:rot lat="0" lon="0" rev="0"/>
+          </a:camera>
+          <a:lightRig rig="threePt" dir="t">
+            <a:rot lat="0" lon="0" rev="19800000"/>
+          </a:lightRig>
+        </a:scene3d>
+        <a:sp3d prstMaterial="flat">
+          <a:bevelT w="25400" h="31750"/>
+        </a:sp3d>
+      </dsp:spPr>
+      <dsp:style>
+        <a:lnRef idx="0">
+          <a:scrgbClr r="0" g="0" b="0"/>
+        </a:lnRef>
+        <a:fillRef idx="3">
+          <a:scrgbClr r="0" g="0" b="0"/>
+        </a:fillRef>
+        <a:effectRef idx="3">
+          <a:scrgbClr r="0" g="0" b="0"/>
+        </a:effectRef>
+        <a:fontRef idx="minor">
+          <a:schemeClr val="lt1"/>
+        </a:fontRef>
+      </dsp:style>
+      <dsp:txBody>
+        <a:bodyPr spcFirstLastPara="0" vert="horz" wrap="square" lIns="266129" tIns="0" rIns="266129" bIns="0" numCol="1" spcCol="1270" anchor="ctr" anchorCtr="0">
+          <a:noAutofit/>
+        </a:bodyPr>
+        <a:lstStyle/>
+        <a:p>
+          <a:pPr marL="0" lvl="0" indent="0" algn="l" defTabSz="933450">
+            <a:lnSpc>
+              <a:spcPct val="90000"/>
+            </a:lnSpc>
+            <a:spcBef>
+              <a:spcPct val="0"/>
+            </a:spcBef>
+            <a:spcAft>
+              <a:spcPct val="35000"/>
+            </a:spcAft>
+            <a:buNone/>
+          </a:pPr>
+          <a:r>
+            <a:rPr lang="en-US" sz="2100" kern="1200"/>
+            <a:t>Michael Ferral – Data Analyst</a:t>
+          </a:r>
+        </a:p>
+      </dsp:txBody>
+      <dsp:txXfrm>
+        <a:off x="533182" y="1967407"/>
+        <a:ext cx="6980356" cy="559396"/>
+      </dsp:txXfrm>
+    </dsp:sp>
+    <dsp:sp modelId="{1DC8B2D0-1489-492D-BC08-78D65542FAB5}">
+      <dsp:nvSpPr>
+        <dsp:cNvPr id="0" name=""/>
+        <dsp:cNvSpPr/>
+      </dsp:nvSpPr>
+      <dsp:spPr>
+        <a:xfrm>
+          <a:off x="0" y="3199665"/>
+          <a:ext cx="10058399" cy="529200"/>
+        </a:xfrm>
+        <a:prstGeom prst="rect">
+          <a:avLst/>
+        </a:prstGeom>
+        <a:solidFill>
+          <a:schemeClr val="lt1">
+            <a:alpha val="90000"/>
+            <a:hueOff val="0"/>
+            <a:satOff val="0"/>
+            <a:lumOff val="0"/>
+            <a:alphaOff val="0"/>
+          </a:schemeClr>
+        </a:solidFill>
+        <a:ln w="12700" cap="flat" cmpd="sng" algn="ctr">
+          <a:solidFill>
+            <a:schemeClr val="accent2">
+              <a:hueOff val="0"/>
+              <a:satOff val="0"/>
+              <a:lumOff val="0"/>
+              <a:alphaOff val="0"/>
+            </a:schemeClr>
+          </a:solidFill>
+          <a:prstDash val="solid"/>
+        </a:ln>
+        <a:effectLst>
+          <a:outerShdw blurRad="38100" dist="25400" dir="2700000" algn="br" rotWithShape="0">
+            <a:srgbClr val="000000">
+              <a:alpha val="60000"/>
+            </a:srgbClr>
+          </a:outerShdw>
+        </a:effectLst>
+      </dsp:spPr>
+      <dsp:style>
+        <a:lnRef idx="1">
+          <a:scrgbClr r="0" g="0" b="0"/>
+        </a:lnRef>
+        <a:fillRef idx="1">
+          <a:scrgbClr r="0" g="0" b="0"/>
+        </a:fillRef>
+        <a:effectRef idx="2">
+          <a:scrgbClr r="0" g="0" b="0"/>
+        </a:effectRef>
+        <a:fontRef idx="minor"/>
+      </dsp:style>
+    </dsp:sp>
+    <dsp:sp modelId="{DF6D1B9D-7B70-4089-BEFA-85E8EDDAD769}">
+      <dsp:nvSpPr>
+        <dsp:cNvPr id="0" name=""/>
+        <dsp:cNvSpPr/>
+      </dsp:nvSpPr>
+      <dsp:spPr>
+        <a:xfrm>
+          <a:off x="502920" y="2889705"/>
+          <a:ext cx="7040880" cy="619920"/>
+        </a:xfrm>
+        <a:prstGeom prst="roundRect">
+          <a:avLst/>
+        </a:prstGeom>
+        <a:gradFill rotWithShape="0">
+          <a:gsLst>
+            <a:gs pos="0">
+              <a:schemeClr val="accent2">
+                <a:hueOff val="0"/>
+                <a:satOff val="0"/>
+                <a:lumOff val="0"/>
+                <a:alphaOff val="0"/>
+                <a:shade val="85000"/>
+                <a:satMod val="130000"/>
+              </a:schemeClr>
+            </a:gs>
+            <a:gs pos="34000">
+              <a:schemeClr val="accent2">
+                <a:hueOff val="0"/>
+                <a:satOff val="0"/>
+                <a:lumOff val="0"/>
+                <a:alphaOff val="0"/>
+                <a:shade val="87000"/>
+                <a:satMod val="125000"/>
+              </a:schemeClr>
+            </a:gs>
+            <a:gs pos="70000">
+              <a:schemeClr val="accent2">
+                <a:hueOff val="0"/>
+                <a:satOff val="0"/>
+                <a:lumOff val="0"/>
+                <a:alphaOff val="0"/>
+                <a:tint val="100000"/>
+                <a:shade val="90000"/>
+                <a:satMod val="130000"/>
+              </a:schemeClr>
+            </a:gs>
+            <a:gs pos="100000">
+              <a:schemeClr val="accent2">
+                <a:hueOff val="0"/>
+                <a:satOff val="0"/>
+                <a:lumOff val="0"/>
+                <a:alphaOff val="0"/>
+                <a:tint val="100000"/>
+                <a:shade val="100000"/>
+                <a:satMod val="110000"/>
+              </a:schemeClr>
+            </a:gs>
+          </a:gsLst>
+          <a:path path="circle">
+            <a:fillToRect l="100000" t="100000" r="100000" b="100000"/>
+          </a:path>
+        </a:gradFill>
+        <a:ln>
+          <a:noFill/>
+        </a:ln>
+        <a:effectLst>
+          <a:outerShdw blurRad="44450" dist="25400" dir="2700000" algn="br" rotWithShape="0">
+            <a:srgbClr val="000000">
+              <a:alpha val="60000"/>
+            </a:srgbClr>
+          </a:outerShdw>
+        </a:effectLst>
+        <a:scene3d>
+          <a:camera prst="orthographicFront">
+            <a:rot lat="0" lon="0" rev="0"/>
+          </a:camera>
+          <a:lightRig rig="threePt" dir="t">
+            <a:rot lat="0" lon="0" rev="19800000"/>
+          </a:lightRig>
+        </a:scene3d>
+        <a:sp3d prstMaterial="flat">
+          <a:bevelT w="25400" h="31750"/>
+        </a:sp3d>
+      </dsp:spPr>
+      <dsp:style>
+        <a:lnRef idx="0">
+          <a:scrgbClr r="0" g="0" b="0"/>
+        </a:lnRef>
+        <a:fillRef idx="3">
+          <a:scrgbClr r="0" g="0" b="0"/>
+        </a:fillRef>
+        <a:effectRef idx="3">
+          <a:scrgbClr r="0" g="0" b="0"/>
+        </a:effectRef>
+        <a:fontRef idx="minor">
+          <a:schemeClr val="lt1"/>
+        </a:fontRef>
+      </dsp:style>
+      <dsp:txBody>
+        <a:bodyPr spcFirstLastPara="0" vert="horz" wrap="square" lIns="266129" tIns="0" rIns="266129" bIns="0" numCol="1" spcCol="1270" anchor="ctr" anchorCtr="0">
+          <a:noAutofit/>
+        </a:bodyPr>
+        <a:lstStyle/>
+        <a:p>
+          <a:pPr marL="0" lvl="0" indent="0" algn="l" defTabSz="933450">
+            <a:lnSpc>
+              <a:spcPct val="90000"/>
+            </a:lnSpc>
+            <a:spcBef>
+              <a:spcPct val="0"/>
+            </a:spcBef>
+            <a:spcAft>
+              <a:spcPct val="35000"/>
+            </a:spcAft>
+            <a:buNone/>
+          </a:pPr>
+          <a:r>
+            <a:rPr lang="en-US" sz="2100" kern="1200"/>
+            <a:t>Robert LaNier – Data Analyst</a:t>
+          </a:r>
+        </a:p>
+      </dsp:txBody>
+      <dsp:txXfrm>
+        <a:off x="533182" y="2919967"/>
+        <a:ext cx="6980356" cy="559396"/>
+      </dsp:txXfrm>
+    </dsp:sp>
+  </dsp:spTree>
+</dsp:drawing>
+</file>
+
+<file path=ppt/diagrams/layout1.xml><?xml version="1.0" encoding="utf-8"?>
+<dgm:layoutDef xmlns:dgm="http://schemas.openxmlformats.org/drawingml/2006/diagram" xmlns:a="http://schemas.openxmlformats.org/drawingml/2006/main" uniqueId="urn:microsoft.com/office/officeart/2005/8/layout/list1">
+  <dgm:title val=""/>
+  <dgm:desc val=""/>
+  <dgm:catLst>
+    <dgm:cat type="list" pri="4000"/>
+  </dgm:catLst>
+  <dgm:sampData>
+    <dgm:dataModel>
+      <dgm:ptLst>
+        <dgm:pt modelId="0" type="doc"/>
+        <dgm:pt modelId="1">
+          <dgm:prSet phldr="1"/>
+        </dgm:pt>
+        <dgm:pt modelId="2">
+          <dgm:prSet phldr="1"/>
+        </dgm:pt>
+        <dgm:pt modelId="3">
+          <dgm:prSet phldr="1"/>
+        </dgm:pt>
+      </dgm:ptLst>
+      <dgm:cxnLst>
+        <dgm:cxn modelId="4" srcId="0" destId="1" srcOrd="0" destOrd="0"/>
+        <dgm:cxn modelId="5" srcId="0" destId="2" srcOrd="1" destOrd="0"/>
+        <dgm:cxn modelId="6" srcId="0" destId="3" srcOrd="2" destOrd="0"/>
+      </dgm:cxnLst>
+      <dgm:bg/>
+      <dgm:whole/>
+    </dgm:dataModel>
+  </dgm:sampData>
+  <dgm:styleData>
+    <dgm:dataModel>
+      <dgm:ptLst>
+        <dgm:pt modelId="0" type="doc"/>
+        <dgm:pt modelId="1"/>
+        <dgm:pt modelId="2"/>
+      </dgm:ptLst>
+      <dgm:cxnLst>
+        <dgm:cxn modelId="4" srcId="0" destId="1" srcOrd="0" destOrd="0"/>
+        <dgm:cxn modelId="5" srcId="0" destId="2" srcOrd="1" destOrd="0"/>
+      </dgm:cxnLst>
+      <dgm:bg/>
+      <dgm:whole/>
+    </dgm:dataModel>
+  </dgm:styleData>
+  <dgm:clrData>
+    <dgm:dataModel>
+      <dgm:ptLst>
+        <dgm:pt modelId="0" type="doc"/>
+        <dgm:pt modelId="1"/>
+        <dgm:pt modelId="2"/>
+        <dgm:pt modelId="3"/>
+        <dgm:pt modelId="4"/>
+      </dgm:ptLst>
+      <dgm:cxnLst>
+        <dgm:cxn modelId="5" srcId="0" destId="1" srcOrd="0" destOrd="0"/>
+        <dgm:cxn modelId="6" srcId="0" destId="2" srcOrd="1" destOrd="0"/>
+        <dgm:cxn modelId="7" srcId="0" destId="3" srcOrd="2" destOrd="0"/>
+        <dgm:cxn modelId="8" srcId="0" destId="4" srcOrd="3" destOrd="0"/>
+      </dgm:cxnLst>
+      <dgm:bg/>
+      <dgm:whole/>
+    </dgm:dataModel>
+  </dgm:clrData>
+  <dgm:layoutNode name="linear">
+    <dgm:varLst>
+      <dgm:dir/>
+      <dgm:animLvl val="lvl"/>
+      <dgm:resizeHandles val="exact"/>
+    </dgm:varLst>
+    <dgm:choose name="Name0">
+      <dgm:if name="Name1" func="var" arg="dir" op="equ" val="norm">
+        <dgm:alg type="lin">
+          <dgm:param type="linDir" val="fromT"/>
+          <dgm:param type="vertAlign" val="mid"/>
+          <dgm:param type="horzAlign" val="l"/>
+          <dgm:param type="nodeHorzAlign" val="l"/>
+        </dgm:alg>
+      </dgm:if>
+      <dgm:else name="Name2">
+        <dgm:alg type="lin">
+          <dgm:param type="linDir" val="fromT"/>
+          <dgm:param type="vertAlign" val="mid"/>
+          <dgm:param type="horzAlign" val="r"/>
+          <dgm:param type="nodeHorzAlign" val="r"/>
+        </dgm:alg>
+      </dgm:else>
+    </dgm:choose>
+    <dgm:shape xmlns:r="http://schemas.openxmlformats.org/officeDocument/2006/relationships" r:blip="">
+      <dgm:adjLst/>
+    </dgm:shape>
+    <dgm:presOf/>
+    <dgm:constrLst>
+      <dgm:constr type="w" for="ch" forName="parentLin" refType="w"/>
+      <dgm:constr type="h" for="ch" forName="parentLin" val="INF"/>
+      <dgm:constr type="w" for="des" forName="parentLeftMargin" refType="w" fact="0.05"/>
+      <dgm:constr type="w" for="des" forName="parentText" refType="w" fact="0.7"/>
+      <dgm:constr type="h" for="des" forName="parentText" refType="primFontSz" refFor="des" refForName="parentText" fact="0.82"/>
+      <dgm:constr type="h" for="ch" forName="negativeSpace" refType="primFontSz" refFor="des" refForName="parentText" fact="-0.41"/>
+      <dgm:constr type="h" for="ch" forName="negativeSpace" refType="h" refFor="des" refForName="parentText" op="lte" fact="-0.82"/>
+      <dgm:constr type="h" for="ch" forName="negativeSpace" refType="h" refFor="des" refForName="parentText" op="gte" fact="-0.82"/>
+      <dgm:constr type="w" for="ch" forName="childText" refType="w"/>
+      <dgm:constr type="h" for="ch" forName="childText" refType="primFontSz" refFor="des" refForName="parentText" fact="0.7"/>
+      <dgm:constr type="primFontSz" for="des" forName="parentText" val="65"/>
+      <dgm:constr type="primFontSz" for="ch" forName="childText" refType="primFontSz" refFor="des" refForName="parentText"/>
+      <dgm:constr type="tMarg" for="ch" forName="childText" refType="primFontSz" refFor="des" refForName="parentText" fact="1.64"/>
+      <dgm:constr type="tMarg" for="ch" forName="childText" refType="h" refFor="des" refForName="parentText" op="lte" fact="3.28"/>
+      <dgm:constr type="tMarg" for="ch" forName="childText" refType="h" refFor="des" refForName="parentText" op="gte" fact="3.28"/>
+      <dgm:constr type="lMarg" for="ch" forName="childText" refType="w" fact="0.22"/>
+      <dgm:constr type="rMarg" for="ch" forName="childText" refType="lMarg" refFor="ch" refForName="childText"/>
+      <dgm:constr type="lMarg" for="des" forName="parentText" refType="w" fact="0.075"/>
+      <dgm:constr type="rMarg" for="des" forName="parentText" refType="lMarg" refFor="des" refForName="parentText"/>
+      <dgm:constr type="h" for="ch" forName="spaceBetweenRectangles" refType="primFontSz" refFor="des" refForName="parentText" fact="0.15"/>
+    </dgm:constrLst>
+    <dgm:ruleLst>
+      <dgm:rule type="primFontSz" for="des" forName="parentText" val="5" fact="NaN" max="NaN"/>
+    </dgm:ruleLst>
+    <dgm:forEach name="Name3" axis="ch" ptType="node">
+      <dgm:layoutNode name="parentLin">
+        <dgm:choose name="Name4">
+          <dgm:if name="Name5" func="var" arg="dir" op="equ" val="norm">
+            <dgm:alg type="lin">
+              <dgm:param type="linDir" val="fromL"/>
+              <dgm:param type="horzAlign" val="l"/>
+              <dgm:param type="nodeHorzAlign" val="l"/>
+            </dgm:alg>
+          </dgm:if>
+          <dgm:else name="Name6">
+            <dgm:alg type="lin">
+              <dgm:param type="linDir" val="fromR"/>
+              <dgm:param type="horzAlign" val="r"/>
+              <dgm:param type="nodeHorzAlign" val="r"/>
+            </dgm:alg>
+          </dgm:else>
+        </dgm:choose>
+        <dgm:shape xmlns:r="http://schemas.openxmlformats.org/officeDocument/2006/relationships" r:blip="">
+          <dgm:adjLst/>
+        </dgm:shape>
+        <dgm:presOf/>
+        <dgm:constrLst/>
+        <dgm:ruleLst/>
+        <dgm:layoutNode name="parentLeftMargin">
+          <dgm:alg type="sp"/>
+          <dgm:shape xmlns:r="http://schemas.openxmlformats.org/officeDocument/2006/relationships" type="rect" r:blip="" hideGeom="1">
+            <dgm:adjLst/>
+          </dgm:shape>
+          <dgm:presOf axis="self"/>
+          <dgm:constrLst>
+            <dgm:constr type="h"/>
+          </dgm:constrLst>
+          <dgm:ruleLst/>
+        </dgm:layoutNode>
+        <dgm:layoutNode name="parentText" styleLbl="node1">
+          <dgm:varLst>
+            <dgm:chMax val="0"/>
+            <dgm:bulletEnabled val="1"/>
+          </dgm:varLst>
+          <dgm:choose name="Name7">
+            <dgm:if name="Name8" func="var" arg="dir" op="equ" val="norm">
+              <dgm:alg type="tx">
+                <dgm:param type="parTxLTRAlign" val="l"/>
+                <dgm:param type="parTxRTLAlign" val="l"/>
+              </dgm:alg>
+            </dgm:if>
+            <dgm:else name="Name9">
+              <dgm:alg type="tx">
+                <dgm:param type="parTxLTRAlign" val="r"/>
+                <dgm:param type="parTxRTLAlign" val="r"/>
+              </dgm:alg>
+            </dgm:else>
+          </dgm:choose>
+          <dgm:shape xmlns:r="http://schemas.openxmlformats.org/officeDocument/2006/relationships" type="roundRect" r:blip="">
+            <dgm:adjLst/>
+          </dgm:shape>
+          <dgm:presOf axis="self" ptType="node"/>
+          <dgm:constrLst>
+            <dgm:constr type="tMarg"/>
+            <dgm:constr type="bMarg"/>
+          </dgm:constrLst>
+          <dgm:ruleLst/>
+        </dgm:layoutNode>
+      </dgm:layoutNode>
+      <dgm:layoutNode name="negativeSpace">
+        <dgm:alg type="sp"/>
+        <dgm:shape xmlns:r="http://schemas.openxmlformats.org/officeDocument/2006/relationships" r:blip="">
+          <dgm:adjLst/>
+        </dgm:shape>
+        <dgm:presOf/>
+        <dgm:constrLst/>
+        <dgm:ruleLst/>
+      </dgm:layoutNode>
+      <dgm:layoutNode name="childText" styleLbl="conFgAcc1">
+        <dgm:varLst>
+          <dgm:bulletEnabled val="1"/>
+        </dgm:varLst>
+        <dgm:alg type="tx">
+          <dgm:param type="stBulletLvl" val="1"/>
+        </dgm:alg>
+        <dgm:shape xmlns:r="http://schemas.openxmlformats.org/officeDocument/2006/relationships" type="rect" r:blip="" zOrderOff="-2">
+          <dgm:adjLst/>
+        </dgm:shape>
+        <dgm:presOf axis="des" ptType="node"/>
+        <dgm:constrLst>
+          <dgm:constr type="secFontSz" refType="primFontSz"/>
+        </dgm:constrLst>
+        <dgm:ruleLst>
+          <dgm:rule type="h" val="INF" fact="NaN" max="NaN"/>
+        </dgm:ruleLst>
+      </dgm:layoutNode>
+      <dgm:forEach name="Name10" axis="followSib" ptType="sibTrans" cnt="1">
+        <dgm:layoutNode name="spaceBetweenRectangles">
+          <dgm:alg type="sp"/>
+          <dgm:shape xmlns:r="http://schemas.openxmlformats.org/officeDocument/2006/relationships" r:blip="">
+            <dgm:adjLst/>
+          </dgm:shape>
+          <dgm:presOf/>
+          <dgm:constrLst/>
+          <dgm:ruleLst/>
+        </dgm:layoutNode>
+      </dgm:forEach>
+    </dgm:forEach>
+  </dgm:layoutNode>
+</dgm:layoutDef>
+</file>
+
+<file path=ppt/diagrams/quickStyle1.xml><?xml version="1.0" encoding="utf-8"?>
+<dgm:styleDef xmlns:dgm="http://schemas.openxmlformats.org/drawingml/2006/diagram" xmlns:a="http://schemas.openxmlformats.org/drawingml/2006/main" uniqueId="urn:microsoft.com/office/officeart/2005/8/quickstyle/simple5">
+  <dgm:title val=""/>
+  <dgm:desc val=""/>
+  <dgm:catLst>
+    <dgm:cat type="simple" pri="10500"/>
+  </dgm:catLst>
+  <dgm:scene3d>
+    <a:camera prst="orthographicFront"/>
+    <a:lightRig rig="threePt" dir="t"/>
+  </dgm:scene3d>
+  <dgm:styleLbl name="node0">
+    <dgm:scene3d>
+      <a:camera prst="orthographicFront"/>
+      <a:lightRig rig="threePt" dir="t"/>
+    </dgm:scene3d>
+    <dgm:sp3d/>
+    <dgm:txPr/>
+    <dgm:style>
+      <a:lnRef idx="0">
+        <a:scrgbClr r="0" g="0" b="0"/>
+      </a:lnRef>
+      <a:fillRef idx="3">
+        <a:scrgbClr r="0" g="0" b="0"/>
+      </a:fillRef>
+      <a:effectRef idx="3">
+        <a:scrgbClr r="0" g="0" b="0"/>
+      </a:effectRef>
+      <a:fontRef idx="minor">
+        <a:schemeClr val="lt1"/>
+      </a:fontRef>
+    </dgm:style>
+  </dgm:styleLbl>
+  <dgm:styleLbl name="lnNode1">
+    <dgm:scene3d>
+      <a:camera prst="orthographicFront"/>
+      <a:lightRig rig="threePt" dir="t"/>
+    </dgm:scene3d>
+    <dgm:sp3d/>
+    <dgm:txPr/>
+    <dgm:style>
+      <a:lnRef idx="0">
+        <a:scrgbClr r="0" g="0" b="0"/>
+      </a:lnRef>
+      <a:fillRef idx="3">
+        <a:scrgbClr r="0" g="0" b="0"/>
+      </a:fillRef>
+      <a:effectRef idx="3">
+        <a:scrgbClr r="0" g="0" b="0"/>
+      </a:effectRef>
+      <a:fontRef idx="minor">
+        <a:schemeClr val="lt1"/>
+      </a:fontRef>
+    </dgm:style>
+  </dgm:styleLbl>
+  <dgm:styleLbl name="vennNode1">
+    <dgm:scene3d>
+      <a:camera prst="orthographicFront"/>
+      <a:lightRig rig="threePt" dir="t"/>
+    </dgm:scene3d>
+    <dgm:sp3d/>
+    <dgm:txPr/>
+    <dgm:style>
+      <a:lnRef idx="0">
+        <a:scrgbClr r="0" g="0" b="0"/>
+      </a:lnRef>
+      <a:fillRef idx="3">
+        <a:scrgbClr r="0" g="0" b="0"/>
+      </a:fillRef>
+      <a:effectRef idx="3">
+        <a:scrgbClr r="0" g="0" b="0"/>
+      </a:effectRef>
+      <a:fontRef idx="minor">
+        <a:schemeClr val="tx1"/>
+      </a:fontRef>
+    </dgm:style>
+  </dgm:styleLbl>
+  <dgm:styleLbl name="alignNode1">
+    <dgm:scene3d>
+      <a:camera prst="orthographicFront"/>
+      <a:lightRig rig="threePt" dir="t"/>
+    </dgm:scene3d>
+    <dgm:sp3d/>
+    <dgm:txPr/>
+    <dgm:style>
+      <a:lnRef idx="1">
+        <a:scrgbClr r="0" g="0" b="0"/>
+      </a:lnRef>
+      <a:fillRef idx="3">
+        <a:scrgbClr r="0" g="0" b="0"/>
+      </a:fillRef>
+      <a:effectRef idx="3">
+        <a:scrgbClr r="0" g="0" b="0"/>
+      </a:effectRef>
+      <a:fontRef idx="minor">
+        <a:schemeClr val="lt1"/>
+      </a:fontRef>
+    </dgm:style>
+  </dgm:styleLbl>
+  <dgm:styleLbl name="node1">
+    <dgm:scene3d>
+      <a:camera prst="orthographicFront"/>
+      <a:lightRig rig="threePt" dir="t"/>
+    </dgm:scene3d>
+    <dgm:sp3d/>
+    <dgm:txPr/>
+    <dgm:style>
+      <a:lnRef idx="0">
+        <a:scrgbClr r="0" g="0" b="0"/>
+      </a:lnRef>
+      <a:fillRef idx="3">
+        <a:scrgbClr r="0" g="0" b="0"/>
+      </a:fillRef>
+      <a:effectRef idx="3">
+        <a:scrgbClr r="0" g="0" b="0"/>
+      </a:effectRef>
+      <a:fontRef idx="minor">
+        <a:schemeClr val="lt1"/>
+      </a:fontRef>
+    </dgm:style>
+  </dgm:styleLbl>
+  <dgm:styleLbl name="node2">
+    <dgm:scene3d>
+      <a:camera prst="orthographicFront"/>
+      <a:lightRig rig="threePt" dir="t"/>
+    </dgm:scene3d>
+    <dgm:sp3d/>
+    <dgm:txPr/>
+    <dgm:style>
+      <a:lnRef idx="0">
+        <a:scrgbClr r="0" g="0" b="0"/>
+      </a:lnRef>
+      <a:fillRef idx="3">
+        <a:scrgbClr r="0" g="0" b="0"/>
+      </a:fillRef>
+      <a:effectRef idx="3">
+        <a:scrgbClr r="0" g="0" b="0"/>
+      </a:effectRef>
+      <a:fontRef idx="minor">
+        <a:schemeClr val="lt1"/>
+      </a:fontRef>
+    </dgm:style>
+  </dgm:styleLbl>
+  <dgm:styleLbl name="node3">
+    <dgm:scene3d>
+      <a:camera prst="orthographicFront"/>
+      <a:lightRig rig="threePt" dir="t"/>
+    </dgm:scene3d>
+    <dgm:sp3d/>
+    <dgm:txPr/>
+    <dgm:style>
+      <a:lnRef idx="0">
+        <a:scrgbClr r="0" g="0" b="0"/>
+      </a:lnRef>
+      <a:fillRef idx="3">
+        <a:scrgbClr r="0" g="0" b="0"/>
+      </a:fillRef>
+      <a:effectRef idx="3">
+        <a:scrgbClr r="0" g="0" b="0"/>
+      </a:effectRef>
+      <a:fontRef idx="minor">
+        <a:schemeClr val="lt1"/>
+      </a:fontRef>
+    </dgm:style>
+  </dgm:styleLbl>
+  <dgm:styleLbl name="node4">
+    <dgm:scene3d>
+      <a:camera prst="orthographicFront"/>
+      <a:lightRig rig="threePt" dir="t"/>
+    </dgm:scene3d>
+    <dgm:sp3d/>
+    <dgm:txPr/>
+    <dgm:style>
+      <a:lnRef idx="0">
+        <a:scrgbClr r="0" g="0" b="0"/>
+      </a:lnRef>
+      <a:fillRef idx="3">
+        <a:scrgbClr r="0" g="0" b="0"/>
+      </a:fillRef>
+      <a:effectRef idx="3">
+        <a:scrgbClr r="0" g="0" b="0"/>
+      </a:effectRef>
+      <a:fontRef idx="minor">
+        <a:schemeClr val="lt1"/>
+      </a:fontRef>
+    </dgm:style>
+  </dgm:styleLbl>
+  <dgm:styleLbl name="fgImgPlace1">
+    <dgm:scene3d>
+      <a:camera prst="orthographicFront"/>
+      <a:lightRig rig="threePt" dir="t"/>
+    </dgm:scene3d>
+    <dgm:sp3d/>
+    <dgm:txPr/>
+    <dgm:style>
+      <a:lnRef idx="0">
+        <a:scrgbClr r="0" g="0" b="0"/>
+      </a:lnRef>
+      <a:fillRef idx="1">
+        <a:scrgbClr r="0" g="0" b="0"/>
+      </a:fillRef>
+      <a:effectRef idx="3">
+        <a:scrgbClr r="0" g="0" b="0"/>
+      </a:effectRef>
+      <a:fontRef idx="minor"/>
+    </dgm:style>
+  </dgm:styleLbl>
+  <dgm:styleLbl name="alignImgPlace1">
+    <dgm:scene3d>
+      <a:camera prst="orthographicFront"/>
+      <a:lightRig rig="threePt" dir="t"/>
+    </dgm:scene3d>
+    <dgm:sp3d/>
+    <dgm:txPr/>
+    <dgm:style>
+      <a:lnRef idx="0">
+        <a:scrgbClr r="0" g="0" b="0"/>
+      </a:lnRef>
+      <a:fillRef idx="1">
+        <a:scrgbClr r="0" g="0" b="0"/>
+      </a:fillRef>
+      <a:effectRef idx="3">
+        <a:scrgbClr r="0" g="0" b="0"/>
+      </a:effectRef>
+      <a:fontRef idx="minor"/>
+    </dgm:style>
+  </dgm:styleLbl>
+  <dgm:styleLbl name="bgImgPlace1">
+    <dgm:scene3d>
+      <a:camera prst="orthographicFront"/>
+      <a:lightRig rig="threePt" dir="t"/>
+    </dgm:scene3d>
+    <dgm:sp3d/>
+    <dgm:txPr/>
+    <dgm:style>
+      <a:lnRef idx="0">
+        <a:scrgbClr r="0" g="0" b="0"/>
+      </a:lnRef>
+      <a:fillRef idx="1">
+        <a:scrgbClr r="0" g="0" b="0"/>
+      </a:fillRef>
+      <a:effectRef idx="3">
+        <a:scrgbClr r="0" g="0" b="0"/>
+      </a:effectRef>
+      <a:fontRef idx="minor"/>
+    </dgm:style>
+  </dgm:styleLbl>
+  <dgm:styleLbl name="sibTrans2D1">
+    <dgm:scene3d>
+      <a:camera prst="orthographicFront"/>
+      <a:lightRig rig="threePt" dir="t"/>
+    </dgm:scene3d>
+    <dgm:sp3d/>
+    <dgm:txPr/>
+    <dgm:style>
+      <a:lnRef idx="0">
+        <a:scrgbClr r="0" g="0" b="0"/>
+      </a:lnRef>
+      <a:fillRef idx="3">
+        <a:scrgbClr r="0" g="0" b="0"/>
+      </a:fillRef>
+      <a:effectRef idx="3">
+        <a:scrgbClr r="0" g="0" b="0"/>
+      </a:effectRef>
+      <a:fontRef idx="minor">
+        <a:schemeClr val="lt1"/>
+      </a:fontRef>
+    </dgm:style>
+  </dgm:styleLbl>
+  <dgm:styleLbl name="fgSibTrans2D1">
+    <dgm:scene3d>
+      <a:camera prst="orthographicFront"/>
+      <a:lightRig rig="threePt" dir="t"/>
+    </dgm:scene3d>
+    <dgm:sp3d/>
+    <dgm:txPr/>
+    <dgm:style>
+      <a:lnRef idx="0">
+        <a:scrgbClr r="0" g="0" b="0"/>
+      </a:lnRef>
+      <a:fillRef idx="3">
+        <a:scrgbClr r="0" g="0" b="0"/>
+      </a:fillRef>
+      <a:effectRef idx="3">
+        <a:scrgbClr r="0" g="0" b="0"/>
+      </a:effectRef>
+      <a:fontRef idx="minor">
+        <a:schemeClr val="lt1"/>
+      </a:fontRef>
+    </dgm:style>
+  </dgm:styleLbl>
+  <dgm:styleLbl name="bgSibTrans2D1">
+    <dgm:scene3d>
+      <a:camera prst="orthographicFront"/>
+      <a:lightRig rig="threePt" dir="t"/>
+    </dgm:scene3d>
+    <dgm:sp3d/>
+    <dgm:txPr/>
+    <dgm:style>
+      <a:lnRef idx="0">
+        <a:scrgbClr r="0" g="0" b="0"/>
+      </a:lnRef>
+      <a:fillRef idx="3">
+        <a:scrgbClr r="0" g="0" b="0"/>
+      </a:fillRef>
+      <a:effectRef idx="3">
+        <a:scrgbClr r="0" g="0" b="0"/>
+      </a:effectRef>
+      <a:fontRef idx="minor">
+        <a:schemeClr val="lt1"/>
+      </a:fontRef>
+    </dgm:style>
+  </dgm:styleLbl>
+  <dgm:styleLbl name="sibTrans1D1">
+    <dgm:scene3d>
+      <a:camera prst="orthographicFront"/>
+      <a:lightRig rig="threePt" dir="t"/>
+    </dgm:scene3d>
+    <dgm:sp3d/>
+    <dgm:txPr/>
+    <dgm:style>
+      <a:lnRef idx="1">
+        <a:scrgbClr r="0" g="0" b="0"/>
+      </a:lnRef>
+      <a:fillRef idx="0">
+        <a:scrgbClr r="0" g="0" b="0"/>
+      </a:fillRef>
+      <a:effectRef idx="0">
+        <a:scrgbClr r="0" g="0" b="0"/>
+      </a:effectRef>
+      <a:fontRef idx="minor"/>
+    </dgm:style>
+  </dgm:styleLbl>
+  <dgm:styleLbl name="callout">
+    <dgm:scene3d>
+      <a:camera prst="orthographicFront"/>
+      <a:lightRig rig="threePt" dir="t"/>
+    </dgm:scene3d>
+    <dgm:sp3d/>
+    <dgm:txPr/>
+    <dgm:style>
+      <a:lnRef idx="1">
+        <a:scrgbClr r="0" g="0" b="0"/>
+      </a:lnRef>
+      <a:fillRef idx="0">
+        <a:scrgbClr r="0" g="0" b="0"/>
+      </a:fillRef>
+      <a:effectRef idx="1">
+        <a:scrgbClr r="0" g="0" b="0"/>
+      </a:effectRef>
+      <a:fontRef idx="minor"/>
+    </dgm:style>
+  </dgm:styleLbl>
+  <dgm:styleLbl name="asst0">
+    <dgm:scene3d>
+      <a:camera prst="orthographicFront"/>
+      <a:lightRig rig="threePt" dir="t"/>
+    </dgm:scene3d>
+    <dgm:sp3d/>
+    <dgm:txPr/>
+    <dgm:style>
+      <a:lnRef idx="0">
+        <a:scrgbClr r="0" g="0" b="0"/>
+      </a:lnRef>
+      <a:fillRef idx="3">
+        <a:scrgbClr r="0" g="0" b="0"/>
+      </a:fillRef>
+      <a:effectRef idx="3">
+        <a:scrgbClr r="0" g="0" b="0"/>
+      </a:effectRef>
+      <a:fontRef idx="minor">
+        <a:schemeClr val="lt1"/>
+      </a:fontRef>
+    </dgm:style>
+  </dgm:styleLbl>
+  <dgm:styleLbl name="asst1">
+    <dgm:scene3d>
+      <a:camera prst="orthographicFront"/>
+      <a:lightRig rig="threePt" dir="t"/>
+    </dgm:scene3d>
+    <dgm:sp3d/>
+    <dgm:txPr/>
+    <dgm:style>
+      <a:lnRef idx="0">
+        <a:scrgbClr r="0" g="0" b="0"/>
+      </a:lnRef>
+      <a:fillRef idx="3">
+        <a:scrgbClr r="0" g="0" b="0"/>
+      </a:fillRef>
+      <a:effectRef idx="3">
+        <a:scrgbClr r="0" g="0" b="0"/>
+      </a:effectRef>
+      <a:fontRef idx="minor">
+        <a:schemeClr val="lt1"/>
+      </a:fontRef>
+    </dgm:style>
+  </dgm:styleLbl>
+  <dgm:styleLbl name="asst2">
+    <dgm:scene3d>
+      <a:camera prst="orthographicFront"/>
+      <a:lightRig rig="threePt" dir="t"/>
+    </dgm:scene3d>
+    <dgm:sp3d/>
+    <dgm:txPr/>
+    <dgm:style>
+      <a:lnRef idx="0">
+        <a:scrgbClr r="0" g="0" b="0"/>
+      </a:lnRef>
+      <a:fillRef idx="3">
+        <a:scrgbClr r="0" g="0" b="0"/>
+      </a:fillRef>
+      <a:effectRef idx="3">
+        <a:scrgbClr r="0" g="0" b="0"/>
+      </a:effectRef>
+      <a:fontRef idx="minor">
+        <a:schemeClr val="lt1"/>
+      </a:fontRef>
+    </dgm:style>
+  </dgm:styleLbl>
+  <dgm:styleLbl name="asst3">
+    <dgm:scene3d>
+      <a:camera prst="orthographicFront"/>
+      <a:lightRig rig="threePt" dir="t"/>
+    </dgm:scene3d>
+    <dgm:sp3d/>
+    <dgm:txPr/>
+    <dgm:style>
+      <a:lnRef idx="0">
+        <a:scrgbClr r="0" g="0" b="0"/>
+      </a:lnRef>
+      <a:fillRef idx="3">
+        <a:scrgbClr r="0" g="0" b="0"/>
+      </a:fillRef>
+      <a:effectRef idx="3">
+        <a:scrgbClr r="0" g="0" b="0"/>
+      </a:effectRef>
+      <a:fontRef idx="minor">
+        <a:schemeClr val="lt1"/>
+      </a:fontRef>
+    </dgm:style>
+  </dgm:styleLbl>
+  <dgm:styleLbl name="asst4">
+    <dgm:scene3d>
+      <a:camera prst="orthographicFront"/>
+      <a:lightRig rig="threePt" dir="t"/>
+    </dgm:scene3d>
+    <dgm:sp3d/>
+    <dgm:txPr/>
+    <dgm:style>
+      <a:lnRef idx="0">
+        <a:scrgbClr r="0" g="0" b="0"/>
+      </a:lnRef>
+      <a:fillRef idx="3">
+        <a:scrgbClr r="0" g="0" b="0"/>
+      </a:fillRef>
+      <a:effectRef idx="3">
+        <a:scrgbClr r="0" g="0" b="0"/>
+      </a:effectRef>
+      <a:fontRef idx="minor">
+        <a:schemeClr val="lt1"/>
+      </a:fontRef>
+    </dgm:style>
+  </dgm:styleLbl>
+  <dgm:styleLbl name="parChTrans2D1">
+    <dgm:scene3d>
+      <a:camera prst="orthographicFront"/>
+      <a:lightRig rig="threePt" dir="t"/>
+    </dgm:scene3d>
+    <dgm:sp3d/>
+    <dgm:txPr/>
+    <dgm:style>
+      <a:lnRef idx="0">
+        <a:scrgbClr r="0" g="0" b="0"/>
+      </a:lnRef>
+      <a:fillRef idx="3">
+        <a:scrgbClr r="0" g="0" b="0"/>
+      </a:fillRef>
+      <a:effectRef idx="3">
+        <a:scrgbClr r="0" g="0" b="0"/>
+      </a:effectRef>
+      <a:fontRef idx="minor">
+        <a:schemeClr val="lt1"/>
+      </a:fontRef>
+    </dgm:style>
+  </dgm:styleLbl>
+  <dgm:styleLbl name="parChTrans2D2">
+    <dgm:scene3d>
+      <a:camera prst="orthographicFront"/>
+      <a:lightRig rig="threePt" dir="t"/>
+    </dgm:scene3d>
+    <dgm:sp3d/>
+    <dgm:txPr/>
+    <dgm:style>
+      <a:lnRef idx="0">
+        <a:scrgbClr r="0" g="0" b="0"/>
+      </a:lnRef>
+      <a:fillRef idx="3">
+        <a:scrgbClr r="0" g="0" b="0"/>
+      </a:fillRef>
+      <a:effectRef idx="3">
+        <a:scrgbClr r="0" g="0" b="0"/>
+      </a:effectRef>
+      <a:fontRef idx="minor">
+        <a:schemeClr val="lt1"/>
+      </a:fontRef>
+    </dgm:style>
+  </dgm:styleLbl>
+  <dgm:styleLbl name="parChTrans2D3">
+    <dgm:scene3d>
+      <a:camera prst="orthographicFront"/>
+      <a:lightRig rig="threePt" dir="t"/>
+    </dgm:scene3d>
+    <dgm:sp3d/>
+    <dgm:txPr/>
+    <dgm:style>
+      <a:lnRef idx="0">
+        <a:scrgbClr r="0" g="0" b="0"/>
+      </a:lnRef>
+      <a:fillRef idx="3">
+        <a:scrgbClr r="0" g="0" b="0"/>
+      </a:fillRef>
+      <a:effectRef idx="3">
+        <a:scrgbClr r="0" g="0" b="0"/>
+      </a:effectRef>
+      <a:fontRef idx="minor">
+        <a:schemeClr val="lt1"/>
+      </a:fontRef>
+    </dgm:style>
+  </dgm:styleLbl>
+  <dgm:styleLbl name="parChTrans2D4">
+    <dgm:scene3d>
+      <a:camera prst="orthographicFront"/>
+      <a:lightRig rig="threePt" dir="t"/>
+    </dgm:scene3d>
+    <dgm:sp3d/>
+    <dgm:txPr/>
+    <dgm:style>
+      <a:lnRef idx="0">
+        <a:scrgbClr r="0" g="0" b="0"/>
+      </a:lnRef>
+      <a:fillRef idx="3">
+        <a:scrgbClr r="0" g="0" b="0"/>
+      </a:fillRef>
+      <a:effectRef idx="3">
+        <a:scrgbClr r="0" g="0" b="0"/>
+      </a:effectRef>
+      <a:fontRef idx="minor">
+        <a:schemeClr val="lt1"/>
+      </a:fontRef>
+    </dgm:style>
+  </dgm:styleLbl>
+  <dgm:styleLbl name="parChTrans1D1">
+    <dgm:scene3d>
+      <a:camera prst="orthographicFront"/>
+      <a:lightRig rig="threePt" dir="t"/>
+    </dgm:scene3d>
+    <dgm:sp3d/>
+    <dgm:txPr/>
+    <dgm:style>
+      <a:lnRef idx="2">
+        <a:scrgbClr r="0" g="0" b="0"/>
+      </a:lnRef>
+      <a:fillRef idx="0">
+        <a:scrgbClr r="0" g="0" b="0"/>
+      </a:fillRef>
+      <a:effectRef idx="0">
+        <a:scrgbClr r="0" g="0" b="0"/>
+      </a:effectRef>
+      <a:fontRef idx="minor"/>
+    </dgm:style>
+  </dgm:styleLbl>
+  <dgm:styleLbl name="parChTrans1D2">
+    <dgm:scene3d>
+      <a:camera prst="orthographicFront"/>
+      <a:lightRig rig="threePt" dir="t"/>
+    </dgm:scene3d>
+    <dgm:sp3d/>
+    <dgm:txPr/>
+    <dgm:style>
+      <a:lnRef idx="2">
+        <a:scrgbClr r="0" g="0" b="0"/>
+      </a:lnRef>
+      <a:fillRef idx="0">
+        <a:scrgbClr r="0" g="0" b="0"/>
+      </a:fillRef>
+      <a:effectRef idx="0">
+        <a:scrgbClr r="0" g="0" b="0"/>
+      </a:effectRef>
+      <a:fontRef idx="minor"/>
+    </dgm:style>
+  </dgm:styleLbl>
+  <dgm:styleLbl name="parChTrans1D3">
+    <dgm:scene3d>
+      <a:camera prst="orthographicFront"/>
+      <a:lightRig rig="threePt" dir="t"/>
+    </dgm:scene3d>
+    <dgm:sp3d/>
+    <dgm:txPr/>
+    <dgm:style>
+      <a:lnRef idx="2">
+        <a:scrgbClr r="0" g="0" b="0"/>
+      </a:lnRef>
+      <a:fillRef idx="0">
+        <a:scrgbClr r="0" g="0" b="0"/>
+      </a:fillRef>
+      <a:effectRef idx="0">
+        <a:scrgbClr r="0" g="0" b="0"/>
+      </a:effectRef>
+      <a:fontRef idx="minor"/>
+    </dgm:style>
+  </dgm:styleLbl>
+  <dgm:styleLbl name="parChTrans1D4">
+    <dgm:scene3d>
+      <a:camera prst="orthographicFront"/>
+      <a:lightRig rig="threePt" dir="t"/>
+    </dgm:scene3d>
+    <dgm:sp3d/>
+    <dgm:txPr/>
+    <dgm:style>
+      <a:lnRef idx="2">
+        <a:scrgbClr r="0" g="0" b="0"/>
+      </a:lnRef>
+      <a:fillRef idx="0">
+        <a:scrgbClr r="0" g="0" b="0"/>
+      </a:fillRef>
+      <a:effectRef idx="0">
+        <a:scrgbClr r="0" g="0" b="0"/>
+      </a:effectRef>
+      <a:fontRef idx="minor"/>
+    </dgm:style>
+  </dgm:styleLbl>
+  <dgm:styleLbl name="fgAcc1">
+    <dgm:scene3d>
+      <a:camera prst="orthographicFront"/>
+      <a:lightRig rig="threePt" dir="t"/>
+    </dgm:scene3d>
+    <dgm:sp3d/>
+    <dgm:txPr/>
+    <dgm:style>
+      <a:lnRef idx="1">
+        <a:scrgbClr r="0" g="0" b="0"/>
+      </a:lnRef>
+      <a:fillRef idx="1">
+        <a:scrgbClr r="0" g="0" b="0"/>
+      </a:fillRef>
+      <a:effectRef idx="2">
+        <a:scrgbClr r="0" g="0" b="0"/>
+      </a:effectRef>
+      <a:fontRef idx="minor"/>
+    </dgm:style>
+  </dgm:styleLbl>
+  <dgm:styleLbl name="conFgAcc1">
+    <dgm:scene3d>
+      <a:camera prst="orthographicFront"/>
+      <a:lightRig rig="threePt" dir="t"/>
+    </dgm:scene3d>
+    <dgm:sp3d/>
+    <dgm:txPr/>
+    <dgm:style>
+      <a:lnRef idx="1">
+        <a:scrgbClr r="0" g="0" b="0"/>
+      </a:lnRef>
+      <a:fillRef idx="1">
+        <a:scrgbClr r="0" g="0" b="0"/>
+      </a:fillRef>
+      <a:effectRef idx="2">
+        <a:scrgbClr r="0" g="0" b="0"/>
+      </a:effectRef>
+      <a:fontRef idx="minor"/>
+    </dgm:style>
+  </dgm:styleLbl>
+  <dgm:styleLbl name="alignAcc1">
+    <dgm:scene3d>
+      <a:camera prst="orthographicFront"/>
+      <a:lightRig rig="threePt" dir="t"/>
+    </dgm:scene3d>
+    <dgm:sp3d/>
+    <dgm:txPr/>
+    <dgm:style>
+      <a:lnRef idx="1">
+        <a:scrgbClr r="0" g="0" b="0"/>
+      </a:lnRef>
+      <a:fillRef idx="1">
+        <a:scrgbClr r="0" g="0" b="0"/>
+      </a:fillRef>
+      <a:effectRef idx="2">
+        <a:scrgbClr r="0" g="0" b="0"/>
+      </a:effectRef>
+      <a:fontRef idx="minor"/>
+    </dgm:style>
+  </dgm:styleLbl>
+  <dgm:styleLbl name="trAlignAcc1">
+    <dgm:scene3d>
+      <a:camera prst="orthographicFront"/>
+      <a:lightRig rig="threePt" dir="t"/>
+    </dgm:scene3d>
+    <dgm:sp3d/>
+    <dgm:txPr/>
+    <dgm:style>
+      <a:lnRef idx="1">
+        <a:scrgbClr r="0" g="0" b="0"/>
+      </a:lnRef>
+      <a:fillRef idx="1">
+        <a:scrgbClr r="0" g="0" b="0"/>
+      </a:fillRef>
+      <a:effectRef idx="0">
+        <a:scrgbClr r="0" g="0" b="0"/>
+      </a:effectRef>
+      <a:fontRef idx="minor"/>
+    </dgm:style>
+  </dgm:styleLbl>
+  <dgm:styleLbl name="bgAcc1">
+    <dgm:scene3d>
+      <a:camera prst="orthographicFront"/>
+      <a:lightRig rig="threePt" dir="t"/>
+    </dgm:scene3d>
+    <dgm:sp3d/>
+    <dgm:txPr/>
+    <dgm:style>
+      <a:lnRef idx="1">
+        <a:scrgbClr r="0" g="0" b="0"/>
+      </a:lnRef>
+      <a:fillRef idx="1">
+        <a:scrgbClr r="0" g="0" b="0"/>
+      </a:fillRef>
+      <a:effectRef idx="2">
+        <a:scrgbClr r="0" g="0" b="0"/>
+      </a:effectRef>
+      <a:fontRef idx="minor"/>
+    </dgm:style>
+  </dgm:styleLbl>
+  <dgm:styleLbl name="solidFgAcc1">
+    <dgm:scene3d>
+      <a:camera prst="orthographicFront"/>
+      <a:lightRig rig="threePt" dir="t"/>
+    </dgm:scene3d>
+    <dgm:sp3d/>
+    <dgm:txPr/>
+    <dgm:style>
+      <a:lnRef idx="1">
+        <a:scrgbClr r="0" g="0" b="0"/>
+      </a:lnRef>
+      <a:fillRef idx="1">
+        <a:scrgbClr r="0" g="0" b="0"/>
+      </a:fillRef>
+      <a:effectRef idx="2">
+        <a:scrgbClr r="0" g="0" b="0"/>
+      </a:effectRef>
+      <a:fontRef idx="minor"/>
+    </dgm:style>
+  </dgm:styleLbl>
+  <dgm:styleLbl name="solidAlignAcc1">
+    <dgm:scene3d>
+      <a:camera prst="orthographicFront"/>
+      <a:lightRig rig="threePt" dir="t"/>
+    </dgm:scene3d>
+    <dgm:sp3d/>
+    <dgm:txPr/>
+    <dgm:style>
+      <a:lnRef idx="1">
+        <a:scrgbClr r="0" g="0" b="0"/>
+      </a:lnRef>
+      <a:fillRef idx="1">
+        <a:scrgbClr r="0" g="0" b="0"/>
+      </a:fillRef>
+      <a:effectRef idx="3">
+        <a:scrgbClr r="0" g="0" b="0"/>
+      </a:effectRef>
+      <a:fontRef idx="minor"/>
+    </dgm:style>
+  </dgm:styleLbl>
+  <dgm:styleLbl name="solidBgAcc1">
+    <dgm:scene3d>
+      <a:camera prst="orthographicFront"/>
+      <a:lightRig rig="threePt" dir="t"/>
+    </dgm:scene3d>
+    <dgm:sp3d/>
+    <dgm:txPr/>
+    <dgm:style>
+      <a:lnRef idx="1">
+        <a:scrgbClr r="0" g="0" b="0"/>
+      </a:lnRef>
+      <a:fillRef idx="1">
+        <a:scrgbClr r="0" g="0" b="0"/>
+      </a:fillRef>
+      <a:effectRef idx="3">
+        <a:scrgbClr r="0" g="0" b="0"/>
+      </a:effectRef>
+      <a:fontRef idx="minor"/>
+    </dgm:style>
+  </dgm:styleLbl>
+  <dgm:styleLbl name="fgAccFollowNode1">
+    <dgm:scene3d>
+      <a:camera prst="orthographicFront"/>
+      <a:lightRig rig="threePt" dir="t"/>
+    </dgm:scene3d>
+    <dgm:sp3d/>
+    <dgm:txPr/>
+    <dgm:style>
+      <a:lnRef idx="1">
+        <a:scrgbClr r="0" g="0" b="0"/>
+      </a:lnRef>
+      <a:fillRef idx="1">
+        <a:scrgbClr r="0" g="0" b="0"/>
+      </a:fillRef>
+      <a:effectRef idx="2">
+        <a:scrgbClr r="0" g="0" b="0"/>
+      </a:effectRef>
+      <a:fontRef idx="minor"/>
+    </dgm:style>
+  </dgm:styleLbl>
+  <dgm:styleLbl name="alignAccFollowNode1">
+    <dgm:scene3d>
+      <a:camera prst="orthographicFront"/>
+      <a:lightRig rig="threePt" dir="t"/>
+    </dgm:scene3d>
+    <dgm:sp3d/>
+    <dgm:txPr/>
+    <dgm:style>
+      <a:lnRef idx="1">
+        <a:scrgbClr r="0" g="0" b="0"/>
+      </a:lnRef>
+      <a:fillRef idx="1">
+        <a:scrgbClr r="0" g="0" b="0"/>
+      </a:fillRef>
+      <a:effectRef idx="2">
+        <a:scrgbClr r="0" g="0" b="0"/>
+      </a:effectRef>
+      <a:fontRef idx="minor"/>
+    </dgm:style>
+  </dgm:styleLbl>
+  <dgm:styleLbl name="bgAccFollowNode1">
+    <dgm:scene3d>
+      <a:camera prst="orthographicFront"/>
+      <a:lightRig rig="threePt" dir="t"/>
+    </dgm:scene3d>
+    <dgm:sp3d/>
+    <dgm:txPr/>
+    <dgm:style>
+      <a:lnRef idx="1">
+        <a:scrgbClr r="0" g="0" b="0"/>
+      </a:lnRef>
+      <a:fillRef idx="1">
+        <a:scrgbClr r="0" g="0" b="0"/>
+      </a:fillRef>
+      <a:effectRef idx="2">
+        <a:scrgbClr r="0" g="0" b="0"/>
+      </a:effectRef>
+      <a:fontRef idx="minor"/>
+    </dgm:style>
+  </dgm:styleLbl>
+  <dgm:styleLbl name="fgAcc0">
+    <dgm:scene3d>
+      <a:camera prst="orthographicFront"/>
+      <a:lightRig rig="threePt" dir="t"/>
+    </dgm:scene3d>
+    <dgm:sp3d/>
+    <dgm:txPr/>
+    <dgm:style>
+      <a:lnRef idx="1">
+        <a:scrgbClr r="0" g="0" b="0"/>
+      </a:lnRef>
+      <a:fillRef idx="1">
+        <a:scrgbClr r="0" g="0" b="0"/>
+      </a:fillRef>
+      <a:effectRef idx="2">
+        <a:scrgbClr r="0" g="0" b="0"/>
+      </a:effectRef>
+      <a:fontRef idx="minor"/>
+    </dgm:style>
+  </dgm:styleLbl>
+  <dgm:styleLbl name="fgAcc2">
+    <dgm:scene3d>
+      <a:camera prst="orthographicFront"/>
+      <a:lightRig rig="threePt" dir="t"/>
+    </dgm:scene3d>
+    <dgm:sp3d/>
+    <dgm:txPr/>
+    <dgm:style>
+      <a:lnRef idx="1">
+        <a:scrgbClr r="0" g="0" b="0"/>
+      </a:lnRef>
+      <a:fillRef idx="1">
+        <a:scrgbClr r="0" g="0" b="0"/>
+      </a:fillRef>
+      <a:effectRef idx="2">
+        <a:scrgbClr r="0" g="0" b="0"/>
+      </a:effectRef>
+      <a:fontRef idx="minor"/>
+    </dgm:style>
+  </dgm:styleLbl>
+  <dgm:styleLbl name="fgAcc3">
+    <dgm:scene3d>
+      <a:camera prst="orthographicFront"/>
+      <a:lightRig rig="threePt" dir="t"/>
+    </dgm:scene3d>
+    <dgm:sp3d/>
+    <dgm:txPr/>
+    <dgm:style>
+      <a:lnRef idx="1">
+        <a:scrgbClr r="0" g="0" b="0"/>
+      </a:lnRef>
+      <a:fillRef idx="1">
+        <a:scrgbClr r="0" g="0" b="0"/>
+      </a:fillRef>
+      <a:effectRef idx="2">
+        <a:scrgbClr r="0" g="0" b="0"/>
+      </a:effectRef>
+      <a:fontRef idx="minor"/>
+    </dgm:style>
+  </dgm:styleLbl>
+  <dgm:styleLbl name="fgAcc4">
+    <dgm:scene3d>
+      <a:camera prst="orthographicFront"/>
+      <a:lightRig rig="threePt" dir="t"/>
+    </dgm:scene3d>
+    <dgm:sp3d/>
+    <dgm:txPr/>
+    <dgm:style>
+      <a:lnRef idx="1">
+        <a:scrgbClr r="0" g="0" b="0"/>
+      </a:lnRef>
+      <a:fillRef idx="1">
+        <a:scrgbClr r="0" g="0" b="0"/>
+      </a:fillRef>
+      <a:effectRef idx="2">
+        <a:scrgbClr r="0" g="0" b="0"/>
+      </a:effectRef>
+      <a:fontRef idx="minor"/>
+    </dgm:style>
+  </dgm:styleLbl>
+  <dgm:styleLbl name="bgShp">
+    <dgm:scene3d>
+      <a:camera prst="orthographicFront"/>
+      <a:lightRig rig="threePt" dir="t"/>
+    </dgm:scene3d>
+    <dgm:sp3d/>
+    <dgm:txPr/>
+    <dgm:style>
+      <a:lnRef idx="0">
+        <a:scrgbClr r="0" g="0" b="0"/>
+      </a:lnRef>
+      <a:fillRef idx="1">
+        <a:scrgbClr r="0" g="0" b="0"/>
+      </a:fillRef>
+      <a:effectRef idx="2">
+        <a:scrgbClr r="0" g="0" b="0"/>
+      </a:effectRef>
+      <a:fontRef idx="minor"/>
+    </dgm:style>
+  </dgm:styleLbl>
+  <dgm:styleLbl name="dkBgShp">
+    <dgm:scene3d>
+      <a:camera prst="orthographicFront"/>
+      <a:lightRig rig="threePt" dir="t"/>
+    </dgm:scene3d>
+    <dgm:sp3d/>
+    <dgm:txPr/>
+    <dgm:style>
+      <a:lnRef idx="0">
+        <a:scrgbClr r="0" g="0" b="0"/>
+      </a:lnRef>
+      <a:fillRef idx="1">
+        <a:scrgbClr r="0" g="0" b="0"/>
+      </a:fillRef>
+      <a:effectRef idx="3">
+        <a:scrgbClr r="0" g="0" b="0"/>
+      </a:effectRef>
+      <a:fontRef idx="minor"/>
+    </dgm:style>
+  </dgm:styleLbl>
+  <dgm:styleLbl name="trBgShp">
+    <dgm:scene3d>
+      <a:camera prst="orthographicFront"/>
+      <a:lightRig rig="threePt" dir="t"/>
+    </dgm:scene3d>
+    <dgm:sp3d/>
+    <dgm:txPr/>
+    <dgm:style>
+      <a:lnRef idx="0">
+        <a:scrgbClr r="0" g="0" b="0"/>
+      </a:lnRef>
+      <a:fillRef idx="1">
+        <a:scrgbClr r="0" g="0" b="0"/>
+      </a:fillRef>
+      <a:effectRef idx="0">
+        <a:scrgbClr r="0" g="0" b="0"/>
+      </a:effectRef>
+      <a:fontRef idx="minor"/>
+    </dgm:style>
+  </dgm:styleLbl>
+  <dgm:styleLbl name="fgShp">
+    <dgm:scene3d>
+      <a:camera prst="orthographicFront"/>
+      <a:lightRig rig="threePt" dir="t"/>
+    </dgm:scene3d>
+    <dgm:sp3d/>
+    <dgm:txPr/>
+    <dgm:style>
+      <a:lnRef idx="0">
+        <a:scrgbClr r="0" g="0" b="0"/>
+      </a:lnRef>
+      <a:fillRef idx="3">
+        <a:scrgbClr r="0" g="0" b="0"/>
+      </a:fillRef>
+      <a:effectRef idx="3">
+        <a:scrgbClr r="0" g="0" b="0"/>
+      </a:effectRef>
+      <a:fontRef idx="minor"/>
+    </dgm:style>
+  </dgm:styleLbl>
+  <dgm:styleLbl name="revTx">
+    <dgm:scene3d>
+      <a:camera prst="orthographicFront"/>
+      <a:lightRig rig="threePt" dir="t"/>
+    </dgm:scene3d>
+    <dgm:sp3d/>
+    <dgm:txPr/>
+    <dgm:style>
+      <a:lnRef idx="0">
+        <a:scrgbClr r="0" g="0" b="0"/>
+      </a:lnRef>
+      <a:fillRef idx="0">
+        <a:scrgbClr r="0" g="0" b="0"/>
+      </a:fillRef>
+      <a:effectRef idx="0">
+        <a:scrgbClr r="0" g="0" b="0"/>
+      </a:effectRef>
+      <a:fontRef idx="minor"/>
+    </dgm:style>
+  </dgm:styleLbl>
+</dgm:styleDef>
+</file>
+
 <file path=ppt/slideLayouts/slideLayout1.xml><?xml version="1.0" encoding="utf-8"?>
 <p:sldLayout xmlns:a="http://schemas.openxmlformats.org/drawingml/2006/main" xmlns:r="http://schemas.openxmlformats.org/officeDocument/2006/relationships" xmlns:p="http://schemas.openxmlformats.org/presentationml/2006/main" showMasterSp="0" type="title" preserve="1">
   <p:cSld name="Title Slide">
@@ -363,7 +3454,7 @@
           <a:p>
             <a:fld id="{9184DA70-C731-4C70-880D-CCD4705E623C}" type="datetime1">
               <a:rPr lang="en-US" smtClean="0"/>
-              <a:t>8/21/2021</a:t>
+              <a:t>8/24/2021</a:t>
             </a:fld>
             <a:endParaRPr lang="en-US" dirty="0"/>
           </a:p>
@@ -551,7 +3642,7 @@
           <a:p>
             <a:fld id="{B612A279-0833-481D-8C56-F67FD0AC6C50}" type="datetime1">
               <a:rPr lang="en-US" smtClean="0"/>
-              <a:t>8/21/2021</a:t>
+              <a:t>8/24/2021</a:t>
             </a:fld>
             <a:endParaRPr lang="en-US" dirty="0"/>
           </a:p>
@@ -793,7 +3884,7 @@
           <a:p>
             <a:fld id="{6587DA83-5663-4C9C-B9AA-0B40A3DAFF81}" type="datetime1">
               <a:rPr lang="en-US" smtClean="0"/>
-              <a:t>8/21/2021</a:t>
+              <a:t>8/24/2021</a:t>
             </a:fld>
             <a:endParaRPr lang="en-US" dirty="0"/>
           </a:p>
@@ -981,7 +4072,7 @@
           <a:p>
             <a:fld id="{4BE1D723-8F53-4F53-90B0-1982A396982E}" type="datetime1">
               <a:rPr lang="en-US" smtClean="0"/>
-              <a:t>8/21/2021</a:t>
+              <a:t>8/24/2021</a:t>
             </a:fld>
             <a:endParaRPr lang="en-US" dirty="0"/>
           </a:p>
@@ -1354,7 +4445,7 @@
           <a:p>
             <a:fld id="{97669AF7-7BEB-44E4-9852-375E34362B5B}" type="datetime1">
               <a:rPr lang="en-US" smtClean="0"/>
-              <a:t>8/21/2021</a:t>
+              <a:t>8/24/2021</a:t>
             </a:fld>
             <a:endParaRPr lang="en-US" dirty="0"/>
           </a:p>
@@ -1609,7 +4700,7 @@
           <a:p>
             <a:fld id="{BAAAC38D-0552-4C82-B593-E6124DFADBE2}" type="datetime1">
               <a:rPr lang="en-US" smtClean="0"/>
-              <a:t>8/21/2021</a:t>
+              <a:t>8/24/2021</a:t>
             </a:fld>
             <a:endParaRPr lang="en-US" dirty="0"/>
           </a:p>
@@ -2006,7 +5097,7 @@
           <a:p>
             <a:fld id="{D9DF0F1C-5577-4ACB-BB62-DF8F3C494C7E}" type="datetime1">
               <a:rPr lang="en-US" smtClean="0"/>
-              <a:t>8/21/2021</a:t>
+              <a:t>8/24/2021</a:t>
             </a:fld>
             <a:endParaRPr lang="en-US" dirty="0"/>
           </a:p>
@@ -2142,7 +5233,7 @@
           <a:p>
             <a:fld id="{1775B394-D9F9-4F0C-B15D-605F45CB9E9F}" type="datetime1">
               <a:rPr lang="en-US" smtClean="0"/>
-              <a:t>8/21/2021</a:t>
+              <a:t>8/24/2021</a:t>
             </a:fld>
             <a:endParaRPr lang="en-US" dirty="0"/>
           </a:p>
@@ -2299,7 +5390,7 @@
           <a:p>
             <a:fld id="{39667345-2558-425A-8533-9BFDBCE15005}" type="datetime1">
               <a:rPr lang="en-US" smtClean="0"/>
-              <a:t>8/21/2021</a:t>
+              <a:t>8/24/2021</a:t>
             </a:fld>
             <a:endParaRPr lang="en-US" dirty="0"/>
           </a:p>
@@ -2628,7 +5719,7 @@
           <a:p>
             <a:fld id="{92BEA474-078D-4E9B-9B14-09A87B19DC46}" type="datetime1">
               <a:rPr lang="en-US" smtClean="0"/>
-              <a:t>8/21/2021</a:t>
+              <a:t>8/24/2021</a:t>
             </a:fld>
             <a:endParaRPr lang="en-US" dirty="0"/>
           </a:p>
@@ -2978,7 +6069,7 @@
           <a:p>
             <a:fld id="{4907D986-8816-4272-A432-0437A28A9828}" type="datetime1">
               <a:rPr lang="en-US" smtClean="0"/>
-              <a:t>8/21/2021</a:t>
+              <a:t>8/24/2021</a:t>
             </a:fld>
             <a:endParaRPr lang="en-US" dirty="0"/>
           </a:p>
@@ -3239,7 +6330,7 @@
           <a:p>
             <a:fld id="{62D6E202-B606-4609-B914-27C9371A1F6D}" type="datetime1">
               <a:rPr lang="en-US" smtClean="0"/>
-              <a:t>8/21/2021</a:t>
+              <a:t>8/24/2021</a:t>
             </a:fld>
             <a:endParaRPr lang="en-US" dirty="0"/>
           </a:p>
@@ -4048,7 +7139,7 @@
 </p:sld>
 </file>
 
-<file path=ppt/slides/slide2.xml><?xml version="1.0" encoding="utf-8"?>
+<file path=ppt/slides/slide10.xml><?xml version="1.0" encoding="utf-8"?>
 <p:sld xmlns:a="http://schemas.openxmlformats.org/drawingml/2006/main" xmlns:r="http://schemas.openxmlformats.org/officeDocument/2006/relationships" xmlns:p="http://schemas.openxmlformats.org/presentationml/2006/main">
   <p:cSld>
     <p:spTree>
@@ -4070,7 +7161,144 @@
           <p:cNvPr id="2" name="Title 1">
             <a:extLst>
               <a:ext uri="{FF2B5EF4-FFF2-40B4-BE49-F238E27FC236}">
-                <a16:creationId xmlns:a16="http://schemas.microsoft.com/office/drawing/2014/main" id="{BE042830-852F-47D6-900E-FA3484EB1751}"/>
+                <a16:creationId xmlns:a16="http://schemas.microsoft.com/office/drawing/2014/main" id="{BA8FC292-43F6-4805-A446-7DBD4BD06A93}"/>
+              </a:ext>
+            </a:extLst>
+          </p:cNvPr>
+          <p:cNvSpPr>
+            <a:spLocks noGrp="1"/>
+          </p:cNvSpPr>
+          <p:nvPr>
+            <p:ph type="title"/>
+          </p:nvPr>
+        </p:nvSpPr>
+        <p:spPr>
+          <a:xfrm>
+            <a:off x="1097280" y="286603"/>
+            <a:ext cx="10058400" cy="1450757"/>
+          </a:xfrm>
+        </p:spPr>
+        <p:txBody>
+          <a:bodyPr anchor="b">
+            <a:normAutofit/>
+          </a:bodyPr>
+          <a:lstStyle/>
+          <a:p>
+            <a:r>
+              <a:rPr lang="en-US" dirty="0"/>
+              <a:t>Content Rating</a:t>
+            </a:r>
+          </a:p>
+        </p:txBody>
+      </p:sp>
+      <p:sp>
+        <p:nvSpPr>
+          <p:cNvPr id="8" name="Content Placeholder 2">
+            <a:extLst>
+              <a:ext uri="{FF2B5EF4-FFF2-40B4-BE49-F238E27FC236}">
+                <a16:creationId xmlns:a16="http://schemas.microsoft.com/office/drawing/2014/main" id="{BA58F9B3-3D6A-4203-A671-D6CEF5EDEEEF}"/>
+              </a:ext>
+            </a:extLst>
+          </p:cNvPr>
+          <p:cNvSpPr>
+            <a:spLocks noGrp="1"/>
+          </p:cNvSpPr>
+          <p:nvPr>
+            <p:ph sz="half" idx="1"/>
+          </p:nvPr>
+        </p:nvSpPr>
+        <p:spPr>
+          <a:xfrm>
+            <a:off x="1097280" y="2120900"/>
+            <a:ext cx="4639736" cy="3748193"/>
+          </a:xfrm>
+        </p:spPr>
+        <p:txBody>
+          <a:bodyPr/>
+          <a:lstStyle/>
+          <a:p>
+            <a:endParaRPr lang="en-US"/>
+          </a:p>
+        </p:txBody>
+      </p:sp>
+      <p:sp>
+        <p:nvSpPr>
+          <p:cNvPr id="10" name="Content Placeholder 3">
+            <a:extLst>
+              <a:ext uri="{FF2B5EF4-FFF2-40B4-BE49-F238E27FC236}">
+                <a16:creationId xmlns:a16="http://schemas.microsoft.com/office/drawing/2014/main" id="{C50C6702-8BF1-4894-AD32-DA41A8FC4ABD}"/>
+              </a:ext>
+            </a:extLst>
+          </p:cNvPr>
+          <p:cNvSpPr>
+            <a:spLocks noGrp="1"/>
+          </p:cNvSpPr>
+          <p:nvPr>
+            <p:ph sz="half" idx="2"/>
+          </p:nvPr>
+        </p:nvSpPr>
+        <p:spPr>
+          <a:xfrm>
+            <a:off x="6515944" y="2120900"/>
+            <a:ext cx="4639736" cy="3748194"/>
+          </a:xfrm>
+        </p:spPr>
+        <p:txBody>
+          <a:bodyPr/>
+          <a:lstStyle/>
+          <a:p>
+            <a:endParaRPr lang="en-US"/>
+          </a:p>
+        </p:txBody>
+      </p:sp>
+    </p:spTree>
+    <p:extLst>
+      <p:ext uri="{BB962C8B-B14F-4D97-AF65-F5344CB8AC3E}">
+        <p14:creationId xmlns:p14="http://schemas.microsoft.com/office/powerpoint/2010/main" val="1245357987"/>
+      </p:ext>
+    </p:extLst>
+  </p:cSld>
+  <p:clrMapOvr>
+    <a:masterClrMapping/>
+  </p:clrMapOvr>
+  <mc:AlternateContent xmlns:mc="http://schemas.openxmlformats.org/markup-compatibility/2006">
+    <mc:Choice xmlns:p14="http://schemas.microsoft.com/office/powerpoint/2010/main" Requires="p14">
+      <p:transition spd="slow" p14:dur="3400">
+        <p14:reveal/>
+      </p:transition>
+    </mc:Choice>
+    <mc:Fallback>
+      <p:transition spd="slow">
+        <p:fade/>
+      </p:transition>
+    </mc:Fallback>
+  </mc:AlternateContent>
+</p:sld>
+</file>
+
+<file path=ppt/slides/slide11.xml><?xml version="1.0" encoding="utf-8"?>
+<p:sld xmlns:a="http://schemas.openxmlformats.org/drawingml/2006/main" xmlns:r="http://schemas.openxmlformats.org/officeDocument/2006/relationships" xmlns:p="http://schemas.openxmlformats.org/presentationml/2006/main">
+  <p:cSld>
+    <p:spTree>
+      <p:nvGrpSpPr>
+        <p:cNvPr id="1" name=""/>
+        <p:cNvGrpSpPr/>
+        <p:nvPr/>
+      </p:nvGrpSpPr>
+      <p:grpSpPr>
+        <a:xfrm>
+          <a:off x="0" y="0"/>
+          <a:ext cx="0" cy="0"/>
+          <a:chOff x="0" y="0"/>
+          <a:chExt cx="0" cy="0"/>
+        </a:xfrm>
+      </p:grpSpPr>
+      <p:sp>
+        <p:nvSpPr>
+          <p:cNvPr id="2" name="Title 1">
+            <a:extLst>
+              <a:ext uri="{FF2B5EF4-FFF2-40B4-BE49-F238E27FC236}">
+                <a16:creationId xmlns:a16="http://schemas.microsoft.com/office/drawing/2014/main" id="{8E04682E-F77E-4D76-9D8E-A21D9F6617E7}"/>
               </a:ext>
             </a:extLst>
           </p:cNvPr>
@@ -4088,17 +7316,17 @@
           <a:p>
             <a:r>
               <a:rPr lang="en-US" dirty="0"/>
-              <a:t>Agenda</a:t>
+              <a:t>Top 10</a:t>
             </a:r>
           </a:p>
         </p:txBody>
       </p:sp>
       <p:sp>
         <p:nvSpPr>
-          <p:cNvPr id="3" name="Text Placeholder 2">
+          <p:cNvPr id="3" name="Content Placeholder 2">
             <a:extLst>
               <a:ext uri="{FF2B5EF4-FFF2-40B4-BE49-F238E27FC236}">
-                <a16:creationId xmlns:a16="http://schemas.microsoft.com/office/drawing/2014/main" id="{88F0C2C5-B4EF-4E3C-8DD0-9CEE01FBF012}"/>
+                <a16:creationId xmlns:a16="http://schemas.microsoft.com/office/drawing/2014/main" id="{C4D18CF8-357E-4A56-9176-310C6574768C}"/>
               </a:ext>
             </a:extLst>
           </p:cNvPr>
@@ -4106,7 +7334,7 @@
             <a:spLocks noGrp="1"/>
           </p:cNvSpPr>
           <p:nvPr>
-            <p:ph type="body" idx="1"/>
+            <p:ph idx="1"/>
           </p:nvPr>
         </p:nvSpPr>
         <p:spPr/>
@@ -4114,31 +7342,28 @@
           <a:bodyPr/>
           <a:lstStyle/>
           <a:p>
-            <a:r>
-              <a:rPr lang="en-US" dirty="0"/>
-              <a:t>Why are we here?</a:t>
-            </a:r>
+            <a:endParaRPr lang="en-US"/>
           </a:p>
         </p:txBody>
       </p:sp>
     </p:spTree>
     <p:extLst>
       <p:ext uri="{BB962C8B-B14F-4D97-AF65-F5344CB8AC3E}">
-        <p14:creationId xmlns:p14="http://schemas.microsoft.com/office/powerpoint/2010/main" val="4187597208"/>
+        <p14:creationId xmlns:p14="http://schemas.microsoft.com/office/powerpoint/2010/main" val="564477931"/>
       </p:ext>
     </p:extLst>
   </p:cSld>
   <p:clrMapOvr>
     <a:masterClrMapping/>
   </p:clrMapOvr>
-  <mc:AlternateContent xmlns:mc="http://schemas.openxmlformats.org/markup-compatibility/2006" xmlns:p14="http://schemas.microsoft.com/office/powerpoint/2010/main">
-    <mc:Choice Requires="p14">
-      <p:transition spd="med" p14:dur="700">
-        <p:fade/>
+  <mc:AlternateContent xmlns:mc="http://schemas.openxmlformats.org/markup-compatibility/2006">
+    <mc:Choice xmlns:p14="http://schemas.microsoft.com/office/powerpoint/2010/main" Requires="p14">
+      <p:transition spd="slow" p14:dur="3400">
+        <p14:reveal/>
       </p:transition>
     </mc:Choice>
-    <mc:Fallback xmlns="">
-      <p:transition spd="med">
+    <mc:Fallback>
+      <p:transition spd="slow">
         <p:fade/>
       </p:transition>
     </mc:Fallback>
@@ -4146,7 +7371,245 @@
 </p:sld>
 </file>
 
-<file path=ppt/slides/slide3.xml><?xml version="1.0" encoding="utf-8"?>
+<file path=ppt/slides/slide12.xml><?xml version="1.0" encoding="utf-8"?>
+<p:sld xmlns:a="http://schemas.openxmlformats.org/drawingml/2006/main" xmlns:r="http://schemas.openxmlformats.org/officeDocument/2006/relationships" xmlns:p="http://schemas.openxmlformats.org/presentationml/2006/main">
+  <p:cSld>
+    <p:bg>
+      <p:bgPr>
+        <a:solidFill>
+          <a:schemeClr val="bg1"/>
+        </a:solidFill>
+        <a:effectLst/>
+      </p:bgPr>
+    </p:bg>
+    <p:spTree>
+      <p:nvGrpSpPr>
+        <p:cNvPr id="1" name=""/>
+        <p:cNvGrpSpPr/>
+        <p:nvPr/>
+      </p:nvGrpSpPr>
+      <p:grpSpPr>
+        <a:xfrm>
+          <a:off x="0" y="0"/>
+          <a:ext cx="0" cy="0"/>
+          <a:chOff x="0" y="0"/>
+          <a:chExt cx="0" cy="0"/>
+        </a:xfrm>
+      </p:grpSpPr>
+      <p:sp>
+        <p:nvSpPr>
+          <p:cNvPr id="47" name="Rectangle 46">
+            <a:extLst>
+              <a:ext uri="{FF2B5EF4-FFF2-40B4-BE49-F238E27FC236}">
+                <a16:creationId xmlns:a16="http://schemas.microsoft.com/office/drawing/2014/main" id="{FBDCECDC-EEE3-4128-AA5E-82A8C08796E8}"/>
+              </a:ext>
+              <a:ext uri="{C183D7F6-B498-43B3-948B-1728B52AA6E4}">
+                <adec:decorative xmlns:adec="http://schemas.microsoft.com/office/drawing/2017/decorative" val="1"/>
+              </a:ext>
+            </a:extLst>
+          </p:cNvPr>
+          <p:cNvSpPr>
+            <a:spLocks noGrp="1" noRot="1" noChangeAspect="1" noMove="1" noResize="1" noEditPoints="1" noAdjustHandles="1" noChangeArrowheads="1" noChangeShapeType="1" noTextEdit="1"/>
+          </p:cNvSpPr>
+          <p:nvPr>
+            <p:extLst>
+              <p:ext uri="{386F3935-93C4-4BCD-93E2-E3B085C9AB24}">
+                <p16:designElem xmlns:p16="http://schemas.microsoft.com/office/powerpoint/2015/main" val="1"/>
+              </p:ext>
+            </p:extLst>
+          </p:nvPr>
+        </p:nvSpPr>
+        <p:spPr>
+          <a:xfrm>
+            <a:off x="1507" y="0"/>
+            <a:ext cx="12192000" cy="6858000"/>
+          </a:xfrm>
+          <a:prstGeom prst="rect">
+            <a:avLst/>
+          </a:prstGeom>
+          <a:solidFill>
+            <a:schemeClr val="accent1"/>
+          </a:solidFill>
+          <a:ln>
+            <a:noFill/>
+          </a:ln>
+        </p:spPr>
+        <p:style>
+          <a:lnRef idx="2">
+            <a:schemeClr val="accent1">
+              <a:shade val="50000"/>
+            </a:schemeClr>
+          </a:lnRef>
+          <a:fillRef idx="1">
+            <a:schemeClr val="accent1"/>
+          </a:fillRef>
+          <a:effectRef idx="0">
+            <a:schemeClr val="accent1"/>
+          </a:effectRef>
+          <a:fontRef idx="minor">
+            <a:schemeClr val="lt1"/>
+          </a:fontRef>
+        </p:style>
+        <p:txBody>
+          <a:bodyPr rtlCol="0" anchor="ctr"/>
+          <a:lstStyle/>
+          <a:p>
+            <a:pPr algn="ctr"/>
+            <a:endParaRPr lang="en-US"/>
+          </a:p>
+        </p:txBody>
+      </p:sp>
+      <p:sp>
+        <p:nvSpPr>
+          <p:cNvPr id="2" name="Title 1">
+            <a:extLst>
+              <a:ext uri="{FF2B5EF4-FFF2-40B4-BE49-F238E27FC236}">
+                <a16:creationId xmlns:a16="http://schemas.microsoft.com/office/drawing/2014/main" id="{9AB2EA78-AEB3-469B-9025-3B17201A457B}"/>
+              </a:ext>
+            </a:extLst>
+          </p:cNvPr>
+          <p:cNvSpPr>
+            <a:spLocks noGrp="1"/>
+          </p:cNvSpPr>
+          <p:nvPr>
+            <p:ph type="ctrTitle"/>
+          </p:nvPr>
+        </p:nvSpPr>
+        <p:spPr>
+          <a:xfrm>
+            <a:off x="1097280" y="758952"/>
+            <a:ext cx="10058400" cy="3892168"/>
+          </a:xfrm>
+        </p:spPr>
+        <p:txBody>
+          <a:bodyPr anchor="ctr">
+            <a:normAutofit/>
+          </a:bodyPr>
+          <a:lstStyle/>
+          <a:p>
+            <a:pPr lvl="0"/>
+            <a:r>
+              <a:rPr lang="en-US" sz="4800" i="1" dirty="0">
+                <a:solidFill>
+                  <a:srgbClr val="FFFFFF"/>
+                </a:solidFill>
+              </a:rPr>
+              <a:t>“If the statistics are boring, you’ve got the wrong numbers.”</a:t>
+            </a:r>
+          </a:p>
+        </p:txBody>
+      </p:sp>
+      <p:sp>
+        <p:nvSpPr>
+          <p:cNvPr id="49" name="Rectangle 48">
+            <a:extLst>
+              <a:ext uri="{FF2B5EF4-FFF2-40B4-BE49-F238E27FC236}">
+                <a16:creationId xmlns:a16="http://schemas.microsoft.com/office/drawing/2014/main" id="{4260EDE0-989C-4E16-AF94-F652294D828E}"/>
+              </a:ext>
+              <a:ext uri="{C183D7F6-B498-43B3-948B-1728B52AA6E4}">
+                <adec:decorative xmlns:adec="http://schemas.microsoft.com/office/drawing/2017/decorative" val="1"/>
+              </a:ext>
+            </a:extLst>
+          </p:cNvPr>
+          <p:cNvSpPr>
+            <a:spLocks noGrp="1" noRot="1" noChangeAspect="1" noMove="1" noResize="1" noEditPoints="1" noAdjustHandles="1" noChangeArrowheads="1" noChangeShapeType="1" noTextEdit="1"/>
+          </p:cNvSpPr>
+          <p:nvPr>
+            <p:extLst>
+              <p:ext uri="{386F3935-93C4-4BCD-93E2-E3B085C9AB24}">
+                <p16:designElem xmlns:p16="http://schemas.microsoft.com/office/powerpoint/2015/main" val="1"/>
+              </p:ext>
+            </p:extLst>
+          </p:nvPr>
+        </p:nvSpPr>
+        <p:spPr bwMode="white">
+          <a:xfrm>
+            <a:off x="1507" y="4953000"/>
+            <a:ext cx="12188952" cy="1905000"/>
+          </a:xfrm>
+          <a:prstGeom prst="rect">
+            <a:avLst/>
+          </a:prstGeom>
+          <a:solidFill>
+            <a:srgbClr val="262626"/>
+          </a:solidFill>
+          <a:ln>
+            <a:noFill/>
+          </a:ln>
+        </p:spPr>
+        <p:style>
+          <a:lnRef idx="2">
+            <a:schemeClr val="accent1">
+              <a:shade val="50000"/>
+            </a:schemeClr>
+          </a:lnRef>
+          <a:fillRef idx="1">
+            <a:schemeClr val="accent1"/>
+          </a:fillRef>
+          <a:effectRef idx="0">
+            <a:schemeClr val="accent1"/>
+          </a:effectRef>
+          <a:fontRef idx="minor">
+            <a:schemeClr val="lt1"/>
+          </a:fontRef>
+        </p:style>
+      </p:sp>
+      <p:sp>
+        <p:nvSpPr>
+          <p:cNvPr id="3" name="Subtitle 2">
+            <a:extLst>
+              <a:ext uri="{FF2B5EF4-FFF2-40B4-BE49-F238E27FC236}">
+                <a16:creationId xmlns:a16="http://schemas.microsoft.com/office/drawing/2014/main" id="{255E1F2F-E259-4EA8-9FFD-3A10AF541859}"/>
+              </a:ext>
+            </a:extLst>
+          </p:cNvPr>
+          <p:cNvSpPr>
+            <a:spLocks noGrp="1"/>
+          </p:cNvSpPr>
+          <p:nvPr>
+            <p:ph type="subTitle" idx="1"/>
+          </p:nvPr>
+        </p:nvSpPr>
+        <p:spPr>
+          <a:xfrm>
+            <a:off x="1100051" y="5225240"/>
+            <a:ext cx="10058400" cy="1143000"/>
+          </a:xfrm>
+        </p:spPr>
+        <p:txBody>
+          <a:bodyPr>
+            <a:normAutofit/>
+          </a:bodyPr>
+          <a:lstStyle/>
+          <a:p>
+            <a:r>
+              <a:rPr lang="en-US" dirty="0">
+                <a:solidFill>
+                  <a:srgbClr val="FFFFFF"/>
+                </a:solidFill>
+              </a:rPr>
+              <a:t>- Edward Tufte</a:t>
+            </a:r>
+          </a:p>
+        </p:txBody>
+      </p:sp>
+    </p:spTree>
+    <p:extLst>
+      <p:ext uri="{BB962C8B-B14F-4D97-AF65-F5344CB8AC3E}">
+        <p14:creationId xmlns:p14="http://schemas.microsoft.com/office/powerpoint/2010/main" val="191714609"/>
+      </p:ext>
+    </p:extLst>
+  </p:cSld>
+  <p:clrMapOvr>
+    <a:masterClrMapping/>
+  </p:clrMapOvr>
+  <p:transition spd="slow">
+    <p:wipe/>
+  </p:transition>
+</p:sld>
+</file>
+
+<file path=ppt/slides/slide2.xml><?xml version="1.0" encoding="utf-8"?>
 <p:sld xmlns:a="http://schemas.openxmlformats.org/drawingml/2006/main" xmlns:r="http://schemas.openxmlformats.org/officeDocument/2006/relationships" xmlns:p="http://schemas.openxmlformats.org/presentationml/2006/main">
   <p:cSld>
     <p:spTree>
@@ -4214,6 +7677,12 @@
           <a:p>
             <a:r>
               <a:rPr lang="en-US" dirty="0"/>
+              <a:t>Our Team</a:t>
+            </a:r>
+          </a:p>
+          <a:p>
+            <a:r>
+              <a:rPr lang="en-US" dirty="0"/>
               <a:t>The Ask</a:t>
             </a:r>
           </a:p>
@@ -4232,13 +7701,8 @@
           <a:p>
             <a:r>
               <a:rPr lang="en-US" dirty="0"/>
-              <a:t>Our </a:t>
-            </a:r>
-            <a:r>
-              <a:rPr lang="en-US" dirty="0" err="1"/>
-              <a:t>SELECTion</a:t>
-            </a:r>
-            <a:endParaRPr lang="en-US" dirty="0"/>
+              <a:t>Top 10</a:t>
+            </a:r>
           </a:p>
         </p:txBody>
       </p:sp>
@@ -4252,14 +7716,130 @@
   <p:clrMapOvr>
     <a:masterClrMapping/>
   </p:clrMapOvr>
-  <mc:AlternateContent xmlns:mc="http://schemas.openxmlformats.org/markup-compatibility/2006" xmlns:p14="http://schemas.microsoft.com/office/powerpoint/2010/main">
-    <mc:Choice Requires="p14">
+  <mc:AlternateContent xmlns:mc="http://schemas.openxmlformats.org/markup-compatibility/2006">
+    <mc:Choice xmlns:p14="http://schemas.microsoft.com/office/powerpoint/2010/main" Requires="p14">
       <p:transition spd="med" p14:dur="700">
         <p:fade/>
       </p:transition>
     </mc:Choice>
-    <mc:Fallback xmlns="">
+    <mc:Fallback>
       <p:transition spd="med">
+        <p:fade/>
+      </p:transition>
+    </mc:Fallback>
+  </mc:AlternateContent>
+</p:sld>
+</file>
+
+<file path=ppt/slides/slide3.xml><?xml version="1.0" encoding="utf-8"?>
+<p:sld xmlns:a="http://schemas.openxmlformats.org/drawingml/2006/main" xmlns:r="http://schemas.openxmlformats.org/officeDocument/2006/relationships" xmlns:p="http://schemas.openxmlformats.org/presentationml/2006/main">
+  <p:cSld>
+    <p:spTree>
+      <p:nvGrpSpPr>
+        <p:cNvPr id="1" name=""/>
+        <p:cNvGrpSpPr/>
+        <p:nvPr/>
+      </p:nvGrpSpPr>
+      <p:grpSpPr>
+        <a:xfrm>
+          <a:off x="0" y="0"/>
+          <a:ext cx="0" cy="0"/>
+          <a:chOff x="0" y="0"/>
+          <a:chExt cx="0" cy="0"/>
+        </a:xfrm>
+      </p:grpSpPr>
+      <p:sp>
+        <p:nvSpPr>
+          <p:cNvPr id="2" name="Title 1">
+            <a:extLst>
+              <a:ext uri="{FF2B5EF4-FFF2-40B4-BE49-F238E27FC236}">
+                <a16:creationId xmlns:a16="http://schemas.microsoft.com/office/drawing/2014/main" id="{227F6E8E-CE3F-4797-9E7D-3D19DFE1BEF7}"/>
+              </a:ext>
+            </a:extLst>
+          </p:cNvPr>
+          <p:cNvSpPr>
+            <a:spLocks noGrp="1"/>
+          </p:cNvSpPr>
+          <p:nvPr>
+            <p:ph type="title"/>
+          </p:nvPr>
+        </p:nvSpPr>
+        <p:spPr>
+          <a:xfrm>
+            <a:off x="1097280" y="286603"/>
+            <a:ext cx="10058400" cy="1450757"/>
+          </a:xfrm>
+        </p:spPr>
+        <p:txBody>
+          <a:bodyPr anchor="b">
+            <a:normAutofit/>
+          </a:bodyPr>
+          <a:lstStyle/>
+          <a:p>
+            <a:r>
+              <a:rPr lang="en-US" dirty="0"/>
+              <a:t>Teamwork makes the </a:t>
+            </a:r>
+            <a:r>
+              <a:rPr lang="en-US" dirty="0" err="1"/>
+              <a:t>Deamwork</a:t>
+            </a:r>
+            <a:r>
+              <a:rPr lang="en-US" dirty="0"/>
+              <a:t>!</a:t>
+            </a:r>
+          </a:p>
+        </p:txBody>
+      </p:sp>
+      <p:graphicFrame>
+        <p:nvGraphicFramePr>
+          <p:cNvPr id="5" name="Content Placeholder 2">
+            <a:extLst>
+              <a:ext uri="{FF2B5EF4-FFF2-40B4-BE49-F238E27FC236}">
+                <a16:creationId xmlns:a16="http://schemas.microsoft.com/office/drawing/2014/main" id="{60878AB7-2A52-48B8-9A85-72CFC79CE37F}"/>
+              </a:ext>
+            </a:extLst>
+          </p:cNvPr>
+          <p:cNvGraphicFramePr>
+            <a:graphicFrameLocks noGrp="1"/>
+          </p:cNvGraphicFramePr>
+          <p:nvPr>
+            <p:ph idx="1"/>
+            <p:extLst>
+              <p:ext uri="{D42A27DB-BD31-4B8C-83A1-F6EECF244321}">
+                <p14:modId xmlns:p14="http://schemas.microsoft.com/office/powerpoint/2010/main" val="3866133788"/>
+              </p:ext>
+            </p:extLst>
+          </p:nvPr>
+        </p:nvGraphicFramePr>
+        <p:xfrm>
+          <a:off x="1097280" y="2108201"/>
+          <a:ext cx="10058400" cy="3760891"/>
+        </p:xfrm>
+        <a:graphic>
+          <a:graphicData uri="http://schemas.openxmlformats.org/drawingml/2006/diagram">
+            <dgm:relIds xmlns:dgm="http://schemas.openxmlformats.org/drawingml/2006/diagram" xmlns:r="http://schemas.openxmlformats.org/officeDocument/2006/relationships" r:dm="rId2" r:lo="rId3" r:qs="rId4" r:cs="rId5"/>
+          </a:graphicData>
+        </a:graphic>
+      </p:graphicFrame>
+    </p:spTree>
+    <p:extLst>
+      <p:ext uri="{BB962C8B-B14F-4D97-AF65-F5344CB8AC3E}">
+        <p14:creationId xmlns:p14="http://schemas.microsoft.com/office/powerpoint/2010/main" val="864200419"/>
+      </p:ext>
+    </p:extLst>
+  </p:cSld>
+  <p:clrMapOvr>
+    <a:masterClrMapping/>
+  </p:clrMapOvr>
+  <mc:AlternateContent xmlns:mc="http://schemas.openxmlformats.org/markup-compatibility/2006">
+    <mc:Choice xmlns:p14="http://schemas.microsoft.com/office/powerpoint/2010/main" Requires="p14">
+      <p:transition spd="slow" p14:dur="3400">
+        <p14:reveal/>
+      </p:transition>
+    </mc:Choice>
+    <mc:Fallback>
+      <p:transition spd="slow">
         <p:fade/>
       </p:transition>
     </mc:Fallback>
@@ -4434,14 +8014,14 @@
   <p:clrMapOvr>
     <a:masterClrMapping/>
   </p:clrMapOvr>
-  <mc:AlternateContent xmlns:mc="http://schemas.openxmlformats.org/markup-compatibility/2006" xmlns:p14="http://schemas.microsoft.com/office/powerpoint/2010/main">
-    <mc:Choice Requires="p14">
-      <p:transition spd="med" p14:dur="700">
-        <p:fade/>
+  <mc:AlternateContent xmlns:mc="http://schemas.openxmlformats.org/markup-compatibility/2006">
+    <mc:Choice xmlns:p159="http://schemas.microsoft.com/office/powerpoint/2015/09/main" Requires="p159">
+      <p:transition xmlns:p14="http://schemas.microsoft.com/office/powerpoint/2010/main" spd="slow" p14:dur="2000">
+        <p159:morph option="byObject"/>
       </p:transition>
     </mc:Choice>
-    <mc:Fallback xmlns="">
-      <p:transition spd="med">
+    <mc:Fallback>
+      <p:transition spd="slow">
         <p:fade/>
       </p:transition>
     </mc:Fallback>
@@ -5012,14 +8592,14 @@
   <p:clrMapOvr>
     <a:masterClrMapping/>
   </p:clrMapOvr>
-  <mc:AlternateContent xmlns:mc="http://schemas.openxmlformats.org/markup-compatibility/2006" xmlns:p14="http://schemas.microsoft.com/office/powerpoint/2010/main">
-    <mc:Choice Requires="p14">
-      <p:transition spd="med" p14:dur="700">
-        <p:fade/>
+  <mc:AlternateContent xmlns:mc="http://schemas.openxmlformats.org/markup-compatibility/2006">
+    <mc:Choice xmlns:p159="http://schemas.microsoft.com/office/powerpoint/2015/09/main" Requires="p159">
+      <p:transition xmlns:p14="http://schemas.microsoft.com/office/powerpoint/2010/main" spd="slow" p14:dur="2000">
+        <p159:morph option="byObject"/>
       </p:transition>
     </mc:Choice>
-    <mc:Fallback xmlns="">
-      <p:transition spd="med">
+    <mc:Fallback>
+      <p:transition spd="slow">
         <p:fade/>
       </p:transition>
     </mc:Fallback>
@@ -5616,6 +9196,36 @@
           <a:chExt cx="0" cy="0"/>
         </a:xfrm>
       </p:grpSpPr>
+      <p:pic>
+        <p:nvPicPr>
+          <p:cNvPr id="8" name="Picture 7" descr="Graph">
+            <a:extLst>
+              <a:ext uri="{FF2B5EF4-FFF2-40B4-BE49-F238E27FC236}">
+                <a16:creationId xmlns:a16="http://schemas.microsoft.com/office/drawing/2014/main" id="{902BC782-B5FC-4CE3-AF47-BC0F93F60D6C}"/>
+              </a:ext>
+            </a:extLst>
+          </p:cNvPr>
+          <p:cNvPicPr>
+            <a:picLocks noChangeAspect="1"/>
+          </p:cNvPicPr>
+          <p:nvPr/>
+        </p:nvPicPr>
+        <p:blipFill rotWithShape="1">
+          <a:blip r:embed="rId2"/>
+          <a:srcRect t="18940" b="20977"/>
+          <a:stretch/>
+        </p:blipFill>
+        <p:spPr>
+          <a:xfrm>
+            <a:off x="15" y="10"/>
+            <a:ext cx="12191985" cy="4578340"/>
+          </a:xfrm>
+          <a:prstGeom prst="rect">
+            <a:avLst/>
+          </a:prstGeom>
+          <a:noFill/>
+        </p:spPr>
+      </p:pic>
       <p:sp>
         <p:nvSpPr>
           <p:cNvPr id="2" name="Title 1">
@@ -5632,9 +9242,16 @@
             <p:ph type="title"/>
           </p:nvPr>
         </p:nvSpPr>
-        <p:spPr/>
+        <p:spPr>
+          <a:xfrm>
+            <a:off x="1097279" y="4799362"/>
+            <a:ext cx="10113645" cy="743682"/>
+          </a:xfrm>
+        </p:spPr>
         <p:txBody>
-          <a:bodyPr/>
+          <a:bodyPr anchor="b">
+            <a:normAutofit/>
+          </a:bodyPr>
           <a:lstStyle/>
           <a:p>
             <a:r>
@@ -5646,10 +9263,10 @@
       </p:sp>
       <p:sp>
         <p:nvSpPr>
-          <p:cNvPr id="3" name="Text Placeholder 2">
+          <p:cNvPr id="12" name="Text Placeholder 3">
             <a:extLst>
               <a:ext uri="{FF2B5EF4-FFF2-40B4-BE49-F238E27FC236}">
-                <a16:creationId xmlns:a16="http://schemas.microsoft.com/office/drawing/2014/main" id="{CE58E6FE-90D3-4531-99F4-327525A68CA1}"/>
+                <a16:creationId xmlns:a16="http://schemas.microsoft.com/office/drawing/2014/main" id="{714115DE-CCC1-465B-8252-92860C98A23E}"/>
               </a:ext>
             </a:extLst>
           </p:cNvPr>
@@ -5657,90 +9274,23 @@
             <a:spLocks noGrp="1"/>
           </p:cNvSpPr>
           <p:nvPr>
-            <p:ph type="body" idx="1"/>
+            <p:ph type="body" sz="half" idx="2"/>
           </p:nvPr>
         </p:nvSpPr>
-        <p:spPr/>
+        <p:spPr>
+          <a:xfrm>
+            <a:off x="1097279" y="5715000"/>
+            <a:ext cx="10113264" cy="609600"/>
+          </a:xfrm>
+        </p:spPr>
         <p:txBody>
           <a:bodyPr/>
           <a:lstStyle/>
           <a:p>
-            <a:endParaRPr lang="en-US"/>
-          </a:p>
-        </p:txBody>
-      </p:sp>
-      <p:sp>
-        <p:nvSpPr>
-          <p:cNvPr id="4" name="Content Placeholder 3">
-            <a:extLst>
-              <a:ext uri="{FF2B5EF4-FFF2-40B4-BE49-F238E27FC236}">
-                <a16:creationId xmlns:a16="http://schemas.microsoft.com/office/drawing/2014/main" id="{E783C360-69FA-452D-AE0E-EE08AABF84D1}"/>
-              </a:ext>
-            </a:extLst>
-          </p:cNvPr>
-          <p:cNvSpPr>
-            <a:spLocks noGrp="1"/>
-          </p:cNvSpPr>
-          <p:nvPr>
-            <p:ph sz="half" idx="2"/>
-          </p:nvPr>
-        </p:nvSpPr>
-        <p:spPr/>
-        <p:txBody>
-          <a:bodyPr/>
-          <a:lstStyle/>
-          <a:p>
-            <a:endParaRPr lang="en-US"/>
-          </a:p>
-        </p:txBody>
-      </p:sp>
-      <p:sp>
-        <p:nvSpPr>
-          <p:cNvPr id="5" name="Text Placeholder 4">
-            <a:extLst>
-              <a:ext uri="{FF2B5EF4-FFF2-40B4-BE49-F238E27FC236}">
-                <a16:creationId xmlns:a16="http://schemas.microsoft.com/office/drawing/2014/main" id="{F90F5BF4-8587-48DA-A352-2BA6426582F9}"/>
-              </a:ext>
-            </a:extLst>
-          </p:cNvPr>
-          <p:cNvSpPr>
-            <a:spLocks noGrp="1"/>
-          </p:cNvSpPr>
-          <p:nvPr>
-            <p:ph type="body" sz="quarter" idx="3"/>
-          </p:nvPr>
-        </p:nvSpPr>
-        <p:spPr/>
-        <p:txBody>
-          <a:bodyPr/>
-          <a:lstStyle/>
-          <a:p>
-            <a:endParaRPr lang="en-US"/>
-          </a:p>
-        </p:txBody>
-      </p:sp>
-      <p:sp>
-        <p:nvSpPr>
-          <p:cNvPr id="6" name="Content Placeholder 5">
-            <a:extLst>
-              <a:ext uri="{FF2B5EF4-FFF2-40B4-BE49-F238E27FC236}">
-                <a16:creationId xmlns:a16="http://schemas.microsoft.com/office/drawing/2014/main" id="{3C6C0612-7493-4D9D-A023-737863305CDE}"/>
-              </a:ext>
-            </a:extLst>
-          </p:cNvPr>
-          <p:cNvSpPr>
-            <a:spLocks noGrp="1"/>
-          </p:cNvSpPr>
-          <p:nvPr>
-            <p:ph sz="quarter" idx="4"/>
-          </p:nvPr>
-        </p:nvSpPr>
-        <p:spPr/>
-        <p:txBody>
-          <a:bodyPr/>
-          <a:lstStyle/>
-          <a:p>
-            <a:endParaRPr lang="en-US"/>
+            <a:r>
+              <a:rPr lang="en-US" dirty="0"/>
+              <a:t>Proposal for App Trader ~ Thesaurus Rex</a:t>
+            </a:r>
           </a:p>
         </p:txBody>
       </p:sp>
@@ -5754,18 +9304,9 @@
   <p:clrMapOvr>
     <a:masterClrMapping/>
   </p:clrMapOvr>
-  <mc:AlternateContent xmlns:mc="http://schemas.openxmlformats.org/markup-compatibility/2006">
-    <mc:Choice xmlns:p14="http://schemas.microsoft.com/office/powerpoint/2010/main" Requires="p14">
-      <p:transition spd="med" p14:dur="700">
-        <p:fade/>
-      </p:transition>
-    </mc:Choice>
-    <mc:Fallback>
-      <p:transition spd="med">
-        <p:fade/>
-      </p:transition>
-    </mc:Fallback>
-  </mc:AlternateContent>
+  <p:transition spd="slow">
+    <p:wipe dir="r"/>
+  </p:transition>
 </p:sld>
 </file>
 
@@ -5791,7 +9332,7 @@
           <p:cNvPr id="2" name="Title 1">
             <a:extLst>
               <a:ext uri="{FF2B5EF4-FFF2-40B4-BE49-F238E27FC236}">
-                <a16:creationId xmlns:a16="http://schemas.microsoft.com/office/drawing/2014/main" id="{8E04682E-F77E-4D76-9D8E-A21D9F6617E7}"/>
+                <a16:creationId xmlns:a16="http://schemas.microsoft.com/office/drawing/2014/main" id="{7413B728-92DD-4358-9F7C-2B40530C03AF}"/>
               </a:ext>
             </a:extLst>
           </p:cNvPr>
@@ -5809,13 +9350,8 @@
           <a:p>
             <a:r>
               <a:rPr lang="en-US" dirty="0"/>
-              <a:t>Our </a:t>
-            </a:r>
-            <a:r>
-              <a:rPr lang="en-US" dirty="0" err="1"/>
-              <a:t>SELECTion</a:t>
-            </a:r>
-            <a:endParaRPr lang="en-US" dirty="0"/>
+              <a:t>Our Recommendations</a:t>
+            </a:r>
           </a:p>
         </p:txBody>
       </p:sp>
@@ -5824,7 +9360,7 @@
           <p:cNvPr id="3" name="Content Placeholder 2">
             <a:extLst>
               <a:ext uri="{FF2B5EF4-FFF2-40B4-BE49-F238E27FC236}">
-                <a16:creationId xmlns:a16="http://schemas.microsoft.com/office/drawing/2014/main" id="{C4D18CF8-357E-4A56-9176-310C6574768C}"/>
+                <a16:creationId xmlns:a16="http://schemas.microsoft.com/office/drawing/2014/main" id="{2A90E639-D02D-4E5E-95D1-630F8E3CCBAD}"/>
               </a:ext>
             </a:extLst>
           </p:cNvPr>
@@ -5847,7 +9383,7 @@
     </p:spTree>
     <p:extLst>
       <p:ext uri="{BB962C8B-B14F-4D97-AF65-F5344CB8AC3E}">
-        <p14:creationId xmlns:p14="http://schemas.microsoft.com/office/powerpoint/2010/main" val="564477931"/>
+        <p14:creationId xmlns:p14="http://schemas.microsoft.com/office/powerpoint/2010/main" val="2580704716"/>
       </p:ext>
     </p:extLst>
   </p:cSld>
@@ -5872,14 +9408,6 @@
 <file path=ppt/slides/slide8.xml><?xml version="1.0" encoding="utf-8"?>
 <p:sld xmlns:a="http://schemas.openxmlformats.org/drawingml/2006/main" xmlns:r="http://schemas.openxmlformats.org/officeDocument/2006/relationships" xmlns:p="http://schemas.openxmlformats.org/presentationml/2006/main">
   <p:cSld>
-    <p:bg>
-      <p:bgPr>
-        <a:solidFill>
-          <a:schemeClr val="bg1"/>
-        </a:solidFill>
-        <a:effectLst/>
-      </p:bgPr>
-    </p:bg>
     <p:spTree>
       <p:nvGrpSpPr>
         <p:cNvPr id="1" name=""/>
@@ -5896,73 +9424,10 @@
       </p:grpSpPr>
       <p:sp>
         <p:nvSpPr>
-          <p:cNvPr id="47" name="Rectangle 46">
-            <a:extLst>
-              <a:ext uri="{FF2B5EF4-FFF2-40B4-BE49-F238E27FC236}">
-                <a16:creationId xmlns:a16="http://schemas.microsoft.com/office/drawing/2014/main" id="{FBDCECDC-EEE3-4128-AA5E-82A8C08796E8}"/>
-              </a:ext>
-              <a:ext uri="{C183D7F6-B498-43B3-948B-1728B52AA6E4}">
-                <adec:decorative xmlns:adec="http://schemas.microsoft.com/office/drawing/2017/decorative" val="1"/>
-              </a:ext>
-            </a:extLst>
-          </p:cNvPr>
-          <p:cNvSpPr>
-            <a:spLocks noGrp="1" noRot="1" noChangeAspect="1" noMove="1" noResize="1" noEditPoints="1" noAdjustHandles="1" noChangeArrowheads="1" noChangeShapeType="1" noTextEdit="1"/>
-          </p:cNvSpPr>
-          <p:nvPr>
-            <p:extLst>
-              <p:ext uri="{386F3935-93C4-4BCD-93E2-E3B085C9AB24}">
-                <p16:designElem xmlns:p16="http://schemas.microsoft.com/office/powerpoint/2015/main" val="1"/>
-              </p:ext>
-            </p:extLst>
-          </p:nvPr>
-        </p:nvSpPr>
-        <p:spPr>
-          <a:xfrm>
-            <a:off x="1507" y="0"/>
-            <a:ext cx="12192000" cy="6858000"/>
-          </a:xfrm>
-          <a:prstGeom prst="rect">
-            <a:avLst/>
-          </a:prstGeom>
-          <a:solidFill>
-            <a:schemeClr val="accent1"/>
-          </a:solidFill>
-          <a:ln>
-            <a:noFill/>
-          </a:ln>
-        </p:spPr>
-        <p:style>
-          <a:lnRef idx="2">
-            <a:schemeClr val="accent1">
-              <a:shade val="50000"/>
-            </a:schemeClr>
-          </a:lnRef>
-          <a:fillRef idx="1">
-            <a:schemeClr val="accent1"/>
-          </a:fillRef>
-          <a:effectRef idx="0">
-            <a:schemeClr val="accent1"/>
-          </a:effectRef>
-          <a:fontRef idx="minor">
-            <a:schemeClr val="lt1"/>
-          </a:fontRef>
-        </p:style>
-        <p:txBody>
-          <a:bodyPr rtlCol="0" anchor="ctr"/>
-          <a:lstStyle/>
-          <a:p>
-            <a:pPr algn="ctr"/>
-            <a:endParaRPr lang="en-US"/>
-          </a:p>
-        </p:txBody>
-      </p:sp>
-      <p:sp>
-        <p:nvSpPr>
           <p:cNvPr id="2" name="Title 1">
             <a:extLst>
               <a:ext uri="{FF2B5EF4-FFF2-40B4-BE49-F238E27FC236}">
-                <a16:creationId xmlns:a16="http://schemas.microsoft.com/office/drawing/2014/main" id="{9AB2EA78-AEB3-469B-9025-3B17201A457B}"/>
+                <a16:creationId xmlns:a16="http://schemas.microsoft.com/office/drawing/2014/main" id="{B5339456-D5C3-4A7C-9465-9EDB08F911AA}"/>
               </a:ext>
             </a:extLst>
           </p:cNvPr>
@@ -5970,94 +9435,32 @@
             <a:spLocks noGrp="1"/>
           </p:cNvSpPr>
           <p:nvPr>
-            <p:ph type="ctrTitle"/>
+            <p:ph type="title"/>
           </p:nvPr>
         </p:nvSpPr>
-        <p:spPr>
-          <a:xfrm>
-            <a:off x="1097280" y="758952"/>
-            <a:ext cx="10058400" cy="3892168"/>
-          </a:xfrm>
-        </p:spPr>
+        <p:spPr/>
         <p:txBody>
-          <a:bodyPr anchor="ctr">
-            <a:normAutofit/>
-          </a:bodyPr>
+          <a:bodyPr/>
           <a:lstStyle/>
           <a:p>
-            <a:pPr lvl="0"/>
-            <a:r>
-              <a:rPr lang="en-US" sz="4800" i="1" dirty="0">
-                <a:solidFill>
-                  <a:srgbClr val="FFFFFF"/>
-                </a:solidFill>
-              </a:rPr>
-              <a:t>“If the statistics are boring, you’ve got the wrong numbers.”</a:t>
-            </a:r>
+            <a:r>
+              <a:rPr lang="en-US" dirty="0"/>
+              <a:t>Price </a:t>
+            </a:r>
+            <a:r>
+              <a:rPr lang="en-US" dirty="0" err="1"/>
+              <a:t>SELECTion</a:t>
+            </a:r>
+            <a:endParaRPr lang="en-US" dirty="0"/>
           </a:p>
         </p:txBody>
       </p:sp>
       <p:sp>
         <p:nvSpPr>
-          <p:cNvPr id="49" name="Rectangle 48">
+          <p:cNvPr id="3" name="Content Placeholder 2">
             <a:extLst>
               <a:ext uri="{FF2B5EF4-FFF2-40B4-BE49-F238E27FC236}">
-                <a16:creationId xmlns:a16="http://schemas.microsoft.com/office/drawing/2014/main" id="{4260EDE0-989C-4E16-AF94-F652294D828E}"/>
-              </a:ext>
-              <a:ext uri="{C183D7F6-B498-43B3-948B-1728B52AA6E4}">
-                <adec:decorative xmlns:adec="http://schemas.microsoft.com/office/drawing/2017/decorative" val="1"/>
-              </a:ext>
-            </a:extLst>
-          </p:cNvPr>
-          <p:cNvSpPr>
-            <a:spLocks noGrp="1" noRot="1" noChangeAspect="1" noMove="1" noResize="1" noEditPoints="1" noAdjustHandles="1" noChangeArrowheads="1" noChangeShapeType="1" noTextEdit="1"/>
-          </p:cNvSpPr>
-          <p:nvPr>
-            <p:extLst>
-              <p:ext uri="{386F3935-93C4-4BCD-93E2-E3B085C9AB24}">
-                <p16:designElem xmlns:p16="http://schemas.microsoft.com/office/powerpoint/2015/main" val="1"/>
-              </p:ext>
-            </p:extLst>
-          </p:nvPr>
-        </p:nvSpPr>
-        <p:spPr bwMode="white">
-          <a:xfrm>
-            <a:off x="1507" y="4953000"/>
-            <a:ext cx="12188952" cy="1905000"/>
-          </a:xfrm>
-          <a:prstGeom prst="rect">
-            <a:avLst/>
-          </a:prstGeom>
-          <a:solidFill>
-            <a:srgbClr val="262626"/>
-          </a:solidFill>
-          <a:ln>
-            <a:noFill/>
-          </a:ln>
-        </p:spPr>
-        <p:style>
-          <a:lnRef idx="2">
-            <a:schemeClr val="accent1">
-              <a:shade val="50000"/>
-            </a:schemeClr>
-          </a:lnRef>
-          <a:fillRef idx="1">
-            <a:schemeClr val="accent1"/>
-          </a:fillRef>
-          <a:effectRef idx="0">
-            <a:schemeClr val="accent1"/>
-          </a:effectRef>
-          <a:fontRef idx="minor">
-            <a:schemeClr val="lt1"/>
-          </a:fontRef>
-        </p:style>
-      </p:sp>
-      <p:sp>
-        <p:nvSpPr>
-          <p:cNvPr id="3" name="Subtitle 2">
-            <a:extLst>
-              <a:ext uri="{FF2B5EF4-FFF2-40B4-BE49-F238E27FC236}">
-                <a16:creationId xmlns:a16="http://schemas.microsoft.com/office/drawing/2014/main" id="{255E1F2F-E259-4EA8-9FFD-3A10AF541859}"/>
+                <a16:creationId xmlns:a16="http://schemas.microsoft.com/office/drawing/2014/main" id="{8E970A7B-7940-4F2C-B1F5-4C409012B8E9}"/>
               </a:ext>
             </a:extLst>
           </p:cNvPr>
@@ -6065,36 +9468,22 @@
             <a:spLocks noGrp="1"/>
           </p:cNvSpPr>
           <p:nvPr>
-            <p:ph type="subTitle" idx="1"/>
+            <p:ph idx="1"/>
           </p:nvPr>
         </p:nvSpPr>
-        <p:spPr>
-          <a:xfrm>
-            <a:off x="1100051" y="5225240"/>
-            <a:ext cx="10058400" cy="1143000"/>
-          </a:xfrm>
-        </p:spPr>
+        <p:spPr/>
         <p:txBody>
-          <a:bodyPr>
-            <a:normAutofit/>
-          </a:bodyPr>
+          <a:bodyPr/>
           <a:lstStyle/>
           <a:p>
-            <a:r>
-              <a:rPr lang="en-US" dirty="0">
-                <a:solidFill>
-                  <a:srgbClr val="FFFFFF"/>
-                </a:solidFill>
-              </a:rPr>
-              <a:t>- Edward Tufte</a:t>
-            </a:r>
+            <a:endParaRPr lang="en-US"/>
           </a:p>
         </p:txBody>
       </p:sp>
     </p:spTree>
     <p:extLst>
       <p:ext uri="{BB962C8B-B14F-4D97-AF65-F5344CB8AC3E}">
-        <p14:creationId xmlns:p14="http://schemas.microsoft.com/office/powerpoint/2010/main" val="191714609"/>
+        <p14:creationId xmlns:p14="http://schemas.microsoft.com/office/powerpoint/2010/main" val="2580287563"/>
       </p:ext>
     </p:extLst>
   </p:cSld>
@@ -6103,12 +9492,107 @@
   </p:clrMapOvr>
   <mc:AlternateContent xmlns:mc="http://schemas.openxmlformats.org/markup-compatibility/2006">
     <mc:Choice xmlns:p14="http://schemas.microsoft.com/office/powerpoint/2010/main" Requires="p14">
-      <p:transition spd="med" p14:dur="700">
-        <p:fade/>
+      <p:transition spd="slow" p14:dur="3400">
+        <p14:reveal/>
       </p:transition>
     </mc:Choice>
     <mc:Fallback>
-      <p:transition spd="med">
+      <p:transition spd="slow">
+        <p:fade/>
+      </p:transition>
+    </mc:Fallback>
+  </mc:AlternateContent>
+</p:sld>
+</file>
+
+<file path=ppt/slides/slide9.xml><?xml version="1.0" encoding="utf-8"?>
+<p:sld xmlns:a="http://schemas.openxmlformats.org/drawingml/2006/main" xmlns:r="http://schemas.openxmlformats.org/officeDocument/2006/relationships" xmlns:p="http://schemas.openxmlformats.org/presentationml/2006/main">
+  <p:cSld>
+    <p:spTree>
+      <p:nvGrpSpPr>
+        <p:cNvPr id="1" name=""/>
+        <p:cNvGrpSpPr/>
+        <p:nvPr/>
+      </p:nvGrpSpPr>
+      <p:grpSpPr>
+        <a:xfrm>
+          <a:off x="0" y="0"/>
+          <a:ext cx="0" cy="0"/>
+          <a:chOff x="0" y="0"/>
+          <a:chExt cx="0" cy="0"/>
+        </a:xfrm>
+      </p:grpSpPr>
+      <p:sp>
+        <p:nvSpPr>
+          <p:cNvPr id="2" name="Title 1">
+            <a:extLst>
+              <a:ext uri="{FF2B5EF4-FFF2-40B4-BE49-F238E27FC236}">
+                <a16:creationId xmlns:a16="http://schemas.microsoft.com/office/drawing/2014/main" id="{2F8B3293-7CC9-4619-BA88-12478EC89FED}"/>
+              </a:ext>
+            </a:extLst>
+          </p:cNvPr>
+          <p:cNvSpPr>
+            <a:spLocks noGrp="1"/>
+          </p:cNvSpPr>
+          <p:nvPr>
+            <p:ph type="title"/>
+          </p:nvPr>
+        </p:nvSpPr>
+        <p:spPr/>
+        <p:txBody>
+          <a:bodyPr/>
+          <a:lstStyle/>
+          <a:p>
+            <a:r>
+              <a:rPr lang="en-US" dirty="0"/>
+              <a:t>Genre</a:t>
+            </a:r>
+          </a:p>
+        </p:txBody>
+      </p:sp>
+      <p:sp>
+        <p:nvSpPr>
+          <p:cNvPr id="3" name="Content Placeholder 2">
+            <a:extLst>
+              <a:ext uri="{FF2B5EF4-FFF2-40B4-BE49-F238E27FC236}">
+                <a16:creationId xmlns:a16="http://schemas.microsoft.com/office/drawing/2014/main" id="{BFE90BFD-45AF-4AAE-9BC1-37331AE81562}"/>
+              </a:ext>
+            </a:extLst>
+          </p:cNvPr>
+          <p:cNvSpPr>
+            <a:spLocks noGrp="1"/>
+          </p:cNvSpPr>
+          <p:nvPr>
+            <p:ph idx="1"/>
+          </p:nvPr>
+        </p:nvSpPr>
+        <p:spPr/>
+        <p:txBody>
+          <a:bodyPr/>
+          <a:lstStyle/>
+          <a:p>
+            <a:endParaRPr lang="en-US"/>
+          </a:p>
+        </p:txBody>
+      </p:sp>
+    </p:spTree>
+    <p:extLst>
+      <p:ext uri="{BB962C8B-B14F-4D97-AF65-F5344CB8AC3E}">
+        <p14:creationId xmlns:p14="http://schemas.microsoft.com/office/powerpoint/2010/main" val="1356297468"/>
+      </p:ext>
+    </p:extLst>
+  </p:cSld>
+  <p:clrMapOvr>
+    <a:masterClrMapping/>
+  </p:clrMapOvr>
+  <mc:AlternateContent xmlns:mc="http://schemas.openxmlformats.org/markup-compatibility/2006">
+    <mc:Choice xmlns:p14="http://schemas.microsoft.com/office/powerpoint/2010/main" Requires="p14">
+      <p:transition spd="slow" p14:dur="3400">
+        <p14:reveal/>
+      </p:transition>
+    </mc:Choice>
+    <mc:Fallback>
+      <p:transition spd="slow">
         <p:fade/>
       </p:transition>
     </mc:Fallback>

</xml_diff>

<commit_message>
updating prsentation - RL
</commit_message>
<xml_diff>
--- a/presentation/app_trader_proposal.pptx
+++ b/presentation/app_trader_proposal.pptx
@@ -12,9 +12,9 @@
     <p:sldId id="263" r:id="rId6"/>
     <p:sldId id="264" r:id="rId7"/>
     <p:sldId id="267" r:id="rId8"/>
-    <p:sldId id="268" r:id="rId9"/>
-    <p:sldId id="269" r:id="rId10"/>
-    <p:sldId id="270" r:id="rId11"/>
+    <p:sldId id="269" r:id="rId9"/>
+    <p:sldId id="270" r:id="rId10"/>
+    <p:sldId id="271" r:id="rId11"/>
     <p:sldId id="265" r:id="rId12"/>
     <p:sldId id="258" r:id="rId13"/>
   </p:sldIdLst>
@@ -121,6 +121,2671 @@
     </p:ext>
   </p:extLst>
 </p:presentation>
+</file>
+
+<file path=ppt/charts/chart1.xml><?xml version="1.0" encoding="utf-8"?>
+<c:chartSpace xmlns:c="http://schemas.openxmlformats.org/drawingml/2006/chart" xmlns:a="http://schemas.openxmlformats.org/drawingml/2006/main" xmlns:r="http://schemas.openxmlformats.org/officeDocument/2006/relationships" xmlns:c16r2="http://schemas.microsoft.com/office/drawing/2015/06/chart">
+  <c:date1904 val="0"/>
+  <c:lang val="en-US"/>
+  <c:roundedCorners val="0"/>
+  <mc:AlternateContent xmlns:mc="http://schemas.openxmlformats.org/markup-compatibility/2006">
+    <mc:Choice xmlns:c14="http://schemas.microsoft.com/office/drawing/2007/8/2/chart" Requires="c14">
+      <c14:style val="103"/>
+    </mc:Choice>
+    <mc:Fallback>
+      <c:style val="3"/>
+    </mc:Fallback>
+  </mc:AlternateContent>
+  <c:chart>
+    <c:title>
+      <c:tx>
+        <c:rich>
+          <a:bodyPr rot="0" spcFirstLastPara="1" vertOverflow="ellipsis" vert="horz" wrap="square" anchor="ctr" anchorCtr="1"/>
+          <a:lstStyle/>
+          <a:p>
+            <a:pPr>
+              <a:defRPr sz="1600" b="1" i="0" u="none" strike="noStrike" kern="1200" spc="100" baseline="0">
+                <a:solidFill>
+                  <a:schemeClr val="lt1">
+                    <a:lumMod val="95000"/>
+                  </a:schemeClr>
+                </a:solidFill>
+                <a:effectLst>
+                  <a:outerShdw blurRad="50800" dist="38100" dir="5400000" algn="t" rotWithShape="0">
+                    <a:prstClr val="black">
+                      <a:alpha val="40000"/>
+                    </a:prstClr>
+                  </a:outerShdw>
+                </a:effectLst>
+                <a:latin typeface="+mn-lt"/>
+                <a:ea typeface="+mn-ea"/>
+                <a:cs typeface="+mn-cs"/>
+              </a:defRPr>
+            </a:pPr>
+            <a:r>
+              <a:rPr lang="en-US" dirty="0"/>
+              <a:t>Appstore AVG Ratings</a:t>
+            </a:r>
+          </a:p>
+        </c:rich>
+      </c:tx>
+      <c:overlay val="0"/>
+      <c:spPr>
+        <a:noFill/>
+        <a:ln>
+          <a:noFill/>
+        </a:ln>
+        <a:effectLst/>
+      </c:spPr>
+      <c:txPr>
+        <a:bodyPr rot="0" spcFirstLastPara="1" vertOverflow="ellipsis" vert="horz" wrap="square" anchor="ctr" anchorCtr="1"/>
+        <a:lstStyle/>
+        <a:p>
+          <a:pPr>
+            <a:defRPr sz="1600" b="1" i="0" u="none" strike="noStrike" kern="1200" spc="100" baseline="0">
+              <a:solidFill>
+                <a:schemeClr val="lt1">
+                  <a:lumMod val="95000"/>
+                </a:schemeClr>
+              </a:solidFill>
+              <a:effectLst>
+                <a:outerShdw blurRad="50800" dist="38100" dir="5400000" algn="t" rotWithShape="0">
+                  <a:prstClr val="black">
+                    <a:alpha val="40000"/>
+                  </a:prstClr>
+                </a:outerShdw>
+              </a:effectLst>
+              <a:latin typeface="+mn-lt"/>
+              <a:ea typeface="+mn-ea"/>
+              <a:cs typeface="+mn-cs"/>
+            </a:defRPr>
+          </a:pPr>
+          <a:endParaRPr lang="en-US"/>
+        </a:p>
+      </c:txPr>
+    </c:title>
+    <c:autoTitleDeleted val="0"/>
+    <c:plotArea>
+      <c:layout/>
+      <c:barChart>
+        <c:barDir val="col"/>
+        <c:grouping val="clustered"/>
+        <c:varyColors val="0"/>
+        <c:ser>
+          <c:idx val="1"/>
+          <c:order val="1"/>
+          <c:tx>
+            <c:strRef>
+              <c:f>app_store_rating_metrics!$C$1</c:f>
+              <c:strCache>
+                <c:ptCount val="1"/>
+                <c:pt idx="0">
+                  <c:v>avg_rating</c:v>
+                </c:pt>
+              </c:strCache>
+            </c:strRef>
+          </c:tx>
+          <c:spPr>
+            <a:gradFill rotWithShape="1">
+              <a:gsLst>
+                <a:gs pos="0">
+                  <a:schemeClr val="accent1">
+                    <a:shade val="86000"/>
+                    <a:shade val="85000"/>
+                    <a:satMod val="130000"/>
+                  </a:schemeClr>
+                </a:gs>
+                <a:gs pos="34000">
+                  <a:schemeClr val="accent1">
+                    <a:shade val="86000"/>
+                    <a:shade val="87000"/>
+                    <a:satMod val="125000"/>
+                  </a:schemeClr>
+                </a:gs>
+                <a:gs pos="70000">
+                  <a:schemeClr val="accent1">
+                    <a:shade val="86000"/>
+                    <a:tint val="100000"/>
+                    <a:shade val="90000"/>
+                    <a:satMod val="130000"/>
+                  </a:schemeClr>
+                </a:gs>
+                <a:gs pos="100000">
+                  <a:schemeClr val="accent1">
+                    <a:shade val="86000"/>
+                    <a:tint val="100000"/>
+                    <a:shade val="100000"/>
+                    <a:satMod val="110000"/>
+                  </a:schemeClr>
+                </a:gs>
+              </a:gsLst>
+              <a:path path="circle">
+                <a:fillToRect l="100000" t="100000" r="100000" b="100000"/>
+              </a:path>
+            </a:gradFill>
+            <a:ln>
+              <a:noFill/>
+            </a:ln>
+            <a:effectLst>
+              <a:outerShdw blurRad="57150" dist="19050" dir="5400000" algn="ctr" rotWithShape="0">
+                <a:srgbClr val="000000">
+                  <a:alpha val="63000"/>
+                </a:srgbClr>
+              </a:outerShdw>
+            </a:effectLst>
+            <a:scene3d>
+              <a:camera prst="orthographicFront">
+                <a:rot lat="0" lon="0" rev="0"/>
+              </a:camera>
+              <a:lightRig rig="threePt" dir="t">
+                <a:rot lat="0" lon="0" rev="19800000"/>
+              </a:lightRig>
+            </a:scene3d>
+            <a:sp3d prstMaterial="flat">
+              <a:bevelT w="25400" h="31750"/>
+            </a:sp3d>
+          </c:spPr>
+          <c:invertIfNegative val="0"/>
+          <c:cat>
+            <c:strRef>
+              <c:f>app_store_rating_metrics!$A$2:$A$5</c:f>
+              <c:strCache>
+                <c:ptCount val="4"/>
+                <c:pt idx="0">
+                  <c:v>9+</c:v>
+                </c:pt>
+                <c:pt idx="1">
+                  <c:v>12+</c:v>
+                </c:pt>
+                <c:pt idx="2">
+                  <c:v>4+</c:v>
+                </c:pt>
+                <c:pt idx="3">
+                  <c:v>17+</c:v>
+                </c:pt>
+              </c:strCache>
+            </c:strRef>
+          </c:cat>
+          <c:val>
+            <c:numRef>
+              <c:f>app_store_rating_metrics!$C$2:$C$5</c:f>
+              <c:numCache>
+                <c:formatCode>General</c:formatCode>
+                <c:ptCount val="4"/>
+                <c:pt idx="0">
+                  <c:v>3.77</c:v>
+                </c:pt>
+                <c:pt idx="1">
+                  <c:v>3.57</c:v>
+                </c:pt>
+                <c:pt idx="2">
+                  <c:v>3.57</c:v>
+                </c:pt>
+                <c:pt idx="3">
+                  <c:v>2.76</c:v>
+                </c:pt>
+              </c:numCache>
+            </c:numRef>
+          </c:val>
+          <c:extLst>
+            <c:ext xmlns:c16="http://schemas.microsoft.com/office/drawing/2014/chart" uri="{C3380CC4-5D6E-409C-BE32-E72D297353CC}">
+              <c16:uniqueId val="{00000000-7CA1-45FD-9246-15E330876DA8}"/>
+            </c:ext>
+          </c:extLst>
+        </c:ser>
+        <c:dLbls>
+          <c:showLegendKey val="0"/>
+          <c:showVal val="0"/>
+          <c:showCatName val="0"/>
+          <c:showSerName val="0"/>
+          <c:showPercent val="0"/>
+          <c:showBubbleSize val="0"/>
+        </c:dLbls>
+        <c:gapWidth val="219"/>
+        <c:overlap val="-27"/>
+        <c:axId val="1390148143"/>
+        <c:axId val="1390149391"/>
+        <c:extLst>
+          <c:ext xmlns:c15="http://schemas.microsoft.com/office/drawing/2012/chart" uri="{02D57815-91ED-43cb-92C2-25804820EDAC}">
+            <c15:filteredBarSeries>
+              <c15:ser>
+                <c:idx val="0"/>
+                <c:order val="0"/>
+                <c:tx>
+                  <c:strRef>
+                    <c:extLst>
+                      <c:ext uri="{02D57815-91ED-43cb-92C2-25804820EDAC}">
+                        <c15:formulaRef>
+                          <c15:sqref>app_store_rating_metrics!$B$1</c15:sqref>
+                        </c15:formulaRef>
+                      </c:ext>
+                    </c:extLst>
+                    <c:strCache>
+                      <c:ptCount val="1"/>
+                      <c:pt idx="0">
+                        <c:v>count</c:v>
+                      </c:pt>
+                    </c:strCache>
+                  </c:strRef>
+                </c:tx>
+                <c:spPr>
+                  <a:gradFill rotWithShape="1">
+                    <a:gsLst>
+                      <a:gs pos="0">
+                        <a:schemeClr val="accent1">
+                          <a:shade val="58000"/>
+                          <a:shade val="85000"/>
+                          <a:satMod val="130000"/>
+                        </a:schemeClr>
+                      </a:gs>
+                      <a:gs pos="34000">
+                        <a:schemeClr val="accent1">
+                          <a:shade val="58000"/>
+                          <a:shade val="87000"/>
+                          <a:satMod val="125000"/>
+                        </a:schemeClr>
+                      </a:gs>
+                      <a:gs pos="70000">
+                        <a:schemeClr val="accent1">
+                          <a:shade val="58000"/>
+                          <a:tint val="100000"/>
+                          <a:shade val="90000"/>
+                          <a:satMod val="130000"/>
+                        </a:schemeClr>
+                      </a:gs>
+                      <a:gs pos="100000">
+                        <a:schemeClr val="accent1">
+                          <a:shade val="58000"/>
+                          <a:tint val="100000"/>
+                          <a:shade val="100000"/>
+                          <a:satMod val="110000"/>
+                        </a:schemeClr>
+                      </a:gs>
+                    </a:gsLst>
+                    <a:path path="circle">
+                      <a:fillToRect l="100000" t="100000" r="100000" b="100000"/>
+                    </a:path>
+                  </a:gradFill>
+                  <a:ln>
+                    <a:noFill/>
+                  </a:ln>
+                  <a:effectLst>
+                    <a:outerShdw blurRad="57150" dist="19050" dir="5400000" algn="ctr" rotWithShape="0">
+                      <a:srgbClr val="000000">
+                        <a:alpha val="63000"/>
+                      </a:srgbClr>
+                    </a:outerShdw>
+                  </a:effectLst>
+                  <a:scene3d>
+                    <a:camera prst="orthographicFront">
+                      <a:rot lat="0" lon="0" rev="0"/>
+                    </a:camera>
+                    <a:lightRig rig="threePt" dir="t">
+                      <a:rot lat="0" lon="0" rev="19800000"/>
+                    </a:lightRig>
+                  </a:scene3d>
+                  <a:sp3d prstMaterial="flat">
+                    <a:bevelT w="25400" h="31750"/>
+                  </a:sp3d>
+                </c:spPr>
+                <c:invertIfNegative val="0"/>
+                <c:cat>
+                  <c:strRef>
+                    <c:extLst>
+                      <c:ext uri="{02D57815-91ED-43cb-92C2-25804820EDAC}">
+                        <c15:formulaRef>
+                          <c15:sqref>app_store_rating_metrics!$A$2:$A$5</c15:sqref>
+                        </c15:formulaRef>
+                      </c:ext>
+                    </c:extLst>
+                    <c:strCache>
+                      <c:ptCount val="4"/>
+                      <c:pt idx="0">
+                        <c:v>9+</c:v>
+                      </c:pt>
+                      <c:pt idx="1">
+                        <c:v>12+</c:v>
+                      </c:pt>
+                      <c:pt idx="2">
+                        <c:v>4+</c:v>
+                      </c:pt>
+                      <c:pt idx="3">
+                        <c:v>17+</c:v>
+                      </c:pt>
+                    </c:strCache>
+                  </c:strRef>
+                </c:cat>
+                <c:val>
+                  <c:numRef>
+                    <c:extLst>
+                      <c:ext uri="{02D57815-91ED-43cb-92C2-25804820EDAC}">
+                        <c15:formulaRef>
+                          <c15:sqref>app_store_rating_metrics!$B$2:$B$5</c15:sqref>
+                        </c15:formulaRef>
+                      </c:ext>
+                    </c:extLst>
+                    <c:numCache>
+                      <c:formatCode>General</c:formatCode>
+                      <c:ptCount val="4"/>
+                      <c:pt idx="0">
+                        <c:v>987</c:v>
+                      </c:pt>
+                      <c:pt idx="1">
+                        <c:v>1155</c:v>
+                      </c:pt>
+                      <c:pt idx="2">
+                        <c:v>4433</c:v>
+                      </c:pt>
+                      <c:pt idx="3">
+                        <c:v>622</c:v>
+                      </c:pt>
+                    </c:numCache>
+                  </c:numRef>
+                </c:val>
+                <c:extLst>
+                  <c:ext xmlns:c16="http://schemas.microsoft.com/office/drawing/2014/chart" uri="{C3380CC4-5D6E-409C-BE32-E72D297353CC}">
+                    <c16:uniqueId val="{00000001-7CA1-45FD-9246-15E330876DA8}"/>
+                  </c:ext>
+                </c:extLst>
+              </c15:ser>
+            </c15:filteredBarSeries>
+            <c15:filteredBarSeries>
+              <c15:ser>
+                <c:idx val="2"/>
+                <c:order val="2"/>
+                <c:tx>
+                  <c:strRef>
+                    <c:extLst>
+                      <c:ext xmlns:c15="http://schemas.microsoft.com/office/drawing/2012/chart" uri="{02D57815-91ED-43cb-92C2-25804820EDAC}">
+                        <c15:formulaRef>
+                          <c15:sqref>app_store_rating_metrics!$D$1</c15:sqref>
+                        </c15:formulaRef>
+                      </c:ext>
+                    </c:extLst>
+                    <c:strCache>
+                      <c:ptCount val="1"/>
+                      <c:pt idx="0">
+                        <c:v>high_rated_total</c:v>
+                      </c:pt>
+                    </c:strCache>
+                  </c:strRef>
+                </c:tx>
+                <c:spPr>
+                  <a:gradFill rotWithShape="1">
+                    <a:gsLst>
+                      <a:gs pos="0">
+                        <a:schemeClr val="accent1">
+                          <a:tint val="86000"/>
+                          <a:shade val="85000"/>
+                          <a:satMod val="130000"/>
+                        </a:schemeClr>
+                      </a:gs>
+                      <a:gs pos="34000">
+                        <a:schemeClr val="accent1">
+                          <a:tint val="86000"/>
+                          <a:shade val="87000"/>
+                          <a:satMod val="125000"/>
+                        </a:schemeClr>
+                      </a:gs>
+                      <a:gs pos="70000">
+                        <a:schemeClr val="accent1">
+                          <a:tint val="86000"/>
+                          <a:tint val="100000"/>
+                          <a:shade val="90000"/>
+                          <a:satMod val="130000"/>
+                        </a:schemeClr>
+                      </a:gs>
+                      <a:gs pos="100000">
+                        <a:schemeClr val="accent1">
+                          <a:tint val="86000"/>
+                          <a:tint val="100000"/>
+                          <a:shade val="100000"/>
+                          <a:satMod val="110000"/>
+                        </a:schemeClr>
+                      </a:gs>
+                    </a:gsLst>
+                    <a:path path="circle">
+                      <a:fillToRect l="100000" t="100000" r="100000" b="100000"/>
+                    </a:path>
+                  </a:gradFill>
+                  <a:ln>
+                    <a:noFill/>
+                  </a:ln>
+                  <a:effectLst>
+                    <a:outerShdw blurRad="57150" dist="19050" dir="5400000" algn="ctr" rotWithShape="0">
+                      <a:srgbClr val="000000">
+                        <a:alpha val="63000"/>
+                      </a:srgbClr>
+                    </a:outerShdw>
+                  </a:effectLst>
+                  <a:scene3d>
+                    <a:camera prst="orthographicFront">
+                      <a:rot lat="0" lon="0" rev="0"/>
+                    </a:camera>
+                    <a:lightRig rig="threePt" dir="t">
+                      <a:rot lat="0" lon="0" rev="19800000"/>
+                    </a:lightRig>
+                  </a:scene3d>
+                  <a:sp3d prstMaterial="flat">
+                    <a:bevelT w="25400" h="31750"/>
+                  </a:sp3d>
+                </c:spPr>
+                <c:invertIfNegative val="0"/>
+                <c:cat>
+                  <c:strRef>
+                    <c:extLst>
+                      <c:ext xmlns:c15="http://schemas.microsoft.com/office/drawing/2012/chart" uri="{02D57815-91ED-43cb-92C2-25804820EDAC}">
+                        <c15:formulaRef>
+                          <c15:sqref>app_store_rating_metrics!$A$2:$A$5</c15:sqref>
+                        </c15:formulaRef>
+                      </c:ext>
+                    </c:extLst>
+                    <c:strCache>
+                      <c:ptCount val="4"/>
+                      <c:pt idx="0">
+                        <c:v>9+</c:v>
+                      </c:pt>
+                      <c:pt idx="1">
+                        <c:v>12+</c:v>
+                      </c:pt>
+                      <c:pt idx="2">
+                        <c:v>4+</c:v>
+                      </c:pt>
+                      <c:pt idx="3">
+                        <c:v>17+</c:v>
+                      </c:pt>
+                    </c:strCache>
+                  </c:strRef>
+                </c:cat>
+                <c:val>
+                  <c:numRef>
+                    <c:extLst>
+                      <c:ext xmlns:c15="http://schemas.microsoft.com/office/drawing/2012/chart" uri="{02D57815-91ED-43cb-92C2-25804820EDAC}">
+                        <c15:formulaRef>
+                          <c15:sqref>app_store_rating_metrics!$D$2:$D$5</c15:sqref>
+                        </c15:formulaRef>
+                      </c:ext>
+                    </c:extLst>
+                    <c:numCache>
+                      <c:formatCode>General</c:formatCode>
+                      <c:ptCount val="4"/>
+                      <c:pt idx="0">
+                        <c:v>504</c:v>
+                      </c:pt>
+                      <c:pt idx="1">
+                        <c:v>543</c:v>
+                      </c:pt>
+                      <c:pt idx="2">
+                        <c:v>1928</c:v>
+                      </c:pt>
+                      <c:pt idx="3">
+                        <c:v>180</c:v>
+                      </c:pt>
+                    </c:numCache>
+                  </c:numRef>
+                </c:val>
+                <c:extLst xmlns:c15="http://schemas.microsoft.com/office/drawing/2012/chart">
+                  <c:ext xmlns:c16="http://schemas.microsoft.com/office/drawing/2014/chart" uri="{C3380CC4-5D6E-409C-BE32-E72D297353CC}">
+                    <c16:uniqueId val="{00000002-7CA1-45FD-9246-15E330876DA8}"/>
+                  </c:ext>
+                </c:extLst>
+              </c15:ser>
+            </c15:filteredBarSeries>
+          </c:ext>
+        </c:extLst>
+      </c:barChart>
+      <c:lineChart>
+        <c:grouping val="standard"/>
+        <c:varyColors val="0"/>
+        <c:dLbls>
+          <c:showLegendKey val="0"/>
+          <c:showVal val="0"/>
+          <c:showCatName val="0"/>
+          <c:showSerName val="0"/>
+          <c:showPercent val="0"/>
+          <c:showBubbleSize val="0"/>
+        </c:dLbls>
+        <c:marker val="1"/>
+        <c:smooth val="0"/>
+        <c:axId val="1390149807"/>
+        <c:axId val="1390148975"/>
+        <c:extLst>
+          <c:ext xmlns:c15="http://schemas.microsoft.com/office/drawing/2012/chart" uri="{02D57815-91ED-43cb-92C2-25804820EDAC}">
+            <c15:filteredLineSeries>
+              <c15:ser>
+                <c:idx val="3"/>
+                <c:order val="3"/>
+                <c:tx>
+                  <c:strRef>
+                    <c:extLst>
+                      <c:ext uri="{02D57815-91ED-43cb-92C2-25804820EDAC}">
+                        <c15:formulaRef>
+                          <c15:sqref>app_store_rating_metrics!$E$1</c15:sqref>
+                        </c15:formulaRef>
+                      </c:ext>
+                    </c:extLst>
+                    <c:strCache>
+                      <c:ptCount val="1"/>
+                      <c:pt idx="0">
+                        <c:v>pct_highly_rated</c:v>
+                      </c:pt>
+                    </c:strCache>
+                  </c:strRef>
+                </c:tx>
+                <c:spPr>
+                  <a:ln w="34925" cap="rnd">
+                    <a:solidFill>
+                      <a:schemeClr val="accent1">
+                        <a:tint val="58000"/>
+                      </a:schemeClr>
+                    </a:solidFill>
+                    <a:round/>
+                  </a:ln>
+                  <a:effectLst>
+                    <a:outerShdw blurRad="57150" dist="19050" dir="5400000" algn="ctr" rotWithShape="0">
+                      <a:srgbClr val="000000">
+                        <a:alpha val="63000"/>
+                      </a:srgbClr>
+                    </a:outerShdw>
+                  </a:effectLst>
+                </c:spPr>
+                <c:marker>
+                  <c:symbol val="none"/>
+                </c:marker>
+                <c:cat>
+                  <c:strRef>
+                    <c:extLst>
+                      <c:ext uri="{02D57815-91ED-43cb-92C2-25804820EDAC}">
+                        <c15:formulaRef>
+                          <c15:sqref>app_store_rating_metrics!$A$2:$A$5</c15:sqref>
+                        </c15:formulaRef>
+                      </c:ext>
+                    </c:extLst>
+                    <c:strCache>
+                      <c:ptCount val="4"/>
+                      <c:pt idx="0">
+                        <c:v>9+</c:v>
+                      </c:pt>
+                      <c:pt idx="1">
+                        <c:v>12+</c:v>
+                      </c:pt>
+                      <c:pt idx="2">
+                        <c:v>4+</c:v>
+                      </c:pt>
+                      <c:pt idx="3">
+                        <c:v>17+</c:v>
+                      </c:pt>
+                    </c:strCache>
+                  </c:strRef>
+                </c:cat>
+                <c:val>
+                  <c:numRef>
+                    <c:extLst>
+                      <c:ext uri="{02D57815-91ED-43cb-92C2-25804820EDAC}">
+                        <c15:formulaRef>
+                          <c15:sqref>app_store_rating_metrics!$E$2:$E$5</c15:sqref>
+                        </c15:formulaRef>
+                      </c:ext>
+                    </c:extLst>
+                    <c:numCache>
+                      <c:formatCode>0%</c:formatCode>
+                      <c:ptCount val="4"/>
+                      <c:pt idx="0">
+                        <c:v>0.51</c:v>
+                      </c:pt>
+                      <c:pt idx="1">
+                        <c:v>0.47</c:v>
+                      </c:pt>
+                      <c:pt idx="2">
+                        <c:v>0.43</c:v>
+                      </c:pt>
+                      <c:pt idx="3">
+                        <c:v>0.28999999999999998</c:v>
+                      </c:pt>
+                    </c:numCache>
+                  </c:numRef>
+                </c:val>
+                <c:smooth val="0"/>
+                <c:extLst>
+                  <c:ext xmlns:c16="http://schemas.microsoft.com/office/drawing/2014/chart" uri="{C3380CC4-5D6E-409C-BE32-E72D297353CC}">
+                    <c16:uniqueId val="{00000003-7CA1-45FD-9246-15E330876DA8}"/>
+                  </c:ext>
+                </c:extLst>
+              </c15:ser>
+            </c15:filteredLineSeries>
+          </c:ext>
+        </c:extLst>
+      </c:lineChart>
+      <c:catAx>
+        <c:axId val="1390148143"/>
+        <c:scaling>
+          <c:orientation val="minMax"/>
+        </c:scaling>
+        <c:delete val="0"/>
+        <c:axPos val="b"/>
+        <c:numFmt formatCode="General" sourceLinked="1"/>
+        <c:majorTickMark val="none"/>
+        <c:minorTickMark val="none"/>
+        <c:tickLblPos val="nextTo"/>
+        <c:spPr>
+          <a:noFill/>
+          <a:ln w="12700" cap="flat" cmpd="sng" algn="ctr">
+            <a:solidFill>
+              <a:schemeClr val="lt1">
+                <a:lumMod val="95000"/>
+                <a:alpha val="54000"/>
+              </a:schemeClr>
+            </a:solidFill>
+            <a:round/>
+          </a:ln>
+          <a:effectLst/>
+        </c:spPr>
+        <c:txPr>
+          <a:bodyPr rot="-60000000" spcFirstLastPara="1" vertOverflow="ellipsis" vert="horz" wrap="square" anchor="ctr" anchorCtr="1"/>
+          <a:lstStyle/>
+          <a:p>
+            <a:pPr>
+              <a:defRPr sz="900" b="0" i="0" u="none" strike="noStrike" kern="1200" baseline="0">
+                <a:solidFill>
+                  <a:schemeClr val="lt1">
+                    <a:lumMod val="85000"/>
+                  </a:schemeClr>
+                </a:solidFill>
+                <a:latin typeface="+mn-lt"/>
+                <a:ea typeface="+mn-ea"/>
+                <a:cs typeface="+mn-cs"/>
+              </a:defRPr>
+            </a:pPr>
+            <a:endParaRPr lang="en-US"/>
+          </a:p>
+        </c:txPr>
+        <c:crossAx val="1390149391"/>
+        <c:crosses val="autoZero"/>
+        <c:auto val="1"/>
+        <c:lblAlgn val="ctr"/>
+        <c:lblOffset val="100"/>
+        <c:noMultiLvlLbl val="0"/>
+      </c:catAx>
+      <c:valAx>
+        <c:axId val="1390149391"/>
+        <c:scaling>
+          <c:orientation val="minMax"/>
+        </c:scaling>
+        <c:delete val="0"/>
+        <c:axPos val="l"/>
+        <c:majorGridlines>
+          <c:spPr>
+            <a:ln w="9525" cap="flat" cmpd="sng" algn="ctr">
+              <a:solidFill>
+                <a:schemeClr val="lt1">
+                  <a:lumMod val="95000"/>
+                  <a:alpha val="10000"/>
+                </a:schemeClr>
+              </a:solidFill>
+              <a:round/>
+            </a:ln>
+            <a:effectLst/>
+          </c:spPr>
+        </c:majorGridlines>
+        <c:numFmt formatCode="General" sourceLinked="1"/>
+        <c:majorTickMark val="none"/>
+        <c:minorTickMark val="none"/>
+        <c:tickLblPos val="nextTo"/>
+        <c:spPr>
+          <a:noFill/>
+          <a:ln>
+            <a:noFill/>
+          </a:ln>
+          <a:effectLst/>
+        </c:spPr>
+        <c:txPr>
+          <a:bodyPr rot="-60000000" spcFirstLastPara="1" vertOverflow="ellipsis" vert="horz" wrap="square" anchor="ctr" anchorCtr="1"/>
+          <a:lstStyle/>
+          <a:p>
+            <a:pPr>
+              <a:defRPr sz="900" b="0" i="0" u="none" strike="noStrike" kern="1200" baseline="0">
+                <a:solidFill>
+                  <a:schemeClr val="lt1">
+                    <a:lumMod val="85000"/>
+                  </a:schemeClr>
+                </a:solidFill>
+                <a:latin typeface="+mn-lt"/>
+                <a:ea typeface="+mn-ea"/>
+                <a:cs typeface="+mn-cs"/>
+              </a:defRPr>
+            </a:pPr>
+            <a:endParaRPr lang="en-US"/>
+          </a:p>
+        </c:txPr>
+        <c:crossAx val="1390148143"/>
+        <c:crosses val="autoZero"/>
+        <c:crossBetween val="between"/>
+      </c:valAx>
+      <c:valAx>
+        <c:axId val="1390148975"/>
+        <c:scaling>
+          <c:orientation val="minMax"/>
+        </c:scaling>
+        <c:delete val="1"/>
+        <c:axPos val="r"/>
+        <c:numFmt formatCode="0%" sourceLinked="1"/>
+        <c:majorTickMark val="none"/>
+        <c:minorTickMark val="none"/>
+        <c:tickLblPos val="nextTo"/>
+        <c:crossAx val="1390149807"/>
+        <c:crosses val="max"/>
+        <c:crossBetween val="between"/>
+      </c:valAx>
+      <c:catAx>
+        <c:axId val="1390149807"/>
+        <c:scaling>
+          <c:orientation val="minMax"/>
+        </c:scaling>
+        <c:delete val="1"/>
+        <c:axPos val="b"/>
+        <c:numFmt formatCode="General" sourceLinked="1"/>
+        <c:majorTickMark val="none"/>
+        <c:minorTickMark val="none"/>
+        <c:tickLblPos val="nextTo"/>
+        <c:crossAx val="1390148975"/>
+        <c:crosses val="autoZero"/>
+        <c:auto val="1"/>
+        <c:lblAlgn val="ctr"/>
+        <c:lblOffset val="100"/>
+        <c:noMultiLvlLbl val="0"/>
+      </c:catAx>
+      <c:spPr>
+        <a:noFill/>
+        <a:ln>
+          <a:noFill/>
+        </a:ln>
+        <a:effectLst/>
+      </c:spPr>
+    </c:plotArea>
+    <c:plotVisOnly val="1"/>
+    <c:dispBlanksAs val="gap"/>
+    <c:showDLblsOverMax val="0"/>
+  </c:chart>
+  <c:spPr>
+    <a:gradFill flip="none" rotWithShape="1">
+      <a:gsLst>
+        <a:gs pos="0">
+          <a:schemeClr val="dk1">
+            <a:lumMod val="65000"/>
+            <a:lumOff val="35000"/>
+          </a:schemeClr>
+        </a:gs>
+        <a:gs pos="100000">
+          <a:schemeClr val="dk1">
+            <a:lumMod val="85000"/>
+            <a:lumOff val="15000"/>
+          </a:schemeClr>
+        </a:gs>
+      </a:gsLst>
+      <a:path path="circle">
+        <a:fillToRect l="50000" t="50000" r="50000" b="50000"/>
+      </a:path>
+      <a:tileRect/>
+    </a:gradFill>
+    <a:ln>
+      <a:noFill/>
+    </a:ln>
+    <a:effectLst/>
+  </c:spPr>
+  <c:txPr>
+    <a:bodyPr/>
+    <a:lstStyle/>
+    <a:p>
+      <a:pPr>
+        <a:defRPr/>
+      </a:pPr>
+      <a:endParaRPr lang="en-US"/>
+    </a:p>
+  </c:txPr>
+  <c:externalData r:id="rId3">
+    <c:autoUpdate val="0"/>
+  </c:externalData>
+</c:chartSpace>
+</file>
+
+<file path=ppt/charts/chart2.xml><?xml version="1.0" encoding="utf-8"?>
+<c:chartSpace xmlns:c="http://schemas.openxmlformats.org/drawingml/2006/chart" xmlns:a="http://schemas.openxmlformats.org/drawingml/2006/main" xmlns:r="http://schemas.openxmlformats.org/officeDocument/2006/relationships" xmlns:c16r2="http://schemas.microsoft.com/office/drawing/2015/06/chart">
+  <c:date1904 val="0"/>
+  <c:lang val="en-US"/>
+  <c:roundedCorners val="0"/>
+  <mc:AlternateContent xmlns:mc="http://schemas.openxmlformats.org/markup-compatibility/2006">
+    <mc:Choice xmlns:c14="http://schemas.microsoft.com/office/drawing/2007/8/2/chart" Requires="c14">
+      <c14:style val="106"/>
+    </mc:Choice>
+    <mc:Fallback>
+      <c:style val="6"/>
+    </mc:Fallback>
+  </mc:AlternateContent>
+  <c:chart>
+    <c:title>
+      <c:tx>
+        <c:rich>
+          <a:bodyPr rot="0" spcFirstLastPara="1" vertOverflow="ellipsis" vert="horz" wrap="square" anchor="ctr" anchorCtr="1"/>
+          <a:lstStyle/>
+          <a:p>
+            <a:pPr>
+              <a:defRPr sz="2128" b="1" i="0" u="none" strike="noStrike" kern="1200" spc="100" baseline="0">
+                <a:solidFill>
+                  <a:schemeClr val="lt1">
+                    <a:lumMod val="95000"/>
+                  </a:schemeClr>
+                </a:solidFill>
+                <a:effectLst>
+                  <a:outerShdw blurRad="50800" dist="38100" dir="5400000" algn="t" rotWithShape="0">
+                    <a:prstClr val="black">
+                      <a:alpha val="40000"/>
+                    </a:prstClr>
+                  </a:outerShdw>
+                </a:effectLst>
+                <a:latin typeface="+mn-lt"/>
+                <a:ea typeface="+mn-ea"/>
+                <a:cs typeface="+mn-cs"/>
+              </a:defRPr>
+            </a:pPr>
+            <a:r>
+              <a:rPr lang="en-US"/>
+              <a:t>Playstore AVG Ratings</a:t>
+            </a:r>
+          </a:p>
+        </c:rich>
+      </c:tx>
+      <c:overlay val="0"/>
+      <c:spPr>
+        <a:noFill/>
+        <a:ln>
+          <a:noFill/>
+        </a:ln>
+        <a:effectLst/>
+      </c:spPr>
+      <c:txPr>
+        <a:bodyPr rot="0" spcFirstLastPara="1" vertOverflow="ellipsis" vert="horz" wrap="square" anchor="ctr" anchorCtr="1"/>
+        <a:lstStyle/>
+        <a:p>
+          <a:pPr>
+            <a:defRPr sz="2128" b="1" i="0" u="none" strike="noStrike" kern="1200" spc="100" baseline="0">
+              <a:solidFill>
+                <a:schemeClr val="lt1">
+                  <a:lumMod val="95000"/>
+                </a:schemeClr>
+              </a:solidFill>
+              <a:effectLst>
+                <a:outerShdw blurRad="50800" dist="38100" dir="5400000" algn="t" rotWithShape="0">
+                  <a:prstClr val="black">
+                    <a:alpha val="40000"/>
+                  </a:prstClr>
+                </a:outerShdw>
+              </a:effectLst>
+              <a:latin typeface="+mn-lt"/>
+              <a:ea typeface="+mn-ea"/>
+              <a:cs typeface="+mn-cs"/>
+            </a:defRPr>
+          </a:pPr>
+          <a:endParaRPr lang="en-US"/>
+        </a:p>
+      </c:txPr>
+    </c:title>
+    <c:autoTitleDeleted val="0"/>
+    <c:plotArea>
+      <c:layout/>
+      <c:barChart>
+        <c:barDir val="col"/>
+        <c:grouping val="clustered"/>
+        <c:varyColors val="0"/>
+        <c:ser>
+          <c:idx val="1"/>
+          <c:order val="1"/>
+          <c:tx>
+            <c:strRef>
+              <c:f>playstore_rating_metrics!$C$1</c:f>
+              <c:strCache>
+                <c:ptCount val="1"/>
+                <c:pt idx="0">
+                  <c:v>avg_rating</c:v>
+                </c:pt>
+              </c:strCache>
+            </c:strRef>
+          </c:tx>
+          <c:spPr>
+            <a:gradFill rotWithShape="1">
+              <a:gsLst>
+                <a:gs pos="0">
+                  <a:schemeClr val="accent4">
+                    <a:shade val="86000"/>
+                    <a:shade val="85000"/>
+                    <a:satMod val="130000"/>
+                  </a:schemeClr>
+                </a:gs>
+                <a:gs pos="34000">
+                  <a:schemeClr val="accent4">
+                    <a:shade val="86000"/>
+                    <a:shade val="87000"/>
+                    <a:satMod val="125000"/>
+                  </a:schemeClr>
+                </a:gs>
+                <a:gs pos="70000">
+                  <a:schemeClr val="accent4">
+                    <a:shade val="86000"/>
+                    <a:tint val="100000"/>
+                    <a:shade val="90000"/>
+                    <a:satMod val="130000"/>
+                  </a:schemeClr>
+                </a:gs>
+                <a:gs pos="100000">
+                  <a:schemeClr val="accent4">
+                    <a:shade val="86000"/>
+                    <a:tint val="100000"/>
+                    <a:shade val="100000"/>
+                    <a:satMod val="110000"/>
+                  </a:schemeClr>
+                </a:gs>
+              </a:gsLst>
+              <a:path path="circle">
+                <a:fillToRect l="100000" t="100000" r="100000" b="100000"/>
+              </a:path>
+            </a:gradFill>
+            <a:ln>
+              <a:noFill/>
+            </a:ln>
+            <a:effectLst>
+              <a:outerShdw blurRad="44450" dist="25400" dir="2700000" algn="br" rotWithShape="0">
+                <a:srgbClr val="000000">
+                  <a:alpha val="60000"/>
+                </a:srgbClr>
+              </a:outerShdw>
+            </a:effectLst>
+            <a:scene3d>
+              <a:camera prst="orthographicFront">
+                <a:rot lat="0" lon="0" rev="0"/>
+              </a:camera>
+              <a:lightRig rig="threePt" dir="t">
+                <a:rot lat="0" lon="0" rev="19800000"/>
+              </a:lightRig>
+            </a:scene3d>
+            <a:sp3d prstMaterial="flat">
+              <a:bevelT w="25400" h="31750"/>
+            </a:sp3d>
+          </c:spPr>
+          <c:invertIfNegative val="0"/>
+          <c:cat>
+            <c:strRef>
+              <c:f>playstore_rating_metrics!$A$2:$A$6</c:f>
+              <c:strCache>
+                <c:ptCount val="4"/>
+                <c:pt idx="0">
+                  <c:v>Everyone 10+</c:v>
+                </c:pt>
+                <c:pt idx="1">
+                  <c:v>Teen</c:v>
+                </c:pt>
+                <c:pt idx="2">
+                  <c:v>Everyone</c:v>
+                </c:pt>
+                <c:pt idx="3">
+                  <c:v>Mature 17+</c:v>
+                </c:pt>
+              </c:strCache>
+            </c:strRef>
+          </c:cat>
+          <c:val>
+            <c:numRef>
+              <c:f>playstore_rating_metrics!$C$2:$C$6</c:f>
+              <c:numCache>
+                <c:formatCode>General</c:formatCode>
+                <c:ptCount val="4"/>
+                <c:pt idx="0">
+                  <c:v>4.26</c:v>
+                </c:pt>
+                <c:pt idx="1">
+                  <c:v>4.2300000000000004</c:v>
+                </c:pt>
+                <c:pt idx="2">
+                  <c:v>4.1900000000000004</c:v>
+                </c:pt>
+                <c:pt idx="3">
+                  <c:v>4.12</c:v>
+                </c:pt>
+              </c:numCache>
+            </c:numRef>
+          </c:val>
+          <c:extLst>
+            <c:ext xmlns:c16="http://schemas.microsoft.com/office/drawing/2014/chart" uri="{C3380CC4-5D6E-409C-BE32-E72D297353CC}">
+              <c16:uniqueId val="{00000000-0743-4F34-A4AD-7EEF5BB26F52}"/>
+            </c:ext>
+          </c:extLst>
+        </c:ser>
+        <c:dLbls>
+          <c:showLegendKey val="0"/>
+          <c:showVal val="0"/>
+          <c:showCatName val="0"/>
+          <c:showSerName val="0"/>
+          <c:showPercent val="0"/>
+          <c:showBubbleSize val="0"/>
+        </c:dLbls>
+        <c:gapWidth val="100"/>
+        <c:overlap val="-24"/>
+        <c:axId val="1390121519"/>
+        <c:axId val="1390130671"/>
+        <c:extLst>
+          <c:ext xmlns:c15="http://schemas.microsoft.com/office/drawing/2012/chart" uri="{02D57815-91ED-43cb-92C2-25804820EDAC}">
+            <c15:filteredBarSeries>
+              <c15:ser>
+                <c:idx val="0"/>
+                <c:order val="0"/>
+                <c:tx>
+                  <c:strRef>
+                    <c:extLst>
+                      <c:ext uri="{02D57815-91ED-43cb-92C2-25804820EDAC}">
+                        <c15:formulaRef>
+                          <c15:sqref>playstore_rating_metrics!$B$1</c15:sqref>
+                        </c15:formulaRef>
+                      </c:ext>
+                    </c:extLst>
+                    <c:strCache>
+                      <c:ptCount val="1"/>
+                      <c:pt idx="0">
+                        <c:v>count</c:v>
+                      </c:pt>
+                    </c:strCache>
+                  </c:strRef>
+                </c:tx>
+                <c:spPr>
+                  <a:gradFill rotWithShape="1">
+                    <a:gsLst>
+                      <a:gs pos="0">
+                        <a:schemeClr val="accent4">
+                          <a:shade val="58000"/>
+                          <a:shade val="85000"/>
+                          <a:satMod val="130000"/>
+                        </a:schemeClr>
+                      </a:gs>
+                      <a:gs pos="34000">
+                        <a:schemeClr val="accent4">
+                          <a:shade val="58000"/>
+                          <a:shade val="87000"/>
+                          <a:satMod val="125000"/>
+                        </a:schemeClr>
+                      </a:gs>
+                      <a:gs pos="70000">
+                        <a:schemeClr val="accent4">
+                          <a:shade val="58000"/>
+                          <a:tint val="100000"/>
+                          <a:shade val="90000"/>
+                          <a:satMod val="130000"/>
+                        </a:schemeClr>
+                      </a:gs>
+                      <a:gs pos="100000">
+                        <a:schemeClr val="accent4">
+                          <a:shade val="58000"/>
+                          <a:tint val="100000"/>
+                          <a:shade val="100000"/>
+                          <a:satMod val="110000"/>
+                        </a:schemeClr>
+                      </a:gs>
+                    </a:gsLst>
+                    <a:path path="circle">
+                      <a:fillToRect l="100000" t="100000" r="100000" b="100000"/>
+                    </a:path>
+                  </a:gradFill>
+                  <a:ln>
+                    <a:noFill/>
+                  </a:ln>
+                  <a:effectLst>
+                    <a:outerShdw blurRad="44450" dist="25400" dir="2700000" algn="br" rotWithShape="0">
+                      <a:srgbClr val="000000">
+                        <a:alpha val="60000"/>
+                      </a:srgbClr>
+                    </a:outerShdw>
+                  </a:effectLst>
+                  <a:scene3d>
+                    <a:camera prst="orthographicFront">
+                      <a:rot lat="0" lon="0" rev="0"/>
+                    </a:camera>
+                    <a:lightRig rig="threePt" dir="t">
+                      <a:rot lat="0" lon="0" rev="19800000"/>
+                    </a:lightRig>
+                  </a:scene3d>
+                  <a:sp3d prstMaterial="flat">
+                    <a:bevelT w="25400" h="31750"/>
+                  </a:sp3d>
+                </c:spPr>
+                <c:invertIfNegative val="0"/>
+                <c:cat>
+                  <c:strRef>
+                    <c:extLst>
+                      <c:ext uri="{02D57815-91ED-43cb-92C2-25804820EDAC}">
+                        <c15:formulaRef>
+                          <c15:sqref>playstore_rating_metrics!$A$2:$A$6</c15:sqref>
+                        </c15:formulaRef>
+                      </c:ext>
+                    </c:extLst>
+                    <c:strCache>
+                      <c:ptCount val="4"/>
+                      <c:pt idx="0">
+                        <c:v>Everyone 10+</c:v>
+                      </c:pt>
+                      <c:pt idx="1">
+                        <c:v>Teen</c:v>
+                      </c:pt>
+                      <c:pt idx="2">
+                        <c:v>Everyone</c:v>
+                      </c:pt>
+                      <c:pt idx="3">
+                        <c:v>Mature 17+</c:v>
+                      </c:pt>
+                    </c:strCache>
+                  </c:strRef>
+                </c:cat>
+                <c:val>
+                  <c:numRef>
+                    <c:extLst>
+                      <c:ext uri="{02D57815-91ED-43cb-92C2-25804820EDAC}">
+                        <c15:formulaRef>
+                          <c15:sqref>playstore_rating_metrics!$B$2:$B$6</c15:sqref>
+                        </c15:formulaRef>
+                      </c:ext>
+                    </c:extLst>
+                    <c:numCache>
+                      <c:formatCode>General</c:formatCode>
+                      <c:ptCount val="4"/>
+                      <c:pt idx="0">
+                        <c:v>414</c:v>
+                      </c:pt>
+                      <c:pt idx="1">
+                        <c:v>1208</c:v>
+                      </c:pt>
+                      <c:pt idx="2">
+                        <c:v>8714</c:v>
+                      </c:pt>
+                      <c:pt idx="3">
+                        <c:v>499</c:v>
+                      </c:pt>
+                    </c:numCache>
+                  </c:numRef>
+                </c:val>
+                <c:extLst>
+                  <c:ext xmlns:c16="http://schemas.microsoft.com/office/drawing/2014/chart" uri="{C3380CC4-5D6E-409C-BE32-E72D297353CC}">
+                    <c16:uniqueId val="{00000001-0743-4F34-A4AD-7EEF5BB26F52}"/>
+                  </c:ext>
+                </c:extLst>
+              </c15:ser>
+            </c15:filteredBarSeries>
+            <c15:filteredBarSeries>
+              <c15:ser>
+                <c:idx val="2"/>
+                <c:order val="2"/>
+                <c:tx>
+                  <c:strRef>
+                    <c:extLst>
+                      <c:ext xmlns:c15="http://schemas.microsoft.com/office/drawing/2012/chart" uri="{02D57815-91ED-43cb-92C2-25804820EDAC}">
+                        <c15:formulaRef>
+                          <c15:sqref>playstore_rating_metrics!$D$1</c15:sqref>
+                        </c15:formulaRef>
+                      </c:ext>
+                    </c:extLst>
+                    <c:strCache>
+                      <c:ptCount val="1"/>
+                      <c:pt idx="0">
+                        <c:v>high_rated_total</c:v>
+                      </c:pt>
+                    </c:strCache>
+                  </c:strRef>
+                </c:tx>
+                <c:spPr>
+                  <a:gradFill rotWithShape="1">
+                    <a:gsLst>
+                      <a:gs pos="0">
+                        <a:schemeClr val="accent4">
+                          <a:tint val="86000"/>
+                          <a:shade val="85000"/>
+                          <a:satMod val="130000"/>
+                        </a:schemeClr>
+                      </a:gs>
+                      <a:gs pos="34000">
+                        <a:schemeClr val="accent4">
+                          <a:tint val="86000"/>
+                          <a:shade val="87000"/>
+                          <a:satMod val="125000"/>
+                        </a:schemeClr>
+                      </a:gs>
+                      <a:gs pos="70000">
+                        <a:schemeClr val="accent4">
+                          <a:tint val="86000"/>
+                          <a:tint val="100000"/>
+                          <a:shade val="90000"/>
+                          <a:satMod val="130000"/>
+                        </a:schemeClr>
+                      </a:gs>
+                      <a:gs pos="100000">
+                        <a:schemeClr val="accent4">
+                          <a:tint val="86000"/>
+                          <a:tint val="100000"/>
+                          <a:shade val="100000"/>
+                          <a:satMod val="110000"/>
+                        </a:schemeClr>
+                      </a:gs>
+                    </a:gsLst>
+                    <a:path path="circle">
+                      <a:fillToRect l="100000" t="100000" r="100000" b="100000"/>
+                    </a:path>
+                  </a:gradFill>
+                  <a:ln>
+                    <a:noFill/>
+                  </a:ln>
+                  <a:effectLst>
+                    <a:outerShdw blurRad="44450" dist="25400" dir="2700000" algn="br" rotWithShape="0">
+                      <a:srgbClr val="000000">
+                        <a:alpha val="60000"/>
+                      </a:srgbClr>
+                    </a:outerShdw>
+                  </a:effectLst>
+                  <a:scene3d>
+                    <a:camera prst="orthographicFront">
+                      <a:rot lat="0" lon="0" rev="0"/>
+                    </a:camera>
+                    <a:lightRig rig="threePt" dir="t">
+                      <a:rot lat="0" lon="0" rev="19800000"/>
+                    </a:lightRig>
+                  </a:scene3d>
+                  <a:sp3d prstMaterial="flat">
+                    <a:bevelT w="25400" h="31750"/>
+                  </a:sp3d>
+                </c:spPr>
+                <c:invertIfNegative val="0"/>
+                <c:cat>
+                  <c:strRef>
+                    <c:extLst>
+                      <c:ext xmlns:c15="http://schemas.microsoft.com/office/drawing/2012/chart" uri="{02D57815-91ED-43cb-92C2-25804820EDAC}">
+                        <c15:formulaRef>
+                          <c15:sqref>playstore_rating_metrics!$A$2:$A$6</c15:sqref>
+                        </c15:formulaRef>
+                      </c:ext>
+                    </c:extLst>
+                    <c:strCache>
+                      <c:ptCount val="4"/>
+                      <c:pt idx="0">
+                        <c:v>Everyone 10+</c:v>
+                      </c:pt>
+                      <c:pt idx="1">
+                        <c:v>Teen</c:v>
+                      </c:pt>
+                      <c:pt idx="2">
+                        <c:v>Everyone</c:v>
+                      </c:pt>
+                      <c:pt idx="3">
+                        <c:v>Mature 17+</c:v>
+                      </c:pt>
+                    </c:strCache>
+                  </c:strRef>
+                </c:cat>
+                <c:val>
+                  <c:numRef>
+                    <c:extLst>
+                      <c:ext xmlns:c15="http://schemas.microsoft.com/office/drawing/2012/chart" uri="{02D57815-91ED-43cb-92C2-25804820EDAC}">
+                        <c15:formulaRef>
+                          <c15:sqref>playstore_rating_metrics!$D$2:$D$6</c15:sqref>
+                        </c15:formulaRef>
+                      </c:ext>
+                    </c:extLst>
+                    <c:numCache>
+                      <c:formatCode>General</c:formatCode>
+                      <c:ptCount val="4"/>
+                      <c:pt idx="0">
+                        <c:v>88</c:v>
+                      </c:pt>
+                      <c:pt idx="1">
+                        <c:v>275</c:v>
+                      </c:pt>
+                      <c:pt idx="2">
+                        <c:v>2099</c:v>
+                      </c:pt>
+                      <c:pt idx="3">
+                        <c:v>87</c:v>
+                      </c:pt>
+                    </c:numCache>
+                  </c:numRef>
+                </c:val>
+                <c:extLst xmlns:c15="http://schemas.microsoft.com/office/drawing/2012/chart">
+                  <c:ext xmlns:c16="http://schemas.microsoft.com/office/drawing/2014/chart" uri="{C3380CC4-5D6E-409C-BE32-E72D297353CC}">
+                    <c16:uniqueId val="{00000002-0743-4F34-A4AD-7EEF5BB26F52}"/>
+                  </c:ext>
+                </c:extLst>
+              </c15:ser>
+            </c15:filteredBarSeries>
+            <c15:filteredBarSeries>
+              <c15:ser>
+                <c:idx val="3"/>
+                <c:order val="3"/>
+                <c:tx>
+                  <c:strRef>
+                    <c:extLst>
+                      <c:ext xmlns:c15="http://schemas.microsoft.com/office/drawing/2012/chart" uri="{02D57815-91ED-43cb-92C2-25804820EDAC}">
+                        <c15:formulaRef>
+                          <c15:sqref>playstore_rating_metrics!$E$1</c15:sqref>
+                        </c15:formulaRef>
+                      </c:ext>
+                    </c:extLst>
+                    <c:strCache>
+                      <c:ptCount val="1"/>
+                      <c:pt idx="0">
+                        <c:v>pct_high_rated</c:v>
+                      </c:pt>
+                    </c:strCache>
+                  </c:strRef>
+                </c:tx>
+                <c:spPr>
+                  <a:gradFill rotWithShape="1">
+                    <a:gsLst>
+                      <a:gs pos="0">
+                        <a:schemeClr val="accent4">
+                          <a:tint val="58000"/>
+                          <a:shade val="85000"/>
+                          <a:satMod val="130000"/>
+                        </a:schemeClr>
+                      </a:gs>
+                      <a:gs pos="34000">
+                        <a:schemeClr val="accent4">
+                          <a:tint val="58000"/>
+                          <a:shade val="87000"/>
+                          <a:satMod val="125000"/>
+                        </a:schemeClr>
+                      </a:gs>
+                      <a:gs pos="70000">
+                        <a:schemeClr val="accent4">
+                          <a:tint val="58000"/>
+                          <a:tint val="100000"/>
+                          <a:shade val="90000"/>
+                          <a:satMod val="130000"/>
+                        </a:schemeClr>
+                      </a:gs>
+                      <a:gs pos="100000">
+                        <a:schemeClr val="accent4">
+                          <a:tint val="58000"/>
+                          <a:tint val="100000"/>
+                          <a:shade val="100000"/>
+                          <a:satMod val="110000"/>
+                        </a:schemeClr>
+                      </a:gs>
+                    </a:gsLst>
+                    <a:path path="circle">
+                      <a:fillToRect l="100000" t="100000" r="100000" b="100000"/>
+                    </a:path>
+                  </a:gradFill>
+                  <a:ln>
+                    <a:noFill/>
+                  </a:ln>
+                  <a:effectLst>
+                    <a:outerShdw blurRad="44450" dist="25400" dir="2700000" algn="br" rotWithShape="0">
+                      <a:srgbClr val="000000">
+                        <a:alpha val="60000"/>
+                      </a:srgbClr>
+                    </a:outerShdw>
+                  </a:effectLst>
+                  <a:scene3d>
+                    <a:camera prst="orthographicFront">
+                      <a:rot lat="0" lon="0" rev="0"/>
+                    </a:camera>
+                    <a:lightRig rig="threePt" dir="t">
+                      <a:rot lat="0" lon="0" rev="19800000"/>
+                    </a:lightRig>
+                  </a:scene3d>
+                  <a:sp3d prstMaterial="flat">
+                    <a:bevelT w="25400" h="31750"/>
+                  </a:sp3d>
+                </c:spPr>
+                <c:invertIfNegative val="0"/>
+                <c:cat>
+                  <c:strRef>
+                    <c:extLst>
+                      <c:ext xmlns:c15="http://schemas.microsoft.com/office/drawing/2012/chart" uri="{02D57815-91ED-43cb-92C2-25804820EDAC}">
+                        <c15:formulaRef>
+                          <c15:sqref>playstore_rating_metrics!$A$2:$A$6</c15:sqref>
+                        </c15:formulaRef>
+                      </c:ext>
+                    </c:extLst>
+                    <c:strCache>
+                      <c:ptCount val="4"/>
+                      <c:pt idx="0">
+                        <c:v>Everyone 10+</c:v>
+                      </c:pt>
+                      <c:pt idx="1">
+                        <c:v>Teen</c:v>
+                      </c:pt>
+                      <c:pt idx="2">
+                        <c:v>Everyone</c:v>
+                      </c:pt>
+                      <c:pt idx="3">
+                        <c:v>Mature 17+</c:v>
+                      </c:pt>
+                    </c:strCache>
+                  </c:strRef>
+                </c:cat>
+                <c:val>
+                  <c:numRef>
+                    <c:extLst>
+                      <c:ext xmlns:c15="http://schemas.microsoft.com/office/drawing/2012/chart" uri="{02D57815-91ED-43cb-92C2-25804820EDAC}">
+                        <c15:formulaRef>
+                          <c15:sqref>playstore_rating_metrics!$E$2:$E$6</c15:sqref>
+                        </c15:formulaRef>
+                      </c:ext>
+                    </c:extLst>
+                    <c:numCache>
+                      <c:formatCode>0%</c:formatCode>
+                      <c:ptCount val="4"/>
+                      <c:pt idx="0">
+                        <c:v>0.21</c:v>
+                      </c:pt>
+                      <c:pt idx="1">
+                        <c:v>0.23</c:v>
+                      </c:pt>
+                      <c:pt idx="2">
+                        <c:v>0.24</c:v>
+                      </c:pt>
+                      <c:pt idx="3">
+                        <c:v>0.17</c:v>
+                      </c:pt>
+                    </c:numCache>
+                  </c:numRef>
+                </c:val>
+                <c:extLst xmlns:c15="http://schemas.microsoft.com/office/drawing/2012/chart">
+                  <c:ext xmlns:c16="http://schemas.microsoft.com/office/drawing/2014/chart" uri="{C3380CC4-5D6E-409C-BE32-E72D297353CC}">
+                    <c16:uniqueId val="{00000003-0743-4F34-A4AD-7EEF5BB26F52}"/>
+                  </c:ext>
+                </c:extLst>
+              </c15:ser>
+            </c15:filteredBarSeries>
+          </c:ext>
+        </c:extLst>
+      </c:barChart>
+      <c:catAx>
+        <c:axId val="1390121519"/>
+        <c:scaling>
+          <c:orientation val="minMax"/>
+        </c:scaling>
+        <c:delete val="0"/>
+        <c:axPos val="b"/>
+        <c:numFmt formatCode="General" sourceLinked="1"/>
+        <c:majorTickMark val="none"/>
+        <c:minorTickMark val="none"/>
+        <c:tickLblPos val="nextTo"/>
+        <c:spPr>
+          <a:noFill/>
+          <a:ln w="12700" cap="flat" cmpd="sng" algn="ctr">
+            <a:solidFill>
+              <a:schemeClr val="lt1">
+                <a:lumMod val="95000"/>
+                <a:alpha val="54000"/>
+              </a:schemeClr>
+            </a:solidFill>
+            <a:round/>
+          </a:ln>
+          <a:effectLst/>
+        </c:spPr>
+        <c:txPr>
+          <a:bodyPr rot="-60000000" spcFirstLastPara="1" vertOverflow="ellipsis" vert="horz" wrap="square" anchor="ctr" anchorCtr="1"/>
+          <a:lstStyle/>
+          <a:p>
+            <a:pPr>
+              <a:defRPr sz="1197" b="0" i="0" u="none" strike="noStrike" kern="1200" baseline="0">
+                <a:solidFill>
+                  <a:schemeClr val="lt1">
+                    <a:lumMod val="85000"/>
+                  </a:schemeClr>
+                </a:solidFill>
+                <a:latin typeface="+mn-lt"/>
+                <a:ea typeface="+mn-ea"/>
+                <a:cs typeface="+mn-cs"/>
+              </a:defRPr>
+            </a:pPr>
+            <a:endParaRPr lang="en-US"/>
+          </a:p>
+        </c:txPr>
+        <c:crossAx val="1390130671"/>
+        <c:crosses val="autoZero"/>
+        <c:auto val="1"/>
+        <c:lblAlgn val="ctr"/>
+        <c:lblOffset val="100"/>
+        <c:noMultiLvlLbl val="0"/>
+      </c:catAx>
+      <c:valAx>
+        <c:axId val="1390130671"/>
+        <c:scaling>
+          <c:orientation val="minMax"/>
+        </c:scaling>
+        <c:delete val="0"/>
+        <c:axPos val="l"/>
+        <c:majorGridlines>
+          <c:spPr>
+            <a:ln w="9525" cap="flat" cmpd="sng" algn="ctr">
+              <a:solidFill>
+                <a:schemeClr val="lt1">
+                  <a:lumMod val="95000"/>
+                  <a:alpha val="10000"/>
+                </a:schemeClr>
+              </a:solidFill>
+              <a:round/>
+            </a:ln>
+            <a:effectLst/>
+          </c:spPr>
+        </c:majorGridlines>
+        <c:numFmt formatCode="General" sourceLinked="1"/>
+        <c:majorTickMark val="none"/>
+        <c:minorTickMark val="none"/>
+        <c:tickLblPos val="nextTo"/>
+        <c:spPr>
+          <a:noFill/>
+          <a:ln>
+            <a:noFill/>
+          </a:ln>
+          <a:effectLst/>
+        </c:spPr>
+        <c:txPr>
+          <a:bodyPr rot="-60000000" spcFirstLastPara="1" vertOverflow="ellipsis" vert="horz" wrap="square" anchor="ctr" anchorCtr="1"/>
+          <a:lstStyle/>
+          <a:p>
+            <a:pPr>
+              <a:defRPr sz="1197" b="0" i="0" u="none" strike="noStrike" kern="1200" baseline="0">
+                <a:solidFill>
+                  <a:schemeClr val="lt1">
+                    <a:lumMod val="85000"/>
+                  </a:schemeClr>
+                </a:solidFill>
+                <a:latin typeface="+mn-lt"/>
+                <a:ea typeface="+mn-ea"/>
+                <a:cs typeface="+mn-cs"/>
+              </a:defRPr>
+            </a:pPr>
+            <a:endParaRPr lang="en-US"/>
+          </a:p>
+        </c:txPr>
+        <c:crossAx val="1390121519"/>
+        <c:crosses val="autoZero"/>
+        <c:crossBetween val="between"/>
+      </c:valAx>
+      <c:spPr>
+        <a:noFill/>
+        <a:ln>
+          <a:noFill/>
+        </a:ln>
+        <a:effectLst/>
+      </c:spPr>
+    </c:plotArea>
+    <c:plotVisOnly val="1"/>
+    <c:dispBlanksAs val="gap"/>
+    <c:extLst>
+      <c:ext xmlns:c16r3="http://schemas.microsoft.com/office/drawing/2017/03/chart" uri="{56B9EC1D-385E-4148-901F-78D8002777C0}">
+        <c16r3:dataDisplayOptions16>
+          <c16r3:dispNaAsBlank val="1"/>
+        </c16r3:dataDisplayOptions16>
+      </c:ext>
+    </c:extLst>
+    <c:showDLblsOverMax val="0"/>
+  </c:chart>
+  <c:spPr>
+    <a:gradFill flip="none" rotWithShape="1">
+      <a:gsLst>
+        <a:gs pos="0">
+          <a:schemeClr val="dk1">
+            <a:lumMod val="65000"/>
+            <a:lumOff val="35000"/>
+          </a:schemeClr>
+        </a:gs>
+        <a:gs pos="100000">
+          <a:schemeClr val="dk1">
+            <a:lumMod val="85000"/>
+            <a:lumOff val="15000"/>
+          </a:schemeClr>
+        </a:gs>
+      </a:gsLst>
+      <a:path path="circle">
+        <a:fillToRect l="50000" t="50000" r="50000" b="50000"/>
+      </a:path>
+      <a:tileRect/>
+    </a:gradFill>
+    <a:ln>
+      <a:noFill/>
+    </a:ln>
+    <a:effectLst/>
+  </c:spPr>
+  <c:txPr>
+    <a:bodyPr/>
+    <a:lstStyle/>
+    <a:p>
+      <a:pPr>
+        <a:defRPr/>
+      </a:pPr>
+      <a:endParaRPr lang="en-US"/>
+    </a:p>
+  </c:txPr>
+  <c:externalData r:id="rId3">
+    <c:autoUpdate val="0"/>
+  </c:externalData>
+</c:chartSpace>
+</file>
+
+<file path=ppt/charts/colors1.xml><?xml version="1.0" encoding="utf-8"?>
+<cs:colorStyle xmlns:cs="http://schemas.microsoft.com/office/drawing/2012/chartStyle" xmlns:a="http://schemas.openxmlformats.org/drawingml/2006/main" meth="withinLinear" id="14">
+  <a:schemeClr val="accent1"/>
+</cs:colorStyle>
+</file>
+
+<file path=ppt/charts/colors2.xml><?xml version="1.0" encoding="utf-8"?>
+<cs:colorStyle xmlns:cs="http://schemas.microsoft.com/office/drawing/2012/chartStyle" xmlns:a="http://schemas.openxmlformats.org/drawingml/2006/main" meth="withinLinear" id="17">
+  <a:schemeClr val="accent4"/>
+</cs:colorStyle>
+</file>
+
+<file path=ppt/charts/style1.xml><?xml version="1.0" encoding="utf-8"?>
+<cs:chartStyle xmlns:cs="http://schemas.microsoft.com/office/drawing/2012/chartStyle" xmlns:a="http://schemas.openxmlformats.org/drawingml/2006/main" id="328">
+  <cs:axisTitle>
+    <cs:lnRef idx="0"/>
+    <cs:fillRef idx="0"/>
+    <cs:effectRef idx="0"/>
+    <cs:fontRef idx="minor">
+      <a:schemeClr val="lt1">
+        <a:lumMod val="85000"/>
+      </a:schemeClr>
+    </cs:fontRef>
+    <cs:defRPr sz="900" b="1" kern="1200" cap="all"/>
+  </cs:axisTitle>
+  <cs:categoryAxis>
+    <cs:lnRef idx="0"/>
+    <cs:fillRef idx="0"/>
+    <cs:effectRef idx="0"/>
+    <cs:fontRef idx="minor">
+      <a:schemeClr val="lt1">
+        <a:lumMod val="85000"/>
+      </a:schemeClr>
+    </cs:fontRef>
+    <cs:spPr>
+      <a:ln w="12700" cap="flat" cmpd="sng" algn="ctr">
+        <a:solidFill>
+          <a:schemeClr val="lt1">
+            <a:lumMod val="95000"/>
+            <a:alpha val="54000"/>
+          </a:schemeClr>
+        </a:solidFill>
+        <a:round/>
+      </a:ln>
+    </cs:spPr>
+    <cs:defRPr sz="900" kern="1200"/>
+  </cs:categoryAxis>
+  <cs:chartArea>
+    <cs:lnRef idx="0"/>
+    <cs:fillRef idx="0"/>
+    <cs:effectRef idx="0"/>
+    <cs:fontRef idx="minor">
+      <a:schemeClr val="dk1"/>
+    </cs:fontRef>
+    <cs:spPr>
+      <a:gradFill flip="none" rotWithShape="1">
+        <a:gsLst>
+          <a:gs pos="0">
+            <a:schemeClr val="dk1">
+              <a:lumMod val="65000"/>
+              <a:lumOff val="35000"/>
+            </a:schemeClr>
+          </a:gs>
+          <a:gs pos="100000">
+            <a:schemeClr val="dk1">
+              <a:lumMod val="85000"/>
+              <a:lumOff val="15000"/>
+            </a:schemeClr>
+          </a:gs>
+        </a:gsLst>
+        <a:path path="circle">
+          <a:fillToRect l="50000" t="50000" r="50000" b="50000"/>
+        </a:path>
+        <a:tileRect/>
+      </a:gradFill>
+    </cs:spPr>
+    <cs:defRPr sz="1000" kern="1200"/>
+  </cs:chartArea>
+  <cs:dataLabel>
+    <cs:lnRef idx="0"/>
+    <cs:fillRef idx="0"/>
+    <cs:effectRef idx="0"/>
+    <cs:fontRef idx="minor">
+      <a:schemeClr val="lt1">
+        <a:lumMod val="85000"/>
+      </a:schemeClr>
+    </cs:fontRef>
+    <cs:defRPr sz="900" kern="1200"/>
+  </cs:dataLabel>
+  <cs:dataLabelCallout>
+    <cs:lnRef idx="0"/>
+    <cs:fillRef idx="0"/>
+    <cs:effectRef idx="0"/>
+    <cs:fontRef idx="minor">
+      <a:schemeClr val="dk1">
+        <a:lumMod val="65000"/>
+        <a:lumOff val="35000"/>
+      </a:schemeClr>
+    </cs:fontRef>
+    <cs:spPr>
+      <a:solidFill>
+        <a:schemeClr val="lt1"/>
+      </a:solidFill>
+    </cs:spPr>
+    <cs:defRPr sz="900" kern="1200"/>
+    <cs:bodyPr rot="0" spcFirstLastPara="1" vertOverflow="clip" horzOverflow="clip" vert="horz" wrap="square" lIns="36576" tIns="18288" rIns="36576" bIns="18288" anchor="ctr" anchorCtr="1">
+      <a:spAutoFit/>
+    </cs:bodyPr>
+  </cs:dataLabelCallout>
+  <cs:dataPoint>
+    <cs:lnRef idx="0"/>
+    <cs:fillRef idx="3">
+      <cs:styleClr val="auto"/>
+    </cs:fillRef>
+    <cs:effectRef idx="3"/>
+    <cs:fontRef idx="minor">
+      <a:schemeClr val="tx1"/>
+    </cs:fontRef>
+  </cs:dataPoint>
+  <cs:dataPoint3D>
+    <cs:lnRef idx="0"/>
+    <cs:fillRef idx="3">
+      <cs:styleClr val="auto"/>
+    </cs:fillRef>
+    <cs:effectRef idx="3"/>
+    <cs:fontRef idx="minor">
+      <a:schemeClr val="tx1"/>
+    </cs:fontRef>
+  </cs:dataPoint3D>
+  <cs:dataPointLine>
+    <cs:lnRef idx="0">
+      <cs:styleClr val="auto"/>
+    </cs:lnRef>
+    <cs:fillRef idx="3"/>
+    <cs:effectRef idx="3"/>
+    <cs:fontRef idx="minor">
+      <a:schemeClr val="tx1"/>
+    </cs:fontRef>
+    <cs:spPr>
+      <a:ln w="34925" cap="rnd">
+        <a:solidFill>
+          <a:schemeClr val="phClr"/>
+        </a:solidFill>
+        <a:round/>
+      </a:ln>
+    </cs:spPr>
+  </cs:dataPointLine>
+  <cs:dataPointMarker>
+    <cs:lnRef idx="0">
+      <cs:styleClr val="auto"/>
+    </cs:lnRef>
+    <cs:fillRef idx="3">
+      <cs:styleClr val="auto"/>
+    </cs:fillRef>
+    <cs:effectRef idx="3"/>
+    <cs:fontRef idx="minor">
+      <a:schemeClr val="tx1"/>
+    </cs:fontRef>
+    <cs:spPr>
+      <a:ln w="9525">
+        <a:solidFill>
+          <a:schemeClr val="phClr"/>
+        </a:solidFill>
+        <a:round/>
+      </a:ln>
+    </cs:spPr>
+  </cs:dataPointMarker>
+  <cs:dataPointMarkerLayout symbol="circle" size="6"/>
+  <cs:dataPointWireframe>
+    <cs:lnRef idx="0">
+      <cs:styleClr val="auto"/>
+    </cs:lnRef>
+    <cs:fillRef idx="3"/>
+    <cs:effectRef idx="3"/>
+    <cs:fontRef idx="minor">
+      <a:schemeClr val="tx1"/>
+    </cs:fontRef>
+    <cs:spPr>
+      <a:ln w="9525" cap="rnd">
+        <a:solidFill>
+          <a:schemeClr val="phClr"/>
+        </a:solidFill>
+        <a:round/>
+      </a:ln>
+    </cs:spPr>
+  </cs:dataPointWireframe>
+  <cs:dataTable>
+    <cs:lnRef idx="0"/>
+    <cs:fillRef idx="0"/>
+    <cs:effectRef idx="0"/>
+    <cs:fontRef idx="minor">
+      <a:schemeClr val="lt1">
+        <a:lumMod val="85000"/>
+      </a:schemeClr>
+    </cs:fontRef>
+    <cs:spPr>
+      <a:ln w="9525">
+        <a:solidFill>
+          <a:schemeClr val="lt1">
+            <a:lumMod val="95000"/>
+            <a:alpha val="54000"/>
+          </a:schemeClr>
+        </a:solidFill>
+      </a:ln>
+    </cs:spPr>
+    <cs:defRPr sz="900" kern="1200"/>
+  </cs:dataTable>
+  <cs:downBar>
+    <cs:lnRef idx="0"/>
+    <cs:fillRef idx="0"/>
+    <cs:effectRef idx="0"/>
+    <cs:fontRef idx="minor">
+      <a:schemeClr val="tx1"/>
+    </cs:fontRef>
+    <cs:spPr>
+      <a:gradFill>
+        <a:gsLst>
+          <a:gs pos="100000">
+            <a:schemeClr val="dk1">
+              <a:lumMod val="95000"/>
+              <a:lumOff val="5000"/>
+            </a:schemeClr>
+          </a:gs>
+          <a:gs pos="0">
+            <a:schemeClr val="dk1">
+              <a:lumMod val="75000"/>
+              <a:lumOff val="25000"/>
+            </a:schemeClr>
+          </a:gs>
+        </a:gsLst>
+        <a:path path="circle">
+          <a:fillToRect l="50000" t="50000" r="50000" b="50000"/>
+        </a:path>
+      </a:gradFill>
+      <a:ln w="9525">
+        <a:solidFill>
+          <a:schemeClr val="dk1">
+            <a:lumMod val="75000"/>
+            <a:lumOff val="25000"/>
+          </a:schemeClr>
+        </a:solidFill>
+      </a:ln>
+    </cs:spPr>
+  </cs:downBar>
+  <cs:dropLine>
+    <cs:lnRef idx="0"/>
+    <cs:fillRef idx="0"/>
+    <cs:effectRef idx="0"/>
+    <cs:fontRef idx="minor">
+      <a:schemeClr val="tx1"/>
+    </cs:fontRef>
+    <cs:spPr>
+      <a:ln w="9525" cap="flat" cmpd="sng" algn="ctr">
+        <a:solidFill>
+          <a:schemeClr val="lt1"/>
+        </a:solidFill>
+        <a:round/>
+      </a:ln>
+    </cs:spPr>
+  </cs:dropLine>
+  <cs:errorBar>
+    <cs:lnRef idx="0"/>
+    <cs:fillRef idx="0"/>
+    <cs:effectRef idx="0"/>
+    <cs:fontRef idx="minor">
+      <a:schemeClr val="tx1"/>
+    </cs:fontRef>
+    <cs:spPr>
+      <a:ln w="9525" cap="flat" cmpd="sng" algn="ctr">
+        <a:solidFill>
+          <a:schemeClr val="lt1">
+            <a:lumMod val="95000"/>
+          </a:schemeClr>
+        </a:solidFill>
+        <a:round/>
+      </a:ln>
+    </cs:spPr>
+  </cs:errorBar>
+  <cs:floor>
+    <cs:lnRef idx="0"/>
+    <cs:fillRef idx="0"/>
+    <cs:effectRef idx="0"/>
+    <cs:fontRef idx="minor">
+      <a:schemeClr val="tx1"/>
+    </cs:fontRef>
+  </cs:floor>
+  <cs:gridlineMajor>
+    <cs:lnRef idx="0"/>
+    <cs:fillRef idx="0"/>
+    <cs:effectRef idx="0"/>
+    <cs:fontRef idx="minor">
+      <a:schemeClr val="tx1"/>
+    </cs:fontRef>
+    <cs:spPr>
+      <a:ln w="9525" cap="flat" cmpd="sng" algn="ctr">
+        <a:solidFill>
+          <a:schemeClr val="lt1">
+            <a:lumMod val="95000"/>
+            <a:alpha val="10000"/>
+          </a:schemeClr>
+        </a:solidFill>
+        <a:round/>
+      </a:ln>
+    </cs:spPr>
+  </cs:gridlineMajor>
+  <cs:gridlineMinor>
+    <cs:lnRef idx="0"/>
+    <cs:fillRef idx="0"/>
+    <cs:effectRef idx="0"/>
+    <cs:fontRef idx="minor">
+      <a:schemeClr val="tx1"/>
+    </cs:fontRef>
+    <cs:spPr>
+      <a:ln>
+        <a:solidFill>
+          <a:schemeClr val="lt1">
+            <a:lumMod val="95000"/>
+            <a:alpha val="5000"/>
+          </a:schemeClr>
+        </a:solidFill>
+      </a:ln>
+    </cs:spPr>
+  </cs:gridlineMinor>
+  <cs:hiLoLine>
+    <cs:lnRef idx="0"/>
+    <cs:fillRef idx="0"/>
+    <cs:effectRef idx="0"/>
+    <cs:fontRef idx="minor">
+      <a:schemeClr val="tx1"/>
+    </cs:fontRef>
+    <cs:spPr>
+      <a:ln w="9525" cap="flat" cmpd="sng" algn="ctr">
+        <a:solidFill>
+          <a:schemeClr val="lt1"/>
+        </a:solidFill>
+        <a:round/>
+      </a:ln>
+    </cs:spPr>
+  </cs:hiLoLine>
+  <cs:leaderLine>
+    <cs:lnRef idx="0"/>
+    <cs:fillRef idx="0"/>
+    <cs:effectRef idx="0"/>
+    <cs:fontRef idx="minor">
+      <a:schemeClr val="tx1"/>
+    </cs:fontRef>
+    <cs:spPr>
+      <a:ln w="9525">
+        <a:solidFill>
+          <a:schemeClr val="lt1">
+            <a:lumMod val="95000"/>
+            <a:alpha val="54000"/>
+          </a:schemeClr>
+        </a:solidFill>
+      </a:ln>
+    </cs:spPr>
+  </cs:leaderLine>
+  <cs:legend>
+    <cs:lnRef idx="0"/>
+    <cs:fillRef idx="0"/>
+    <cs:effectRef idx="0"/>
+    <cs:fontRef idx="minor">
+      <a:schemeClr val="lt1">
+        <a:lumMod val="85000"/>
+      </a:schemeClr>
+    </cs:fontRef>
+    <cs:defRPr sz="900" kern="1200"/>
+  </cs:legend>
+  <cs:plotArea>
+    <cs:lnRef idx="0"/>
+    <cs:fillRef idx="0"/>
+    <cs:effectRef idx="0"/>
+    <cs:fontRef idx="minor">
+      <a:schemeClr val="tx1"/>
+    </cs:fontRef>
+  </cs:plotArea>
+  <cs:plotArea3D>
+    <cs:lnRef idx="0"/>
+    <cs:fillRef idx="0"/>
+    <cs:effectRef idx="0"/>
+    <cs:fontRef idx="minor">
+      <a:schemeClr val="tx1"/>
+    </cs:fontRef>
+  </cs:plotArea3D>
+  <cs:seriesAxis>
+    <cs:lnRef idx="0"/>
+    <cs:fillRef idx="0"/>
+    <cs:effectRef idx="0"/>
+    <cs:fontRef idx="minor">
+      <a:schemeClr val="lt1">
+        <a:lumMod val="85000"/>
+      </a:schemeClr>
+    </cs:fontRef>
+    <cs:spPr>
+      <a:ln w="12700" cap="flat" cmpd="sng" algn="ctr">
+        <a:solidFill>
+          <a:schemeClr val="lt1">
+            <a:lumMod val="95000"/>
+            <a:alpha val="54000"/>
+          </a:schemeClr>
+        </a:solidFill>
+        <a:round/>
+      </a:ln>
+    </cs:spPr>
+    <cs:defRPr sz="900" kern="1200"/>
+  </cs:seriesAxis>
+  <cs:seriesLine>
+    <cs:lnRef idx="0"/>
+    <cs:fillRef idx="0"/>
+    <cs:effectRef idx="0"/>
+    <cs:fontRef idx="minor">
+      <a:schemeClr val="lt1"/>
+    </cs:fontRef>
+    <cs:spPr>
+      <a:ln w="9525" cap="flat" cmpd="sng" algn="ctr">
+        <a:solidFill>
+          <a:schemeClr val="lt1">
+            <a:lumMod val="95000"/>
+            <a:alpha val="54000"/>
+          </a:schemeClr>
+        </a:solidFill>
+        <a:round/>
+      </a:ln>
+    </cs:spPr>
+  </cs:seriesLine>
+  <cs:title>
+    <cs:lnRef idx="0"/>
+    <cs:fillRef idx="0"/>
+    <cs:effectRef idx="0"/>
+    <cs:fontRef idx="minor">
+      <a:schemeClr val="lt1">
+        <a:lumMod val="95000"/>
+      </a:schemeClr>
+    </cs:fontRef>
+    <cs:defRPr sz="1600" b="1" kern="1200" spc="100" baseline="0">
+      <a:effectLst>
+        <a:outerShdw blurRad="50800" dist="38100" dir="5400000" algn="t" rotWithShape="0">
+          <a:prstClr val="black">
+            <a:alpha val="40000"/>
+          </a:prstClr>
+        </a:outerShdw>
+      </a:effectLst>
+    </cs:defRPr>
+  </cs:title>
+  <cs:trendline>
+    <cs:lnRef idx="0">
+      <cs:styleClr val="auto"/>
+    </cs:lnRef>
+    <cs:fillRef idx="0"/>
+    <cs:effectRef idx="0"/>
+    <cs:fontRef idx="minor">
+      <a:schemeClr val="tx1"/>
+    </cs:fontRef>
+    <cs:spPr>
+      <a:ln w="19050" cap="rnd">
+        <a:solidFill>
+          <a:schemeClr val="phClr"/>
+        </a:solidFill>
+      </a:ln>
+    </cs:spPr>
+  </cs:trendline>
+  <cs:trendlineLabel>
+    <cs:lnRef idx="0"/>
+    <cs:fillRef idx="0"/>
+    <cs:effectRef idx="0"/>
+    <cs:fontRef idx="minor">
+      <a:schemeClr val="lt1">
+        <a:lumMod val="85000"/>
+      </a:schemeClr>
+    </cs:fontRef>
+    <cs:defRPr sz="900" kern="1200"/>
+  </cs:trendlineLabel>
+  <cs:upBar>
+    <cs:lnRef idx="0"/>
+    <cs:fillRef idx="0"/>
+    <cs:effectRef idx="0"/>
+    <cs:fontRef idx="minor">
+      <a:schemeClr val="tx1"/>
+    </cs:fontRef>
+    <cs:spPr>
+      <a:gradFill>
+        <a:gsLst>
+          <a:gs pos="100000">
+            <a:schemeClr val="lt1">
+              <a:lumMod val="85000"/>
+            </a:schemeClr>
+          </a:gs>
+          <a:gs pos="0">
+            <a:schemeClr val="lt1"/>
+          </a:gs>
+        </a:gsLst>
+        <a:path path="circle">
+          <a:fillToRect l="50000" t="50000" r="50000" b="50000"/>
+        </a:path>
+      </a:gradFill>
+      <a:ln w="9525" cap="flat" cmpd="sng" algn="ctr">
+        <a:solidFill>
+          <a:schemeClr val="lt1"/>
+        </a:solidFill>
+        <a:round/>
+      </a:ln>
+    </cs:spPr>
+  </cs:upBar>
+  <cs:valueAxis>
+    <cs:lnRef idx="0"/>
+    <cs:fillRef idx="0"/>
+    <cs:effectRef idx="0"/>
+    <cs:fontRef idx="minor">
+      <a:schemeClr val="lt1">
+        <a:lumMod val="85000"/>
+      </a:schemeClr>
+    </cs:fontRef>
+    <cs:defRPr sz="900" kern="1200"/>
+  </cs:valueAxis>
+  <cs:wall>
+    <cs:lnRef idx="0"/>
+    <cs:fillRef idx="0"/>
+    <cs:effectRef idx="0"/>
+    <cs:fontRef idx="minor">
+      <a:schemeClr val="tx1"/>
+    </cs:fontRef>
+  </cs:wall>
+</cs:chartStyle>
+</file>
+
+<file path=ppt/charts/style2.xml><?xml version="1.0" encoding="utf-8"?>
+<cs:chartStyle xmlns:cs="http://schemas.microsoft.com/office/drawing/2012/chartStyle" xmlns:a="http://schemas.openxmlformats.org/drawingml/2006/main" id="209">
+  <cs:axisTitle>
+    <cs:lnRef idx="0"/>
+    <cs:fillRef idx="0"/>
+    <cs:effectRef idx="0"/>
+    <cs:fontRef idx="minor">
+      <a:schemeClr val="lt1">
+        <a:lumMod val="85000"/>
+      </a:schemeClr>
+    </cs:fontRef>
+    <cs:defRPr sz="1197" b="1" kern="1200" cap="all"/>
+  </cs:axisTitle>
+  <cs:categoryAxis>
+    <cs:lnRef idx="0"/>
+    <cs:fillRef idx="0"/>
+    <cs:effectRef idx="0"/>
+    <cs:fontRef idx="minor">
+      <a:schemeClr val="lt1">
+        <a:lumMod val="85000"/>
+      </a:schemeClr>
+    </cs:fontRef>
+    <cs:spPr>
+      <a:ln w="12700" cap="flat" cmpd="sng" algn="ctr">
+        <a:solidFill>
+          <a:schemeClr val="lt1">
+            <a:lumMod val="95000"/>
+            <a:alpha val="54000"/>
+          </a:schemeClr>
+        </a:solidFill>
+        <a:round/>
+      </a:ln>
+    </cs:spPr>
+    <cs:defRPr sz="1197" kern="1200"/>
+  </cs:categoryAxis>
+  <cs:chartArea>
+    <cs:lnRef idx="0"/>
+    <cs:fillRef idx="0"/>
+    <cs:effectRef idx="0"/>
+    <cs:fontRef idx="minor">
+      <a:schemeClr val="dk1"/>
+    </cs:fontRef>
+    <cs:spPr>
+      <a:gradFill flip="none" rotWithShape="1">
+        <a:gsLst>
+          <a:gs pos="0">
+            <a:schemeClr val="dk1">
+              <a:lumMod val="65000"/>
+              <a:lumOff val="35000"/>
+            </a:schemeClr>
+          </a:gs>
+          <a:gs pos="100000">
+            <a:schemeClr val="dk1">
+              <a:lumMod val="85000"/>
+              <a:lumOff val="15000"/>
+            </a:schemeClr>
+          </a:gs>
+        </a:gsLst>
+        <a:path path="circle">
+          <a:fillToRect l="50000" t="50000" r="50000" b="50000"/>
+        </a:path>
+        <a:tileRect/>
+      </a:gradFill>
+    </cs:spPr>
+    <cs:defRPr sz="1330" kern="1200"/>
+  </cs:chartArea>
+  <cs:dataLabel>
+    <cs:lnRef idx="0"/>
+    <cs:fillRef idx="0"/>
+    <cs:effectRef idx="0"/>
+    <cs:fontRef idx="minor">
+      <a:schemeClr val="lt1">
+        <a:lumMod val="85000"/>
+      </a:schemeClr>
+    </cs:fontRef>
+    <cs:defRPr sz="1197" kern="1200"/>
+  </cs:dataLabel>
+  <cs:dataLabelCallout>
+    <cs:lnRef idx="0"/>
+    <cs:fillRef idx="0"/>
+    <cs:effectRef idx="0"/>
+    <cs:fontRef idx="minor">
+      <a:schemeClr val="dk1">
+        <a:lumMod val="65000"/>
+        <a:lumOff val="35000"/>
+      </a:schemeClr>
+    </cs:fontRef>
+    <cs:spPr>
+      <a:solidFill>
+        <a:schemeClr val="lt1"/>
+      </a:solidFill>
+    </cs:spPr>
+    <cs:defRPr sz="1197" kern="1200"/>
+    <cs:bodyPr rot="0" spcFirstLastPara="1" vertOverflow="clip" horzOverflow="clip" vert="horz" wrap="square" lIns="36576" tIns="18288" rIns="36576" bIns="18288" anchor="ctr" anchorCtr="1">
+      <a:spAutoFit/>
+    </cs:bodyPr>
+  </cs:dataLabelCallout>
+  <cs:dataPoint>
+    <cs:lnRef idx="0"/>
+    <cs:fillRef idx="3">
+      <cs:styleClr val="auto"/>
+    </cs:fillRef>
+    <cs:effectRef idx="3"/>
+    <cs:fontRef idx="minor">
+      <a:schemeClr val="lt1"/>
+    </cs:fontRef>
+  </cs:dataPoint>
+  <cs:dataPoint3D>
+    <cs:lnRef idx="0"/>
+    <cs:fillRef idx="3">
+      <cs:styleClr val="auto"/>
+    </cs:fillRef>
+    <cs:effectRef idx="3"/>
+    <cs:fontRef idx="minor">
+      <a:schemeClr val="lt1"/>
+    </cs:fontRef>
+  </cs:dataPoint3D>
+  <cs:dataPointLine>
+    <cs:lnRef idx="0">
+      <cs:styleClr val="auto"/>
+    </cs:lnRef>
+    <cs:fillRef idx="3"/>
+    <cs:effectRef idx="3"/>
+    <cs:fontRef idx="minor">
+      <a:schemeClr val="lt1"/>
+    </cs:fontRef>
+    <cs:spPr>
+      <a:ln w="34925" cap="rnd">
+        <a:solidFill>
+          <a:schemeClr val="phClr"/>
+        </a:solidFill>
+        <a:round/>
+      </a:ln>
+    </cs:spPr>
+  </cs:dataPointLine>
+  <cs:dataPointMarker>
+    <cs:lnRef idx="0">
+      <cs:styleClr val="auto"/>
+    </cs:lnRef>
+    <cs:fillRef idx="3">
+      <cs:styleClr val="auto"/>
+    </cs:fillRef>
+    <cs:effectRef idx="3"/>
+    <cs:fontRef idx="minor">
+      <a:schemeClr val="lt1"/>
+    </cs:fontRef>
+    <cs:spPr>
+      <a:ln w="9525">
+        <a:solidFill>
+          <a:schemeClr val="phClr"/>
+        </a:solidFill>
+        <a:round/>
+      </a:ln>
+    </cs:spPr>
+  </cs:dataPointMarker>
+  <cs:dataPointMarkerLayout symbol="circle" size="6"/>
+  <cs:dataPointWireframe>
+    <cs:lnRef idx="0">
+      <cs:styleClr val="auto"/>
+    </cs:lnRef>
+    <cs:fillRef idx="3"/>
+    <cs:effectRef idx="3"/>
+    <cs:fontRef idx="minor">
+      <a:schemeClr val="lt1"/>
+    </cs:fontRef>
+    <cs:spPr>
+      <a:ln w="9525" cap="rnd">
+        <a:solidFill>
+          <a:schemeClr val="phClr"/>
+        </a:solidFill>
+        <a:round/>
+      </a:ln>
+    </cs:spPr>
+  </cs:dataPointWireframe>
+  <cs:dataTable>
+    <cs:lnRef idx="0"/>
+    <cs:fillRef idx="0"/>
+    <cs:effectRef idx="0"/>
+    <cs:fontRef idx="minor">
+      <a:schemeClr val="lt1">
+        <a:lumMod val="85000"/>
+      </a:schemeClr>
+    </cs:fontRef>
+    <cs:spPr>
+      <a:ln w="9525">
+        <a:solidFill>
+          <a:schemeClr val="lt1">
+            <a:lumMod val="95000"/>
+            <a:alpha val="54000"/>
+          </a:schemeClr>
+        </a:solidFill>
+      </a:ln>
+    </cs:spPr>
+    <cs:defRPr sz="1197" kern="1200"/>
+  </cs:dataTable>
+  <cs:downBar>
+    <cs:lnRef idx="0"/>
+    <cs:fillRef idx="0"/>
+    <cs:effectRef idx="0"/>
+    <cs:fontRef idx="minor">
+      <a:schemeClr val="lt1"/>
+    </cs:fontRef>
+    <cs:spPr>
+      <a:solidFill>
+        <a:schemeClr val="dk1">
+          <a:lumMod val="75000"/>
+          <a:lumOff val="25000"/>
+        </a:schemeClr>
+      </a:solidFill>
+      <a:ln w="9525">
+        <a:solidFill>
+          <a:schemeClr val="lt1">
+            <a:lumMod val="95000"/>
+            <a:alpha val="54000"/>
+          </a:schemeClr>
+        </a:solidFill>
+      </a:ln>
+    </cs:spPr>
+  </cs:downBar>
+  <cs:dropLine>
+    <cs:lnRef idx="0"/>
+    <cs:fillRef idx="0"/>
+    <cs:effectRef idx="0"/>
+    <cs:fontRef idx="minor">
+      <a:schemeClr val="lt1"/>
+    </cs:fontRef>
+    <cs:spPr>
+      <a:ln w="9525">
+        <a:solidFill>
+          <a:schemeClr val="lt1">
+            <a:lumMod val="95000"/>
+            <a:alpha val="54000"/>
+          </a:schemeClr>
+        </a:solidFill>
+        <a:prstDash val="dash"/>
+      </a:ln>
+    </cs:spPr>
+  </cs:dropLine>
+  <cs:errorBar>
+    <cs:lnRef idx="0"/>
+    <cs:fillRef idx="0"/>
+    <cs:effectRef idx="0"/>
+    <cs:fontRef idx="minor">
+      <a:schemeClr val="lt1"/>
+    </cs:fontRef>
+    <cs:spPr>
+      <a:ln w="9525" cap="flat" cmpd="sng" algn="ctr">
+        <a:solidFill>
+          <a:schemeClr val="lt1">
+            <a:lumMod val="95000"/>
+          </a:schemeClr>
+        </a:solidFill>
+        <a:round/>
+      </a:ln>
+    </cs:spPr>
+  </cs:errorBar>
+  <cs:floor>
+    <cs:lnRef idx="0"/>
+    <cs:fillRef idx="0"/>
+    <cs:effectRef idx="0"/>
+    <cs:fontRef idx="minor">
+      <a:schemeClr val="lt1"/>
+    </cs:fontRef>
+  </cs:floor>
+  <cs:gridlineMajor>
+    <cs:lnRef idx="0"/>
+    <cs:fillRef idx="0"/>
+    <cs:effectRef idx="0"/>
+    <cs:fontRef idx="minor">
+      <a:schemeClr val="lt1"/>
+    </cs:fontRef>
+    <cs:spPr>
+      <a:ln w="9525" cap="flat" cmpd="sng" algn="ctr">
+        <a:solidFill>
+          <a:schemeClr val="lt1">
+            <a:lumMod val="95000"/>
+            <a:alpha val="10000"/>
+          </a:schemeClr>
+        </a:solidFill>
+        <a:round/>
+      </a:ln>
+    </cs:spPr>
+  </cs:gridlineMajor>
+  <cs:gridlineMinor>
+    <cs:lnRef idx="0"/>
+    <cs:fillRef idx="0"/>
+    <cs:effectRef idx="0"/>
+    <cs:fontRef idx="minor">
+      <a:schemeClr val="lt1"/>
+    </cs:fontRef>
+    <cs:spPr>
+      <a:ln>
+        <a:solidFill>
+          <a:schemeClr val="lt1">
+            <a:lumMod val="95000"/>
+            <a:alpha val="5000"/>
+          </a:schemeClr>
+        </a:solidFill>
+      </a:ln>
+    </cs:spPr>
+  </cs:gridlineMinor>
+  <cs:hiLoLine>
+    <cs:lnRef idx="0"/>
+    <cs:fillRef idx="0"/>
+    <cs:effectRef idx="0"/>
+    <cs:fontRef idx="minor">
+      <a:schemeClr val="lt1"/>
+    </cs:fontRef>
+    <cs:spPr>
+      <a:ln w="9525">
+        <a:solidFill>
+          <a:schemeClr val="lt1">
+            <a:lumMod val="95000"/>
+            <a:alpha val="54000"/>
+          </a:schemeClr>
+        </a:solidFill>
+        <a:prstDash val="dash"/>
+      </a:ln>
+    </cs:spPr>
+  </cs:hiLoLine>
+  <cs:leaderLine>
+    <cs:lnRef idx="0"/>
+    <cs:fillRef idx="0"/>
+    <cs:effectRef idx="0"/>
+    <cs:fontRef idx="minor">
+      <a:schemeClr val="lt1"/>
+    </cs:fontRef>
+    <cs:spPr>
+      <a:ln w="9525">
+        <a:solidFill>
+          <a:schemeClr val="lt1">
+            <a:lumMod val="95000"/>
+            <a:alpha val="54000"/>
+          </a:schemeClr>
+        </a:solidFill>
+      </a:ln>
+    </cs:spPr>
+  </cs:leaderLine>
+  <cs:legend>
+    <cs:lnRef idx="0"/>
+    <cs:fillRef idx="0"/>
+    <cs:effectRef idx="0"/>
+    <cs:fontRef idx="minor">
+      <a:schemeClr val="lt1">
+        <a:lumMod val="85000"/>
+      </a:schemeClr>
+    </cs:fontRef>
+    <cs:defRPr sz="1197" kern="1200"/>
+  </cs:legend>
+  <cs:plotArea>
+    <cs:lnRef idx="0"/>
+    <cs:fillRef idx="0"/>
+    <cs:effectRef idx="0"/>
+    <cs:fontRef idx="minor">
+      <a:schemeClr val="lt1"/>
+    </cs:fontRef>
+  </cs:plotArea>
+  <cs:plotArea3D>
+    <cs:lnRef idx="0"/>
+    <cs:fillRef idx="0"/>
+    <cs:effectRef idx="0"/>
+    <cs:fontRef idx="minor">
+      <a:schemeClr val="lt1"/>
+    </cs:fontRef>
+  </cs:plotArea3D>
+  <cs:seriesAxis>
+    <cs:lnRef idx="0"/>
+    <cs:fillRef idx="0"/>
+    <cs:effectRef idx="0"/>
+    <cs:fontRef idx="minor">
+      <a:schemeClr val="lt1">
+        <a:lumMod val="85000"/>
+      </a:schemeClr>
+    </cs:fontRef>
+    <cs:spPr>
+      <a:ln w="12700" cap="flat" cmpd="sng" algn="ctr">
+        <a:solidFill>
+          <a:schemeClr val="lt1">
+            <a:lumMod val="95000"/>
+            <a:alpha val="54000"/>
+          </a:schemeClr>
+        </a:solidFill>
+        <a:round/>
+      </a:ln>
+    </cs:spPr>
+    <cs:defRPr sz="1197" kern="1200"/>
+  </cs:seriesAxis>
+  <cs:seriesLine>
+    <cs:lnRef idx="0"/>
+    <cs:fillRef idx="0"/>
+    <cs:effectRef idx="0"/>
+    <cs:fontRef idx="minor">
+      <a:schemeClr val="lt1"/>
+    </cs:fontRef>
+    <cs:spPr>
+      <a:ln w="9525" cap="flat" cmpd="sng" algn="ctr">
+        <a:solidFill>
+          <a:schemeClr val="lt1">
+            <a:lumMod val="95000"/>
+            <a:alpha val="54000"/>
+          </a:schemeClr>
+        </a:solidFill>
+        <a:round/>
+      </a:ln>
+    </cs:spPr>
+  </cs:seriesLine>
+  <cs:title>
+    <cs:lnRef idx="0"/>
+    <cs:fillRef idx="0"/>
+    <cs:effectRef idx="0"/>
+    <cs:fontRef idx="minor">
+      <a:schemeClr val="lt1">
+        <a:lumMod val="95000"/>
+      </a:schemeClr>
+    </cs:fontRef>
+    <cs:defRPr sz="2128" b="1" kern="1200" spc="100" baseline="0">
+      <a:effectLst>
+        <a:outerShdw blurRad="50800" dist="38100" dir="5400000" algn="t" rotWithShape="0">
+          <a:prstClr val="black">
+            <a:alpha val="40000"/>
+          </a:prstClr>
+        </a:outerShdw>
+      </a:effectLst>
+    </cs:defRPr>
+  </cs:title>
+  <cs:trendline>
+    <cs:lnRef idx="0">
+      <cs:styleClr val="auto"/>
+    </cs:lnRef>
+    <cs:fillRef idx="0"/>
+    <cs:effectRef idx="0"/>
+    <cs:fontRef idx="minor">
+      <a:schemeClr val="lt1"/>
+    </cs:fontRef>
+    <cs:spPr>
+      <a:ln w="19050" cap="rnd">
+        <a:solidFill>
+          <a:schemeClr val="phClr"/>
+        </a:solidFill>
+      </a:ln>
+    </cs:spPr>
+  </cs:trendline>
+  <cs:trendlineLabel>
+    <cs:lnRef idx="0"/>
+    <cs:fillRef idx="0"/>
+    <cs:effectRef idx="0"/>
+    <cs:fontRef idx="minor">
+      <a:schemeClr val="lt1">
+        <a:lumMod val="85000"/>
+      </a:schemeClr>
+    </cs:fontRef>
+    <cs:defRPr sz="1197" kern="1200"/>
+  </cs:trendlineLabel>
+  <cs:upBar>
+    <cs:lnRef idx="0"/>
+    <cs:fillRef idx="0"/>
+    <cs:effectRef idx="0"/>
+    <cs:fontRef idx="minor">
+      <a:schemeClr val="lt1"/>
+    </cs:fontRef>
+    <cs:spPr>
+      <a:solidFill>
+        <a:schemeClr val="lt1"/>
+      </a:solidFill>
+      <a:ln w="9525">
+        <a:solidFill>
+          <a:schemeClr val="lt1">
+            <a:lumMod val="95000"/>
+            <a:alpha val="54000"/>
+          </a:schemeClr>
+        </a:solidFill>
+      </a:ln>
+    </cs:spPr>
+  </cs:upBar>
+  <cs:valueAxis>
+    <cs:lnRef idx="0"/>
+    <cs:fillRef idx="0"/>
+    <cs:effectRef idx="0"/>
+    <cs:fontRef idx="minor">
+      <a:schemeClr val="lt1">
+        <a:lumMod val="85000"/>
+      </a:schemeClr>
+    </cs:fontRef>
+    <cs:defRPr sz="1197" kern="1200"/>
+  </cs:valueAxis>
+  <cs:wall>
+    <cs:lnRef idx="0"/>
+    <cs:fillRef idx="0"/>
+    <cs:effectRef idx="0"/>
+    <cs:fontRef idx="minor">
+      <a:schemeClr val="lt1"/>
+    </cs:fontRef>
+  </cs:wall>
+</cs:chartStyle>
 </file>
 
 <file path=ppt/diagrams/colors1.xml><?xml version="1.0" encoding="utf-8"?>
@@ -892,7 +3557,7 @@
         <a:lstStyle/>
         <a:p>
           <a:r>
-            <a:rPr lang="en-US"/>
+            <a:rPr lang="en-US" dirty="0"/>
             <a:t>Christian Mack – Team Lead</a:t>
           </a:r>
         </a:p>
@@ -1394,7 +4059,7 @@
             <a:buNone/>
           </a:pPr>
           <a:r>
-            <a:rPr lang="en-US" sz="2100" kern="1200"/>
+            <a:rPr lang="en-US" sz="2100" kern="1200" dirty="0"/>
             <a:t>Christian Mack – Team Lead</a:t>
           </a:r>
         </a:p>
@@ -7161,7 +9826,7 @@
           <p:cNvPr id="2" name="Title 1">
             <a:extLst>
               <a:ext uri="{FF2B5EF4-FFF2-40B4-BE49-F238E27FC236}">
-                <a16:creationId xmlns:a16="http://schemas.microsoft.com/office/drawing/2014/main" id="{BA8FC292-43F6-4805-A446-7DBD4BD06A93}"/>
+                <a16:creationId xmlns:a16="http://schemas.microsoft.com/office/drawing/2014/main" id="{B307D4A1-1E3E-46E4-9EF6-4DA40F2F3FEF}"/>
               </a:ext>
             </a:extLst>
           </p:cNvPr>
@@ -7172,107 +9837,90 @@
             <p:ph type="title"/>
           </p:nvPr>
         </p:nvSpPr>
-        <p:spPr>
-          <a:xfrm>
-            <a:off x="1097280" y="286603"/>
-            <a:ext cx="10058400" cy="1450757"/>
-          </a:xfrm>
-        </p:spPr>
+        <p:spPr/>
         <p:txBody>
-          <a:bodyPr anchor="b">
-            <a:normAutofit/>
-          </a:bodyPr>
+          <a:bodyPr/>
           <a:lstStyle/>
           <a:p>
             <a:r>
               <a:rPr lang="en-US" dirty="0"/>
-              <a:t>Content Rating</a:t>
+              <a:t>Content Rating Analysis</a:t>
             </a:r>
           </a:p>
         </p:txBody>
       </p:sp>
-      <p:sp>
-        <p:nvSpPr>
-          <p:cNvPr id="8" name="Content Placeholder 2">
+      <p:graphicFrame>
+        <p:nvGraphicFramePr>
+          <p:cNvPr id="5" name="Content Placeholder 4">
             <a:extLst>
               <a:ext uri="{FF2B5EF4-FFF2-40B4-BE49-F238E27FC236}">
-                <a16:creationId xmlns:a16="http://schemas.microsoft.com/office/drawing/2014/main" id="{BA58F9B3-3D6A-4203-A671-D6CEF5EDEEEF}"/>
+                <a16:creationId xmlns:a16="http://schemas.microsoft.com/office/drawing/2014/main" id="{6C3EFDA3-414E-408E-8962-8D2F3495ECF7}"/>
               </a:ext>
             </a:extLst>
           </p:cNvPr>
-          <p:cNvSpPr>
-            <a:spLocks noGrp="1"/>
-          </p:cNvSpPr>
+          <p:cNvGraphicFramePr>
+            <a:graphicFrameLocks noGrp="1"/>
+          </p:cNvGraphicFramePr>
           <p:nvPr>
             <p:ph sz="half" idx="1"/>
+            <p:extLst>
+              <p:ext uri="{D42A27DB-BD31-4B8C-83A1-F6EECF244321}">
+                <p14:modId xmlns:p14="http://schemas.microsoft.com/office/powerpoint/2010/main" val="2920414030"/>
+              </p:ext>
+            </p:extLst>
           </p:nvPr>
-        </p:nvSpPr>
-        <p:spPr>
-          <a:xfrm>
-            <a:off x="1097280" y="2120900"/>
-            <a:ext cx="4639736" cy="3748193"/>
-          </a:xfrm>
-        </p:spPr>
-        <p:txBody>
-          <a:bodyPr/>
-          <a:lstStyle/>
-          <a:p>
-            <a:endParaRPr lang="en-US"/>
-          </a:p>
-        </p:txBody>
-      </p:sp>
-      <p:sp>
-        <p:nvSpPr>
-          <p:cNvPr id="10" name="Content Placeholder 3">
+        </p:nvGraphicFramePr>
+        <p:xfrm>
+          <a:off x="1096963" y="2120900"/>
+          <a:ext cx="4640262" cy="3748088"/>
+        </p:xfrm>
+        <a:graphic>
+          <a:graphicData uri="http://schemas.openxmlformats.org/drawingml/2006/chart">
+            <c:chart xmlns:c="http://schemas.openxmlformats.org/drawingml/2006/chart" xmlns:r="http://schemas.openxmlformats.org/officeDocument/2006/relationships" r:id="rId2"/>
+          </a:graphicData>
+        </a:graphic>
+      </p:graphicFrame>
+      <p:graphicFrame>
+        <p:nvGraphicFramePr>
+          <p:cNvPr id="6" name="Content Placeholder 5">
             <a:extLst>
               <a:ext uri="{FF2B5EF4-FFF2-40B4-BE49-F238E27FC236}">
-                <a16:creationId xmlns:a16="http://schemas.microsoft.com/office/drawing/2014/main" id="{C50C6702-8BF1-4894-AD32-DA41A8FC4ABD}"/>
+                <a16:creationId xmlns:a16="http://schemas.microsoft.com/office/drawing/2014/main" id="{2EA13302-A461-4852-B3BF-C30F42EE9348}"/>
               </a:ext>
             </a:extLst>
           </p:cNvPr>
-          <p:cNvSpPr>
-            <a:spLocks noGrp="1"/>
-          </p:cNvSpPr>
+          <p:cNvGraphicFramePr>
+            <a:graphicFrameLocks noGrp="1"/>
+          </p:cNvGraphicFramePr>
           <p:nvPr>
             <p:ph sz="half" idx="2"/>
+            <p:extLst>
+              <p:ext uri="{D42A27DB-BD31-4B8C-83A1-F6EECF244321}">
+                <p14:modId xmlns:p14="http://schemas.microsoft.com/office/powerpoint/2010/main" val="1516891880"/>
+              </p:ext>
+            </p:extLst>
           </p:nvPr>
-        </p:nvSpPr>
-        <p:spPr>
-          <a:xfrm>
-            <a:off x="6515944" y="2120900"/>
-            <a:ext cx="4639736" cy="3748194"/>
-          </a:xfrm>
-        </p:spPr>
-        <p:txBody>
-          <a:bodyPr/>
-          <a:lstStyle/>
-          <a:p>
-            <a:endParaRPr lang="en-US"/>
-          </a:p>
-        </p:txBody>
-      </p:sp>
+        </p:nvGraphicFramePr>
+        <p:xfrm>
+          <a:off x="6516688" y="2120900"/>
+          <a:ext cx="4638675" cy="3748088"/>
+        </p:xfrm>
+        <a:graphic>
+          <a:graphicData uri="http://schemas.openxmlformats.org/drawingml/2006/chart">
+            <c:chart xmlns:c="http://schemas.openxmlformats.org/drawingml/2006/chart" xmlns:r="http://schemas.openxmlformats.org/officeDocument/2006/relationships" r:id="rId3"/>
+          </a:graphicData>
+        </a:graphic>
+      </p:graphicFrame>
     </p:spTree>
     <p:extLst>
       <p:ext uri="{BB962C8B-B14F-4D97-AF65-F5344CB8AC3E}">
-        <p14:creationId xmlns:p14="http://schemas.microsoft.com/office/powerpoint/2010/main" val="1245357987"/>
+        <p14:creationId xmlns:p14="http://schemas.microsoft.com/office/powerpoint/2010/main" val="4084898709"/>
       </p:ext>
     </p:extLst>
   </p:cSld>
   <p:clrMapOvr>
     <a:masterClrMapping/>
   </p:clrMapOvr>
-  <mc:AlternateContent xmlns:mc="http://schemas.openxmlformats.org/markup-compatibility/2006">
-    <mc:Choice xmlns:p14="http://schemas.microsoft.com/office/powerpoint/2010/main" Requires="p14">
-      <p:transition spd="slow" p14:dur="3400">
-        <p14:reveal/>
-      </p:transition>
-    </mc:Choice>
-    <mc:Fallback>
-      <p:transition spd="slow">
-        <p:fade/>
-      </p:transition>
-    </mc:Fallback>
-  </mc:AlternateContent>
 </p:sld>
 </file>
 
@@ -7323,10 +9971,10 @@
       </p:sp>
       <p:sp>
         <p:nvSpPr>
-          <p:cNvPr id="3" name="Content Placeholder 2">
+          <p:cNvPr id="14" name="Content Placeholder 13">
             <a:extLst>
               <a:ext uri="{FF2B5EF4-FFF2-40B4-BE49-F238E27FC236}">
-                <a16:creationId xmlns:a16="http://schemas.microsoft.com/office/drawing/2014/main" id="{C4D18CF8-357E-4A56-9176-310C6574768C}"/>
+                <a16:creationId xmlns:a16="http://schemas.microsoft.com/office/drawing/2014/main" id="{A5B2852C-B06C-404D-8F1B-DBF5E581AEF2}"/>
               </a:ext>
             </a:extLst>
           </p:cNvPr>
@@ -7356,13 +10004,13 @@
   <p:clrMapOvr>
     <a:masterClrMapping/>
   </p:clrMapOvr>
-  <mc:AlternateContent xmlns:mc="http://schemas.openxmlformats.org/markup-compatibility/2006">
-    <mc:Choice xmlns:p14="http://schemas.microsoft.com/office/powerpoint/2010/main" Requires="p14">
+  <mc:AlternateContent xmlns:mc="http://schemas.openxmlformats.org/markup-compatibility/2006" xmlns:p14="http://schemas.microsoft.com/office/powerpoint/2010/main">
+    <mc:Choice Requires="p14">
       <p:transition spd="slow" p14:dur="3400">
         <p14:reveal/>
       </p:transition>
     </mc:Choice>
-    <mc:Fallback>
+    <mc:Fallback xmlns="">
       <p:transition spd="slow">
         <p:fade/>
       </p:transition>
@@ -7716,13 +10364,13 @@
   <p:clrMapOvr>
     <a:masterClrMapping/>
   </p:clrMapOvr>
-  <mc:AlternateContent xmlns:mc="http://schemas.openxmlformats.org/markup-compatibility/2006">
-    <mc:Choice xmlns:p14="http://schemas.microsoft.com/office/powerpoint/2010/main" Requires="p14">
+  <mc:AlternateContent xmlns:mc="http://schemas.openxmlformats.org/markup-compatibility/2006" xmlns:p14="http://schemas.microsoft.com/office/powerpoint/2010/main">
+    <mc:Choice Requires="p14">
       <p:transition spd="med" p14:dur="700">
         <p:fade/>
       </p:transition>
     </mc:Choice>
-    <mc:Fallback>
+    <mc:Fallback xmlns="">
       <p:transition spd="med">
         <p:fade/>
       </p:transition>
@@ -7832,13 +10480,13 @@
   <p:clrMapOvr>
     <a:masterClrMapping/>
   </p:clrMapOvr>
-  <mc:AlternateContent xmlns:mc="http://schemas.openxmlformats.org/markup-compatibility/2006">
-    <mc:Choice xmlns:p14="http://schemas.microsoft.com/office/powerpoint/2010/main" Requires="p14">
+  <mc:AlternateContent xmlns:mc="http://schemas.openxmlformats.org/markup-compatibility/2006" xmlns:p14="http://schemas.microsoft.com/office/powerpoint/2010/main">
+    <mc:Choice Requires="p14">
       <p:transition spd="slow" p14:dur="3400">
         <p14:reveal/>
       </p:transition>
     </mc:Choice>
-    <mc:Fallback>
+    <mc:Fallback xmlns="">
       <p:transition spd="slow">
         <p:fade/>
       </p:transition>
@@ -8014,13 +10662,13 @@
   <p:clrMapOvr>
     <a:masterClrMapping/>
   </p:clrMapOvr>
-  <mc:AlternateContent xmlns:mc="http://schemas.openxmlformats.org/markup-compatibility/2006">
-    <mc:Choice xmlns:p159="http://schemas.microsoft.com/office/powerpoint/2015/09/main" Requires="p159">
+  <mc:AlternateContent xmlns:mc="http://schemas.openxmlformats.org/markup-compatibility/2006" xmlns:p159="http://schemas.microsoft.com/office/powerpoint/2015/09/main">
+    <mc:Choice Requires="p159">
       <p:transition xmlns:p14="http://schemas.microsoft.com/office/powerpoint/2010/main" spd="slow" p14:dur="2000">
         <p159:morph option="byObject"/>
       </p:transition>
     </mc:Choice>
-    <mc:Fallback>
+    <mc:Fallback xmlns="">
       <p:transition spd="slow">
         <p:fade/>
       </p:transition>
@@ -8592,13 +11240,13 @@
   <p:clrMapOvr>
     <a:masterClrMapping/>
   </p:clrMapOvr>
-  <mc:AlternateContent xmlns:mc="http://schemas.openxmlformats.org/markup-compatibility/2006">
-    <mc:Choice xmlns:p159="http://schemas.microsoft.com/office/powerpoint/2015/09/main" Requires="p159">
+  <mc:AlternateContent xmlns:mc="http://schemas.openxmlformats.org/markup-compatibility/2006" xmlns:p159="http://schemas.microsoft.com/office/powerpoint/2015/09/main">
+    <mc:Choice Requires="p159">
       <p:transition xmlns:p14="http://schemas.microsoft.com/office/powerpoint/2010/main" spd="slow" p14:dur="2000">
         <p159:morph option="byObject"/>
       </p:transition>
     </mc:Choice>
-    <mc:Fallback>
+    <mc:Fallback xmlns="">
       <p:transition spd="slow">
         <p:fade/>
       </p:transition>
@@ -9390,13 +12038,13 @@
   <p:clrMapOvr>
     <a:masterClrMapping/>
   </p:clrMapOvr>
-  <mc:AlternateContent xmlns:mc="http://schemas.openxmlformats.org/markup-compatibility/2006">
-    <mc:Choice xmlns:p14="http://schemas.microsoft.com/office/powerpoint/2010/main" Requires="p14">
+  <mc:AlternateContent xmlns:mc="http://schemas.openxmlformats.org/markup-compatibility/2006" xmlns:p14="http://schemas.microsoft.com/office/powerpoint/2010/main">
+    <mc:Choice Requires="p14">
       <p:transition spd="med" p14:dur="700">
         <p:fade/>
       </p:transition>
     </mc:Choice>
-    <mc:Fallback>
+    <mc:Fallback xmlns="">
       <p:transition spd="med">
         <p:fade/>
       </p:transition>
@@ -9406,106 +12054,6 @@
 </file>
 
 <file path=ppt/slides/slide8.xml><?xml version="1.0" encoding="utf-8"?>
-<p:sld xmlns:a="http://schemas.openxmlformats.org/drawingml/2006/main" xmlns:r="http://schemas.openxmlformats.org/officeDocument/2006/relationships" xmlns:p="http://schemas.openxmlformats.org/presentationml/2006/main">
-  <p:cSld>
-    <p:spTree>
-      <p:nvGrpSpPr>
-        <p:cNvPr id="1" name=""/>
-        <p:cNvGrpSpPr/>
-        <p:nvPr/>
-      </p:nvGrpSpPr>
-      <p:grpSpPr>
-        <a:xfrm>
-          <a:off x="0" y="0"/>
-          <a:ext cx="0" cy="0"/>
-          <a:chOff x="0" y="0"/>
-          <a:chExt cx="0" cy="0"/>
-        </a:xfrm>
-      </p:grpSpPr>
-      <p:sp>
-        <p:nvSpPr>
-          <p:cNvPr id="2" name="Title 1">
-            <a:extLst>
-              <a:ext uri="{FF2B5EF4-FFF2-40B4-BE49-F238E27FC236}">
-                <a16:creationId xmlns:a16="http://schemas.microsoft.com/office/drawing/2014/main" id="{B5339456-D5C3-4A7C-9465-9EDB08F911AA}"/>
-              </a:ext>
-            </a:extLst>
-          </p:cNvPr>
-          <p:cNvSpPr>
-            <a:spLocks noGrp="1"/>
-          </p:cNvSpPr>
-          <p:nvPr>
-            <p:ph type="title"/>
-          </p:nvPr>
-        </p:nvSpPr>
-        <p:spPr/>
-        <p:txBody>
-          <a:bodyPr/>
-          <a:lstStyle/>
-          <a:p>
-            <a:r>
-              <a:rPr lang="en-US" dirty="0"/>
-              <a:t>Price </a:t>
-            </a:r>
-            <a:r>
-              <a:rPr lang="en-US" dirty="0" err="1"/>
-              <a:t>SELECTion</a:t>
-            </a:r>
-            <a:endParaRPr lang="en-US" dirty="0"/>
-          </a:p>
-        </p:txBody>
-      </p:sp>
-      <p:sp>
-        <p:nvSpPr>
-          <p:cNvPr id="3" name="Content Placeholder 2">
-            <a:extLst>
-              <a:ext uri="{FF2B5EF4-FFF2-40B4-BE49-F238E27FC236}">
-                <a16:creationId xmlns:a16="http://schemas.microsoft.com/office/drawing/2014/main" id="{8E970A7B-7940-4F2C-B1F5-4C409012B8E9}"/>
-              </a:ext>
-            </a:extLst>
-          </p:cNvPr>
-          <p:cNvSpPr>
-            <a:spLocks noGrp="1"/>
-          </p:cNvSpPr>
-          <p:nvPr>
-            <p:ph idx="1"/>
-          </p:nvPr>
-        </p:nvSpPr>
-        <p:spPr/>
-        <p:txBody>
-          <a:bodyPr/>
-          <a:lstStyle/>
-          <a:p>
-            <a:endParaRPr lang="en-US"/>
-          </a:p>
-        </p:txBody>
-      </p:sp>
-    </p:spTree>
-    <p:extLst>
-      <p:ext uri="{BB962C8B-B14F-4D97-AF65-F5344CB8AC3E}">
-        <p14:creationId xmlns:p14="http://schemas.microsoft.com/office/powerpoint/2010/main" val="2580287563"/>
-      </p:ext>
-    </p:extLst>
-  </p:cSld>
-  <p:clrMapOvr>
-    <a:masterClrMapping/>
-  </p:clrMapOvr>
-  <mc:AlternateContent xmlns:mc="http://schemas.openxmlformats.org/markup-compatibility/2006">
-    <mc:Choice xmlns:p14="http://schemas.microsoft.com/office/powerpoint/2010/main" Requires="p14">
-      <p:transition spd="slow" p14:dur="3400">
-        <p14:reveal/>
-      </p:transition>
-    </mc:Choice>
-    <mc:Fallback>
-      <p:transition spd="slow">
-        <p:fade/>
-      </p:transition>
-    </mc:Fallback>
-  </mc:AlternateContent>
-</p:sld>
-</file>
-
-<file path=ppt/slides/slide9.xml><?xml version="1.0" encoding="utf-8"?>
 <p:sld xmlns:a="http://schemas.openxmlformats.org/drawingml/2006/main" xmlns:r="http://schemas.openxmlformats.org/officeDocument/2006/relationships" xmlns:p="http://schemas.openxmlformats.org/presentationml/2006/main">
   <p:cSld>
     <p:spTree>
@@ -9538,9 +12086,16 @@
             <p:ph type="title"/>
           </p:nvPr>
         </p:nvSpPr>
-        <p:spPr/>
+        <p:spPr>
+          <a:xfrm>
+            <a:off x="1097280" y="286603"/>
+            <a:ext cx="10058400" cy="1450757"/>
+          </a:xfrm>
+        </p:spPr>
         <p:txBody>
-          <a:bodyPr/>
+          <a:bodyPr anchor="b">
+            <a:normAutofit/>
+          </a:bodyPr>
           <a:lstStyle/>
           <a:p>
             <a:r>
@@ -9552,10 +12107,10 @@
       </p:sp>
       <p:sp>
         <p:nvSpPr>
-          <p:cNvPr id="3" name="Content Placeholder 2">
+          <p:cNvPr id="8" name="Content Placeholder 2">
             <a:extLst>
               <a:ext uri="{FF2B5EF4-FFF2-40B4-BE49-F238E27FC236}">
-                <a16:creationId xmlns:a16="http://schemas.microsoft.com/office/drawing/2014/main" id="{BFE90BFD-45AF-4AAE-9BC1-37331AE81562}"/>
+                <a16:creationId xmlns:a16="http://schemas.microsoft.com/office/drawing/2014/main" id="{6F565426-6231-474B-A207-FBBB20774806}"/>
               </a:ext>
             </a:extLst>
           </p:cNvPr>
@@ -9563,10 +12118,45 @@
             <a:spLocks noGrp="1"/>
           </p:cNvSpPr>
           <p:nvPr>
-            <p:ph idx="1"/>
+            <p:ph sz="half" idx="1"/>
           </p:nvPr>
         </p:nvSpPr>
-        <p:spPr/>
+        <p:spPr>
+          <a:xfrm>
+            <a:off x="1097280" y="2120900"/>
+            <a:ext cx="4639736" cy="3748193"/>
+          </a:xfrm>
+        </p:spPr>
+        <p:txBody>
+          <a:bodyPr/>
+          <a:lstStyle/>
+          <a:p>
+            <a:endParaRPr lang="en-US"/>
+          </a:p>
+        </p:txBody>
+      </p:sp>
+      <p:sp>
+        <p:nvSpPr>
+          <p:cNvPr id="10" name="Content Placeholder 3">
+            <a:extLst>
+              <a:ext uri="{FF2B5EF4-FFF2-40B4-BE49-F238E27FC236}">
+                <a16:creationId xmlns:a16="http://schemas.microsoft.com/office/drawing/2014/main" id="{035EF7DF-CBF4-4A6F-8986-F2691A0461B1}"/>
+              </a:ext>
+            </a:extLst>
+          </p:cNvPr>
+          <p:cNvSpPr>
+            <a:spLocks noGrp="1"/>
+          </p:cNvSpPr>
+          <p:nvPr>
+            <p:ph sz="half" idx="2"/>
+          </p:nvPr>
+        </p:nvSpPr>
+        <p:spPr>
+          <a:xfrm>
+            <a:off x="6515944" y="2120900"/>
+            <a:ext cx="4639736" cy="3748194"/>
+          </a:xfrm>
+        </p:spPr>
         <p:txBody>
           <a:bodyPr/>
           <a:lstStyle/>
@@ -9585,13 +12175,150 @@
   <p:clrMapOvr>
     <a:masterClrMapping/>
   </p:clrMapOvr>
-  <mc:AlternateContent xmlns:mc="http://schemas.openxmlformats.org/markup-compatibility/2006">
-    <mc:Choice xmlns:p14="http://schemas.microsoft.com/office/powerpoint/2010/main" Requires="p14">
+  <mc:AlternateContent xmlns:mc="http://schemas.openxmlformats.org/markup-compatibility/2006" xmlns:p14="http://schemas.microsoft.com/office/powerpoint/2010/main">
+    <mc:Choice Requires="p14">
       <p:transition spd="slow" p14:dur="3400">
         <p14:reveal/>
       </p:transition>
     </mc:Choice>
-    <mc:Fallback>
+    <mc:Fallback xmlns="">
+      <p:transition spd="slow">
+        <p:fade/>
+      </p:transition>
+    </mc:Fallback>
+  </mc:AlternateContent>
+</p:sld>
+</file>
+
+<file path=ppt/slides/slide9.xml><?xml version="1.0" encoding="utf-8"?>
+<p:sld xmlns:a="http://schemas.openxmlformats.org/drawingml/2006/main" xmlns:r="http://schemas.openxmlformats.org/officeDocument/2006/relationships" xmlns:p="http://schemas.openxmlformats.org/presentationml/2006/main">
+  <p:cSld>
+    <p:spTree>
+      <p:nvGrpSpPr>
+        <p:cNvPr id="1" name=""/>
+        <p:cNvGrpSpPr/>
+        <p:nvPr/>
+      </p:nvGrpSpPr>
+      <p:grpSpPr>
+        <a:xfrm>
+          <a:off x="0" y="0"/>
+          <a:ext cx="0" cy="0"/>
+          <a:chOff x="0" y="0"/>
+          <a:chExt cx="0" cy="0"/>
+        </a:xfrm>
+      </p:grpSpPr>
+      <p:sp>
+        <p:nvSpPr>
+          <p:cNvPr id="2" name="Title 1">
+            <a:extLst>
+              <a:ext uri="{FF2B5EF4-FFF2-40B4-BE49-F238E27FC236}">
+                <a16:creationId xmlns:a16="http://schemas.microsoft.com/office/drawing/2014/main" id="{BA8FC292-43F6-4805-A446-7DBD4BD06A93}"/>
+              </a:ext>
+            </a:extLst>
+          </p:cNvPr>
+          <p:cNvSpPr>
+            <a:spLocks noGrp="1"/>
+          </p:cNvSpPr>
+          <p:nvPr>
+            <p:ph type="title"/>
+          </p:nvPr>
+        </p:nvSpPr>
+        <p:spPr>
+          <a:xfrm>
+            <a:off x="1097280" y="286603"/>
+            <a:ext cx="10058400" cy="1450757"/>
+          </a:xfrm>
+        </p:spPr>
+        <p:txBody>
+          <a:bodyPr anchor="b">
+            <a:normAutofit/>
+          </a:bodyPr>
+          <a:lstStyle/>
+          <a:p>
+            <a:r>
+              <a:rPr lang="en-US" dirty="0"/>
+              <a:t>Content Rating Overview</a:t>
+            </a:r>
+          </a:p>
+        </p:txBody>
+      </p:sp>
+      <p:sp>
+        <p:nvSpPr>
+          <p:cNvPr id="8" name="Content Placeholder 2">
+            <a:extLst>
+              <a:ext uri="{FF2B5EF4-FFF2-40B4-BE49-F238E27FC236}">
+                <a16:creationId xmlns:a16="http://schemas.microsoft.com/office/drawing/2014/main" id="{BA58F9B3-3D6A-4203-A671-D6CEF5EDEEEF}"/>
+              </a:ext>
+            </a:extLst>
+          </p:cNvPr>
+          <p:cNvSpPr>
+            <a:spLocks noGrp="1"/>
+          </p:cNvSpPr>
+          <p:nvPr>
+            <p:ph sz="half" idx="1"/>
+          </p:nvPr>
+        </p:nvSpPr>
+        <p:spPr>
+          <a:xfrm>
+            <a:off x="1097280" y="2120900"/>
+            <a:ext cx="4639736" cy="3748193"/>
+          </a:xfrm>
+        </p:spPr>
+        <p:txBody>
+          <a:bodyPr/>
+          <a:lstStyle/>
+          <a:p>
+            <a:endParaRPr lang="en-US"/>
+          </a:p>
+        </p:txBody>
+      </p:sp>
+      <p:sp>
+        <p:nvSpPr>
+          <p:cNvPr id="10" name="Content Placeholder 3">
+            <a:extLst>
+              <a:ext uri="{FF2B5EF4-FFF2-40B4-BE49-F238E27FC236}">
+                <a16:creationId xmlns:a16="http://schemas.microsoft.com/office/drawing/2014/main" id="{C50C6702-8BF1-4894-AD32-DA41A8FC4ABD}"/>
+              </a:ext>
+            </a:extLst>
+          </p:cNvPr>
+          <p:cNvSpPr>
+            <a:spLocks noGrp="1"/>
+          </p:cNvSpPr>
+          <p:nvPr>
+            <p:ph sz="half" idx="2"/>
+          </p:nvPr>
+        </p:nvSpPr>
+        <p:spPr>
+          <a:xfrm>
+            <a:off x="6515944" y="2120900"/>
+            <a:ext cx="4639736" cy="3748194"/>
+          </a:xfrm>
+        </p:spPr>
+        <p:txBody>
+          <a:bodyPr/>
+          <a:lstStyle/>
+          <a:p>
+            <a:endParaRPr lang="en-US"/>
+          </a:p>
+        </p:txBody>
+      </p:sp>
+    </p:spTree>
+    <p:extLst>
+      <p:ext uri="{BB962C8B-B14F-4D97-AF65-F5344CB8AC3E}">
+        <p14:creationId xmlns:p14="http://schemas.microsoft.com/office/powerpoint/2010/main" val="1245357987"/>
+      </p:ext>
+    </p:extLst>
+  </p:cSld>
+  <p:clrMapOvr>
+    <a:masterClrMapping/>
+  </p:clrMapOvr>
+  <mc:AlternateContent xmlns:mc="http://schemas.openxmlformats.org/markup-compatibility/2006" xmlns:p14="http://schemas.microsoft.com/office/powerpoint/2010/main">
+    <mc:Choice Requires="p14">
+      <p:transition spd="slow" p14:dur="3400">
+        <p14:reveal/>
+      </p:transition>
+    </mc:Choice>
+    <mc:Fallback xmlns="">
       <p:transition spd="slow">
         <p:fade/>
       </p:transition>

</xml_diff>

<commit_message>
Finalized presentation - RL
</commit_message>
<xml_diff>
--- a/presentation/app_trader_proposal.pptx
+++ b/presentation/app_trader_proposal.pptx
@@ -12,7 +12,7 @@
     <p:sldId id="263" r:id="rId6"/>
     <p:sldId id="264" r:id="rId7"/>
     <p:sldId id="267" r:id="rId8"/>
-    <p:sldId id="269" r:id="rId9"/>
+    <p:sldId id="272" r:id="rId9"/>
     <p:sldId id="270" r:id="rId10"/>
     <p:sldId id="271" r:id="rId11"/>
     <p:sldId id="265" r:id="rId12"/>
@@ -124,6 +124,754 @@
 </file>
 
 <file path=ppt/charts/chart1.xml><?xml version="1.0" encoding="utf-8"?>
+<c:chartSpace xmlns:c="http://schemas.openxmlformats.org/drawingml/2006/chart" xmlns:a="http://schemas.openxmlformats.org/drawingml/2006/main" xmlns:r="http://schemas.openxmlformats.org/officeDocument/2006/relationships" xmlns:c16r2="http://schemas.microsoft.com/office/drawing/2015/06/chart">
+  <c:date1904 val="0"/>
+  <c:lang val="en-US"/>
+  <c:roundedCorners val="0"/>
+  <mc:AlternateContent xmlns:mc="http://schemas.openxmlformats.org/markup-compatibility/2006">
+    <mc:Choice xmlns:c14="http://schemas.microsoft.com/office/drawing/2007/8/2/chart" Requires="c14">
+      <c14:style val="102"/>
+    </mc:Choice>
+    <mc:Fallback>
+      <c:style val="2"/>
+    </mc:Fallback>
+  </mc:AlternateContent>
+  <c:chart>
+    <c:title>
+      <c:tx>
+        <c:rich>
+          <a:bodyPr rot="0" spcFirstLastPara="1" vertOverflow="ellipsis" vert="horz" wrap="square" anchor="ctr" anchorCtr="1"/>
+          <a:lstStyle/>
+          <a:p>
+            <a:pPr>
+              <a:defRPr sz="2128" b="1" i="0" u="none" strike="noStrike" kern="1200" cap="all" spc="120" normalizeH="0" baseline="0">
+                <a:solidFill>
+                  <a:schemeClr val="tx1">
+                    <a:lumMod val="65000"/>
+                    <a:lumOff val="35000"/>
+                  </a:schemeClr>
+                </a:solidFill>
+                <a:latin typeface="+mn-lt"/>
+                <a:ea typeface="+mn-ea"/>
+                <a:cs typeface="+mn-cs"/>
+              </a:defRPr>
+            </a:pPr>
+            <a:r>
+              <a:rPr lang="en-US" sz="1600" dirty="0"/>
+              <a:t>Top 10 Genres by Average Rating</a:t>
+            </a:r>
+          </a:p>
+        </c:rich>
+      </c:tx>
+      <c:overlay val="0"/>
+      <c:spPr>
+        <a:noFill/>
+        <a:ln>
+          <a:noFill/>
+        </a:ln>
+        <a:effectLst/>
+      </c:spPr>
+      <c:txPr>
+        <a:bodyPr rot="0" spcFirstLastPara="1" vertOverflow="ellipsis" vert="horz" wrap="square" anchor="ctr" anchorCtr="1"/>
+        <a:lstStyle/>
+        <a:p>
+          <a:pPr>
+            <a:defRPr sz="2128" b="1" i="0" u="none" strike="noStrike" kern="1200" cap="all" spc="120" normalizeH="0" baseline="0">
+              <a:solidFill>
+                <a:schemeClr val="tx1">
+                  <a:lumMod val="65000"/>
+                  <a:lumOff val="35000"/>
+                </a:schemeClr>
+              </a:solidFill>
+              <a:latin typeface="+mn-lt"/>
+              <a:ea typeface="+mn-ea"/>
+              <a:cs typeface="+mn-cs"/>
+            </a:defRPr>
+          </a:pPr>
+          <a:endParaRPr lang="en-US"/>
+        </a:p>
+      </c:txPr>
+    </c:title>
+    <c:autoTitleDeleted val="0"/>
+    <c:plotArea>
+      <c:layout>
+        <c:manualLayout>
+          <c:layoutTarget val="inner"/>
+          <c:xMode val="edge"/>
+          <c:yMode val="edge"/>
+          <c:x val="0.11539614854384837"/>
+          <c:y val="0.16307970987982737"/>
+          <c:w val="0.85783660483247481"/>
+          <c:h val="0.51823311630415592"/>
+        </c:manualLayout>
+      </c:layout>
+      <c:barChart>
+        <c:barDir val="col"/>
+        <c:grouping val="clustered"/>
+        <c:varyColors val="0"/>
+        <c:ser>
+          <c:idx val="0"/>
+          <c:order val="0"/>
+          <c:tx>
+            <c:strRef>
+              <c:f>avg_rating_count_genre_app!$B$29</c:f>
+              <c:strCache>
+                <c:ptCount val="1"/>
+                <c:pt idx="0">
+                  <c:v>avg_rating</c:v>
+                </c:pt>
+              </c:strCache>
+            </c:strRef>
+          </c:tx>
+          <c:spPr>
+            <a:solidFill>
+              <a:schemeClr val="accent1"/>
+            </a:solidFill>
+            <a:ln>
+              <a:noFill/>
+            </a:ln>
+            <a:effectLst/>
+          </c:spPr>
+          <c:invertIfNegative val="0"/>
+          <c:dLbls>
+            <c:spPr>
+              <a:noFill/>
+              <a:ln>
+                <a:noFill/>
+              </a:ln>
+              <a:effectLst/>
+            </c:spPr>
+            <c:txPr>
+              <a:bodyPr rot="-5400000" spcFirstLastPara="1" vertOverflow="clip" horzOverflow="clip" vert="horz" wrap="square" lIns="38100" tIns="19050" rIns="38100" bIns="19050" anchor="ctr" anchorCtr="1">
+                <a:spAutoFit/>
+              </a:bodyPr>
+              <a:lstStyle/>
+              <a:p>
+                <a:pPr>
+                  <a:defRPr sz="1064" b="0" i="0" u="none" strike="noStrike" kern="1200" baseline="0">
+                    <a:solidFill>
+                      <a:schemeClr val="tx1">
+                        <a:lumMod val="50000"/>
+                        <a:lumOff val="50000"/>
+                      </a:schemeClr>
+                    </a:solidFill>
+                    <a:latin typeface="+mn-lt"/>
+                    <a:ea typeface="+mn-ea"/>
+                    <a:cs typeface="+mn-cs"/>
+                  </a:defRPr>
+                </a:pPr>
+                <a:endParaRPr lang="en-US"/>
+              </a:p>
+            </c:txPr>
+            <c:dLblPos val="outEnd"/>
+            <c:showLegendKey val="0"/>
+            <c:showVal val="1"/>
+            <c:showCatName val="0"/>
+            <c:showSerName val="0"/>
+            <c:showPercent val="0"/>
+            <c:showBubbleSize val="0"/>
+            <c:showLeaderLines val="0"/>
+            <c:extLst>
+              <c:ext xmlns:c15="http://schemas.microsoft.com/office/drawing/2012/chart" uri="{CE6537A1-D6FC-4f65-9D91-7224C49458BB}">
+                <c15:showLeaderLines val="1"/>
+                <c15:leaderLines>
+                  <c:spPr>
+                    <a:ln w="9525">
+                      <a:solidFill>
+                        <a:schemeClr val="tx1">
+                          <a:lumMod val="35000"/>
+                          <a:lumOff val="65000"/>
+                        </a:schemeClr>
+                      </a:solidFill>
+                    </a:ln>
+                    <a:effectLst/>
+                  </c:spPr>
+                </c15:leaderLines>
+              </c:ext>
+            </c:extLst>
+          </c:dLbls>
+          <c:cat>
+            <c:strRef>
+              <c:f>avg_rating_count_genre_app!$A$30:$A$39</c:f>
+              <c:strCache>
+                <c:ptCount val="10"/>
+                <c:pt idx="0">
+                  <c:v>Productivity</c:v>
+                </c:pt>
+                <c:pt idx="1">
+                  <c:v>Music</c:v>
+                </c:pt>
+                <c:pt idx="2">
+                  <c:v>Photo &amp; Video</c:v>
+                </c:pt>
+                <c:pt idx="3">
+                  <c:v>Business</c:v>
+                </c:pt>
+                <c:pt idx="4">
+                  <c:v>Health &amp; Fitness</c:v>
+                </c:pt>
+                <c:pt idx="5">
+                  <c:v>Games</c:v>
+                </c:pt>
+                <c:pt idx="6">
+                  <c:v>Weather</c:v>
+                </c:pt>
+                <c:pt idx="7">
+                  <c:v>Shopping</c:v>
+                </c:pt>
+                <c:pt idx="8">
+                  <c:v>Reference</c:v>
+                </c:pt>
+                <c:pt idx="9">
+                  <c:v>Travel</c:v>
+                </c:pt>
+              </c:strCache>
+            </c:strRef>
+          </c:cat>
+          <c:val>
+            <c:numRef>
+              <c:f>avg_rating_count_genre_app!$B$30:$B$39</c:f>
+              <c:numCache>
+                <c:formatCode>General</c:formatCode>
+                <c:ptCount val="10"/>
+                <c:pt idx="0">
+                  <c:v>4.01</c:v>
+                </c:pt>
+                <c:pt idx="1">
+                  <c:v>3.98</c:v>
+                </c:pt>
+                <c:pt idx="2">
+                  <c:v>3.8</c:v>
+                </c:pt>
+                <c:pt idx="3">
+                  <c:v>3.75</c:v>
+                </c:pt>
+                <c:pt idx="4">
+                  <c:v>3.7</c:v>
+                </c:pt>
+                <c:pt idx="5">
+                  <c:v>3.69</c:v>
+                </c:pt>
+                <c:pt idx="6">
+                  <c:v>3.6</c:v>
+                </c:pt>
+                <c:pt idx="7">
+                  <c:v>3.54</c:v>
+                </c:pt>
+                <c:pt idx="8">
+                  <c:v>3.45</c:v>
+                </c:pt>
+                <c:pt idx="9">
+                  <c:v>3.38</c:v>
+                </c:pt>
+              </c:numCache>
+            </c:numRef>
+          </c:val>
+          <c:extLst>
+            <c:ext xmlns:c16="http://schemas.microsoft.com/office/drawing/2014/chart" uri="{C3380CC4-5D6E-409C-BE32-E72D297353CC}">
+              <c16:uniqueId val="{00000000-7FD3-4BC9-975B-959A4F932479}"/>
+            </c:ext>
+          </c:extLst>
+        </c:ser>
+        <c:dLbls>
+          <c:dLblPos val="outEnd"/>
+          <c:showLegendKey val="0"/>
+          <c:showVal val="1"/>
+          <c:showCatName val="0"/>
+          <c:showSerName val="0"/>
+          <c:showPercent val="0"/>
+          <c:showBubbleSize val="0"/>
+        </c:dLbls>
+        <c:gapWidth val="444"/>
+        <c:overlap val="-90"/>
+        <c:axId val="1553956207"/>
+        <c:axId val="1553961199"/>
+      </c:barChart>
+      <c:catAx>
+        <c:axId val="1553956207"/>
+        <c:scaling>
+          <c:orientation val="minMax"/>
+        </c:scaling>
+        <c:delete val="0"/>
+        <c:axPos val="b"/>
+        <c:majorGridlines>
+          <c:spPr>
+            <a:ln w="9525" cap="flat" cmpd="sng" algn="ctr">
+              <a:solidFill>
+                <a:schemeClr val="tx1">
+                  <a:lumMod val="15000"/>
+                  <a:lumOff val="85000"/>
+                </a:schemeClr>
+              </a:solidFill>
+              <a:round/>
+            </a:ln>
+            <a:effectLst/>
+          </c:spPr>
+        </c:majorGridlines>
+        <c:numFmt formatCode="General" sourceLinked="1"/>
+        <c:majorTickMark val="none"/>
+        <c:minorTickMark val="none"/>
+        <c:tickLblPos val="nextTo"/>
+        <c:spPr>
+          <a:noFill/>
+          <a:ln w="9525" cap="flat" cmpd="sng" algn="ctr">
+            <a:solidFill>
+              <a:schemeClr val="tx1">
+                <a:lumMod val="15000"/>
+                <a:lumOff val="85000"/>
+              </a:schemeClr>
+            </a:solidFill>
+            <a:round/>
+          </a:ln>
+          <a:effectLst/>
+        </c:spPr>
+        <c:txPr>
+          <a:bodyPr rot="-60000000" spcFirstLastPara="1" vertOverflow="ellipsis" vert="horz" wrap="square" anchor="ctr" anchorCtr="1"/>
+          <a:lstStyle/>
+          <a:p>
+            <a:pPr>
+              <a:defRPr sz="1064" b="0" i="0" u="none" strike="noStrike" kern="1200" cap="all" spc="120" normalizeH="0" baseline="0">
+                <a:solidFill>
+                  <a:schemeClr val="tx1">
+                    <a:lumMod val="65000"/>
+                    <a:lumOff val="35000"/>
+                  </a:schemeClr>
+                </a:solidFill>
+                <a:latin typeface="+mn-lt"/>
+                <a:ea typeface="+mn-ea"/>
+                <a:cs typeface="+mn-cs"/>
+              </a:defRPr>
+            </a:pPr>
+            <a:endParaRPr lang="en-US"/>
+          </a:p>
+        </c:txPr>
+        <c:crossAx val="1553961199"/>
+        <c:crosses val="autoZero"/>
+        <c:auto val="1"/>
+        <c:lblAlgn val="ctr"/>
+        <c:lblOffset val="100"/>
+        <c:noMultiLvlLbl val="0"/>
+      </c:catAx>
+      <c:valAx>
+        <c:axId val="1553961199"/>
+        <c:scaling>
+          <c:orientation val="minMax"/>
+        </c:scaling>
+        <c:delete val="1"/>
+        <c:axPos val="l"/>
+        <c:numFmt formatCode="General" sourceLinked="1"/>
+        <c:majorTickMark val="none"/>
+        <c:minorTickMark val="none"/>
+        <c:tickLblPos val="nextTo"/>
+        <c:crossAx val="1553956207"/>
+        <c:crosses val="autoZero"/>
+        <c:crossBetween val="between"/>
+      </c:valAx>
+      <c:spPr>
+        <a:noFill/>
+        <a:ln>
+          <a:noFill/>
+        </a:ln>
+        <a:effectLst/>
+      </c:spPr>
+    </c:plotArea>
+    <c:plotVisOnly val="1"/>
+    <c:dispBlanksAs val="gap"/>
+    <c:showDLblsOverMax val="0"/>
+  </c:chart>
+  <c:spPr>
+    <a:noFill/>
+    <a:ln>
+      <a:noFill/>
+    </a:ln>
+    <a:effectLst/>
+  </c:spPr>
+  <c:txPr>
+    <a:bodyPr/>
+    <a:lstStyle/>
+    <a:p>
+      <a:pPr>
+        <a:defRPr/>
+      </a:pPr>
+      <a:endParaRPr lang="en-US"/>
+    </a:p>
+  </c:txPr>
+  <c:externalData r:id="rId3">
+    <c:autoUpdate val="0"/>
+  </c:externalData>
+</c:chartSpace>
+</file>
+
+<file path=ppt/charts/chart2.xml><?xml version="1.0" encoding="utf-8"?>
+<c:chartSpace xmlns:c="http://schemas.openxmlformats.org/drawingml/2006/chart" xmlns:a="http://schemas.openxmlformats.org/drawingml/2006/main" xmlns:r="http://schemas.openxmlformats.org/officeDocument/2006/relationships" xmlns:c16r2="http://schemas.microsoft.com/office/drawing/2015/06/chart">
+  <c:date1904 val="0"/>
+  <c:lang val="en-US"/>
+  <c:roundedCorners val="0"/>
+  <mc:AlternateContent xmlns:mc="http://schemas.openxmlformats.org/markup-compatibility/2006">
+    <mc:Choice xmlns:c14="http://schemas.microsoft.com/office/drawing/2007/8/2/chart" Requires="c14">
+      <c14:style val="102"/>
+    </mc:Choice>
+    <mc:Fallback>
+      <c:style val="2"/>
+    </mc:Fallback>
+  </mc:AlternateContent>
+  <c:chart>
+    <c:title>
+      <c:tx>
+        <c:rich>
+          <a:bodyPr rot="0" spcFirstLastPara="1" vertOverflow="ellipsis" vert="horz" wrap="square" anchor="ctr" anchorCtr="1"/>
+          <a:lstStyle/>
+          <a:p>
+            <a:pPr>
+              <a:defRPr sz="2128" b="1" i="0" u="none" strike="noStrike" kern="1200" cap="all" spc="120" normalizeH="0" baseline="0">
+                <a:solidFill>
+                  <a:schemeClr val="tx1">
+                    <a:lumMod val="65000"/>
+                    <a:lumOff val="35000"/>
+                  </a:schemeClr>
+                </a:solidFill>
+                <a:latin typeface="+mn-lt"/>
+                <a:ea typeface="+mn-ea"/>
+                <a:cs typeface="+mn-cs"/>
+              </a:defRPr>
+            </a:pPr>
+            <a:r>
+              <a:rPr lang="en-US" sz="1600" dirty="0"/>
+              <a:t>Top 10 Genres by Percent of Apps</a:t>
+            </a:r>
+          </a:p>
+        </c:rich>
+      </c:tx>
+      <c:overlay val="0"/>
+      <c:spPr>
+        <a:noFill/>
+        <a:ln>
+          <a:noFill/>
+        </a:ln>
+        <a:effectLst/>
+      </c:spPr>
+      <c:txPr>
+        <a:bodyPr rot="0" spcFirstLastPara="1" vertOverflow="ellipsis" vert="horz" wrap="square" anchor="ctr" anchorCtr="1"/>
+        <a:lstStyle/>
+        <a:p>
+          <a:pPr>
+            <a:defRPr sz="2128" b="1" i="0" u="none" strike="noStrike" kern="1200" cap="all" spc="120" normalizeH="0" baseline="0">
+              <a:solidFill>
+                <a:schemeClr val="tx1">
+                  <a:lumMod val="65000"/>
+                  <a:lumOff val="35000"/>
+                </a:schemeClr>
+              </a:solidFill>
+              <a:latin typeface="+mn-lt"/>
+              <a:ea typeface="+mn-ea"/>
+              <a:cs typeface="+mn-cs"/>
+            </a:defRPr>
+          </a:pPr>
+          <a:endParaRPr lang="en-US"/>
+        </a:p>
+      </c:txPr>
+    </c:title>
+    <c:autoTitleDeleted val="0"/>
+    <c:plotArea>
+      <c:layout/>
+      <c:barChart>
+        <c:barDir val="col"/>
+        <c:grouping val="clustered"/>
+        <c:varyColors val="0"/>
+        <c:ser>
+          <c:idx val="0"/>
+          <c:order val="0"/>
+          <c:tx>
+            <c:strRef>
+              <c:f>avg_rating_count_genre_app!$J$1</c:f>
+              <c:strCache>
+                <c:ptCount val="1"/>
+                <c:pt idx="0">
+                  <c:v>percent</c:v>
+                </c:pt>
+              </c:strCache>
+            </c:strRef>
+          </c:tx>
+          <c:spPr>
+            <a:solidFill>
+              <a:schemeClr val="accent1"/>
+            </a:solidFill>
+            <a:ln>
+              <a:noFill/>
+            </a:ln>
+            <a:effectLst/>
+          </c:spPr>
+          <c:invertIfNegative val="0"/>
+          <c:dLbls>
+            <c:spPr>
+              <a:noFill/>
+              <a:ln>
+                <a:noFill/>
+              </a:ln>
+              <a:effectLst/>
+            </c:spPr>
+            <c:txPr>
+              <a:bodyPr rot="-5400000" spcFirstLastPara="1" vertOverflow="clip" horzOverflow="clip" vert="horz" wrap="square" lIns="38100" tIns="19050" rIns="38100" bIns="19050" anchor="ctr" anchorCtr="1">
+                <a:spAutoFit/>
+              </a:bodyPr>
+              <a:lstStyle/>
+              <a:p>
+                <a:pPr>
+                  <a:defRPr sz="1064" b="0" i="0" u="none" strike="noStrike" kern="1200" baseline="0">
+                    <a:solidFill>
+                      <a:schemeClr val="tx1">
+                        <a:lumMod val="50000"/>
+                        <a:lumOff val="50000"/>
+                      </a:schemeClr>
+                    </a:solidFill>
+                    <a:latin typeface="+mn-lt"/>
+                    <a:ea typeface="+mn-ea"/>
+                    <a:cs typeface="+mn-cs"/>
+                  </a:defRPr>
+                </a:pPr>
+                <a:endParaRPr lang="en-US"/>
+              </a:p>
+            </c:txPr>
+            <c:dLblPos val="outEnd"/>
+            <c:showLegendKey val="0"/>
+            <c:showVal val="1"/>
+            <c:showCatName val="0"/>
+            <c:showSerName val="0"/>
+            <c:showPercent val="0"/>
+            <c:showBubbleSize val="0"/>
+            <c:showLeaderLines val="0"/>
+            <c:extLst>
+              <c:ext xmlns:c15="http://schemas.microsoft.com/office/drawing/2012/chart" uri="{CE6537A1-D6FC-4f65-9D91-7224C49458BB}">
+                <c15:showLeaderLines val="1"/>
+                <c15:leaderLines>
+                  <c:spPr>
+                    <a:ln w="9525">
+                      <a:solidFill>
+                        <a:schemeClr val="tx1">
+                          <a:lumMod val="35000"/>
+                          <a:lumOff val="65000"/>
+                        </a:schemeClr>
+                      </a:solidFill>
+                    </a:ln>
+                    <a:effectLst/>
+                  </c:spPr>
+                </c15:leaderLines>
+              </c:ext>
+            </c:extLst>
+          </c:dLbls>
+          <c:cat>
+            <c:strRef>
+              <c:f>avg_rating_count_genre_app!$I$2:$I$11</c:f>
+              <c:strCache>
+                <c:ptCount val="10"/>
+                <c:pt idx="0">
+                  <c:v>Games</c:v>
+                </c:pt>
+                <c:pt idx="1">
+                  <c:v>Entertainment</c:v>
+                </c:pt>
+                <c:pt idx="2">
+                  <c:v>Education</c:v>
+                </c:pt>
+                <c:pt idx="3">
+                  <c:v>Photo &amp; Video</c:v>
+                </c:pt>
+                <c:pt idx="4">
+                  <c:v>Utilities</c:v>
+                </c:pt>
+                <c:pt idx="5">
+                  <c:v>Health &amp; Fitness</c:v>
+                </c:pt>
+                <c:pt idx="6">
+                  <c:v>Productivity</c:v>
+                </c:pt>
+                <c:pt idx="7">
+                  <c:v>Social Networking</c:v>
+                </c:pt>
+                <c:pt idx="8">
+                  <c:v>Lifestyle</c:v>
+                </c:pt>
+                <c:pt idx="9">
+                  <c:v>Music</c:v>
+                </c:pt>
+              </c:strCache>
+            </c:strRef>
+          </c:cat>
+          <c:val>
+            <c:numRef>
+              <c:f>avg_rating_count_genre_app!$J$2:$J$11</c:f>
+              <c:numCache>
+                <c:formatCode>0.00%</c:formatCode>
+                <c:ptCount val="10"/>
+                <c:pt idx="0">
+                  <c:v>0.5366124774211477</c:v>
+                </c:pt>
+                <c:pt idx="1">
+                  <c:v>7.4336529109351124E-2</c:v>
+                </c:pt>
+                <c:pt idx="2">
+                  <c:v>6.2942892872030018E-2</c:v>
+                </c:pt>
+                <c:pt idx="3">
+                  <c:v>4.8492427400305682E-2</c:v>
+                </c:pt>
+                <c:pt idx="4">
+                  <c:v>3.4458802278727246E-2</c:v>
+                </c:pt>
+                <c:pt idx="5">
+                  <c:v>2.5010421008753649E-2</c:v>
+                </c:pt>
+                <c:pt idx="6">
+                  <c:v>2.4732527441989716E-2</c:v>
+                </c:pt>
+                <c:pt idx="7">
+                  <c:v>2.3204112824788105E-2</c:v>
+                </c:pt>
+                <c:pt idx="8">
+                  <c:v>2.0008336807002917E-2</c:v>
+                </c:pt>
+                <c:pt idx="9">
+                  <c:v>1.9174656106711131E-2</c:v>
+                </c:pt>
+              </c:numCache>
+            </c:numRef>
+          </c:val>
+          <c:extLst>
+            <c:ext xmlns:c16="http://schemas.microsoft.com/office/drawing/2014/chart" uri="{C3380CC4-5D6E-409C-BE32-E72D297353CC}">
+              <c16:uniqueId val="{00000000-C871-43AC-960E-3F3AE8EF6341}"/>
+            </c:ext>
+          </c:extLst>
+        </c:ser>
+        <c:dLbls>
+          <c:dLblPos val="outEnd"/>
+          <c:showLegendKey val="0"/>
+          <c:showVal val="1"/>
+          <c:showCatName val="0"/>
+          <c:showSerName val="0"/>
+          <c:showPercent val="0"/>
+          <c:showBubbleSize val="0"/>
+        </c:dLbls>
+        <c:gapWidth val="444"/>
+        <c:overlap val="-90"/>
+        <c:axId val="1553954127"/>
+        <c:axId val="1553954543"/>
+      </c:barChart>
+      <c:catAx>
+        <c:axId val="1553954127"/>
+        <c:scaling>
+          <c:orientation val="minMax"/>
+        </c:scaling>
+        <c:delete val="0"/>
+        <c:axPos val="b"/>
+        <c:majorGridlines>
+          <c:spPr>
+            <a:ln w="9525" cap="flat" cmpd="sng" algn="ctr">
+              <a:solidFill>
+                <a:schemeClr val="tx1">
+                  <a:lumMod val="15000"/>
+                  <a:lumOff val="85000"/>
+                </a:schemeClr>
+              </a:solidFill>
+              <a:round/>
+            </a:ln>
+            <a:effectLst/>
+          </c:spPr>
+        </c:majorGridlines>
+        <c:numFmt formatCode="General" sourceLinked="1"/>
+        <c:majorTickMark val="none"/>
+        <c:minorTickMark val="none"/>
+        <c:tickLblPos val="nextTo"/>
+        <c:spPr>
+          <a:noFill/>
+          <a:ln w="9525" cap="flat" cmpd="sng" algn="ctr">
+            <a:solidFill>
+              <a:schemeClr val="tx1">
+                <a:lumMod val="15000"/>
+                <a:lumOff val="85000"/>
+              </a:schemeClr>
+            </a:solidFill>
+            <a:round/>
+          </a:ln>
+          <a:effectLst/>
+        </c:spPr>
+        <c:txPr>
+          <a:bodyPr rot="-60000000" spcFirstLastPara="1" vertOverflow="ellipsis" vert="horz" wrap="square" anchor="ctr" anchorCtr="1"/>
+          <a:lstStyle/>
+          <a:p>
+            <a:pPr>
+              <a:defRPr sz="1064" b="0" i="0" u="none" strike="noStrike" kern="1200" cap="all" spc="120" normalizeH="0" baseline="0">
+                <a:solidFill>
+                  <a:schemeClr val="tx1">
+                    <a:lumMod val="65000"/>
+                    <a:lumOff val="35000"/>
+                  </a:schemeClr>
+                </a:solidFill>
+                <a:latin typeface="+mn-lt"/>
+                <a:ea typeface="+mn-ea"/>
+                <a:cs typeface="+mn-cs"/>
+              </a:defRPr>
+            </a:pPr>
+            <a:endParaRPr lang="en-US"/>
+          </a:p>
+        </c:txPr>
+        <c:crossAx val="1553954543"/>
+        <c:crosses val="autoZero"/>
+        <c:auto val="1"/>
+        <c:lblAlgn val="ctr"/>
+        <c:lblOffset val="100"/>
+        <c:noMultiLvlLbl val="0"/>
+      </c:catAx>
+      <c:valAx>
+        <c:axId val="1553954543"/>
+        <c:scaling>
+          <c:orientation val="minMax"/>
+        </c:scaling>
+        <c:delete val="1"/>
+        <c:axPos val="l"/>
+        <c:numFmt formatCode="0.00%" sourceLinked="1"/>
+        <c:majorTickMark val="none"/>
+        <c:minorTickMark val="none"/>
+        <c:tickLblPos val="nextTo"/>
+        <c:crossAx val="1553954127"/>
+        <c:crosses val="autoZero"/>
+        <c:crossBetween val="between"/>
+      </c:valAx>
+      <c:spPr>
+        <a:noFill/>
+        <a:ln>
+          <a:noFill/>
+        </a:ln>
+        <a:effectLst/>
+      </c:spPr>
+    </c:plotArea>
+    <c:plotVisOnly val="1"/>
+    <c:dispBlanksAs val="gap"/>
+    <c:showDLblsOverMax val="0"/>
+  </c:chart>
+  <c:spPr>
+    <a:noFill/>
+    <a:ln>
+      <a:noFill/>
+    </a:ln>
+    <a:effectLst/>
+  </c:spPr>
+  <c:txPr>
+    <a:bodyPr/>
+    <a:lstStyle/>
+    <a:p>
+      <a:pPr>
+        <a:defRPr/>
+      </a:pPr>
+      <a:endParaRPr lang="en-US"/>
+    </a:p>
+  </c:txPr>
+  <c:externalData r:id="rId3">
+    <c:autoUpdate val="0"/>
+  </c:externalData>
+</c:chartSpace>
+</file>
+
+<file path=ppt/charts/chart3.xml><?xml version="1.0" encoding="utf-8"?>
 <c:chartSpace xmlns:c="http://schemas.openxmlformats.org/drawingml/2006/chart" xmlns:a="http://schemas.openxmlformats.org/drawingml/2006/main" xmlns:r="http://schemas.openxmlformats.org/officeDocument/2006/relationships" xmlns:c16r2="http://schemas.microsoft.com/office/drawing/2015/06/chart">
   <c:date1904 val="0"/>
   <c:lang val="en-US"/>
@@ -479,7 +1227,7 @@
 </c:chartSpace>
 </file>
 
-<file path=ppt/charts/chart2.xml><?xml version="1.0" encoding="utf-8"?>
+<file path=ppt/charts/chart4.xml><?xml version="1.0" encoding="utf-8"?>
 <c:chartSpace xmlns:c="http://schemas.openxmlformats.org/drawingml/2006/chart" xmlns:a="http://schemas.openxmlformats.org/drawingml/2006/main" xmlns:r="http://schemas.openxmlformats.org/officeDocument/2006/relationships" xmlns:c16r2="http://schemas.microsoft.com/office/drawing/2015/06/chart">
   <c:date1904 val="0"/>
   <c:lang val="en-US"/>
@@ -857,7 +1605,7 @@
 </c:chartSpace>
 </file>
 
-<file path=ppt/charts/chart3.xml><?xml version="1.0" encoding="utf-8"?>
+<file path=ppt/charts/chart5.xml><?xml version="1.0" encoding="utf-8"?>
 <c:chartSpace xmlns:c="http://schemas.openxmlformats.org/drawingml/2006/chart" xmlns:a="http://schemas.openxmlformats.org/drawingml/2006/main" xmlns:r="http://schemas.openxmlformats.org/officeDocument/2006/relationships" xmlns:c16r2="http://schemas.microsoft.com/office/drawing/2015/06/chart">
   <c:date1904 val="0"/>
   <c:lang val="en-US"/>
@@ -1639,7 +2387,7 @@
 </c:chartSpace>
 </file>
 
-<file path=ppt/charts/chart4.xml><?xml version="1.0" encoding="utf-8"?>
+<file path=ppt/charts/chart6.xml><?xml version="1.0" encoding="utf-8"?>
 <c:chartSpace xmlns:c="http://schemas.openxmlformats.org/drawingml/2006/chart" xmlns:a="http://schemas.openxmlformats.org/drawingml/2006/main" xmlns:r="http://schemas.openxmlformats.org/officeDocument/2006/relationships" xmlns:c16r2="http://schemas.microsoft.com/office/drawing/2015/06/chart">
   <c:date1904 val="0"/>
   <c:lang val="en-US"/>
@@ -1999,7 +2747,7 @@
                 <c:order val="2"/>
                 <c:tx>
                   <c:strRef>
-                    <c:extLst>
+                    <c:extLst xmlns:c15="http://schemas.microsoft.com/office/drawing/2012/chart">
                       <c:ext xmlns:c15="http://schemas.microsoft.com/office/drawing/2012/chart" uri="{02D57815-91ED-43cb-92C2-25804820EDAC}">
                         <c15:formulaRef>
                           <c15:sqref>playstore_rating_metrics!$D$1</c15:sqref>
@@ -2077,7 +2825,7 @@
                 <c:invertIfNegative val="0"/>
                 <c:cat>
                   <c:strRef>
-                    <c:extLst>
+                    <c:extLst xmlns:c15="http://schemas.microsoft.com/office/drawing/2012/chart">
                       <c:ext xmlns:c15="http://schemas.microsoft.com/office/drawing/2012/chart" uri="{02D57815-91ED-43cb-92C2-25804820EDAC}">
                         <c15:formulaRef>
                           <c15:sqref>playstore_rating_metrics!$A$2:$A$6</c15:sqref>
@@ -2103,7 +2851,7 @@
                 </c:cat>
                 <c:val>
                   <c:numRef>
-                    <c:extLst>
+                    <c:extLst xmlns:c15="http://schemas.microsoft.com/office/drawing/2012/chart">
                       <c:ext xmlns:c15="http://schemas.microsoft.com/office/drawing/2012/chart" uri="{02D57815-91ED-43cb-92C2-25804820EDAC}">
                         <c15:formulaRef>
                           <c15:sqref>playstore_rating_metrics!$D$2:$D$6</c15:sqref>
@@ -2141,7 +2889,7 @@
                 <c:order val="3"/>
                 <c:tx>
                   <c:strRef>
-                    <c:extLst>
+                    <c:extLst xmlns:c15="http://schemas.microsoft.com/office/drawing/2012/chart">
                       <c:ext xmlns:c15="http://schemas.microsoft.com/office/drawing/2012/chart" uri="{02D57815-91ED-43cb-92C2-25804820EDAC}">
                         <c15:formulaRef>
                           <c15:sqref>playstore_rating_metrics!$E$1</c15:sqref>
@@ -2219,7 +2967,7 @@
                 <c:invertIfNegative val="0"/>
                 <c:cat>
                   <c:strRef>
-                    <c:extLst>
+                    <c:extLst xmlns:c15="http://schemas.microsoft.com/office/drawing/2012/chart">
                       <c:ext xmlns:c15="http://schemas.microsoft.com/office/drawing/2012/chart" uri="{02D57815-91ED-43cb-92C2-25804820EDAC}">
                         <c15:formulaRef>
                           <c15:sqref>playstore_rating_metrics!$A$2:$A$6</c15:sqref>
@@ -2245,7 +2993,7 @@
                 </c:cat>
                 <c:val>
                   <c:numRef>
-                    <c:extLst>
+                    <c:extLst xmlns:c15="http://schemas.microsoft.com/office/drawing/2012/chart">
                       <c:ext xmlns:c15="http://schemas.microsoft.com/office/drawing/2012/chart" uri="{02D57815-91ED-43cb-92C2-25804820EDAC}">
                         <c15:formulaRef>
                           <c15:sqref>playstore_rating_metrics!$E$2:$E$6</c15:sqref>
@@ -2496,18 +3244,1146 @@
 </file>
 
 <file path=ppt/charts/colors3.xml><?xml version="1.0" encoding="utf-8"?>
+<cs:colorStyle xmlns:cs="http://schemas.microsoft.com/office/drawing/2012/chartStyle" xmlns:a="http://schemas.openxmlformats.org/drawingml/2006/main" meth="cycle" id="10">
+  <a:schemeClr val="accent1"/>
+  <a:schemeClr val="accent2"/>
+  <a:schemeClr val="accent3"/>
+  <a:schemeClr val="accent4"/>
+  <a:schemeClr val="accent5"/>
+  <a:schemeClr val="accent6"/>
+  <cs:variation/>
+  <cs:variation>
+    <a:lumMod val="60000"/>
+  </cs:variation>
+  <cs:variation>
+    <a:lumMod val="80000"/>
+    <a:lumOff val="20000"/>
+  </cs:variation>
+  <cs:variation>
+    <a:lumMod val="80000"/>
+  </cs:variation>
+  <cs:variation>
+    <a:lumMod val="60000"/>
+    <a:lumOff val="40000"/>
+  </cs:variation>
+  <cs:variation>
+    <a:lumMod val="50000"/>
+  </cs:variation>
+  <cs:variation>
+    <a:lumMod val="70000"/>
+    <a:lumOff val="30000"/>
+  </cs:variation>
+  <cs:variation>
+    <a:lumMod val="70000"/>
+  </cs:variation>
+  <cs:variation>
+    <a:lumMod val="50000"/>
+    <a:lumOff val="50000"/>
+  </cs:variation>
+</cs:colorStyle>
+</file>
+
+<file path=ppt/charts/colors4.xml><?xml version="1.0" encoding="utf-8"?>
+<cs:colorStyle xmlns:cs="http://schemas.microsoft.com/office/drawing/2012/chartStyle" xmlns:a="http://schemas.openxmlformats.org/drawingml/2006/main" meth="cycle" id="10">
+  <a:schemeClr val="accent1"/>
+  <a:schemeClr val="accent2"/>
+  <a:schemeClr val="accent3"/>
+  <a:schemeClr val="accent4"/>
+  <a:schemeClr val="accent5"/>
+  <a:schemeClr val="accent6"/>
+  <cs:variation/>
+  <cs:variation>
+    <a:lumMod val="60000"/>
+  </cs:variation>
+  <cs:variation>
+    <a:lumMod val="80000"/>
+    <a:lumOff val="20000"/>
+  </cs:variation>
+  <cs:variation>
+    <a:lumMod val="80000"/>
+  </cs:variation>
+  <cs:variation>
+    <a:lumMod val="60000"/>
+    <a:lumOff val="40000"/>
+  </cs:variation>
+  <cs:variation>
+    <a:lumMod val="50000"/>
+  </cs:variation>
+  <cs:variation>
+    <a:lumMod val="70000"/>
+    <a:lumOff val="30000"/>
+  </cs:variation>
+  <cs:variation>
+    <a:lumMod val="70000"/>
+  </cs:variation>
+  <cs:variation>
+    <a:lumMod val="50000"/>
+    <a:lumOff val="50000"/>
+  </cs:variation>
+</cs:colorStyle>
+</file>
+
+<file path=ppt/charts/colors5.xml><?xml version="1.0" encoding="utf-8"?>
 <cs:colorStyle xmlns:cs="http://schemas.microsoft.com/office/drawing/2012/chartStyle" xmlns:a="http://schemas.openxmlformats.org/drawingml/2006/main" meth="withinLinear" id="14">
   <a:schemeClr val="accent1"/>
 </cs:colorStyle>
 </file>
 
-<file path=ppt/charts/colors4.xml><?xml version="1.0" encoding="utf-8"?>
+<file path=ppt/charts/colors6.xml><?xml version="1.0" encoding="utf-8"?>
 <cs:colorStyle xmlns:cs="http://schemas.microsoft.com/office/drawing/2012/chartStyle" xmlns:a="http://schemas.openxmlformats.org/drawingml/2006/main" meth="withinLinear" id="17">
   <a:schemeClr val="accent4"/>
 </cs:colorStyle>
 </file>
 
 <file path=ppt/charts/style1.xml><?xml version="1.0" encoding="utf-8"?>
+<cs:chartStyle xmlns:cs="http://schemas.microsoft.com/office/drawing/2012/chartStyle" xmlns:a="http://schemas.openxmlformats.org/drawingml/2006/main" id="202">
+  <cs:axisTitle>
+    <cs:lnRef idx="0"/>
+    <cs:fillRef idx="0"/>
+    <cs:effectRef idx="0"/>
+    <cs:fontRef idx="minor">
+      <a:schemeClr val="tx1">
+        <a:lumMod val="65000"/>
+        <a:lumOff val="35000"/>
+      </a:schemeClr>
+    </cs:fontRef>
+    <cs:defRPr sz="1197" kern="1200" cap="all"/>
+  </cs:axisTitle>
+  <cs:categoryAxis>
+    <cs:lnRef idx="0"/>
+    <cs:fillRef idx="0"/>
+    <cs:effectRef idx="0"/>
+    <cs:fontRef idx="minor">
+      <a:schemeClr val="tx1">
+        <a:lumMod val="65000"/>
+        <a:lumOff val="35000"/>
+      </a:schemeClr>
+    </cs:fontRef>
+    <cs:spPr>
+      <a:ln w="9525" cap="flat" cmpd="sng" algn="ctr">
+        <a:solidFill>
+          <a:schemeClr val="tx1">
+            <a:lumMod val="15000"/>
+            <a:lumOff val="85000"/>
+          </a:schemeClr>
+        </a:solidFill>
+        <a:round/>
+      </a:ln>
+    </cs:spPr>
+    <cs:defRPr sz="1064" kern="1200" cap="all" spc="120" normalizeH="0" baseline="0"/>
+  </cs:categoryAxis>
+  <cs:chartArea mods="allowNoFillOverride allowNoLineOverride">
+    <cs:lnRef idx="0"/>
+    <cs:fillRef idx="0"/>
+    <cs:effectRef idx="0"/>
+    <cs:fontRef idx="minor">
+      <a:schemeClr val="dk1"/>
+    </cs:fontRef>
+    <cs:spPr>
+      <a:solidFill>
+        <a:schemeClr val="lt1"/>
+      </a:solidFill>
+      <a:ln w="9525" cap="flat" cmpd="sng" algn="ctr">
+        <a:solidFill>
+          <a:schemeClr val="tx1">
+            <a:lumMod val="15000"/>
+            <a:lumOff val="85000"/>
+          </a:schemeClr>
+        </a:solidFill>
+        <a:round/>
+      </a:ln>
+    </cs:spPr>
+    <cs:defRPr sz="1197" kern="1200"/>
+  </cs:chartArea>
+  <cs:dataLabel>
+    <cs:lnRef idx="0"/>
+    <cs:fillRef idx="0"/>
+    <cs:effectRef idx="0"/>
+    <cs:fontRef idx="minor">
+      <a:schemeClr val="tx1">
+        <a:lumMod val="50000"/>
+        <a:lumOff val="50000"/>
+      </a:schemeClr>
+    </cs:fontRef>
+    <cs:defRPr sz="1064" b="0" i="0" u="none" strike="noStrike" kern="1200" baseline="0"/>
+    <cs:bodyPr rot="-5400000" spcFirstLastPara="1" vertOverflow="clip" horzOverflow="clip" vert="horz" wrap="square" lIns="38100" tIns="19050" rIns="38100" bIns="19050" anchor="ctr" anchorCtr="1">
+      <a:spAutoFit/>
+    </cs:bodyPr>
+  </cs:dataLabel>
+  <cs:dataLabelCallout>
+    <cs:lnRef idx="0"/>
+    <cs:fillRef idx="0"/>
+    <cs:effectRef idx="0"/>
+    <cs:fontRef idx="minor">
+      <a:schemeClr val="dk1">
+        <a:lumMod val="65000"/>
+        <a:lumOff val="35000"/>
+      </a:schemeClr>
+    </cs:fontRef>
+    <cs:spPr>
+      <a:solidFill>
+        <a:schemeClr val="lt1"/>
+      </a:solidFill>
+      <a:ln>
+        <a:solidFill>
+          <a:schemeClr val="dk1">
+            <a:lumMod val="25000"/>
+            <a:lumOff val="75000"/>
+          </a:schemeClr>
+        </a:solidFill>
+      </a:ln>
+    </cs:spPr>
+    <cs:defRPr sz="1197" kern="1200"/>
+    <cs:bodyPr rot="0" spcFirstLastPara="1" vertOverflow="clip" horzOverflow="clip" vert="horz" wrap="square" lIns="36576" tIns="18288" rIns="36576" bIns="18288" anchor="ctr" anchorCtr="1">
+      <a:spAutoFit/>
+    </cs:bodyPr>
+  </cs:dataLabelCallout>
+  <cs:dataPoint>
+    <cs:lnRef idx="0"/>
+    <cs:fillRef idx="0">
+      <cs:styleClr val="auto"/>
+    </cs:fillRef>
+    <cs:effectRef idx="0"/>
+    <cs:fontRef idx="minor">
+      <a:schemeClr val="dk1"/>
+    </cs:fontRef>
+    <cs:spPr>
+      <a:solidFill>
+        <a:schemeClr val="phClr"/>
+      </a:solidFill>
+    </cs:spPr>
+  </cs:dataPoint>
+  <cs:dataPoint3D>
+    <cs:lnRef idx="0"/>
+    <cs:fillRef idx="0">
+      <cs:styleClr val="auto"/>
+    </cs:fillRef>
+    <cs:effectRef idx="0"/>
+    <cs:fontRef idx="minor">
+      <a:schemeClr val="dk1"/>
+    </cs:fontRef>
+    <cs:spPr>
+      <a:solidFill>
+        <a:schemeClr val="phClr"/>
+      </a:solidFill>
+    </cs:spPr>
+  </cs:dataPoint3D>
+  <cs:dataPointLine>
+    <cs:lnRef idx="0">
+      <cs:styleClr val="auto"/>
+    </cs:lnRef>
+    <cs:fillRef idx="0"/>
+    <cs:effectRef idx="0"/>
+    <cs:fontRef idx="minor">
+      <a:schemeClr val="dk1"/>
+    </cs:fontRef>
+    <cs:spPr>
+      <a:ln w="22225" cap="rnd">
+        <a:solidFill>
+          <a:schemeClr val="phClr"/>
+        </a:solidFill>
+        <a:round/>
+      </a:ln>
+    </cs:spPr>
+  </cs:dataPointLine>
+  <cs:dataPointMarker>
+    <cs:lnRef idx="0">
+      <cs:styleClr val="auto"/>
+    </cs:lnRef>
+    <cs:fillRef idx="0">
+      <cs:styleClr val="auto"/>
+    </cs:fillRef>
+    <cs:effectRef idx="0"/>
+    <cs:fontRef idx="minor">
+      <a:schemeClr val="dk1"/>
+    </cs:fontRef>
+    <cs:spPr>
+      <a:solidFill>
+        <a:schemeClr val="phClr"/>
+      </a:solidFill>
+      <a:ln w="9525">
+        <a:solidFill>
+          <a:schemeClr val="phClr"/>
+        </a:solidFill>
+        <a:round/>
+      </a:ln>
+    </cs:spPr>
+  </cs:dataPointMarker>
+  <cs:dataPointMarkerLayout size="6"/>
+  <cs:dataPointWireframe>
+    <cs:lnRef idx="0">
+      <cs:styleClr val="auto"/>
+    </cs:lnRef>
+    <cs:fillRef idx="0"/>
+    <cs:effectRef idx="0"/>
+    <cs:fontRef idx="minor">
+      <a:schemeClr val="dk1"/>
+    </cs:fontRef>
+    <cs:spPr>
+      <a:ln w="9525" cap="rnd">
+        <a:solidFill>
+          <a:schemeClr val="phClr"/>
+        </a:solidFill>
+        <a:round/>
+      </a:ln>
+    </cs:spPr>
+  </cs:dataPointWireframe>
+  <cs:dataTable>
+    <cs:lnRef idx="0"/>
+    <cs:fillRef idx="0"/>
+    <cs:effectRef idx="0"/>
+    <cs:fontRef idx="minor">
+      <a:schemeClr val="tx1">
+        <a:lumMod val="65000"/>
+        <a:lumOff val="35000"/>
+      </a:schemeClr>
+    </cs:fontRef>
+    <cs:spPr>
+      <a:ln w="9525">
+        <a:solidFill>
+          <a:schemeClr val="tx1">
+            <a:lumMod val="15000"/>
+            <a:lumOff val="85000"/>
+          </a:schemeClr>
+        </a:solidFill>
+      </a:ln>
+    </cs:spPr>
+    <cs:defRPr sz="1197" kern="1200"/>
+  </cs:dataTable>
+  <cs:downBar>
+    <cs:lnRef idx="0"/>
+    <cs:fillRef idx="0"/>
+    <cs:effectRef idx="0"/>
+    <cs:fontRef idx="minor">
+      <a:schemeClr val="dk1"/>
+    </cs:fontRef>
+    <cs:spPr>
+      <a:solidFill>
+        <a:schemeClr val="dk1">
+          <a:lumMod val="75000"/>
+          <a:lumOff val="25000"/>
+        </a:schemeClr>
+      </a:solidFill>
+      <a:ln w="9525">
+        <a:solidFill>
+          <a:schemeClr val="tx1">
+            <a:lumMod val="15000"/>
+            <a:lumOff val="85000"/>
+          </a:schemeClr>
+        </a:solidFill>
+      </a:ln>
+    </cs:spPr>
+  </cs:downBar>
+  <cs:dropLine>
+    <cs:lnRef idx="0"/>
+    <cs:fillRef idx="0"/>
+    <cs:effectRef idx="0"/>
+    <cs:fontRef idx="minor">
+      <a:schemeClr val="dk1"/>
+    </cs:fontRef>
+    <cs:spPr>
+      <a:ln w="9525">
+        <a:solidFill>
+          <a:schemeClr val="tx1">
+            <a:lumMod val="35000"/>
+            <a:lumOff val="65000"/>
+          </a:schemeClr>
+        </a:solidFill>
+      </a:ln>
+    </cs:spPr>
+  </cs:dropLine>
+  <cs:errorBar>
+    <cs:lnRef idx="0"/>
+    <cs:fillRef idx="0"/>
+    <cs:effectRef idx="0"/>
+    <cs:fontRef idx="minor">
+      <a:schemeClr val="dk1"/>
+    </cs:fontRef>
+    <cs:spPr>
+      <a:ln w="9525">
+        <a:solidFill>
+          <a:schemeClr val="tx1">
+            <a:lumMod val="65000"/>
+            <a:lumOff val="35000"/>
+          </a:schemeClr>
+        </a:solidFill>
+        <a:round/>
+      </a:ln>
+    </cs:spPr>
+  </cs:errorBar>
+  <cs:floor>
+    <cs:lnRef idx="0"/>
+    <cs:fillRef idx="0"/>
+    <cs:effectRef idx="0"/>
+    <cs:fontRef idx="minor">
+      <a:schemeClr val="dk1"/>
+    </cs:fontRef>
+  </cs:floor>
+  <cs:gridlineMajor>
+    <cs:lnRef idx="0"/>
+    <cs:fillRef idx="0"/>
+    <cs:effectRef idx="0"/>
+    <cs:fontRef idx="minor">
+      <a:schemeClr val="dk1"/>
+    </cs:fontRef>
+    <cs:spPr>
+      <a:ln w="9525" cap="flat" cmpd="sng" algn="ctr">
+        <a:solidFill>
+          <a:schemeClr val="tx1">
+            <a:lumMod val="15000"/>
+            <a:lumOff val="85000"/>
+          </a:schemeClr>
+        </a:solidFill>
+        <a:round/>
+      </a:ln>
+    </cs:spPr>
+  </cs:gridlineMajor>
+  <cs:gridlineMinor>
+    <cs:lnRef idx="0"/>
+    <cs:fillRef idx="0"/>
+    <cs:effectRef idx="0"/>
+    <cs:fontRef idx="minor">
+      <a:schemeClr val="dk1"/>
+    </cs:fontRef>
+    <cs:spPr>
+      <a:ln>
+        <a:solidFill>
+          <a:schemeClr val="tx1">
+            <a:lumMod val="5000"/>
+            <a:lumOff val="95000"/>
+          </a:schemeClr>
+        </a:solidFill>
+      </a:ln>
+    </cs:spPr>
+  </cs:gridlineMinor>
+  <cs:hiLoLine>
+    <cs:lnRef idx="0"/>
+    <cs:fillRef idx="0"/>
+    <cs:effectRef idx="0"/>
+    <cs:fontRef idx="minor">
+      <a:schemeClr val="dk1"/>
+    </cs:fontRef>
+    <cs:spPr>
+      <a:ln w="9525">
+        <a:solidFill>
+          <a:schemeClr val="tx1">
+            <a:lumMod val="50000"/>
+            <a:lumOff val="50000"/>
+          </a:schemeClr>
+        </a:solidFill>
+      </a:ln>
+    </cs:spPr>
+  </cs:hiLoLine>
+  <cs:leaderLine>
+    <cs:lnRef idx="0"/>
+    <cs:fillRef idx="0"/>
+    <cs:effectRef idx="0"/>
+    <cs:fontRef idx="minor">
+      <a:schemeClr val="dk1"/>
+    </cs:fontRef>
+    <cs:spPr>
+      <a:ln w="9525">
+        <a:solidFill>
+          <a:schemeClr val="tx1">
+            <a:lumMod val="35000"/>
+            <a:lumOff val="65000"/>
+          </a:schemeClr>
+        </a:solidFill>
+      </a:ln>
+    </cs:spPr>
+  </cs:leaderLine>
+  <cs:legend>
+    <cs:lnRef idx="0"/>
+    <cs:fillRef idx="0"/>
+    <cs:effectRef idx="0"/>
+    <cs:fontRef idx="minor">
+      <a:schemeClr val="tx1">
+        <a:lumMod val="65000"/>
+        <a:lumOff val="35000"/>
+      </a:schemeClr>
+    </cs:fontRef>
+    <cs:defRPr sz="1197" kern="1200"/>
+  </cs:legend>
+  <cs:plotArea mods="allowNoFillOverride allowNoLineOverride">
+    <cs:lnRef idx="0"/>
+    <cs:fillRef idx="0"/>
+    <cs:effectRef idx="0"/>
+    <cs:fontRef idx="minor">
+      <a:schemeClr val="dk1"/>
+    </cs:fontRef>
+  </cs:plotArea>
+  <cs:plotArea3D mods="allowNoFillOverride allowNoLineOverride">
+    <cs:lnRef idx="0"/>
+    <cs:fillRef idx="0"/>
+    <cs:effectRef idx="0"/>
+    <cs:fontRef idx="minor">
+      <a:schemeClr val="dk1"/>
+    </cs:fontRef>
+  </cs:plotArea3D>
+  <cs:seriesAxis>
+    <cs:lnRef idx="0"/>
+    <cs:fillRef idx="0"/>
+    <cs:effectRef idx="0"/>
+    <cs:fontRef idx="minor">
+      <a:schemeClr val="tx1">
+        <a:lumMod val="65000"/>
+        <a:lumOff val="35000"/>
+      </a:schemeClr>
+    </cs:fontRef>
+    <cs:spPr>
+      <a:ln w="9525" cap="flat" cmpd="sng" algn="ctr">
+        <a:solidFill>
+          <a:schemeClr val="tx1">
+            <a:lumMod val="15000"/>
+            <a:lumOff val="85000"/>
+          </a:schemeClr>
+        </a:solidFill>
+        <a:round/>
+      </a:ln>
+    </cs:spPr>
+    <cs:defRPr sz="1197" kern="1200"/>
+  </cs:seriesAxis>
+  <cs:seriesLine>
+    <cs:lnRef idx="0"/>
+    <cs:fillRef idx="0"/>
+    <cs:effectRef idx="0"/>
+    <cs:fontRef idx="minor">
+      <a:schemeClr val="dk1"/>
+    </cs:fontRef>
+    <cs:spPr>
+      <a:ln w="9525">
+        <a:solidFill>
+          <a:schemeClr val="tx1">
+            <a:lumMod val="35000"/>
+            <a:lumOff val="65000"/>
+          </a:schemeClr>
+        </a:solidFill>
+        <a:round/>
+      </a:ln>
+    </cs:spPr>
+  </cs:seriesLine>
+  <cs:title>
+    <cs:lnRef idx="0"/>
+    <cs:fillRef idx="0"/>
+    <cs:effectRef idx="0"/>
+    <cs:fontRef idx="minor">
+      <a:schemeClr val="tx1">
+        <a:lumMod val="65000"/>
+        <a:lumOff val="35000"/>
+      </a:schemeClr>
+    </cs:fontRef>
+    <cs:defRPr sz="2128" b="1" kern="1200" cap="all" spc="120" normalizeH="0" baseline="0"/>
+  </cs:title>
+  <cs:trendline>
+    <cs:lnRef idx="0">
+      <cs:styleClr val="auto"/>
+    </cs:lnRef>
+    <cs:fillRef idx="0"/>
+    <cs:effectRef idx="0"/>
+    <cs:fontRef idx="minor">
+      <a:schemeClr val="dk1"/>
+    </cs:fontRef>
+    <cs:spPr>
+      <a:ln w="19050" cap="rnd">
+        <a:solidFill>
+          <a:schemeClr val="phClr"/>
+        </a:solidFill>
+        <a:prstDash val="sysDash"/>
+      </a:ln>
+    </cs:spPr>
+  </cs:trendline>
+  <cs:trendlineLabel>
+    <cs:lnRef idx="0"/>
+    <cs:fillRef idx="0"/>
+    <cs:effectRef idx="0"/>
+    <cs:fontRef idx="minor">
+      <a:schemeClr val="tx1">
+        <a:lumMod val="65000"/>
+        <a:lumOff val="35000"/>
+      </a:schemeClr>
+    </cs:fontRef>
+    <cs:defRPr sz="1064" kern="1200"/>
+  </cs:trendlineLabel>
+  <cs:upBar>
+    <cs:lnRef idx="0"/>
+    <cs:fillRef idx="0"/>
+    <cs:effectRef idx="0"/>
+    <cs:fontRef idx="minor">
+      <a:schemeClr val="dk1"/>
+    </cs:fontRef>
+    <cs:spPr>
+      <a:solidFill>
+        <a:schemeClr val="lt1"/>
+      </a:solidFill>
+      <a:ln w="9525">
+        <a:solidFill>
+          <a:schemeClr val="tx1">
+            <a:lumMod val="65000"/>
+            <a:lumOff val="35000"/>
+          </a:schemeClr>
+        </a:solidFill>
+      </a:ln>
+    </cs:spPr>
+  </cs:upBar>
+  <cs:valueAxis>
+    <cs:lnRef idx="0"/>
+    <cs:fillRef idx="0"/>
+    <cs:effectRef idx="0"/>
+    <cs:fontRef idx="minor">
+      <a:schemeClr val="tx1">
+        <a:lumMod val="65000"/>
+        <a:lumOff val="35000"/>
+      </a:schemeClr>
+    </cs:fontRef>
+    <cs:spPr>
+      <a:ln w="9525" cap="flat" cmpd="sng" algn="ctr">
+        <a:solidFill>
+          <a:schemeClr val="dk1">
+            <a:lumMod val="15000"/>
+            <a:lumOff val="85000"/>
+          </a:schemeClr>
+        </a:solidFill>
+        <a:round/>
+      </a:ln>
+    </cs:spPr>
+    <cs:defRPr sz="1197" kern="1200"/>
+  </cs:valueAxis>
+  <cs:wall>
+    <cs:lnRef idx="0"/>
+    <cs:fillRef idx="0"/>
+    <cs:effectRef idx="0"/>
+    <cs:fontRef idx="minor">
+      <a:schemeClr val="dk1"/>
+    </cs:fontRef>
+  </cs:wall>
+</cs:chartStyle>
+</file>
+
+<file path=ppt/charts/style2.xml><?xml version="1.0" encoding="utf-8"?>
+<cs:chartStyle xmlns:cs="http://schemas.microsoft.com/office/drawing/2012/chartStyle" xmlns:a="http://schemas.openxmlformats.org/drawingml/2006/main" id="202">
+  <cs:axisTitle>
+    <cs:lnRef idx="0"/>
+    <cs:fillRef idx="0"/>
+    <cs:effectRef idx="0"/>
+    <cs:fontRef idx="minor">
+      <a:schemeClr val="tx1">
+        <a:lumMod val="65000"/>
+        <a:lumOff val="35000"/>
+      </a:schemeClr>
+    </cs:fontRef>
+    <cs:defRPr sz="1197" kern="1200" cap="all"/>
+  </cs:axisTitle>
+  <cs:categoryAxis>
+    <cs:lnRef idx="0"/>
+    <cs:fillRef idx="0"/>
+    <cs:effectRef idx="0"/>
+    <cs:fontRef idx="minor">
+      <a:schemeClr val="tx1">
+        <a:lumMod val="65000"/>
+        <a:lumOff val="35000"/>
+      </a:schemeClr>
+    </cs:fontRef>
+    <cs:spPr>
+      <a:ln w="9525" cap="flat" cmpd="sng" algn="ctr">
+        <a:solidFill>
+          <a:schemeClr val="tx1">
+            <a:lumMod val="15000"/>
+            <a:lumOff val="85000"/>
+          </a:schemeClr>
+        </a:solidFill>
+        <a:round/>
+      </a:ln>
+    </cs:spPr>
+    <cs:defRPr sz="1064" kern="1200" cap="all" spc="120" normalizeH="0" baseline="0"/>
+  </cs:categoryAxis>
+  <cs:chartArea mods="allowNoFillOverride allowNoLineOverride">
+    <cs:lnRef idx="0"/>
+    <cs:fillRef idx="0"/>
+    <cs:effectRef idx="0"/>
+    <cs:fontRef idx="minor">
+      <a:schemeClr val="dk1"/>
+    </cs:fontRef>
+    <cs:spPr>
+      <a:solidFill>
+        <a:schemeClr val="lt1"/>
+      </a:solidFill>
+      <a:ln w="9525" cap="flat" cmpd="sng" algn="ctr">
+        <a:solidFill>
+          <a:schemeClr val="tx1">
+            <a:lumMod val="15000"/>
+            <a:lumOff val="85000"/>
+          </a:schemeClr>
+        </a:solidFill>
+        <a:round/>
+      </a:ln>
+    </cs:spPr>
+    <cs:defRPr sz="1197" kern="1200"/>
+  </cs:chartArea>
+  <cs:dataLabel>
+    <cs:lnRef idx="0"/>
+    <cs:fillRef idx="0"/>
+    <cs:effectRef idx="0"/>
+    <cs:fontRef idx="minor">
+      <a:schemeClr val="tx1">
+        <a:lumMod val="50000"/>
+        <a:lumOff val="50000"/>
+      </a:schemeClr>
+    </cs:fontRef>
+    <cs:defRPr sz="1064" b="0" i="0" u="none" strike="noStrike" kern="1200" baseline="0"/>
+    <cs:bodyPr rot="-5400000" spcFirstLastPara="1" vertOverflow="clip" horzOverflow="clip" vert="horz" wrap="square" lIns="38100" tIns="19050" rIns="38100" bIns="19050" anchor="ctr" anchorCtr="1">
+      <a:spAutoFit/>
+    </cs:bodyPr>
+  </cs:dataLabel>
+  <cs:dataLabelCallout>
+    <cs:lnRef idx="0"/>
+    <cs:fillRef idx="0"/>
+    <cs:effectRef idx="0"/>
+    <cs:fontRef idx="minor">
+      <a:schemeClr val="dk1">
+        <a:lumMod val="65000"/>
+        <a:lumOff val="35000"/>
+      </a:schemeClr>
+    </cs:fontRef>
+    <cs:spPr>
+      <a:solidFill>
+        <a:schemeClr val="lt1"/>
+      </a:solidFill>
+      <a:ln>
+        <a:solidFill>
+          <a:schemeClr val="dk1">
+            <a:lumMod val="25000"/>
+            <a:lumOff val="75000"/>
+          </a:schemeClr>
+        </a:solidFill>
+      </a:ln>
+    </cs:spPr>
+    <cs:defRPr sz="1197" kern="1200"/>
+    <cs:bodyPr rot="0" spcFirstLastPara="1" vertOverflow="clip" horzOverflow="clip" vert="horz" wrap="square" lIns="36576" tIns="18288" rIns="36576" bIns="18288" anchor="ctr" anchorCtr="1">
+      <a:spAutoFit/>
+    </cs:bodyPr>
+  </cs:dataLabelCallout>
+  <cs:dataPoint>
+    <cs:lnRef idx="0"/>
+    <cs:fillRef idx="0">
+      <cs:styleClr val="auto"/>
+    </cs:fillRef>
+    <cs:effectRef idx="0"/>
+    <cs:fontRef idx="minor">
+      <a:schemeClr val="dk1"/>
+    </cs:fontRef>
+    <cs:spPr>
+      <a:solidFill>
+        <a:schemeClr val="phClr"/>
+      </a:solidFill>
+    </cs:spPr>
+  </cs:dataPoint>
+  <cs:dataPoint3D>
+    <cs:lnRef idx="0"/>
+    <cs:fillRef idx="0">
+      <cs:styleClr val="auto"/>
+    </cs:fillRef>
+    <cs:effectRef idx="0"/>
+    <cs:fontRef idx="minor">
+      <a:schemeClr val="dk1"/>
+    </cs:fontRef>
+    <cs:spPr>
+      <a:solidFill>
+        <a:schemeClr val="phClr"/>
+      </a:solidFill>
+    </cs:spPr>
+  </cs:dataPoint3D>
+  <cs:dataPointLine>
+    <cs:lnRef idx="0">
+      <cs:styleClr val="auto"/>
+    </cs:lnRef>
+    <cs:fillRef idx="0"/>
+    <cs:effectRef idx="0"/>
+    <cs:fontRef idx="minor">
+      <a:schemeClr val="dk1"/>
+    </cs:fontRef>
+    <cs:spPr>
+      <a:ln w="22225" cap="rnd">
+        <a:solidFill>
+          <a:schemeClr val="phClr"/>
+        </a:solidFill>
+        <a:round/>
+      </a:ln>
+    </cs:spPr>
+  </cs:dataPointLine>
+  <cs:dataPointMarker>
+    <cs:lnRef idx="0">
+      <cs:styleClr val="auto"/>
+    </cs:lnRef>
+    <cs:fillRef idx="0">
+      <cs:styleClr val="auto"/>
+    </cs:fillRef>
+    <cs:effectRef idx="0"/>
+    <cs:fontRef idx="minor">
+      <a:schemeClr val="dk1"/>
+    </cs:fontRef>
+    <cs:spPr>
+      <a:solidFill>
+        <a:schemeClr val="phClr"/>
+      </a:solidFill>
+      <a:ln w="9525">
+        <a:solidFill>
+          <a:schemeClr val="phClr"/>
+        </a:solidFill>
+        <a:round/>
+      </a:ln>
+    </cs:spPr>
+  </cs:dataPointMarker>
+  <cs:dataPointMarkerLayout size="6"/>
+  <cs:dataPointWireframe>
+    <cs:lnRef idx="0">
+      <cs:styleClr val="auto"/>
+    </cs:lnRef>
+    <cs:fillRef idx="0"/>
+    <cs:effectRef idx="0"/>
+    <cs:fontRef idx="minor">
+      <a:schemeClr val="dk1"/>
+    </cs:fontRef>
+    <cs:spPr>
+      <a:ln w="9525" cap="rnd">
+        <a:solidFill>
+          <a:schemeClr val="phClr"/>
+        </a:solidFill>
+        <a:round/>
+      </a:ln>
+    </cs:spPr>
+  </cs:dataPointWireframe>
+  <cs:dataTable>
+    <cs:lnRef idx="0"/>
+    <cs:fillRef idx="0"/>
+    <cs:effectRef idx="0"/>
+    <cs:fontRef idx="minor">
+      <a:schemeClr val="tx1">
+        <a:lumMod val="65000"/>
+        <a:lumOff val="35000"/>
+      </a:schemeClr>
+    </cs:fontRef>
+    <cs:spPr>
+      <a:ln w="9525">
+        <a:solidFill>
+          <a:schemeClr val="tx1">
+            <a:lumMod val="15000"/>
+            <a:lumOff val="85000"/>
+          </a:schemeClr>
+        </a:solidFill>
+      </a:ln>
+    </cs:spPr>
+    <cs:defRPr sz="1197" kern="1200"/>
+  </cs:dataTable>
+  <cs:downBar>
+    <cs:lnRef idx="0"/>
+    <cs:fillRef idx="0"/>
+    <cs:effectRef idx="0"/>
+    <cs:fontRef idx="minor">
+      <a:schemeClr val="dk1"/>
+    </cs:fontRef>
+    <cs:spPr>
+      <a:solidFill>
+        <a:schemeClr val="dk1">
+          <a:lumMod val="75000"/>
+          <a:lumOff val="25000"/>
+        </a:schemeClr>
+      </a:solidFill>
+      <a:ln w="9525">
+        <a:solidFill>
+          <a:schemeClr val="tx1">
+            <a:lumMod val="15000"/>
+            <a:lumOff val="85000"/>
+          </a:schemeClr>
+        </a:solidFill>
+      </a:ln>
+    </cs:spPr>
+  </cs:downBar>
+  <cs:dropLine>
+    <cs:lnRef idx="0"/>
+    <cs:fillRef idx="0"/>
+    <cs:effectRef idx="0"/>
+    <cs:fontRef idx="minor">
+      <a:schemeClr val="dk1"/>
+    </cs:fontRef>
+    <cs:spPr>
+      <a:ln w="9525">
+        <a:solidFill>
+          <a:schemeClr val="tx1">
+            <a:lumMod val="35000"/>
+            <a:lumOff val="65000"/>
+          </a:schemeClr>
+        </a:solidFill>
+      </a:ln>
+    </cs:spPr>
+  </cs:dropLine>
+  <cs:errorBar>
+    <cs:lnRef idx="0"/>
+    <cs:fillRef idx="0"/>
+    <cs:effectRef idx="0"/>
+    <cs:fontRef idx="minor">
+      <a:schemeClr val="dk1"/>
+    </cs:fontRef>
+    <cs:spPr>
+      <a:ln w="9525">
+        <a:solidFill>
+          <a:schemeClr val="tx1">
+            <a:lumMod val="65000"/>
+            <a:lumOff val="35000"/>
+          </a:schemeClr>
+        </a:solidFill>
+        <a:round/>
+      </a:ln>
+    </cs:spPr>
+  </cs:errorBar>
+  <cs:floor>
+    <cs:lnRef idx="0"/>
+    <cs:fillRef idx="0"/>
+    <cs:effectRef idx="0"/>
+    <cs:fontRef idx="minor">
+      <a:schemeClr val="dk1"/>
+    </cs:fontRef>
+  </cs:floor>
+  <cs:gridlineMajor>
+    <cs:lnRef idx="0"/>
+    <cs:fillRef idx="0"/>
+    <cs:effectRef idx="0"/>
+    <cs:fontRef idx="minor">
+      <a:schemeClr val="dk1"/>
+    </cs:fontRef>
+    <cs:spPr>
+      <a:ln w="9525" cap="flat" cmpd="sng" algn="ctr">
+        <a:solidFill>
+          <a:schemeClr val="tx1">
+            <a:lumMod val="15000"/>
+            <a:lumOff val="85000"/>
+          </a:schemeClr>
+        </a:solidFill>
+        <a:round/>
+      </a:ln>
+    </cs:spPr>
+  </cs:gridlineMajor>
+  <cs:gridlineMinor>
+    <cs:lnRef idx="0"/>
+    <cs:fillRef idx="0"/>
+    <cs:effectRef idx="0"/>
+    <cs:fontRef idx="minor">
+      <a:schemeClr val="dk1"/>
+    </cs:fontRef>
+    <cs:spPr>
+      <a:ln>
+        <a:solidFill>
+          <a:schemeClr val="tx1">
+            <a:lumMod val="5000"/>
+            <a:lumOff val="95000"/>
+          </a:schemeClr>
+        </a:solidFill>
+      </a:ln>
+    </cs:spPr>
+  </cs:gridlineMinor>
+  <cs:hiLoLine>
+    <cs:lnRef idx="0"/>
+    <cs:fillRef idx="0"/>
+    <cs:effectRef idx="0"/>
+    <cs:fontRef idx="minor">
+      <a:schemeClr val="dk1"/>
+    </cs:fontRef>
+    <cs:spPr>
+      <a:ln w="9525">
+        <a:solidFill>
+          <a:schemeClr val="tx1">
+            <a:lumMod val="50000"/>
+            <a:lumOff val="50000"/>
+          </a:schemeClr>
+        </a:solidFill>
+      </a:ln>
+    </cs:spPr>
+  </cs:hiLoLine>
+  <cs:leaderLine>
+    <cs:lnRef idx="0"/>
+    <cs:fillRef idx="0"/>
+    <cs:effectRef idx="0"/>
+    <cs:fontRef idx="minor">
+      <a:schemeClr val="dk1"/>
+    </cs:fontRef>
+    <cs:spPr>
+      <a:ln w="9525">
+        <a:solidFill>
+          <a:schemeClr val="tx1">
+            <a:lumMod val="35000"/>
+            <a:lumOff val="65000"/>
+          </a:schemeClr>
+        </a:solidFill>
+      </a:ln>
+    </cs:spPr>
+  </cs:leaderLine>
+  <cs:legend>
+    <cs:lnRef idx="0"/>
+    <cs:fillRef idx="0"/>
+    <cs:effectRef idx="0"/>
+    <cs:fontRef idx="minor">
+      <a:schemeClr val="tx1">
+        <a:lumMod val="65000"/>
+        <a:lumOff val="35000"/>
+      </a:schemeClr>
+    </cs:fontRef>
+    <cs:defRPr sz="1197" kern="1200"/>
+  </cs:legend>
+  <cs:plotArea mods="allowNoFillOverride allowNoLineOverride">
+    <cs:lnRef idx="0"/>
+    <cs:fillRef idx="0"/>
+    <cs:effectRef idx="0"/>
+    <cs:fontRef idx="minor">
+      <a:schemeClr val="dk1"/>
+    </cs:fontRef>
+  </cs:plotArea>
+  <cs:plotArea3D mods="allowNoFillOverride allowNoLineOverride">
+    <cs:lnRef idx="0"/>
+    <cs:fillRef idx="0"/>
+    <cs:effectRef idx="0"/>
+    <cs:fontRef idx="minor">
+      <a:schemeClr val="dk1"/>
+    </cs:fontRef>
+  </cs:plotArea3D>
+  <cs:seriesAxis>
+    <cs:lnRef idx="0"/>
+    <cs:fillRef idx="0"/>
+    <cs:effectRef idx="0"/>
+    <cs:fontRef idx="minor">
+      <a:schemeClr val="tx1">
+        <a:lumMod val="65000"/>
+        <a:lumOff val="35000"/>
+      </a:schemeClr>
+    </cs:fontRef>
+    <cs:spPr>
+      <a:ln w="9525" cap="flat" cmpd="sng" algn="ctr">
+        <a:solidFill>
+          <a:schemeClr val="tx1">
+            <a:lumMod val="15000"/>
+            <a:lumOff val="85000"/>
+          </a:schemeClr>
+        </a:solidFill>
+        <a:round/>
+      </a:ln>
+    </cs:spPr>
+    <cs:defRPr sz="1197" kern="1200"/>
+  </cs:seriesAxis>
+  <cs:seriesLine>
+    <cs:lnRef idx="0"/>
+    <cs:fillRef idx="0"/>
+    <cs:effectRef idx="0"/>
+    <cs:fontRef idx="minor">
+      <a:schemeClr val="dk1"/>
+    </cs:fontRef>
+    <cs:spPr>
+      <a:ln w="9525">
+        <a:solidFill>
+          <a:schemeClr val="tx1">
+            <a:lumMod val="35000"/>
+            <a:lumOff val="65000"/>
+          </a:schemeClr>
+        </a:solidFill>
+        <a:round/>
+      </a:ln>
+    </cs:spPr>
+  </cs:seriesLine>
+  <cs:title>
+    <cs:lnRef idx="0"/>
+    <cs:fillRef idx="0"/>
+    <cs:effectRef idx="0"/>
+    <cs:fontRef idx="minor">
+      <a:schemeClr val="tx1">
+        <a:lumMod val="65000"/>
+        <a:lumOff val="35000"/>
+      </a:schemeClr>
+    </cs:fontRef>
+    <cs:defRPr sz="2128" b="1" kern="1200" cap="all" spc="120" normalizeH="0" baseline="0"/>
+  </cs:title>
+  <cs:trendline>
+    <cs:lnRef idx="0">
+      <cs:styleClr val="auto"/>
+    </cs:lnRef>
+    <cs:fillRef idx="0"/>
+    <cs:effectRef idx="0"/>
+    <cs:fontRef idx="minor">
+      <a:schemeClr val="dk1"/>
+    </cs:fontRef>
+    <cs:spPr>
+      <a:ln w="19050" cap="rnd">
+        <a:solidFill>
+          <a:schemeClr val="phClr"/>
+        </a:solidFill>
+        <a:prstDash val="sysDash"/>
+      </a:ln>
+    </cs:spPr>
+  </cs:trendline>
+  <cs:trendlineLabel>
+    <cs:lnRef idx="0"/>
+    <cs:fillRef idx="0"/>
+    <cs:effectRef idx="0"/>
+    <cs:fontRef idx="minor">
+      <a:schemeClr val="tx1">
+        <a:lumMod val="65000"/>
+        <a:lumOff val="35000"/>
+      </a:schemeClr>
+    </cs:fontRef>
+    <cs:defRPr sz="1064" kern="1200"/>
+  </cs:trendlineLabel>
+  <cs:upBar>
+    <cs:lnRef idx="0"/>
+    <cs:fillRef idx="0"/>
+    <cs:effectRef idx="0"/>
+    <cs:fontRef idx="minor">
+      <a:schemeClr val="dk1"/>
+    </cs:fontRef>
+    <cs:spPr>
+      <a:solidFill>
+        <a:schemeClr val="lt1"/>
+      </a:solidFill>
+      <a:ln w="9525">
+        <a:solidFill>
+          <a:schemeClr val="tx1">
+            <a:lumMod val="65000"/>
+            <a:lumOff val="35000"/>
+          </a:schemeClr>
+        </a:solidFill>
+      </a:ln>
+    </cs:spPr>
+  </cs:upBar>
+  <cs:valueAxis>
+    <cs:lnRef idx="0"/>
+    <cs:fillRef idx="0"/>
+    <cs:effectRef idx="0"/>
+    <cs:fontRef idx="minor">
+      <a:schemeClr val="tx1">
+        <a:lumMod val="65000"/>
+        <a:lumOff val="35000"/>
+      </a:schemeClr>
+    </cs:fontRef>
+    <cs:spPr>
+      <a:ln w="9525" cap="flat" cmpd="sng" algn="ctr">
+        <a:solidFill>
+          <a:schemeClr val="dk1">
+            <a:lumMod val="15000"/>
+            <a:lumOff val="85000"/>
+          </a:schemeClr>
+        </a:solidFill>
+        <a:round/>
+      </a:ln>
+    </cs:spPr>
+    <cs:defRPr sz="1197" kern="1200"/>
+  </cs:valueAxis>
+  <cs:wall>
+    <cs:lnRef idx="0"/>
+    <cs:fillRef idx="0"/>
+    <cs:effectRef idx="0"/>
+    <cs:fontRef idx="minor">
+      <a:schemeClr val="dk1"/>
+    </cs:fontRef>
+  </cs:wall>
+</cs:chartStyle>
+</file>
+
+<file path=ppt/charts/style3.xml><?xml version="1.0" encoding="utf-8"?>
 <cs:chartStyle xmlns:cs="http://schemas.microsoft.com/office/drawing/2012/chartStyle" xmlns:a="http://schemas.openxmlformats.org/drawingml/2006/main" id="251">
   <cs:axisTitle>
     <cs:lnRef idx="0"/>
@@ -3026,7 +4902,7 @@
 </cs:chartStyle>
 </file>
 
-<file path=ppt/charts/style2.xml><?xml version="1.0" encoding="utf-8"?>
+<file path=ppt/charts/style4.xml><?xml version="1.0" encoding="utf-8"?>
 <cs:chartStyle xmlns:cs="http://schemas.microsoft.com/office/drawing/2012/chartStyle" xmlns:a="http://schemas.openxmlformats.org/drawingml/2006/main" id="251">
   <cs:axisTitle>
     <cs:lnRef idx="0"/>
@@ -3545,7 +5421,7 @@
 </cs:chartStyle>
 </file>
 
-<file path=ppt/charts/style3.xml><?xml version="1.0" encoding="utf-8"?>
+<file path=ppt/charts/style5.xml><?xml version="1.0" encoding="utf-8"?>
 <cs:chartStyle xmlns:cs="http://schemas.microsoft.com/office/drawing/2012/chartStyle" xmlns:a="http://schemas.openxmlformats.org/drawingml/2006/main" id="352">
   <cs:axisTitle>
     <cs:lnRef idx="0"/>
@@ -4047,7 +5923,7 @@
 </cs:chartStyle>
 </file>
 
-<file path=ppt/charts/style4.xml><?xml version="1.0" encoding="utf-8"?>
+<file path=ppt/charts/style6.xml><?xml version="1.0" encoding="utf-8"?>
 <cs:chartStyle xmlns:cs="http://schemas.microsoft.com/office/drawing/2012/chartStyle" xmlns:a="http://schemas.openxmlformats.org/drawingml/2006/main" id="340">
   <cs:axisTitle>
     <cs:lnRef idx="0"/>
@@ -7880,7 +9756,7 @@
           <a:p>
             <a:fld id="{9184DA70-C731-4C70-880D-CCD4705E623C}" type="datetime1">
               <a:rPr lang="en-US" smtClean="0"/>
-              <a:t>8/24/2021</a:t>
+              <a:t>8/26/2021</a:t>
             </a:fld>
             <a:endParaRPr lang="en-US" dirty="0"/>
           </a:p>
@@ -8068,7 +9944,7 @@
           <a:p>
             <a:fld id="{B612A279-0833-481D-8C56-F67FD0AC6C50}" type="datetime1">
               <a:rPr lang="en-US" smtClean="0"/>
-              <a:t>8/24/2021</a:t>
+              <a:t>8/26/2021</a:t>
             </a:fld>
             <a:endParaRPr lang="en-US" dirty="0"/>
           </a:p>
@@ -8310,7 +10186,7 @@
           <a:p>
             <a:fld id="{6587DA83-5663-4C9C-B9AA-0B40A3DAFF81}" type="datetime1">
               <a:rPr lang="en-US" smtClean="0"/>
-              <a:t>8/24/2021</a:t>
+              <a:t>8/26/2021</a:t>
             </a:fld>
             <a:endParaRPr lang="en-US" dirty="0"/>
           </a:p>
@@ -8498,7 +10374,7 @@
           <a:p>
             <a:fld id="{4BE1D723-8F53-4F53-90B0-1982A396982E}" type="datetime1">
               <a:rPr lang="en-US" smtClean="0"/>
-              <a:t>8/24/2021</a:t>
+              <a:t>8/26/2021</a:t>
             </a:fld>
             <a:endParaRPr lang="en-US" dirty="0"/>
           </a:p>
@@ -8871,7 +10747,7 @@
           <a:p>
             <a:fld id="{97669AF7-7BEB-44E4-9852-375E34362B5B}" type="datetime1">
               <a:rPr lang="en-US" smtClean="0"/>
-              <a:t>8/24/2021</a:t>
+              <a:t>8/26/2021</a:t>
             </a:fld>
             <a:endParaRPr lang="en-US" dirty="0"/>
           </a:p>
@@ -9126,7 +11002,7 @@
           <a:p>
             <a:fld id="{BAAAC38D-0552-4C82-B593-E6124DFADBE2}" type="datetime1">
               <a:rPr lang="en-US" smtClean="0"/>
-              <a:t>8/24/2021</a:t>
+              <a:t>8/26/2021</a:t>
             </a:fld>
             <a:endParaRPr lang="en-US" dirty="0"/>
           </a:p>
@@ -9523,7 +11399,7 @@
           <a:p>
             <a:fld id="{D9DF0F1C-5577-4ACB-BB62-DF8F3C494C7E}" type="datetime1">
               <a:rPr lang="en-US" smtClean="0"/>
-              <a:t>8/24/2021</a:t>
+              <a:t>8/26/2021</a:t>
             </a:fld>
             <a:endParaRPr lang="en-US" dirty="0"/>
           </a:p>
@@ -9659,7 +11535,7 @@
           <a:p>
             <a:fld id="{1775B394-D9F9-4F0C-B15D-605F45CB9E9F}" type="datetime1">
               <a:rPr lang="en-US" smtClean="0"/>
-              <a:t>8/24/2021</a:t>
+              <a:t>8/26/2021</a:t>
             </a:fld>
             <a:endParaRPr lang="en-US" dirty="0"/>
           </a:p>
@@ -9816,7 +11692,7 @@
           <a:p>
             <a:fld id="{39667345-2558-425A-8533-9BFDBCE15005}" type="datetime1">
               <a:rPr lang="en-US" smtClean="0"/>
-              <a:t>8/24/2021</a:t>
+              <a:t>8/26/2021</a:t>
             </a:fld>
             <a:endParaRPr lang="en-US" dirty="0"/>
           </a:p>
@@ -10145,7 +12021,7 @@
           <a:p>
             <a:fld id="{92BEA474-078D-4E9B-9B14-09A87B19DC46}" type="datetime1">
               <a:rPr lang="en-US" smtClean="0"/>
-              <a:t>8/24/2021</a:t>
+              <a:t>8/26/2021</a:t>
             </a:fld>
             <a:endParaRPr lang="en-US" dirty="0"/>
           </a:p>
@@ -10495,7 +12371,7 @@
           <a:p>
             <a:fld id="{4907D986-8816-4272-A432-0437A28A9828}" type="datetime1">
               <a:rPr lang="en-US" smtClean="0"/>
-              <a:t>8/24/2021</a:t>
+              <a:t>8/26/2021</a:t>
             </a:fld>
             <a:endParaRPr lang="en-US" dirty="0"/>
           </a:p>
@@ -10756,7 +12632,7 @@
           <a:p>
             <a:fld id="{62D6E202-B606-4609-B914-27C9371A1F6D}" type="datetime1">
               <a:rPr lang="en-US" smtClean="0"/>
-              <a:t>8/24/2021</a:t>
+              <a:t>8/26/2021</a:t>
             </a:fld>
             <a:endParaRPr lang="en-US" dirty="0"/>
           </a:p>
@@ -11682,13 +13558,13 @@
   <p:clrMapOvr>
     <a:masterClrMapping/>
   </p:clrMapOvr>
-  <mc:AlternateContent xmlns:mc="http://schemas.openxmlformats.org/markup-compatibility/2006">
-    <mc:Choice xmlns:p14="http://schemas.microsoft.com/office/powerpoint/2010/main" Requires="p14">
+  <mc:AlternateContent xmlns:mc="http://schemas.openxmlformats.org/markup-compatibility/2006" xmlns:p14="http://schemas.microsoft.com/office/powerpoint/2010/main">
+    <mc:Choice Requires="p14">
       <p:transition spd="slow" p14:dur="3400">
         <p14:reveal/>
       </p:transition>
     </mc:Choice>
-    <mc:Fallback>
+    <mc:Fallback xmlns="">
       <p:transition spd="slow">
         <p:fade/>
       </p:transition>
@@ -17918,13 +19794,13 @@
   <p:clrMapOvr>
     <a:masterClrMapping/>
   </p:clrMapOvr>
-  <mc:AlternateContent xmlns:mc="http://schemas.openxmlformats.org/markup-compatibility/2006">
-    <mc:Choice xmlns:p14="http://schemas.microsoft.com/office/powerpoint/2010/main" Requires="p14">
+  <mc:AlternateContent xmlns:mc="http://schemas.openxmlformats.org/markup-compatibility/2006" xmlns:p14="http://schemas.microsoft.com/office/powerpoint/2010/main">
+    <mc:Choice Requires="p14">
       <p:transition spd="slow" p14:dur="3400">
         <p14:reveal/>
       </p:transition>
     </mc:Choice>
-    <mc:Fallback>
+    <mc:Fallback xmlns="">
       <p:transition spd="slow">
         <p:fade/>
       </p:transition>
@@ -18496,13 +20372,13 @@
   <p:clrMapOvr>
     <a:masterClrMapping/>
   </p:clrMapOvr>
-  <mc:AlternateContent xmlns:mc="http://schemas.openxmlformats.org/markup-compatibility/2006">
-    <mc:Choice xmlns:p14="http://schemas.microsoft.com/office/powerpoint/2010/main" Requires="p14">
+  <mc:AlternateContent xmlns:mc="http://schemas.openxmlformats.org/markup-compatibility/2006" xmlns:p14="http://schemas.microsoft.com/office/powerpoint/2010/main">
+    <mc:Choice Requires="p14">
       <p:transition spd="slow" p14:dur="3400">
         <p14:reveal/>
       </p:transition>
     </mc:Choice>
-    <mc:Fallback>
+    <mc:Fallback xmlns="">
       <p:transition spd="slow">
         <p:fade/>
       </p:transition>
@@ -19327,13 +21203,13 @@
   <p:clrMapOvr>
     <a:masterClrMapping/>
   </p:clrMapOvr>
-  <mc:AlternateContent xmlns:mc="http://schemas.openxmlformats.org/markup-compatibility/2006">
-    <mc:Choice xmlns:p14="http://schemas.microsoft.com/office/powerpoint/2010/main" Requires="p14">
+  <mc:AlternateContent xmlns:mc="http://schemas.openxmlformats.org/markup-compatibility/2006" xmlns:p14="http://schemas.microsoft.com/office/powerpoint/2010/main">
+    <mc:Choice Requires="p14">
       <p:transition spd="med" p14:dur="700">
         <p:fade/>
       </p:transition>
     </mc:Choice>
-    <mc:Fallback>
+    <mc:Fallback xmlns="">
       <p:transition spd="med">
         <p:fade/>
       </p:transition>
@@ -19950,7 +21826,7 @@
         <p:spPr>
           <a:xfrm>
             <a:off x="1097280" y="286603"/>
-            <a:ext cx="10058400" cy="1450757"/>
+            <a:ext cx="10058400" cy="1410117"/>
           </a:xfrm>
         </p:spPr>
         <p:txBody>
@@ -19961,88 +21837,85 @@
           <a:p>
             <a:r>
               <a:rPr lang="en-US" dirty="0"/>
-              <a:t>Genre</a:t>
+              <a:t>Genre Overview &amp; Analysis</a:t>
             </a:r>
           </a:p>
         </p:txBody>
       </p:sp>
-      <p:sp>
-        <p:nvSpPr>
-          <p:cNvPr id="8" name="Content Placeholder 2">
+      <p:graphicFrame>
+        <p:nvGraphicFramePr>
+          <p:cNvPr id="9" name="Content Placeholder 8">
             <a:extLst>
               <a:ext uri="{FF2B5EF4-FFF2-40B4-BE49-F238E27FC236}">
-                <a16:creationId xmlns:a16="http://schemas.microsoft.com/office/drawing/2014/main" id="{6F565426-6231-474B-A207-FBBB20774806}"/>
+                <a16:creationId xmlns:a16="http://schemas.microsoft.com/office/drawing/2014/main" id="{8ECEE149-D640-4E71-BE1A-96368AB03288}"/>
               </a:ext>
             </a:extLst>
           </p:cNvPr>
-          <p:cNvSpPr>
-            <a:spLocks noGrp="1"/>
-          </p:cNvSpPr>
+          <p:cNvGraphicFramePr>
+            <a:graphicFrameLocks noGrp="1"/>
+          </p:cNvGraphicFramePr>
+          <p:nvPr>
+            <p:ph sz="half" idx="2"/>
+            <p:extLst>
+              <p:ext uri="{D42A27DB-BD31-4B8C-83A1-F6EECF244321}">
+                <p14:modId xmlns:p14="http://schemas.microsoft.com/office/powerpoint/2010/main" val="926910576"/>
+              </p:ext>
+            </p:extLst>
+          </p:nvPr>
+        </p:nvGraphicFramePr>
+        <p:xfrm>
+          <a:off x="6454777" y="2042160"/>
+          <a:ext cx="5219065" cy="3826828"/>
+        </p:xfrm>
+        <a:graphic>
+          <a:graphicData uri="http://schemas.openxmlformats.org/drawingml/2006/chart">
+            <c:chart xmlns:c="http://schemas.openxmlformats.org/drawingml/2006/chart" xmlns:r="http://schemas.openxmlformats.org/officeDocument/2006/relationships" r:id="rId2"/>
+          </a:graphicData>
+        </a:graphic>
+      </p:graphicFrame>
+      <p:graphicFrame>
+        <p:nvGraphicFramePr>
+          <p:cNvPr id="10" name="Content Placeholder 9">
+            <a:extLst>
+              <a:ext uri="{FF2B5EF4-FFF2-40B4-BE49-F238E27FC236}">
+                <a16:creationId xmlns:a16="http://schemas.microsoft.com/office/drawing/2014/main" id="{C44CE5A1-E62D-4325-BDBD-4C2A5075353C}"/>
+              </a:ext>
+            </a:extLst>
+          </p:cNvPr>
+          <p:cNvGraphicFramePr>
+            <a:graphicFrameLocks noGrp="1"/>
+          </p:cNvGraphicFramePr>
           <p:nvPr>
             <p:ph sz="half" idx="1"/>
           </p:nvPr>
-        </p:nvSpPr>
-        <p:spPr>
-          <a:xfrm>
-            <a:off x="1097280" y="2120900"/>
-            <a:ext cx="4639736" cy="3748193"/>
-          </a:xfrm>
-        </p:spPr>
-        <p:txBody>
-          <a:bodyPr/>
-          <a:lstStyle/>
-          <a:p>
-            <a:endParaRPr lang="en-US"/>
-          </a:p>
-        </p:txBody>
-      </p:sp>
-      <p:sp>
-        <p:nvSpPr>
-          <p:cNvPr id="10" name="Content Placeholder 3">
-            <a:extLst>
-              <a:ext uri="{FF2B5EF4-FFF2-40B4-BE49-F238E27FC236}">
-                <a16:creationId xmlns:a16="http://schemas.microsoft.com/office/drawing/2014/main" id="{035EF7DF-CBF4-4A6F-8986-F2691A0461B1}"/>
-              </a:ext>
-            </a:extLst>
-          </p:cNvPr>
-          <p:cNvSpPr>
-            <a:spLocks noGrp="1"/>
-          </p:cNvSpPr>
-          <p:nvPr>
-            <p:ph sz="half" idx="2"/>
-          </p:nvPr>
-        </p:nvSpPr>
-        <p:spPr>
-          <a:xfrm>
-            <a:off x="6515944" y="2120900"/>
-            <a:ext cx="4639736" cy="3748194"/>
-          </a:xfrm>
-        </p:spPr>
-        <p:txBody>
-          <a:bodyPr/>
-          <a:lstStyle/>
-          <a:p>
-            <a:endParaRPr lang="en-US"/>
-          </a:p>
-        </p:txBody>
-      </p:sp>
+        </p:nvGraphicFramePr>
+        <p:xfrm>
+          <a:off x="518160" y="2120900"/>
+          <a:ext cx="5219065" cy="3748088"/>
+        </p:xfrm>
+        <a:graphic>
+          <a:graphicData uri="http://schemas.openxmlformats.org/drawingml/2006/chart">
+            <c:chart xmlns:c="http://schemas.openxmlformats.org/drawingml/2006/chart" xmlns:r="http://schemas.openxmlformats.org/officeDocument/2006/relationships" r:id="rId3"/>
+          </a:graphicData>
+        </a:graphic>
+      </p:graphicFrame>
     </p:spTree>
     <p:extLst>
       <p:ext uri="{BB962C8B-B14F-4D97-AF65-F5344CB8AC3E}">
-        <p14:creationId xmlns:p14="http://schemas.microsoft.com/office/powerpoint/2010/main" val="1356297468"/>
+        <p14:creationId xmlns:p14="http://schemas.microsoft.com/office/powerpoint/2010/main" val="488600314"/>
       </p:ext>
     </p:extLst>
   </p:cSld>
   <p:clrMapOvr>
     <a:masterClrMapping/>
   </p:clrMapOvr>
-  <mc:AlternateContent xmlns:mc="http://schemas.openxmlformats.org/markup-compatibility/2006">
-    <mc:Choice xmlns:p14="http://schemas.microsoft.com/office/powerpoint/2010/main" Requires="p14">
+  <mc:AlternateContent xmlns:mc="http://schemas.openxmlformats.org/markup-compatibility/2006" xmlns:p14="http://schemas.microsoft.com/office/powerpoint/2010/main">
+    <mc:Choice Requires="p14">
       <p:transition spd="slow" p14:dur="3400">
         <p14:reveal/>
       </p:transition>
     </mc:Choice>
-    <mc:Fallback>
+    <mc:Fallback xmlns="">
       <p:transition spd="slow">
         <p:fade/>
       </p:transition>
@@ -20175,13 +22048,13 @@
   <p:clrMapOvr>
     <a:masterClrMapping/>
   </p:clrMapOvr>
-  <mc:AlternateContent xmlns:mc="http://schemas.openxmlformats.org/markup-compatibility/2006">
-    <mc:Choice xmlns:p14="http://schemas.microsoft.com/office/powerpoint/2010/main" Requires="p14">
+  <mc:AlternateContent xmlns:mc="http://schemas.openxmlformats.org/markup-compatibility/2006" xmlns:p14="http://schemas.microsoft.com/office/powerpoint/2010/main">
+    <mc:Choice Requires="p14">
       <p:transition spd="slow" p14:dur="3400">
         <p14:reveal/>
       </p:transition>
     </mc:Choice>
-    <mc:Fallback>
+    <mc:Fallback xmlns="">
       <p:transition spd="slow">
         <p:fade/>
       </p:transition>

</xml_diff>